<commit_message>
poster changed, functionchanged omitted the ring chain
</commit_message>
<xml_diff>
--- a/Documents/epigenetic workshop/Poster.pptx
+++ b/Documents/epigenetic workshop/Poster.pptx
@@ -104,6 +104,11 @@
       </a:defRPr>
     </a:lvl9pPr>
   </p:defaultTextStyle>
+  <p:extLst>
+    <p:ext uri="{EFAFB233-063F-42B5-8137-9DF3F51BA10A}">
+      <p15:sldGuideLst xmlns:p15="http://schemas.microsoft.com/office/powerpoint/2012/main"/>
+    </p:ext>
+  </p:extLst>
 </p:presentation>
 </file>
 
@@ -238,7 +243,7 @@
           <a:p>
             <a:fld id="{00271780-4C30-459F-9B60-DDDABA3AB087}" type="datetimeFigureOut">
               <a:rPr lang="en-US" smtClean="0"/>
-              <a:t>3/5/2015</a:t>
+              <a:t>3/10/2015</a:t>
             </a:fld>
             <a:endParaRPr lang="en-US"/>
           </a:p>
@@ -415,7 +420,7 @@
           <a:p>
             <a:fld id="{00271780-4C30-459F-9B60-DDDABA3AB087}" type="datetimeFigureOut">
               <a:rPr lang="en-US" smtClean="0"/>
-              <a:t>3/5/2015</a:t>
+              <a:t>3/10/2015</a:t>
             </a:fld>
             <a:endParaRPr lang="en-US"/>
           </a:p>
@@ -595,7 +600,7 @@
           <a:p>
             <a:fld id="{00271780-4C30-459F-9B60-DDDABA3AB087}" type="datetimeFigureOut">
               <a:rPr lang="en-US" smtClean="0"/>
-              <a:t>3/5/2015</a:t>
+              <a:t>3/10/2015</a:t>
             </a:fld>
             <a:endParaRPr lang="en-US"/>
           </a:p>
@@ -765,7 +770,7 @@
           <a:p>
             <a:fld id="{00271780-4C30-459F-9B60-DDDABA3AB087}" type="datetimeFigureOut">
               <a:rPr lang="en-US" smtClean="0"/>
-              <a:t>3/5/2015</a:t>
+              <a:t>3/10/2015</a:t>
             </a:fld>
             <a:endParaRPr lang="en-US"/>
           </a:p>
@@ -1009,7 +1014,7 @@
           <a:p>
             <a:fld id="{00271780-4C30-459F-9B60-DDDABA3AB087}" type="datetimeFigureOut">
               <a:rPr lang="en-US" smtClean="0"/>
-              <a:t>3/5/2015</a:t>
+              <a:t>3/10/2015</a:t>
             </a:fld>
             <a:endParaRPr lang="en-US"/>
           </a:p>
@@ -1241,7 +1246,7 @@
           <a:p>
             <a:fld id="{00271780-4C30-459F-9B60-DDDABA3AB087}" type="datetimeFigureOut">
               <a:rPr lang="en-US" smtClean="0"/>
-              <a:t>3/5/2015</a:t>
+              <a:t>3/10/2015</a:t>
             </a:fld>
             <a:endParaRPr lang="en-US"/>
           </a:p>
@@ -1608,7 +1613,7 @@
           <a:p>
             <a:fld id="{00271780-4C30-459F-9B60-DDDABA3AB087}" type="datetimeFigureOut">
               <a:rPr lang="en-US" smtClean="0"/>
-              <a:t>3/5/2015</a:t>
+              <a:t>3/10/2015</a:t>
             </a:fld>
             <a:endParaRPr lang="en-US"/>
           </a:p>
@@ -1726,7 +1731,7 @@
           <a:p>
             <a:fld id="{00271780-4C30-459F-9B60-DDDABA3AB087}" type="datetimeFigureOut">
               <a:rPr lang="en-US" smtClean="0"/>
-              <a:t>3/5/2015</a:t>
+              <a:t>3/10/2015</a:t>
             </a:fld>
             <a:endParaRPr lang="en-US"/>
           </a:p>
@@ -1821,7 +1826,7 @@
           <a:p>
             <a:fld id="{00271780-4C30-459F-9B60-DDDABA3AB087}" type="datetimeFigureOut">
               <a:rPr lang="en-US" smtClean="0"/>
-              <a:t>3/5/2015</a:t>
+              <a:t>3/10/2015</a:t>
             </a:fld>
             <a:endParaRPr lang="en-US"/>
           </a:p>
@@ -2098,7 +2103,7 @@
           <a:p>
             <a:fld id="{00271780-4C30-459F-9B60-DDDABA3AB087}" type="datetimeFigureOut">
               <a:rPr lang="en-US" smtClean="0"/>
-              <a:t>3/5/2015</a:t>
+              <a:t>3/10/2015</a:t>
             </a:fld>
             <a:endParaRPr lang="en-US"/>
           </a:p>
@@ -2355,7 +2360,7 @@
           <a:p>
             <a:fld id="{00271780-4C30-459F-9B60-DDDABA3AB087}" type="datetimeFigureOut">
               <a:rPr lang="en-US" smtClean="0"/>
-              <a:t>3/5/2015</a:t>
+              <a:t>3/10/2015</a:t>
             </a:fld>
             <a:endParaRPr lang="en-US"/>
           </a:p>
@@ -2568,7 +2573,7 @@
           <a:p>
             <a:fld id="{00271780-4C30-459F-9B60-DDDABA3AB087}" type="datetimeFigureOut">
               <a:rPr lang="en-US" smtClean="0"/>
-              <a:t>3/5/2015</a:t>
+              <a:t>3/10/2015</a:t>
             </a:fld>
             <a:endParaRPr lang="en-US"/>
           </a:p>
@@ -3018,13 +3023,8 @@
             </a:r>
             <a:r>
               <a:rPr lang="en-US" dirty="0" smtClean="0"/>
-              <a:t> encounter frequency </a:t>
-            </a:r>
-            <a:r>
-              <a:rPr lang="en-US" dirty="0" smtClean="0"/>
-              <a:t>maps </a:t>
-            </a:r>
-            <a:endParaRPr lang="en-US" dirty="0" smtClean="0"/>
+              <a:t> encounter frequency maps </a:t>
+            </a:r>
           </a:p>
           <a:p>
             <a:pPr algn="ctr"/>
@@ -3089,7 +3089,11 @@
             </a:r>
             <a:r>
               <a:rPr lang="en-US" sz="4800" dirty="0" smtClean="0"/>
-              <a:t>, 46 rue, </a:t>
+              <a:t>, 46 </a:t>
+            </a:r>
+            <a:r>
+              <a:rPr lang="en-US" sz="4800" dirty="0" smtClean="0"/>
+              <a:t>rue </a:t>
             </a:r>
             <a:r>
               <a:rPr lang="en-US" sz="4800" dirty="0" err="1" smtClean="0"/>
@@ -3142,7 +3146,7 @@
         <p:spPr>
           <a:xfrm>
             <a:off x="0" y="2405146"/>
-            <a:ext cx="9350478" cy="23131973"/>
+            <a:ext cx="9350478" cy="26825292"/>
           </a:xfrm>
           <a:prstGeom prst="rect">
             <a:avLst/>
@@ -3166,7 +3170,19 @@
             </a:r>
             <a:r>
               <a:rPr lang="en-US" sz="4000" dirty="0" smtClean="0"/>
-              <a:t>: Reconstruct the local polymer structure using </a:t>
+              <a:t>: </a:t>
+            </a:r>
+            <a:r>
+              <a:rPr lang="en-US" sz="4000" dirty="0" smtClean="0"/>
+              <a:t>1. Reconstruct </a:t>
+            </a:r>
+            <a:r>
+              <a:rPr lang="en-US" sz="4000" dirty="0" smtClean="0"/>
+              <a:t>the local polymer </a:t>
+            </a:r>
+            <a:r>
+              <a:rPr lang="en-US" sz="4000" dirty="0" smtClean="0"/>
+              <a:t>architecture using </a:t>
             </a:r>
             <a:r>
               <a:rPr lang="en-US" sz="4000" dirty="0" err="1" smtClean="0"/>
@@ -3174,16 +3190,49 @@
             </a:r>
             <a:r>
               <a:rPr lang="en-US" sz="4000" dirty="0" smtClean="0"/>
-              <a:t> encounter frequencies, to find the encounter time distribution and Mean </a:t>
-            </a:r>
-            <a:r>
-              <a:rPr lang="en-US" sz="4000" dirty="0" smtClean="0"/>
-              <a:t>First Passage time (</a:t>
-            </a:r>
-            <a:r>
-              <a:rPr lang="en-US" sz="4000" dirty="0" smtClean="0"/>
-              <a:t>MFPT) for different parts of a polymer in a dynamic and cross-linked structure</a:t>
-            </a:r>
+              <a:t> encounter </a:t>
+            </a:r>
+            <a:r>
+              <a:rPr lang="en-US" sz="4000" dirty="0" smtClean="0"/>
+              <a:t>frequency maps; 2. Study the dynamic properties of the resulting structure ,such as the </a:t>
+            </a:r>
+            <a:r>
+              <a:rPr lang="en-US" sz="4000" dirty="0" smtClean="0"/>
+              <a:t>encounter time distribution and Mean First </a:t>
+            </a:r>
+            <a:r>
+              <a:rPr lang="en-US" sz="4000" dirty="0" smtClean="0"/>
+              <a:t>encounter time </a:t>
+            </a:r>
+            <a:r>
+              <a:rPr lang="en-US" sz="4000" dirty="0" smtClean="0"/>
+              <a:t>(</a:t>
+            </a:r>
+            <a:r>
+              <a:rPr lang="en-US" sz="4000" dirty="0" smtClean="0"/>
+              <a:t>MFET</a:t>
+            </a:r>
+            <a:r>
+              <a:rPr lang="en-US" sz="4000" dirty="0" smtClean="0"/>
+              <a:t>) </a:t>
+            </a:r>
+            <a:r>
+              <a:rPr lang="en-US" sz="4000" dirty="0" smtClean="0"/>
+              <a:t>between </a:t>
+            </a:r>
+            <a:r>
+              <a:rPr lang="en-US" sz="4000" dirty="0" smtClean="0"/>
+              <a:t>different </a:t>
+            </a:r>
+            <a:r>
+              <a:rPr lang="en-US" sz="4000" dirty="0" smtClean="0"/>
+              <a:t>parts of a </a:t>
+            </a:r>
+            <a:r>
+              <a:rPr lang="en-US" sz="4000" dirty="0" smtClean="0"/>
+              <a:t>polymer.</a:t>
+            </a:r>
+            <a:endParaRPr lang="en-US" sz="4000" dirty="0" smtClean="0"/>
           </a:p>
           <a:p>
             <a:endParaRPr lang="en-US" sz="4000" dirty="0" smtClean="0"/>
@@ -3195,13 +3244,34 @@
             </a:r>
             <a:r>
               <a:rPr lang="en-US" sz="4000" dirty="0" smtClean="0"/>
-              <a:t>: Transform static encounter map to an average structure, which captures salient features in the chromosome microstructure.</a:t>
-            </a:r>
-          </a:p>
-          <a:p>
-            <a:r>
-              <a:rPr lang="en-US" sz="4000" dirty="0" smtClean="0"/>
-              <a:t>Allowing examination of the polymer behavior in various scenarios. </a:t>
+              <a:t>: </a:t>
+            </a:r>
+            <a:r>
+              <a:rPr lang="en-US" sz="4000" dirty="0" smtClean="0"/>
+              <a:t>Providing a tool to transform </a:t>
+            </a:r>
+            <a:r>
+              <a:rPr lang="en-US" sz="4000" dirty="0" smtClean="0"/>
+              <a:t>static encounter map to an average structure, which captures salient features in the chromosome </a:t>
+            </a:r>
+            <a:r>
+              <a:rPr lang="en-US" sz="4000" dirty="0" smtClean="0"/>
+              <a:t>microstructure</a:t>
+            </a:r>
+            <a:endParaRPr lang="en-US" sz="4000" dirty="0" smtClean="0"/>
+          </a:p>
+          <a:p>
+            <a:r>
+              <a:rPr lang="en-US" sz="4000" dirty="0" smtClean="0"/>
+              <a:t>A</a:t>
+            </a:r>
+            <a:r>
+              <a:rPr lang="en-US" sz="4000" dirty="0" smtClean="0"/>
+              <a:t>llows the </a:t>
+            </a:r>
+            <a:r>
+              <a:rPr lang="en-US" sz="4000" dirty="0" smtClean="0"/>
+              <a:t>examination of the polymer behavior in various scenarios. </a:t>
             </a:r>
           </a:p>
           <a:p>
@@ -3223,7 +3293,15 @@
             </a:r>
             <a:r>
               <a:rPr lang="en-US" sz="4000" dirty="0" smtClean="0"/>
-              <a:t> allows simultaneous capturing of many looping events of the chromosome. </a:t>
+              <a:t> </a:t>
+            </a:r>
+            <a:r>
+              <a:rPr lang="en-US" sz="4000" dirty="0" smtClean="0"/>
+              <a:t>experiment simultaneously captures millions of looping </a:t>
+            </a:r>
+            <a:r>
+              <a:rPr lang="en-US" sz="4000" dirty="0" smtClean="0"/>
+              <a:t>events of the chromosome. </a:t>
             </a:r>
           </a:p>
           <a:p>
@@ -3248,8 +3326,15 @@
             </a:r>
             <a:r>
               <a:rPr lang="en-US" sz="4000" dirty="0" smtClean="0"/>
-              <a:t> inactivation center,</a:t>
-            </a:r>
+              <a:t> inactivation center</a:t>
+            </a:r>
+            <a:r>
+              <a:rPr lang="en-US" sz="4000" dirty="0" smtClean="0"/>
+              <a:t>, however the actual architecture in a specific stage is unknown </a:t>
+            </a:r>
+          </a:p>
+          <a:p>
+            <a:endParaRPr lang="en-US" sz="4000" dirty="0" smtClean="0"/>
           </a:p>
           <a:p>
             <a:r>
@@ -3279,7 +3364,23 @@
             </a:r>
             <a:r>
               <a:rPr lang="en-US" sz="4000" dirty="0" smtClean="0"/>
-              <a:t>: As a proof of principle for our method we analyze 1Mb region of the X-inactivation center , provided by </a:t>
+              <a:t>: </a:t>
+            </a:r>
+            <a:r>
+              <a:rPr lang="en-US" sz="4000" dirty="0" smtClean="0"/>
+              <a:t>we a subset of  ~1Mb </a:t>
+            </a:r>
+            <a:r>
+              <a:rPr lang="en-US" sz="4000" dirty="0" smtClean="0"/>
+              <a:t>region of the </a:t>
+            </a:r>
+            <a:r>
+              <a:rPr lang="en-US" sz="4000" dirty="0" smtClean="0"/>
+              <a:t>X-chromosome around the X- inactivation </a:t>
+            </a:r>
+            <a:r>
+              <a:rPr lang="en-US" sz="4000" dirty="0" smtClean="0"/>
+              <a:t>center , provided by </a:t>
             </a:r>
             <a:r>
               <a:rPr lang="en-US" sz="4000" dirty="0" err="1" smtClean="0"/>
@@ -3291,6 +3392,10 @@
             </a:r>
           </a:p>
           <a:p>
+            <a:r>
+              <a:rPr lang="en-US" sz="4000" dirty="0" smtClean="0"/>
+              <a:t>A coarse graining of the polymer into segments of 3kb and mapping the encounters onto it.</a:t>
+            </a:r>
             <a:endParaRPr lang="en-US" sz="4000" dirty="0" smtClean="0"/>
           </a:p>
           <a:p>
@@ -3316,7 +3421,7 @@
         <p:spPr>
           <a:xfrm>
             <a:off x="9350478" y="2405146"/>
-            <a:ext cx="10117395" cy="28407777"/>
+            <a:ext cx="10117395" cy="29023330"/>
           </a:xfrm>
           <a:prstGeom prst="rect">
             <a:avLst/>
@@ -3346,7 +3451,23 @@
             </a:r>
             <a:r>
               <a:rPr lang="en-US" sz="4000" dirty="0" smtClean="0"/>
-              <a:t> assuming a Rouse model, map encounter signal into part of loops and chains. </a:t>
+              <a:t> </a:t>
+            </a:r>
+            <a:r>
+              <a:rPr lang="en-US" sz="4000" dirty="0" smtClean="0"/>
+              <a:t>We start by assuming </a:t>
+            </a:r>
+            <a:r>
+              <a:rPr lang="en-US" sz="4000" dirty="0" smtClean="0"/>
+              <a:t>a Rouse </a:t>
+            </a:r>
+            <a:r>
+              <a:rPr lang="en-US" sz="4000" dirty="0" smtClean="0"/>
+              <a:t>model describing the polymer, </a:t>
+            </a:r>
+            <a:r>
+              <a:rPr lang="en-US" sz="4000" dirty="0" smtClean="0"/>
+              <a:t>map encounter signal into part of loops and chains. </a:t>
             </a:r>
           </a:p>
           <a:p>
@@ -3370,7 +3491,15 @@
             </a:r>
             <a:r>
               <a:rPr lang="en-US" sz="4000" dirty="0" smtClean="0"/>
-              <a:t>) encounters were mapped onto beads. Resulting in 307 beads. </a:t>
+              <a:t>) encounters were mapped onto beads. Resulting in </a:t>
+            </a:r>
+            <a:r>
+              <a:rPr lang="en-US" sz="4000" dirty="0" smtClean="0"/>
+              <a:t>a polymer of 307 </a:t>
+            </a:r>
+            <a:r>
+              <a:rPr lang="en-US" sz="4000" dirty="0" smtClean="0"/>
+              <a:t>beads. </a:t>
             </a:r>
           </a:p>
           <a:p>
@@ -3379,6 +3508,15 @@
           <a:p>
             <a:r>
               <a:rPr lang="en-US" sz="4000" dirty="0" smtClean="0"/>
+              <a:t>Signals are noisy </a:t>
+            </a:r>
+          </a:p>
+          <a:p>
+            <a:endParaRPr lang="en-US" sz="4000" dirty="0" smtClean="0"/>
+          </a:p>
+          <a:p>
+            <a:r>
+              <a:rPr lang="en-US" sz="4000" dirty="0" smtClean="0"/>
               <a:t>Interpolate zero values in the signal </a:t>
             </a:r>
           </a:p>
@@ -3388,13 +3526,50 @@
           <a:p>
             <a:r>
               <a:rPr lang="en-US" sz="4000" dirty="0" smtClean="0"/>
-              <a:t>Smoothing using Bilateral filter to preserve information carried by the peaks </a:t>
-            </a:r>
-          </a:p>
-          <a:p>
-            <a:r>
-              <a:rPr lang="en-US" sz="4000" dirty="0" smtClean="0"/>
-              <a:t>Provisional ideas: the encounter probability of the Rouse chain behaves like the diffusion (heat) equation, it is therefore natural to smooth the encounter curve using the diffusion equation. To account for the peaks we have to find an unknown source. We arrive at the inverse heat equation. Finding the source then allows us to smooth the curve with analytical formulas.[add image]</a:t>
+              <a:t>The </a:t>
+            </a:r>
+            <a:r>
+              <a:rPr lang="en-US" sz="4000" dirty="0" smtClean="0"/>
+              <a:t>encounter probability of the Rouse chain behaves like the diffusion (heat) equation, it is therefore natural to smooth the encounter curve using the diffusion equation. To account for the peaks we have to find an </a:t>
+            </a:r>
+            <a:r>
+              <a:rPr lang="en-US" sz="4000" dirty="0" smtClean="0"/>
+              <a:t>unknown, time dependent source function r(t). </a:t>
+            </a:r>
+            <a:r>
+              <a:rPr lang="en-US" sz="4000" dirty="0" smtClean="0"/>
+              <a:t>We arrive at the inverse heat equation. Finding the source then allows us to smooth the curve with analytical formulas.[add image]</a:t>
+            </a:r>
+          </a:p>
+          <a:p>
+            <a:endParaRPr lang="en-US" sz="4000" dirty="0" smtClean="0"/>
+          </a:p>
+          <a:p>
+            <a:r>
+              <a:rPr lang="en-US" sz="4000" dirty="0" smtClean="0"/>
+              <a:t>break the encounter signals into regions of loops and chain [ add image]</a:t>
+            </a:r>
+          </a:p>
+          <a:p>
+            <a:endParaRPr lang="en-US" sz="4000" dirty="0" smtClean="0"/>
+          </a:p>
+          <a:p>
+            <a:r>
+              <a:rPr lang="en-US" sz="4000" dirty="0" smtClean="0"/>
+              <a:t>Resulting structure can now be fitted with encounter probability functions, assuming Rouse model </a:t>
+            </a:r>
+          </a:p>
+          <a:p>
+            <a:endParaRPr lang="en-US" sz="4000" dirty="0" smtClean="0"/>
+          </a:p>
+          <a:p>
+            <a:r>
+              <a:rPr lang="en-US" sz="4000" dirty="0" smtClean="0"/>
+              <a:t>Find an agreement </a:t>
+            </a:r>
+            <a:r>
+              <a:rPr lang="en-US" sz="4000" dirty="0" smtClean="0"/>
+              <a:t>between the loop location in various signals by probabilistic model</a:t>
             </a:r>
           </a:p>
           <a:p>
@@ -3403,52 +3578,7 @@
           <a:p>
             <a:r>
               <a:rPr lang="en-US" sz="4000" dirty="0" smtClean="0"/>
-              <a:t>Peak finding/ peak calling [consider removing]</a:t>
-            </a:r>
-          </a:p>
-          <a:p>
-            <a:endParaRPr lang="en-US" sz="4000" dirty="0" smtClean="0"/>
-          </a:p>
-          <a:p>
-            <a:r>
-              <a:rPr lang="en-US" sz="4000" dirty="0" smtClean="0"/>
-              <a:t>break the encounter signals into regions of loops and chain [ add image]</a:t>
-            </a:r>
-          </a:p>
-          <a:p>
-            <a:endParaRPr lang="en-US" sz="4000" dirty="0" smtClean="0"/>
-          </a:p>
-          <a:p>
-            <a:r>
-              <a:rPr lang="en-US" sz="4000" dirty="0" smtClean="0"/>
-              <a:t>Resulting structure can now be fitted with encounter probability functions, assuming Rouse model </a:t>
-            </a:r>
-          </a:p>
-          <a:p>
-            <a:endParaRPr lang="en-US" sz="4000" dirty="0" smtClean="0"/>
-          </a:p>
-          <a:p>
-            <a:r>
-              <a:rPr lang="en-US" sz="4000" dirty="0" smtClean="0"/>
-              <a:t>Agreement between the loop location in various signals by probabilistic model</a:t>
-            </a:r>
-          </a:p>
-          <a:p>
-            <a:endParaRPr lang="en-US" sz="4000" dirty="0"/>
-          </a:p>
-          <a:p>
-            <a:r>
-              <a:rPr lang="en-US" sz="4000" dirty="0" smtClean="0"/>
               <a:t>Reconstruction</a:t>
-            </a:r>
-          </a:p>
-          <a:p>
-            <a:endParaRPr lang="en-US" sz="4000" dirty="0" smtClean="0"/>
-          </a:p>
-          <a:p>
-            <a:r>
-              <a:rPr lang="en-US" sz="4000" dirty="0" smtClean="0"/>
-              <a:t>Adjusting the spring constant for peaks higher than nearest neighbor </a:t>
             </a:r>
           </a:p>
           <a:p>
@@ -3474,8 +3604,30 @@
             </a:r>
             <a:r>
               <a:rPr lang="en-US" sz="4000" dirty="0" smtClean="0"/>
-              <a:t> maps</a:t>
-            </a:r>
+              <a:t> </a:t>
+            </a:r>
+            <a:r>
+              <a:rPr lang="en-US" sz="4000" dirty="0" smtClean="0"/>
+              <a:t>maps</a:t>
+            </a:r>
+          </a:p>
+          <a:p>
+            <a:endParaRPr lang="en-US" sz="4000" dirty="0"/>
+          </a:p>
+          <a:p>
+            <a:r>
+              <a:rPr lang="en-US" sz="4000" dirty="0"/>
+              <a:t>TODO:</a:t>
+            </a:r>
+          </a:p>
+          <a:p>
+            <a:r>
+              <a:rPr lang="en-US" sz="4000" dirty="0"/>
+              <a:t>Adjusting the spring constant for peaks higher than nearest neighbor </a:t>
+            </a:r>
+          </a:p>
+          <a:p>
+            <a:endParaRPr lang="en-US" sz="4000" dirty="0" smtClean="0"/>
           </a:p>
           <a:p>
             <a:endParaRPr lang="en-US" sz="4000" dirty="0"/>
@@ -3494,7 +3646,7 @@
         <p:spPr>
           <a:xfrm>
             <a:off x="19467873" y="2405146"/>
-            <a:ext cx="9488127" cy="5016758"/>
+            <a:ext cx="9488127" cy="3785652"/>
           </a:xfrm>
           <a:prstGeom prst="rect">
             <a:avLst/>
@@ -3514,12 +3666,6 @@
                 </a:solidFill>
               </a:rPr>
               <a:t>Preliminary Results:</a:t>
-            </a:r>
-          </a:p>
-          <a:p>
-            <a:r>
-              <a:rPr lang="en-US" sz="4000" dirty="0" smtClean="0"/>
-              <a:t>The resulting structure have not yet been analyzed, simulation are underway.</a:t>
             </a:r>
           </a:p>
           <a:p>

</xml_diff>

<commit_message>
poster changed, the class for reconstruction was added several features such as calculating the distribution of nearest neighbor. several fixes were made to the calculation of the encounter probability. Encounter probabilities higher the expected nearest neighbors are now assigned different spring constant
</commit_message>
<xml_diff>
--- a/Documents/epigenetic workshop/Poster.pptx
+++ b/Documents/epigenetic workshop/Poster.pptx
@@ -2,12 +2,12 @@
 <file path=ppt/presentation.xml><?xml version="1.0" encoding="utf-8"?>
 <p:presentation xmlns:a="http://schemas.openxmlformats.org/drawingml/2006/main" xmlns:r="http://schemas.openxmlformats.org/officeDocument/2006/relationships" xmlns:p="http://schemas.openxmlformats.org/presentationml/2006/main" saveSubsetFonts="1">
   <p:sldMasterIdLst>
-    <p:sldMasterId id="2147483660" r:id="rId1"/>
+    <p:sldMasterId id="2147483684" r:id="rId1"/>
   </p:sldMasterIdLst>
   <p:sldIdLst>
     <p:sldId id="256" r:id="rId2"/>
   </p:sldIdLst>
-  <p:sldSz cx="28956000" cy="28498800"/>
+  <p:sldSz cx="39411275" cy="28621038"/>
   <p:notesSz cx="6858000" cy="9144000"/>
   <p:defaultTextStyle>
     <a:defPPr>
@@ -141,15 +141,15 @@
         </p:nvSpPr>
         <p:spPr>
           <a:xfrm>
-            <a:off x="2171700" y="4664042"/>
-            <a:ext cx="24612600" cy="9921804"/>
+            <a:off x="2955846" y="4684047"/>
+            <a:ext cx="33499584" cy="9964361"/>
           </a:xfrm>
         </p:spPr>
         <p:txBody>
           <a:bodyPr anchor="b"/>
           <a:lstStyle>
             <a:lvl1pPr algn="ctr">
-              <a:defRPr sz="19000"/>
+              <a:defRPr sz="25040"/>
             </a:lvl1pPr>
           </a:lstStyle>
           <a:p>
@@ -173,8 +173,8 @@
         </p:nvSpPr>
         <p:spPr>
           <a:xfrm>
-            <a:off x="3619500" y="14968469"/>
-            <a:ext cx="21717000" cy="6880611"/>
+            <a:off x="4926410" y="15032672"/>
+            <a:ext cx="29558456" cy="6910124"/>
           </a:xfrm>
         </p:spPr>
         <p:txBody>
@@ -182,39 +182,39 @@
           <a:lstStyle>
             <a:lvl1pPr marL="0" indent="0" algn="ctr">
               <a:buNone/>
-              <a:defRPr sz="7600"/>
+              <a:defRPr sz="10016"/>
             </a:lvl1pPr>
-            <a:lvl2pPr marL="1447815" indent="0" algn="ctr">
+            <a:lvl2pPr marL="1908078" indent="0" algn="ctr">
               <a:buNone/>
-              <a:defRPr sz="6333"/>
+              <a:defRPr sz="8347"/>
             </a:lvl2pPr>
-            <a:lvl3pPr marL="2895630" indent="0" algn="ctr">
+            <a:lvl3pPr marL="3816157" indent="0" algn="ctr">
               <a:buNone/>
-              <a:defRPr sz="5700"/>
+              <a:defRPr sz="7512"/>
             </a:lvl3pPr>
-            <a:lvl4pPr marL="4343446" indent="0" algn="ctr">
+            <a:lvl4pPr marL="5724235" indent="0" algn="ctr">
               <a:buNone/>
-              <a:defRPr sz="5067"/>
+              <a:defRPr sz="6677"/>
             </a:lvl4pPr>
-            <a:lvl5pPr marL="5791261" indent="0" algn="ctr">
+            <a:lvl5pPr marL="7632314" indent="0" algn="ctr">
               <a:buNone/>
-              <a:defRPr sz="5067"/>
+              <a:defRPr sz="6677"/>
             </a:lvl5pPr>
-            <a:lvl6pPr marL="7239076" indent="0" algn="ctr">
+            <a:lvl6pPr marL="9540392" indent="0" algn="ctr">
               <a:buNone/>
-              <a:defRPr sz="5067"/>
+              <a:defRPr sz="6677"/>
             </a:lvl6pPr>
-            <a:lvl7pPr marL="8686891" indent="0" algn="ctr">
+            <a:lvl7pPr marL="11448471" indent="0" algn="ctr">
               <a:buNone/>
-              <a:defRPr sz="5067"/>
+              <a:defRPr sz="6677"/>
             </a:lvl7pPr>
-            <a:lvl8pPr marL="10134707" indent="0" algn="ctr">
+            <a:lvl8pPr marL="13356549" indent="0" algn="ctr">
               <a:buNone/>
-              <a:defRPr sz="5067"/>
+              <a:defRPr sz="6677"/>
             </a:lvl8pPr>
-            <a:lvl9pPr marL="11582522" indent="0" algn="ctr">
+            <a:lvl9pPr marL="15264628" indent="0" algn="ctr">
               <a:buNone/>
-              <a:defRPr sz="5067"/>
+              <a:defRPr sz="6677"/>
             </a:lvl9pPr>
           </a:lstStyle>
           <a:p>
@@ -294,20 +294,13 @@
     </p:spTree>
     <p:extLst>
       <p:ext uri="{BB962C8B-B14F-4D97-AF65-F5344CB8AC3E}">
-        <p14:creationId xmlns:p14="http://schemas.microsoft.com/office/powerpoint/2010/main" val="2995717559"/>
+        <p14:creationId xmlns:p14="http://schemas.microsoft.com/office/powerpoint/2010/main" val="2523263351"/>
       </p:ext>
     </p:extLst>
   </p:cSld>
   <p:clrMapOvr>
     <a:masterClrMapping/>
   </p:clrMapOvr>
-  <p:timing>
-    <p:tnLst>
-      <p:par>
-        <p:cTn id="1" dur="indefinite" restart="never" nodeType="tmRoot"/>
-      </p:par>
-    </p:tnLst>
-  </p:timing>
 </p:sldLayout>
 </file>
 
@@ -471,7 +464,7 @@
     </p:spTree>
     <p:extLst>
       <p:ext uri="{BB962C8B-B14F-4D97-AF65-F5344CB8AC3E}">
-        <p14:creationId xmlns:p14="http://schemas.microsoft.com/office/powerpoint/2010/main" val="1286032698"/>
+        <p14:creationId xmlns:p14="http://schemas.microsoft.com/office/powerpoint/2010/main" val="812457150"/>
       </p:ext>
     </p:extLst>
   </p:cSld>
@@ -510,8 +503,8 @@
         </p:nvSpPr>
         <p:spPr>
           <a:xfrm>
-            <a:off x="20721639" y="1517297"/>
-            <a:ext cx="6243638" cy="24151416"/>
+            <a:off x="28203696" y="1523805"/>
+            <a:ext cx="8498056" cy="24255007"/>
           </a:xfrm>
         </p:spPr>
         <p:txBody>
@@ -538,8 +531,8 @@
         </p:nvSpPr>
         <p:spPr>
           <a:xfrm>
-            <a:off x="1990726" y="1517297"/>
-            <a:ext cx="18368963" cy="24151416"/>
+            <a:off x="2709527" y="1523805"/>
+            <a:ext cx="25001528" cy="24255007"/>
           </a:xfrm>
         </p:spPr>
         <p:txBody>
@@ -651,7 +644,7 @@
     </p:spTree>
     <p:extLst>
       <p:ext uri="{BB962C8B-B14F-4D97-AF65-F5344CB8AC3E}">
-        <p14:creationId xmlns:p14="http://schemas.microsoft.com/office/powerpoint/2010/main" val="3682149543"/>
+        <p14:creationId xmlns:p14="http://schemas.microsoft.com/office/powerpoint/2010/main" val="4065551402"/>
       </p:ext>
     </p:extLst>
   </p:cSld>
@@ -821,7 +814,7 @@
     </p:spTree>
     <p:extLst>
       <p:ext uri="{BB962C8B-B14F-4D97-AF65-F5344CB8AC3E}">
-        <p14:creationId xmlns:p14="http://schemas.microsoft.com/office/powerpoint/2010/main" val="1767751556"/>
+        <p14:creationId xmlns:p14="http://schemas.microsoft.com/office/powerpoint/2010/main" val="2190822544"/>
       </p:ext>
     </p:extLst>
   </p:cSld>
@@ -860,15 +853,15 @@
         </p:nvSpPr>
         <p:spPr>
           <a:xfrm>
-            <a:off x="1975645" y="7104918"/>
-            <a:ext cx="24974550" cy="11854707"/>
+            <a:off x="2689000" y="7135392"/>
+            <a:ext cx="33992225" cy="11905555"/>
           </a:xfrm>
         </p:spPr>
         <p:txBody>
           <a:bodyPr anchor="b"/>
           <a:lstStyle>
             <a:lvl1pPr>
-              <a:defRPr sz="19000"/>
+              <a:defRPr sz="25040"/>
             </a:lvl1pPr>
           </a:lstStyle>
           <a:p>
@@ -892,8 +885,8 @@
         </p:nvSpPr>
         <p:spPr>
           <a:xfrm>
-            <a:off x="1975645" y="19071775"/>
-            <a:ext cx="24974550" cy="6234110"/>
+            <a:off x="2689000" y="19153578"/>
+            <a:ext cx="33992225" cy="6260850"/>
           </a:xfrm>
         </p:spPr>
         <p:txBody>
@@ -901,15 +894,15 @@
           <a:lstStyle>
             <a:lvl1pPr marL="0" indent="0">
               <a:buNone/>
-              <a:defRPr sz="7600">
+              <a:defRPr sz="10016">
                 <a:solidFill>
                   <a:schemeClr val="tx1"/>
                 </a:solidFill>
               </a:defRPr>
             </a:lvl1pPr>
-            <a:lvl2pPr marL="1447815" indent="0">
+            <a:lvl2pPr marL="1908078" indent="0">
               <a:buNone/>
-              <a:defRPr sz="6333">
+              <a:defRPr sz="8347">
                 <a:solidFill>
                   <a:schemeClr val="tx1">
                     <a:tint val="75000"/>
@@ -917,9 +910,9 @@
                 </a:solidFill>
               </a:defRPr>
             </a:lvl2pPr>
-            <a:lvl3pPr marL="2895630" indent="0">
+            <a:lvl3pPr marL="3816157" indent="0">
               <a:buNone/>
-              <a:defRPr sz="5700">
+              <a:defRPr sz="7512">
                 <a:solidFill>
                   <a:schemeClr val="tx1">
                     <a:tint val="75000"/>
@@ -927,9 +920,9 @@
                 </a:solidFill>
               </a:defRPr>
             </a:lvl3pPr>
-            <a:lvl4pPr marL="4343446" indent="0">
+            <a:lvl4pPr marL="5724235" indent="0">
               <a:buNone/>
-              <a:defRPr sz="5067">
+              <a:defRPr sz="6677">
                 <a:solidFill>
                   <a:schemeClr val="tx1">
                     <a:tint val="75000"/>
@@ -937,9 +930,9 @@
                 </a:solidFill>
               </a:defRPr>
             </a:lvl4pPr>
-            <a:lvl5pPr marL="5791261" indent="0">
+            <a:lvl5pPr marL="7632314" indent="0">
               <a:buNone/>
-              <a:defRPr sz="5067">
+              <a:defRPr sz="6677">
                 <a:solidFill>
                   <a:schemeClr val="tx1">
                     <a:tint val="75000"/>
@@ -947,9 +940,9 @@
                 </a:solidFill>
               </a:defRPr>
             </a:lvl5pPr>
-            <a:lvl6pPr marL="7239076" indent="0">
+            <a:lvl6pPr marL="9540392" indent="0">
               <a:buNone/>
-              <a:defRPr sz="5067">
+              <a:defRPr sz="6677">
                 <a:solidFill>
                   <a:schemeClr val="tx1">
                     <a:tint val="75000"/>
@@ -957,9 +950,9 @@
                 </a:solidFill>
               </a:defRPr>
             </a:lvl6pPr>
-            <a:lvl7pPr marL="8686891" indent="0">
+            <a:lvl7pPr marL="11448471" indent="0">
               <a:buNone/>
-              <a:defRPr sz="5067">
+              <a:defRPr sz="6677">
                 <a:solidFill>
                   <a:schemeClr val="tx1">
                     <a:tint val="75000"/>
@@ -967,9 +960,9 @@
                 </a:solidFill>
               </a:defRPr>
             </a:lvl7pPr>
-            <a:lvl8pPr marL="10134707" indent="0">
+            <a:lvl8pPr marL="13356549" indent="0">
               <a:buNone/>
-              <a:defRPr sz="5067">
+              <a:defRPr sz="6677">
                 <a:solidFill>
                   <a:schemeClr val="tx1">
                     <a:tint val="75000"/>
@@ -977,9 +970,9 @@
                 </a:solidFill>
               </a:defRPr>
             </a:lvl8pPr>
-            <a:lvl9pPr marL="11582522" indent="0">
+            <a:lvl9pPr marL="15264628" indent="0">
               <a:buNone/>
-              <a:defRPr sz="5067">
+              <a:defRPr sz="6677">
                 <a:solidFill>
                   <a:schemeClr val="tx1">
                     <a:tint val="75000"/>
@@ -1065,7 +1058,7 @@
     </p:spTree>
     <p:extLst>
       <p:ext uri="{BB962C8B-B14F-4D97-AF65-F5344CB8AC3E}">
-        <p14:creationId xmlns:p14="http://schemas.microsoft.com/office/powerpoint/2010/main" val="2480267825"/>
+        <p14:creationId xmlns:p14="http://schemas.microsoft.com/office/powerpoint/2010/main" val="3434145203"/>
       </p:ext>
     </p:extLst>
   </p:cSld>
@@ -1127,8 +1120,8 @@
         </p:nvSpPr>
         <p:spPr>
           <a:xfrm>
-            <a:off x="1990725" y="7586486"/>
-            <a:ext cx="12306300" cy="18082227"/>
+            <a:off x="2709525" y="7619026"/>
+            <a:ext cx="16749792" cy="18159786"/>
           </a:xfrm>
         </p:spPr>
         <p:txBody>
@@ -1184,8 +1177,8 @@
         </p:nvSpPr>
         <p:spPr>
           <a:xfrm>
-            <a:off x="14658975" y="7586486"/>
-            <a:ext cx="12306300" cy="18082227"/>
+            <a:off x="19951958" y="7619026"/>
+            <a:ext cx="16749792" cy="18159786"/>
           </a:xfrm>
         </p:spPr>
         <p:txBody>
@@ -1297,7 +1290,7 @@
     </p:spTree>
     <p:extLst>
       <p:ext uri="{BB962C8B-B14F-4D97-AF65-F5344CB8AC3E}">
-        <p14:creationId xmlns:p14="http://schemas.microsoft.com/office/powerpoint/2010/main" val="3924233789"/>
+        <p14:creationId xmlns:p14="http://schemas.microsoft.com/office/powerpoint/2010/main" val="736828821"/>
       </p:ext>
     </p:extLst>
   </p:cSld>
@@ -1336,8 +1329,8 @@
         </p:nvSpPr>
         <p:spPr>
           <a:xfrm>
-            <a:off x="1994497" y="1517303"/>
-            <a:ext cx="24974550" cy="5508451"/>
+            <a:off x="2714658" y="1523811"/>
+            <a:ext cx="33992225" cy="5532078"/>
           </a:xfrm>
         </p:spPr>
         <p:txBody>
@@ -1364,8 +1357,8 @@
         </p:nvSpPr>
         <p:spPr>
           <a:xfrm>
-            <a:off x="1994500" y="6986166"/>
-            <a:ext cx="12249743" cy="3423812"/>
+            <a:off x="2714663" y="7016131"/>
+            <a:ext cx="16672814" cy="3438498"/>
           </a:xfrm>
         </p:spPr>
         <p:txBody>
@@ -1373,39 +1366,39 @@
           <a:lstStyle>
             <a:lvl1pPr marL="0" indent="0">
               <a:buNone/>
-              <a:defRPr sz="7600" b="1"/>
+              <a:defRPr sz="10016" b="1"/>
             </a:lvl1pPr>
-            <a:lvl2pPr marL="1447815" indent="0">
+            <a:lvl2pPr marL="1908078" indent="0">
               <a:buNone/>
-              <a:defRPr sz="6333" b="1"/>
+              <a:defRPr sz="8347" b="1"/>
             </a:lvl2pPr>
-            <a:lvl3pPr marL="2895630" indent="0">
+            <a:lvl3pPr marL="3816157" indent="0">
               <a:buNone/>
-              <a:defRPr sz="5700" b="1"/>
+              <a:defRPr sz="7512" b="1"/>
             </a:lvl3pPr>
-            <a:lvl4pPr marL="4343446" indent="0">
+            <a:lvl4pPr marL="5724235" indent="0">
               <a:buNone/>
-              <a:defRPr sz="5067" b="1"/>
+              <a:defRPr sz="6677" b="1"/>
             </a:lvl4pPr>
-            <a:lvl5pPr marL="5791261" indent="0">
+            <a:lvl5pPr marL="7632314" indent="0">
               <a:buNone/>
-              <a:defRPr sz="5067" b="1"/>
+              <a:defRPr sz="6677" b="1"/>
             </a:lvl5pPr>
-            <a:lvl6pPr marL="7239076" indent="0">
+            <a:lvl6pPr marL="9540392" indent="0">
               <a:buNone/>
-              <a:defRPr sz="5067" b="1"/>
+              <a:defRPr sz="6677" b="1"/>
             </a:lvl6pPr>
-            <a:lvl7pPr marL="8686891" indent="0">
+            <a:lvl7pPr marL="11448471" indent="0">
               <a:buNone/>
-              <a:defRPr sz="5067" b="1"/>
+              <a:defRPr sz="6677" b="1"/>
             </a:lvl7pPr>
-            <a:lvl8pPr marL="10134707" indent="0">
+            <a:lvl8pPr marL="13356549" indent="0">
               <a:buNone/>
-              <a:defRPr sz="5067" b="1"/>
+              <a:defRPr sz="6677" b="1"/>
             </a:lvl8pPr>
-            <a:lvl9pPr marL="11582522" indent="0">
+            <a:lvl9pPr marL="15264628" indent="0">
               <a:buNone/>
-              <a:defRPr sz="5067" b="1"/>
+              <a:defRPr sz="6677" b="1"/>
             </a:lvl9pPr>
           </a:lstStyle>
           <a:p>
@@ -1429,8 +1422,8 @@
         </p:nvSpPr>
         <p:spPr>
           <a:xfrm>
-            <a:off x="1994500" y="10409978"/>
-            <a:ext cx="12249743" cy="15311510"/>
+            <a:off x="2714663" y="10454629"/>
+            <a:ext cx="16672814" cy="15377185"/>
           </a:xfrm>
         </p:spPr>
         <p:txBody>
@@ -1486,8 +1479,8 @@
         </p:nvSpPr>
         <p:spPr>
           <a:xfrm>
-            <a:off x="14658976" y="6986166"/>
-            <a:ext cx="12310072" cy="3423812"/>
+            <a:off x="19951960" y="7016131"/>
+            <a:ext cx="16754925" cy="3438498"/>
           </a:xfrm>
         </p:spPr>
         <p:txBody>
@@ -1495,39 +1488,39 @@
           <a:lstStyle>
             <a:lvl1pPr marL="0" indent="0">
               <a:buNone/>
-              <a:defRPr sz="7600" b="1"/>
+              <a:defRPr sz="10016" b="1"/>
             </a:lvl1pPr>
-            <a:lvl2pPr marL="1447815" indent="0">
+            <a:lvl2pPr marL="1908078" indent="0">
               <a:buNone/>
-              <a:defRPr sz="6333" b="1"/>
+              <a:defRPr sz="8347" b="1"/>
             </a:lvl2pPr>
-            <a:lvl3pPr marL="2895630" indent="0">
+            <a:lvl3pPr marL="3816157" indent="0">
               <a:buNone/>
-              <a:defRPr sz="5700" b="1"/>
+              <a:defRPr sz="7512" b="1"/>
             </a:lvl3pPr>
-            <a:lvl4pPr marL="4343446" indent="0">
+            <a:lvl4pPr marL="5724235" indent="0">
               <a:buNone/>
-              <a:defRPr sz="5067" b="1"/>
+              <a:defRPr sz="6677" b="1"/>
             </a:lvl4pPr>
-            <a:lvl5pPr marL="5791261" indent="0">
+            <a:lvl5pPr marL="7632314" indent="0">
               <a:buNone/>
-              <a:defRPr sz="5067" b="1"/>
+              <a:defRPr sz="6677" b="1"/>
             </a:lvl5pPr>
-            <a:lvl6pPr marL="7239076" indent="0">
+            <a:lvl6pPr marL="9540392" indent="0">
               <a:buNone/>
-              <a:defRPr sz="5067" b="1"/>
+              <a:defRPr sz="6677" b="1"/>
             </a:lvl6pPr>
-            <a:lvl7pPr marL="8686891" indent="0">
+            <a:lvl7pPr marL="11448471" indent="0">
               <a:buNone/>
-              <a:defRPr sz="5067" b="1"/>
+              <a:defRPr sz="6677" b="1"/>
             </a:lvl7pPr>
-            <a:lvl8pPr marL="10134707" indent="0">
+            <a:lvl8pPr marL="13356549" indent="0">
               <a:buNone/>
-              <a:defRPr sz="5067" b="1"/>
+              <a:defRPr sz="6677" b="1"/>
             </a:lvl8pPr>
-            <a:lvl9pPr marL="11582522" indent="0">
+            <a:lvl9pPr marL="15264628" indent="0">
               <a:buNone/>
-              <a:defRPr sz="5067" b="1"/>
+              <a:defRPr sz="6677" b="1"/>
             </a:lvl9pPr>
           </a:lstStyle>
           <a:p>
@@ -1551,8 +1544,8 @@
         </p:nvSpPr>
         <p:spPr>
           <a:xfrm>
-            <a:off x="14658976" y="10409978"/>
-            <a:ext cx="12310072" cy="15311510"/>
+            <a:off x="19951960" y="10454629"/>
+            <a:ext cx="16754925" cy="15377185"/>
           </a:xfrm>
         </p:spPr>
         <p:txBody>
@@ -1664,7 +1657,7 @@
     </p:spTree>
     <p:extLst>
       <p:ext uri="{BB962C8B-B14F-4D97-AF65-F5344CB8AC3E}">
-        <p14:creationId xmlns:p14="http://schemas.microsoft.com/office/powerpoint/2010/main" val="512460228"/>
+        <p14:creationId xmlns:p14="http://schemas.microsoft.com/office/powerpoint/2010/main" val="2857526462"/>
       </p:ext>
     </p:extLst>
   </p:cSld>
@@ -1782,7 +1775,7 @@
     </p:spTree>
     <p:extLst>
       <p:ext uri="{BB962C8B-B14F-4D97-AF65-F5344CB8AC3E}">
-        <p14:creationId xmlns:p14="http://schemas.microsoft.com/office/powerpoint/2010/main" val="4186962247"/>
+        <p14:creationId xmlns:p14="http://schemas.microsoft.com/office/powerpoint/2010/main" val="3609472700"/>
       </p:ext>
     </p:extLst>
   </p:cSld>
@@ -1877,7 +1870,7 @@
     </p:spTree>
     <p:extLst>
       <p:ext uri="{BB962C8B-B14F-4D97-AF65-F5344CB8AC3E}">
-        <p14:creationId xmlns:p14="http://schemas.microsoft.com/office/powerpoint/2010/main" val="1436167361"/>
+        <p14:creationId xmlns:p14="http://schemas.microsoft.com/office/powerpoint/2010/main" val="1259549053"/>
       </p:ext>
     </p:extLst>
   </p:cSld>
@@ -1916,15 +1909,15 @@
         </p:nvSpPr>
         <p:spPr>
           <a:xfrm>
-            <a:off x="1994496" y="1899920"/>
-            <a:ext cx="9339064" cy="6649720"/>
+            <a:off x="2714658" y="1908069"/>
+            <a:ext cx="12711162" cy="6678242"/>
           </a:xfrm>
         </p:spPr>
         <p:txBody>
           <a:bodyPr anchor="b"/>
           <a:lstStyle>
             <a:lvl1pPr>
-              <a:defRPr sz="10133"/>
+              <a:defRPr sz="13355"/>
             </a:lvl1pPr>
           </a:lstStyle>
           <a:p>
@@ -1948,39 +1941,39 @@
         </p:nvSpPr>
         <p:spPr>
           <a:xfrm>
-            <a:off x="12310072" y="4103306"/>
-            <a:ext cx="14658975" cy="20252619"/>
+            <a:off x="16754925" y="4120906"/>
+            <a:ext cx="19951958" cy="20339488"/>
           </a:xfrm>
         </p:spPr>
         <p:txBody>
           <a:bodyPr/>
           <a:lstStyle>
             <a:lvl1pPr>
-              <a:defRPr sz="10133"/>
+              <a:defRPr sz="13355"/>
             </a:lvl1pPr>
             <a:lvl2pPr>
-              <a:defRPr sz="8867"/>
+              <a:defRPr sz="11686"/>
             </a:lvl2pPr>
             <a:lvl3pPr>
-              <a:defRPr sz="7600"/>
+              <a:defRPr sz="10016"/>
             </a:lvl3pPr>
             <a:lvl4pPr>
-              <a:defRPr sz="6333"/>
+              <a:defRPr sz="8347"/>
             </a:lvl4pPr>
             <a:lvl5pPr>
-              <a:defRPr sz="6333"/>
+              <a:defRPr sz="8347"/>
             </a:lvl5pPr>
             <a:lvl6pPr>
-              <a:defRPr sz="6333"/>
+              <a:defRPr sz="8347"/>
             </a:lvl6pPr>
             <a:lvl7pPr>
-              <a:defRPr sz="6333"/>
+              <a:defRPr sz="8347"/>
             </a:lvl7pPr>
             <a:lvl8pPr>
-              <a:defRPr sz="6333"/>
+              <a:defRPr sz="8347"/>
             </a:lvl8pPr>
             <a:lvl9pPr>
-              <a:defRPr sz="6333"/>
+              <a:defRPr sz="8347"/>
             </a:lvl9pPr>
           </a:lstStyle>
           <a:p>
@@ -2033,8 +2026,8 @@
         </p:nvSpPr>
         <p:spPr>
           <a:xfrm>
-            <a:off x="1994496" y="8549640"/>
-            <a:ext cx="9339064" cy="15839266"/>
+            <a:off x="2714658" y="8586311"/>
+            <a:ext cx="12711162" cy="15907204"/>
           </a:xfrm>
         </p:spPr>
         <p:txBody>
@@ -2042,39 +2035,39 @@
           <a:lstStyle>
             <a:lvl1pPr marL="0" indent="0">
               <a:buNone/>
-              <a:defRPr sz="5067"/>
+              <a:defRPr sz="6677"/>
             </a:lvl1pPr>
-            <a:lvl2pPr marL="1447815" indent="0">
+            <a:lvl2pPr marL="1908078" indent="0">
               <a:buNone/>
-              <a:defRPr sz="4433"/>
+              <a:defRPr sz="5843"/>
             </a:lvl2pPr>
-            <a:lvl3pPr marL="2895630" indent="0">
+            <a:lvl3pPr marL="3816157" indent="0">
               <a:buNone/>
-              <a:defRPr sz="3800"/>
+              <a:defRPr sz="5008"/>
             </a:lvl3pPr>
-            <a:lvl4pPr marL="4343446" indent="0">
+            <a:lvl4pPr marL="5724235" indent="0">
               <a:buNone/>
-              <a:defRPr sz="3167"/>
+              <a:defRPr sz="4173"/>
             </a:lvl4pPr>
-            <a:lvl5pPr marL="5791261" indent="0">
+            <a:lvl5pPr marL="7632314" indent="0">
               <a:buNone/>
-              <a:defRPr sz="3167"/>
+              <a:defRPr sz="4173"/>
             </a:lvl5pPr>
-            <a:lvl6pPr marL="7239076" indent="0">
+            <a:lvl6pPr marL="9540392" indent="0">
               <a:buNone/>
-              <a:defRPr sz="3167"/>
+              <a:defRPr sz="4173"/>
             </a:lvl6pPr>
-            <a:lvl7pPr marL="8686891" indent="0">
+            <a:lvl7pPr marL="11448471" indent="0">
               <a:buNone/>
-              <a:defRPr sz="3167"/>
+              <a:defRPr sz="4173"/>
             </a:lvl7pPr>
-            <a:lvl8pPr marL="10134707" indent="0">
+            <a:lvl8pPr marL="13356549" indent="0">
               <a:buNone/>
-              <a:defRPr sz="3167"/>
+              <a:defRPr sz="4173"/>
             </a:lvl8pPr>
-            <a:lvl9pPr marL="11582522" indent="0">
+            <a:lvl9pPr marL="15264628" indent="0">
               <a:buNone/>
-              <a:defRPr sz="3167"/>
+              <a:defRPr sz="4173"/>
             </a:lvl9pPr>
           </a:lstStyle>
           <a:p>
@@ -2154,7 +2147,7 @@
     </p:spTree>
     <p:extLst>
       <p:ext uri="{BB962C8B-B14F-4D97-AF65-F5344CB8AC3E}">
-        <p14:creationId xmlns:p14="http://schemas.microsoft.com/office/powerpoint/2010/main" val="2983179293"/>
+        <p14:creationId xmlns:p14="http://schemas.microsoft.com/office/powerpoint/2010/main" val="4294729000"/>
       </p:ext>
     </p:extLst>
   </p:cSld>
@@ -2193,15 +2186,15 @@
         </p:nvSpPr>
         <p:spPr>
           <a:xfrm>
-            <a:off x="1994496" y="1899920"/>
-            <a:ext cx="9339064" cy="6649720"/>
+            <a:off x="2714658" y="1908069"/>
+            <a:ext cx="12711162" cy="6678242"/>
           </a:xfrm>
         </p:spPr>
         <p:txBody>
           <a:bodyPr anchor="b"/>
           <a:lstStyle>
             <a:lvl1pPr>
-              <a:defRPr sz="10133"/>
+              <a:defRPr sz="13355"/>
             </a:lvl1pPr>
           </a:lstStyle>
           <a:p>
@@ -2225,8 +2218,8 @@
         </p:nvSpPr>
         <p:spPr>
           <a:xfrm>
-            <a:off x="12310072" y="4103306"/>
-            <a:ext cx="14658975" cy="20252619"/>
+            <a:off x="16754925" y="4120906"/>
+            <a:ext cx="19951958" cy="20339488"/>
           </a:xfrm>
         </p:spPr>
         <p:txBody>
@@ -2234,39 +2227,39 @@
           <a:lstStyle>
             <a:lvl1pPr marL="0" indent="0">
               <a:buNone/>
-              <a:defRPr sz="10133"/>
+              <a:defRPr sz="13355"/>
             </a:lvl1pPr>
-            <a:lvl2pPr marL="1447815" indent="0">
+            <a:lvl2pPr marL="1908078" indent="0">
               <a:buNone/>
-              <a:defRPr sz="8867"/>
+              <a:defRPr sz="11686"/>
             </a:lvl2pPr>
-            <a:lvl3pPr marL="2895630" indent="0">
+            <a:lvl3pPr marL="3816157" indent="0">
               <a:buNone/>
-              <a:defRPr sz="7600"/>
+              <a:defRPr sz="10016"/>
             </a:lvl3pPr>
-            <a:lvl4pPr marL="4343446" indent="0">
+            <a:lvl4pPr marL="5724235" indent="0">
               <a:buNone/>
-              <a:defRPr sz="6333"/>
+              <a:defRPr sz="8347"/>
             </a:lvl4pPr>
-            <a:lvl5pPr marL="5791261" indent="0">
+            <a:lvl5pPr marL="7632314" indent="0">
               <a:buNone/>
-              <a:defRPr sz="6333"/>
+              <a:defRPr sz="8347"/>
             </a:lvl5pPr>
-            <a:lvl6pPr marL="7239076" indent="0">
+            <a:lvl6pPr marL="9540392" indent="0">
               <a:buNone/>
-              <a:defRPr sz="6333"/>
+              <a:defRPr sz="8347"/>
             </a:lvl6pPr>
-            <a:lvl7pPr marL="8686891" indent="0">
+            <a:lvl7pPr marL="11448471" indent="0">
               <a:buNone/>
-              <a:defRPr sz="6333"/>
+              <a:defRPr sz="8347"/>
             </a:lvl7pPr>
-            <a:lvl8pPr marL="10134707" indent="0">
+            <a:lvl8pPr marL="13356549" indent="0">
               <a:buNone/>
-              <a:defRPr sz="6333"/>
+              <a:defRPr sz="8347"/>
             </a:lvl8pPr>
-            <a:lvl9pPr marL="11582522" indent="0">
+            <a:lvl9pPr marL="15264628" indent="0">
               <a:buNone/>
-              <a:defRPr sz="6333"/>
+              <a:defRPr sz="8347"/>
             </a:lvl9pPr>
           </a:lstStyle>
           <a:p>
@@ -2290,8 +2283,8 @@
         </p:nvSpPr>
         <p:spPr>
           <a:xfrm>
-            <a:off x="1994496" y="8549640"/>
-            <a:ext cx="9339064" cy="15839266"/>
+            <a:off x="2714658" y="8586311"/>
+            <a:ext cx="12711162" cy="15907204"/>
           </a:xfrm>
         </p:spPr>
         <p:txBody>
@@ -2299,39 +2292,39 @@
           <a:lstStyle>
             <a:lvl1pPr marL="0" indent="0">
               <a:buNone/>
-              <a:defRPr sz="5067"/>
+              <a:defRPr sz="6677"/>
             </a:lvl1pPr>
-            <a:lvl2pPr marL="1447815" indent="0">
+            <a:lvl2pPr marL="1908078" indent="0">
               <a:buNone/>
-              <a:defRPr sz="4433"/>
+              <a:defRPr sz="5843"/>
             </a:lvl2pPr>
-            <a:lvl3pPr marL="2895630" indent="0">
+            <a:lvl3pPr marL="3816157" indent="0">
               <a:buNone/>
-              <a:defRPr sz="3800"/>
+              <a:defRPr sz="5008"/>
             </a:lvl3pPr>
-            <a:lvl4pPr marL="4343446" indent="0">
+            <a:lvl4pPr marL="5724235" indent="0">
               <a:buNone/>
-              <a:defRPr sz="3167"/>
+              <a:defRPr sz="4173"/>
             </a:lvl4pPr>
-            <a:lvl5pPr marL="5791261" indent="0">
+            <a:lvl5pPr marL="7632314" indent="0">
               <a:buNone/>
-              <a:defRPr sz="3167"/>
+              <a:defRPr sz="4173"/>
             </a:lvl5pPr>
-            <a:lvl6pPr marL="7239076" indent="0">
+            <a:lvl6pPr marL="9540392" indent="0">
               <a:buNone/>
-              <a:defRPr sz="3167"/>
+              <a:defRPr sz="4173"/>
             </a:lvl6pPr>
-            <a:lvl7pPr marL="8686891" indent="0">
+            <a:lvl7pPr marL="11448471" indent="0">
               <a:buNone/>
-              <a:defRPr sz="3167"/>
+              <a:defRPr sz="4173"/>
             </a:lvl7pPr>
-            <a:lvl8pPr marL="10134707" indent="0">
+            <a:lvl8pPr marL="13356549" indent="0">
               <a:buNone/>
-              <a:defRPr sz="3167"/>
+              <a:defRPr sz="4173"/>
             </a:lvl8pPr>
-            <a:lvl9pPr marL="11582522" indent="0">
+            <a:lvl9pPr marL="15264628" indent="0">
               <a:buNone/>
-              <a:defRPr sz="3167"/>
+              <a:defRPr sz="4173"/>
             </a:lvl9pPr>
           </a:lstStyle>
           <a:p>
@@ -2411,7 +2404,7 @@
     </p:spTree>
     <p:extLst>
       <p:ext uri="{BB962C8B-B14F-4D97-AF65-F5344CB8AC3E}">
-        <p14:creationId xmlns:p14="http://schemas.microsoft.com/office/powerpoint/2010/main" val="280873063"/>
+        <p14:creationId xmlns:p14="http://schemas.microsoft.com/office/powerpoint/2010/main" val="1356797122"/>
       </p:ext>
     </p:extLst>
   </p:cSld>
@@ -2455,8 +2448,8 @@
         </p:nvSpPr>
         <p:spPr>
           <a:xfrm>
-            <a:off x="1990725" y="1517303"/>
-            <a:ext cx="24974550" cy="5508451"/>
+            <a:off x="2709525" y="1523811"/>
+            <a:ext cx="33992225" cy="5532078"/>
           </a:xfrm>
           <a:prstGeom prst="rect">
             <a:avLst/>
@@ -2488,8 +2481,8 @@
         </p:nvSpPr>
         <p:spPr>
           <a:xfrm>
-            <a:off x="1990725" y="7586486"/>
-            <a:ext cx="24974550" cy="18082227"/>
+            <a:off x="2709525" y="7619026"/>
+            <a:ext cx="33992225" cy="18159786"/>
           </a:xfrm>
           <a:prstGeom prst="rect">
             <a:avLst/>
@@ -2550,8 +2543,8 @@
         </p:nvSpPr>
         <p:spPr>
           <a:xfrm>
-            <a:off x="1990725" y="26414172"/>
-            <a:ext cx="6515100" cy="1517297"/>
+            <a:off x="2709525" y="26527468"/>
+            <a:ext cx="8867537" cy="1523805"/>
           </a:xfrm>
           <a:prstGeom prst="rect">
             <a:avLst/>
@@ -2561,7 +2554,7 @@
           <a:bodyPr vert="horz" lIns="91440" tIns="45720" rIns="91440" bIns="45720" rtlCol="0" anchor="ctr"/>
           <a:lstStyle>
             <a:lvl1pPr algn="l">
-              <a:defRPr sz="3800">
+              <a:defRPr sz="5008">
                 <a:solidFill>
                   <a:schemeClr val="tx1">
                     <a:tint val="75000"/>
@@ -2591,8 +2584,8 @@
         </p:nvSpPr>
         <p:spPr>
           <a:xfrm>
-            <a:off x="9591675" y="26414172"/>
-            <a:ext cx="9772650" cy="1517297"/>
+            <a:off x="13054985" y="26527468"/>
+            <a:ext cx="13301305" cy="1523805"/>
           </a:xfrm>
           <a:prstGeom prst="rect">
             <a:avLst/>
@@ -2602,7 +2595,7 @@
           <a:bodyPr vert="horz" lIns="91440" tIns="45720" rIns="91440" bIns="45720" rtlCol="0" anchor="ctr"/>
           <a:lstStyle>
             <a:lvl1pPr algn="ctr">
-              <a:defRPr sz="3800">
+              <a:defRPr sz="5008">
                 <a:solidFill>
                   <a:schemeClr val="tx1">
                     <a:tint val="75000"/>
@@ -2628,8 +2621,8 @@
         </p:nvSpPr>
         <p:spPr>
           <a:xfrm>
-            <a:off x="20450175" y="26414172"/>
-            <a:ext cx="6515100" cy="1517297"/>
+            <a:off x="27834213" y="26527468"/>
+            <a:ext cx="8867537" cy="1523805"/>
           </a:xfrm>
           <a:prstGeom prst="rect">
             <a:avLst/>
@@ -2639,7 +2632,7 @@
           <a:bodyPr vert="horz" lIns="91440" tIns="45720" rIns="91440" bIns="45720" rtlCol="0" anchor="ctr"/>
           <a:lstStyle>
             <a:lvl1pPr algn="r">
-              <a:defRPr sz="3800">
+              <a:defRPr sz="5008">
                 <a:solidFill>
                   <a:schemeClr val="tx1">
                     <a:tint val="75000"/>
@@ -2660,27 +2653,27 @@
     </p:spTree>
     <p:extLst>
       <p:ext uri="{BB962C8B-B14F-4D97-AF65-F5344CB8AC3E}">
-        <p14:creationId xmlns:p14="http://schemas.microsoft.com/office/powerpoint/2010/main" val="306410366"/>
+        <p14:creationId xmlns:p14="http://schemas.microsoft.com/office/powerpoint/2010/main" val="1226287717"/>
       </p:ext>
     </p:extLst>
   </p:cSld>
   <p:clrMap bg1="lt1" tx1="dk1" bg2="lt2" tx2="dk2" accent1="accent1" accent2="accent2" accent3="accent3" accent4="accent4" accent5="accent5" accent6="accent6" hlink="hlink" folHlink="folHlink"/>
   <p:sldLayoutIdLst>
-    <p:sldLayoutId id="2147483661" r:id="rId1"/>
-    <p:sldLayoutId id="2147483662" r:id="rId2"/>
-    <p:sldLayoutId id="2147483663" r:id="rId3"/>
-    <p:sldLayoutId id="2147483664" r:id="rId4"/>
-    <p:sldLayoutId id="2147483665" r:id="rId5"/>
-    <p:sldLayoutId id="2147483666" r:id="rId6"/>
-    <p:sldLayoutId id="2147483667" r:id="rId7"/>
-    <p:sldLayoutId id="2147483668" r:id="rId8"/>
-    <p:sldLayoutId id="2147483669" r:id="rId9"/>
-    <p:sldLayoutId id="2147483670" r:id="rId10"/>
-    <p:sldLayoutId id="2147483671" r:id="rId11"/>
+    <p:sldLayoutId id="2147483685" r:id="rId1"/>
+    <p:sldLayoutId id="2147483686" r:id="rId2"/>
+    <p:sldLayoutId id="2147483687" r:id="rId3"/>
+    <p:sldLayoutId id="2147483688" r:id="rId4"/>
+    <p:sldLayoutId id="2147483689" r:id="rId5"/>
+    <p:sldLayoutId id="2147483690" r:id="rId6"/>
+    <p:sldLayoutId id="2147483691" r:id="rId7"/>
+    <p:sldLayoutId id="2147483692" r:id="rId8"/>
+    <p:sldLayoutId id="2147483693" r:id="rId9"/>
+    <p:sldLayoutId id="2147483694" r:id="rId10"/>
+    <p:sldLayoutId id="2147483695" r:id="rId11"/>
   </p:sldLayoutIdLst>
   <p:txStyles>
     <p:titleStyle>
-      <a:lvl1pPr algn="l" defTabSz="2895630" rtl="0" eaLnBrk="1" latinLnBrk="0" hangingPunct="1">
+      <a:lvl1pPr algn="l" defTabSz="3816157" rtl="0" eaLnBrk="1" latinLnBrk="0" hangingPunct="1">
         <a:lnSpc>
           <a:spcPct val="90000"/>
         </a:lnSpc>
@@ -2688,7 +2681,7 @@
           <a:spcPct val="0"/>
         </a:spcBef>
         <a:buNone/>
-        <a:defRPr sz="13933" kern="1200">
+        <a:defRPr sz="18363" kern="1200">
           <a:solidFill>
             <a:schemeClr val="tx1"/>
           </a:solidFill>
@@ -2699,16 +2692,16 @@
       </a:lvl1pPr>
     </p:titleStyle>
     <p:bodyStyle>
-      <a:lvl1pPr marL="723908" indent="-723908" algn="l" defTabSz="2895630" rtl="0" eaLnBrk="1" latinLnBrk="0" hangingPunct="1">
+      <a:lvl1pPr marL="954039" indent="-954039" algn="l" defTabSz="3816157" rtl="0" eaLnBrk="1" latinLnBrk="0" hangingPunct="1">
         <a:lnSpc>
           <a:spcPct val="90000"/>
         </a:lnSpc>
         <a:spcBef>
-          <a:spcPts val="3167"/>
+          <a:spcPts val="4173"/>
         </a:spcBef>
         <a:buFont typeface="Arial" panose="020B0604020202020204" pitchFamily="34" charset="0"/>
         <a:buChar char="•"/>
-        <a:defRPr sz="8867" kern="1200">
+        <a:defRPr sz="11686" kern="1200">
           <a:solidFill>
             <a:schemeClr val="tx1"/>
           </a:solidFill>
@@ -2717,16 +2710,16 @@
           <a:cs typeface="+mn-cs"/>
         </a:defRPr>
       </a:lvl1pPr>
-      <a:lvl2pPr marL="2171723" indent="-723908" algn="l" defTabSz="2895630" rtl="0" eaLnBrk="1" latinLnBrk="0" hangingPunct="1">
+      <a:lvl2pPr marL="2862118" indent="-954039" algn="l" defTabSz="3816157" rtl="0" eaLnBrk="1" latinLnBrk="0" hangingPunct="1">
         <a:lnSpc>
           <a:spcPct val="90000"/>
         </a:lnSpc>
         <a:spcBef>
-          <a:spcPts val="1583"/>
+          <a:spcPts val="2087"/>
         </a:spcBef>
         <a:buFont typeface="Arial" panose="020B0604020202020204" pitchFamily="34" charset="0"/>
         <a:buChar char="•"/>
-        <a:defRPr sz="7600" kern="1200">
+        <a:defRPr sz="10016" kern="1200">
           <a:solidFill>
             <a:schemeClr val="tx1"/>
           </a:solidFill>
@@ -2735,16 +2728,16 @@
           <a:cs typeface="+mn-cs"/>
         </a:defRPr>
       </a:lvl2pPr>
-      <a:lvl3pPr marL="3619538" indent="-723908" algn="l" defTabSz="2895630" rtl="0" eaLnBrk="1" latinLnBrk="0" hangingPunct="1">
+      <a:lvl3pPr marL="4770196" indent="-954039" algn="l" defTabSz="3816157" rtl="0" eaLnBrk="1" latinLnBrk="0" hangingPunct="1">
         <a:lnSpc>
           <a:spcPct val="90000"/>
         </a:lnSpc>
         <a:spcBef>
-          <a:spcPts val="1583"/>
+          <a:spcPts val="2087"/>
         </a:spcBef>
         <a:buFont typeface="Arial" panose="020B0604020202020204" pitchFamily="34" charset="0"/>
         <a:buChar char="•"/>
-        <a:defRPr sz="6333" kern="1200">
+        <a:defRPr sz="8347" kern="1200">
           <a:solidFill>
             <a:schemeClr val="tx1"/>
           </a:solidFill>
@@ -2753,16 +2746,16 @@
           <a:cs typeface="+mn-cs"/>
         </a:defRPr>
       </a:lvl3pPr>
-      <a:lvl4pPr marL="5067353" indent="-723908" algn="l" defTabSz="2895630" rtl="0" eaLnBrk="1" latinLnBrk="0" hangingPunct="1">
+      <a:lvl4pPr marL="6678275" indent="-954039" algn="l" defTabSz="3816157" rtl="0" eaLnBrk="1" latinLnBrk="0" hangingPunct="1">
         <a:lnSpc>
           <a:spcPct val="90000"/>
         </a:lnSpc>
         <a:spcBef>
-          <a:spcPts val="1583"/>
+          <a:spcPts val="2087"/>
         </a:spcBef>
         <a:buFont typeface="Arial" panose="020B0604020202020204" pitchFamily="34" charset="0"/>
         <a:buChar char="•"/>
-        <a:defRPr sz="5700" kern="1200">
+        <a:defRPr sz="7512" kern="1200">
           <a:solidFill>
             <a:schemeClr val="tx1"/>
           </a:solidFill>
@@ -2771,16 +2764,16 @@
           <a:cs typeface="+mn-cs"/>
         </a:defRPr>
       </a:lvl4pPr>
-      <a:lvl5pPr marL="6515169" indent="-723908" algn="l" defTabSz="2895630" rtl="0" eaLnBrk="1" latinLnBrk="0" hangingPunct="1">
+      <a:lvl5pPr marL="8586353" indent="-954039" algn="l" defTabSz="3816157" rtl="0" eaLnBrk="1" latinLnBrk="0" hangingPunct="1">
         <a:lnSpc>
           <a:spcPct val="90000"/>
         </a:lnSpc>
         <a:spcBef>
-          <a:spcPts val="1583"/>
+          <a:spcPts val="2087"/>
         </a:spcBef>
         <a:buFont typeface="Arial" panose="020B0604020202020204" pitchFamily="34" charset="0"/>
         <a:buChar char="•"/>
-        <a:defRPr sz="5700" kern="1200">
+        <a:defRPr sz="7512" kern="1200">
           <a:solidFill>
             <a:schemeClr val="tx1"/>
           </a:solidFill>
@@ -2789,16 +2782,16 @@
           <a:cs typeface="+mn-cs"/>
         </a:defRPr>
       </a:lvl5pPr>
-      <a:lvl6pPr marL="7962984" indent="-723908" algn="l" defTabSz="2895630" rtl="0" eaLnBrk="1" latinLnBrk="0" hangingPunct="1">
+      <a:lvl6pPr marL="10494432" indent="-954039" algn="l" defTabSz="3816157" rtl="0" eaLnBrk="1" latinLnBrk="0" hangingPunct="1">
         <a:lnSpc>
           <a:spcPct val="90000"/>
         </a:lnSpc>
         <a:spcBef>
-          <a:spcPts val="1583"/>
+          <a:spcPts val="2087"/>
         </a:spcBef>
         <a:buFont typeface="Arial" panose="020B0604020202020204" pitchFamily="34" charset="0"/>
         <a:buChar char="•"/>
-        <a:defRPr sz="5700" kern="1200">
+        <a:defRPr sz="7512" kern="1200">
           <a:solidFill>
             <a:schemeClr val="tx1"/>
           </a:solidFill>
@@ -2807,16 +2800,16 @@
           <a:cs typeface="+mn-cs"/>
         </a:defRPr>
       </a:lvl6pPr>
-      <a:lvl7pPr marL="9410799" indent="-723908" algn="l" defTabSz="2895630" rtl="0" eaLnBrk="1" latinLnBrk="0" hangingPunct="1">
+      <a:lvl7pPr marL="12402510" indent="-954039" algn="l" defTabSz="3816157" rtl="0" eaLnBrk="1" latinLnBrk="0" hangingPunct="1">
         <a:lnSpc>
           <a:spcPct val="90000"/>
         </a:lnSpc>
         <a:spcBef>
-          <a:spcPts val="1583"/>
+          <a:spcPts val="2087"/>
         </a:spcBef>
         <a:buFont typeface="Arial" panose="020B0604020202020204" pitchFamily="34" charset="0"/>
         <a:buChar char="•"/>
-        <a:defRPr sz="5700" kern="1200">
+        <a:defRPr sz="7512" kern="1200">
           <a:solidFill>
             <a:schemeClr val="tx1"/>
           </a:solidFill>
@@ -2825,16 +2818,16 @@
           <a:cs typeface="+mn-cs"/>
         </a:defRPr>
       </a:lvl7pPr>
-      <a:lvl8pPr marL="10858614" indent="-723908" algn="l" defTabSz="2895630" rtl="0" eaLnBrk="1" latinLnBrk="0" hangingPunct="1">
+      <a:lvl8pPr marL="14310589" indent="-954039" algn="l" defTabSz="3816157" rtl="0" eaLnBrk="1" latinLnBrk="0" hangingPunct="1">
         <a:lnSpc>
           <a:spcPct val="90000"/>
         </a:lnSpc>
         <a:spcBef>
-          <a:spcPts val="1583"/>
+          <a:spcPts val="2087"/>
         </a:spcBef>
         <a:buFont typeface="Arial" panose="020B0604020202020204" pitchFamily="34" charset="0"/>
         <a:buChar char="•"/>
-        <a:defRPr sz="5700" kern="1200">
+        <a:defRPr sz="7512" kern="1200">
           <a:solidFill>
             <a:schemeClr val="tx1"/>
           </a:solidFill>
@@ -2843,16 +2836,16 @@
           <a:cs typeface="+mn-cs"/>
         </a:defRPr>
       </a:lvl8pPr>
-      <a:lvl9pPr marL="12306430" indent="-723908" algn="l" defTabSz="2895630" rtl="0" eaLnBrk="1" latinLnBrk="0" hangingPunct="1">
+      <a:lvl9pPr marL="16218667" indent="-954039" algn="l" defTabSz="3816157" rtl="0" eaLnBrk="1" latinLnBrk="0" hangingPunct="1">
         <a:lnSpc>
           <a:spcPct val="90000"/>
         </a:lnSpc>
         <a:spcBef>
-          <a:spcPts val="1583"/>
+          <a:spcPts val="2087"/>
         </a:spcBef>
         <a:buFont typeface="Arial" panose="020B0604020202020204" pitchFamily="34" charset="0"/>
         <a:buChar char="•"/>
-        <a:defRPr sz="5700" kern="1200">
+        <a:defRPr sz="7512" kern="1200">
           <a:solidFill>
             <a:schemeClr val="tx1"/>
           </a:solidFill>
@@ -2866,8 +2859,8 @@
       <a:defPPr>
         <a:defRPr lang="en-US"/>
       </a:defPPr>
-      <a:lvl1pPr marL="0" algn="l" defTabSz="2895630" rtl="0" eaLnBrk="1" latinLnBrk="0" hangingPunct="1">
-        <a:defRPr sz="5700" kern="1200">
+      <a:lvl1pPr marL="0" algn="l" defTabSz="3816157" rtl="0" eaLnBrk="1" latinLnBrk="0" hangingPunct="1">
+        <a:defRPr sz="7512" kern="1200">
           <a:solidFill>
             <a:schemeClr val="tx1"/>
           </a:solidFill>
@@ -2876,8 +2869,8 @@
           <a:cs typeface="+mn-cs"/>
         </a:defRPr>
       </a:lvl1pPr>
-      <a:lvl2pPr marL="1447815" algn="l" defTabSz="2895630" rtl="0" eaLnBrk="1" latinLnBrk="0" hangingPunct="1">
-        <a:defRPr sz="5700" kern="1200">
+      <a:lvl2pPr marL="1908078" algn="l" defTabSz="3816157" rtl="0" eaLnBrk="1" latinLnBrk="0" hangingPunct="1">
+        <a:defRPr sz="7512" kern="1200">
           <a:solidFill>
             <a:schemeClr val="tx1"/>
           </a:solidFill>
@@ -2886,8 +2879,8 @@
           <a:cs typeface="+mn-cs"/>
         </a:defRPr>
       </a:lvl2pPr>
-      <a:lvl3pPr marL="2895630" algn="l" defTabSz="2895630" rtl="0" eaLnBrk="1" latinLnBrk="0" hangingPunct="1">
-        <a:defRPr sz="5700" kern="1200">
+      <a:lvl3pPr marL="3816157" algn="l" defTabSz="3816157" rtl="0" eaLnBrk="1" latinLnBrk="0" hangingPunct="1">
+        <a:defRPr sz="7512" kern="1200">
           <a:solidFill>
             <a:schemeClr val="tx1"/>
           </a:solidFill>
@@ -2896,8 +2889,8 @@
           <a:cs typeface="+mn-cs"/>
         </a:defRPr>
       </a:lvl3pPr>
-      <a:lvl4pPr marL="4343446" algn="l" defTabSz="2895630" rtl="0" eaLnBrk="1" latinLnBrk="0" hangingPunct="1">
-        <a:defRPr sz="5700" kern="1200">
+      <a:lvl4pPr marL="5724235" algn="l" defTabSz="3816157" rtl="0" eaLnBrk="1" latinLnBrk="0" hangingPunct="1">
+        <a:defRPr sz="7512" kern="1200">
           <a:solidFill>
             <a:schemeClr val="tx1"/>
           </a:solidFill>
@@ -2906,8 +2899,8 @@
           <a:cs typeface="+mn-cs"/>
         </a:defRPr>
       </a:lvl4pPr>
-      <a:lvl5pPr marL="5791261" algn="l" defTabSz="2895630" rtl="0" eaLnBrk="1" latinLnBrk="0" hangingPunct="1">
-        <a:defRPr sz="5700" kern="1200">
+      <a:lvl5pPr marL="7632314" algn="l" defTabSz="3816157" rtl="0" eaLnBrk="1" latinLnBrk="0" hangingPunct="1">
+        <a:defRPr sz="7512" kern="1200">
           <a:solidFill>
             <a:schemeClr val="tx1"/>
           </a:solidFill>
@@ -2916,8 +2909,8 @@
           <a:cs typeface="+mn-cs"/>
         </a:defRPr>
       </a:lvl5pPr>
-      <a:lvl6pPr marL="7239076" algn="l" defTabSz="2895630" rtl="0" eaLnBrk="1" latinLnBrk="0" hangingPunct="1">
-        <a:defRPr sz="5700" kern="1200">
+      <a:lvl6pPr marL="9540392" algn="l" defTabSz="3816157" rtl="0" eaLnBrk="1" latinLnBrk="0" hangingPunct="1">
+        <a:defRPr sz="7512" kern="1200">
           <a:solidFill>
             <a:schemeClr val="tx1"/>
           </a:solidFill>
@@ -2926,8 +2919,8 @@
           <a:cs typeface="+mn-cs"/>
         </a:defRPr>
       </a:lvl6pPr>
-      <a:lvl7pPr marL="8686891" algn="l" defTabSz="2895630" rtl="0" eaLnBrk="1" latinLnBrk="0" hangingPunct="1">
-        <a:defRPr sz="5700" kern="1200">
+      <a:lvl7pPr marL="11448471" algn="l" defTabSz="3816157" rtl="0" eaLnBrk="1" latinLnBrk="0" hangingPunct="1">
+        <a:defRPr sz="7512" kern="1200">
           <a:solidFill>
             <a:schemeClr val="tx1"/>
           </a:solidFill>
@@ -2936,8 +2929,8 @@
           <a:cs typeface="+mn-cs"/>
         </a:defRPr>
       </a:lvl7pPr>
-      <a:lvl8pPr marL="10134707" algn="l" defTabSz="2895630" rtl="0" eaLnBrk="1" latinLnBrk="0" hangingPunct="1">
-        <a:defRPr sz="5700" kern="1200">
+      <a:lvl8pPr marL="13356549" algn="l" defTabSz="3816157" rtl="0" eaLnBrk="1" latinLnBrk="0" hangingPunct="1">
+        <a:defRPr sz="7512" kern="1200">
           <a:solidFill>
             <a:schemeClr val="tx1"/>
           </a:solidFill>
@@ -2946,8 +2939,8 @@
           <a:cs typeface="+mn-cs"/>
         </a:defRPr>
       </a:lvl8pPr>
-      <a:lvl9pPr marL="11582522" algn="l" defTabSz="2895630" rtl="0" eaLnBrk="1" latinLnBrk="0" hangingPunct="1">
-        <a:defRPr sz="5700" kern="1200">
+      <a:lvl9pPr marL="15264628" algn="l" defTabSz="3816157" rtl="0" eaLnBrk="1" latinLnBrk="0" hangingPunct="1">
+        <a:defRPr sz="7512" kern="1200">
           <a:solidFill>
             <a:schemeClr val="tx1"/>
           </a:solidFill>
@@ -2986,8 +2979,8 @@
         </p:nvSpPr>
         <p:spPr>
           <a:xfrm>
-            <a:off x="0" y="0"/>
-            <a:ext cx="28956000" cy="2405146"/>
+            <a:off x="266700" y="0"/>
+            <a:ext cx="38785800" cy="1840504"/>
           </a:xfrm>
           <a:prstGeom prst="rect">
             <a:avLst/>
@@ -3012,98 +3005,97 @@
           </a:bodyPr>
           <a:lstStyle/>
           <a:p>
+            <a:r>
+              <a:rPr lang="en-US" sz="3937" dirty="0" smtClean="0"/>
+              <a:t>             </a:t>
+            </a:r>
+            <a:r>
+              <a:rPr lang="en-US" sz="4400" dirty="0"/>
+              <a:t>Reconstruction of the X-inactivation center structure using </a:t>
+            </a:r>
+            <a:r>
+              <a:rPr lang="en-US" sz="4400" dirty="0" err="1"/>
+              <a:t>HiC</a:t>
+            </a:r>
+            <a:r>
+              <a:rPr lang="en-US" sz="4400" dirty="0"/>
+              <a:t> encounter frequency maps </a:t>
+            </a:r>
+          </a:p>
+          <a:p>
             <a:pPr algn="ctr"/>
             <a:r>
-              <a:rPr lang="en-US" dirty="0" smtClean="0"/>
-              <a:t> Reconstruction of the X-inactivation center structure using </a:t>
-            </a:r>
-            <a:r>
-              <a:rPr lang="en-US" dirty="0" err="1" smtClean="0"/>
-              <a:t>HiC</a:t>
-            </a:r>
-            <a:r>
-              <a:rPr lang="en-US" dirty="0" smtClean="0"/>
-              <a:t> encounter frequency maps </a:t>
+              <a:rPr lang="en-US" sz="3480" dirty="0"/>
+              <a:t>Ofir </a:t>
+            </a:r>
+            <a:r>
+              <a:rPr lang="en-US" sz="3480" dirty="0" err="1"/>
+              <a:t>Shukron</a:t>
+            </a:r>
+            <a:r>
+              <a:rPr lang="en-US" sz="3480" dirty="0"/>
+              <a:t>, David </a:t>
+            </a:r>
+            <a:r>
+              <a:rPr lang="en-US" sz="3480" dirty="0" err="1"/>
+              <a:t>Holcman</a:t>
+            </a:r>
+            <a:r>
+              <a:rPr lang="en-US" sz="3480" dirty="0"/>
+              <a:t>,</a:t>
             </a:r>
           </a:p>
           <a:p>
             <a:pPr algn="ctr"/>
             <a:r>
-              <a:rPr lang="en-US" sz="4800" dirty="0" smtClean="0"/>
-              <a:t>Ofir </a:t>
-            </a:r>
-            <a:r>
-              <a:rPr lang="en-US" sz="4800" dirty="0" err="1" smtClean="0"/>
-              <a:t>Shukron</a:t>
-            </a:r>
-            <a:r>
-              <a:rPr lang="en-US" sz="4800" dirty="0" smtClean="0"/>
-              <a:t>, David </a:t>
-            </a:r>
-            <a:r>
-              <a:rPr lang="en-US" sz="4800" dirty="0" err="1" smtClean="0"/>
-              <a:t>Holcman</a:t>
-            </a:r>
-            <a:r>
-              <a:rPr lang="en-US" sz="4800" dirty="0" smtClean="0"/>
-              <a:t>,</a:t>
-            </a:r>
-          </a:p>
-          <a:p>
-            <a:pPr algn="ctr"/>
-            <a:r>
-              <a:rPr lang="en-US" sz="4800" dirty="0" err="1" smtClean="0"/>
+              <a:rPr lang="en-US" sz="3480" dirty="0" err="1"/>
               <a:t>Departement</a:t>
             </a:r>
             <a:r>
-              <a:rPr lang="en-US" sz="4800" dirty="0" smtClean="0"/>
+              <a:rPr lang="en-US" sz="3480" dirty="0"/>
               <a:t> de </a:t>
             </a:r>
             <a:r>
-              <a:rPr lang="en-US" sz="4800" dirty="0" err="1" smtClean="0"/>
+              <a:rPr lang="en-US" sz="3480" dirty="0" err="1"/>
               <a:t>Biologie</a:t>
             </a:r>
             <a:r>
-              <a:rPr lang="en-US" sz="4800" dirty="0" smtClean="0"/>
+              <a:rPr lang="en-US" sz="3480" dirty="0"/>
               <a:t>, </a:t>
             </a:r>
             <a:r>
-              <a:rPr lang="en-US" sz="4800" dirty="0" err="1" smtClean="0"/>
+              <a:rPr lang="en-US" sz="3480" dirty="0" err="1"/>
               <a:t>Ecole</a:t>
             </a:r>
             <a:r>
-              <a:rPr lang="en-US" sz="4800" dirty="0" smtClean="0"/>
+              <a:rPr lang="en-US" sz="3480" dirty="0"/>
               <a:t> </a:t>
             </a:r>
             <a:r>
-              <a:rPr lang="en-US" sz="4800" dirty="0" err="1" smtClean="0"/>
+              <a:rPr lang="en-US" sz="3480" dirty="0" err="1"/>
               <a:t>Normale</a:t>
             </a:r>
             <a:r>
-              <a:rPr lang="en-US" sz="4800" dirty="0" smtClean="0"/>
+              <a:rPr lang="en-US" sz="3480" dirty="0"/>
               <a:t> </a:t>
             </a:r>
             <a:r>
-              <a:rPr lang="en-US" sz="4800" dirty="0" err="1" smtClean="0"/>
+              <a:rPr lang="en-US" sz="3480" dirty="0" err="1"/>
               <a:t>Superieure</a:t>
             </a:r>
             <a:r>
-              <a:rPr lang="en-US" sz="4800" dirty="0" smtClean="0"/>
-              <a:t>, 46 </a:t>
-            </a:r>
-            <a:r>
-              <a:rPr lang="en-US" sz="4800" dirty="0" smtClean="0"/>
-              <a:t>rue </a:t>
-            </a:r>
-            <a:r>
-              <a:rPr lang="en-US" sz="4800" dirty="0" err="1" smtClean="0"/>
+              <a:rPr lang="en-US" sz="3480" dirty="0"/>
+              <a:t>, 46 rue </a:t>
+            </a:r>
+            <a:r>
+              <a:rPr lang="en-US" sz="3480" dirty="0" err="1"/>
               <a:t>d’Ulm</a:t>
             </a:r>
             <a:r>
-              <a:rPr lang="en-US" sz="4800" dirty="0" smtClean="0"/>
+              <a:rPr lang="en-US" sz="3480" dirty="0"/>
               <a:t>, 75005, Paris, France</a:t>
             </a:r>
-            <a:endParaRPr lang="en-US" sz="4800" dirty="0"/>
+            <a:endParaRPr lang="en-US" sz="3480" dirty="0"/>
           </a:p>
         </p:txBody>
       </p:sp>
@@ -3129,8 +3121,8 @@
         </p:blipFill>
         <p:spPr>
           <a:xfrm>
-            <a:off x="0" y="0"/>
-            <a:ext cx="1769806" cy="2405146"/>
+            <a:off x="342761" y="48261"/>
+            <a:ext cx="1283294" cy="1743982"/>
           </a:xfrm>
           <a:prstGeom prst="rect">
             <a:avLst/>
@@ -3145,8 +3137,8 @@
         </p:nvSpPr>
         <p:spPr>
           <a:xfrm>
-            <a:off x="0" y="2405146"/>
-            <a:ext cx="9350478" cy="26825292"/>
+            <a:off x="539750" y="1902228"/>
+            <a:ext cx="6780074" cy="11026095"/>
           </a:xfrm>
           <a:prstGeom prst="rect">
             <a:avLst/>
@@ -3165,478 +3157,2642 @@
           <a:lstStyle/>
           <a:p>
             <a:r>
-              <a:rPr lang="en-US" sz="4000" b="1" dirty="0" smtClean="0"/>
-              <a:t>Aim</a:t>
-            </a:r>
-            <a:r>
-              <a:rPr lang="en-US" sz="4000" dirty="0" smtClean="0"/>
+              <a:rPr lang="en-US" sz="2030" b="1" dirty="0" smtClean="0"/>
+              <a:t>Goal</a:t>
+            </a:r>
+            <a:r>
+              <a:rPr lang="en-US" sz="2030" dirty="0" smtClean="0"/>
+              <a:t/>
+            </a:r>
+            <a:br>
+              <a:rPr lang="en-US" sz="2030" dirty="0" smtClean="0"/>
+            </a:br>
+            <a:r>
+              <a:rPr lang="en-US" sz="2030" dirty="0" smtClean="0"/>
+              <a:t>Reconstruct </a:t>
+            </a:r>
+            <a:r>
+              <a:rPr lang="en-US" sz="2030" dirty="0"/>
+              <a:t>the local polymer architecture using </a:t>
+            </a:r>
+            <a:r>
+              <a:rPr lang="en-US" sz="2030" dirty="0" err="1"/>
+              <a:t>HiC</a:t>
+            </a:r>
+            <a:r>
+              <a:rPr lang="en-US" sz="2030" dirty="0"/>
+              <a:t> encounter frequency </a:t>
+            </a:r>
+            <a:r>
+              <a:rPr lang="en-US" sz="2030" dirty="0" smtClean="0"/>
+              <a:t>maps; Study </a:t>
+            </a:r>
+            <a:r>
+              <a:rPr lang="en-US" sz="2030" dirty="0"/>
+              <a:t>the dynamic properties of the resulting </a:t>
+            </a:r>
+            <a:r>
+              <a:rPr lang="en-US" sz="2030" dirty="0" smtClean="0"/>
+              <a:t>structure, such </a:t>
+            </a:r>
+            <a:r>
+              <a:rPr lang="en-US" sz="2030" dirty="0"/>
+              <a:t>as the encounter time distribution and Mean First encounter time (MFET) between different parts of a polymer.</a:t>
+            </a:r>
+          </a:p>
+          <a:p>
+            <a:endParaRPr lang="en-US" sz="2030" dirty="0"/>
+          </a:p>
+          <a:p>
+            <a:r>
+              <a:rPr lang="en-US" sz="2030" b="1" dirty="0" smtClean="0"/>
+              <a:t>Significance</a:t>
+            </a:r>
+            <a:r>
+              <a:rPr lang="en-US" sz="2030" dirty="0" smtClean="0"/>
+              <a:t/>
+            </a:r>
+            <a:br>
+              <a:rPr lang="en-US" sz="2030" dirty="0" smtClean="0"/>
+            </a:br>
+            <a:r>
+              <a:rPr lang="en-US" sz="2030" dirty="0" smtClean="0"/>
+              <a:t>Providing </a:t>
+            </a:r>
+            <a:r>
+              <a:rPr lang="en-US" sz="2030" dirty="0"/>
+              <a:t>a tool to transform static </a:t>
+            </a:r>
+            <a:r>
+              <a:rPr lang="en-US" sz="2030" dirty="0" err="1" smtClean="0"/>
+              <a:t>HiC</a:t>
+            </a:r>
+            <a:r>
+              <a:rPr lang="en-US" sz="2030" dirty="0" smtClean="0"/>
+              <a:t> encounter </a:t>
+            </a:r>
+            <a:r>
+              <a:rPr lang="en-US" sz="2030" dirty="0"/>
+              <a:t>map to an </a:t>
+            </a:r>
+            <a:r>
+              <a:rPr lang="en-US" sz="2030" dirty="0" smtClean="0"/>
+              <a:t>average polymer </a:t>
+            </a:r>
+            <a:r>
+              <a:rPr lang="en-US" sz="2030" dirty="0"/>
+              <a:t>structure, which captures salient features in the chromosome </a:t>
+            </a:r>
+            <a:r>
+              <a:rPr lang="en-US" sz="2030" dirty="0" smtClean="0"/>
+              <a:t>microstructure, allowing analysis and simulation of the dynamics of a cross-linked polymer in various </a:t>
+            </a:r>
+            <a:r>
+              <a:rPr lang="en-US" sz="2030" dirty="0"/>
+              <a:t>scenarios. </a:t>
+            </a:r>
+          </a:p>
+          <a:p>
+            <a:endParaRPr lang="en-US" sz="2030" dirty="0"/>
+          </a:p>
+          <a:p>
+            <a:endParaRPr lang="en-US" sz="2030" dirty="0"/>
+          </a:p>
+          <a:p>
+            <a:r>
+              <a:rPr lang="en-US" sz="2030" b="1" dirty="0"/>
+              <a:t>Background:</a:t>
+            </a:r>
+          </a:p>
+          <a:p>
+            <a:r>
+              <a:rPr lang="en-US" sz="2030" dirty="0" err="1"/>
+              <a:t>HiC</a:t>
+            </a:r>
+            <a:r>
+              <a:rPr lang="en-US" sz="2030" dirty="0"/>
+              <a:t> experiment simultaneously captures millions of looping events of the chromosome. </a:t>
+            </a:r>
+            <a:r>
+              <a:rPr lang="en-US" sz="2030" dirty="0" err="1" smtClean="0"/>
+              <a:t>HiC</a:t>
+            </a:r>
+            <a:r>
+              <a:rPr lang="en-US" sz="2030" dirty="0" smtClean="0"/>
+              <a:t> steps include 1</a:t>
+            </a:r>
+            <a:r>
+              <a:rPr lang="en-US" sz="2030" dirty="0"/>
+              <a:t>. extraction of </a:t>
+            </a:r>
+            <a:r>
+              <a:rPr lang="en-US" sz="2030" dirty="0" smtClean="0"/>
+              <a:t>loci </a:t>
+            </a:r>
+            <a:r>
+              <a:rPr lang="en-US" sz="2030" dirty="0"/>
+              <a:t>from cells, 2. </a:t>
+            </a:r>
+            <a:r>
+              <a:rPr lang="en-US" sz="2030" dirty="0"/>
+              <a:t>fixation using formaldehyde 3. digestion using restriction enzymes, e.g. </a:t>
+            </a:r>
+            <a:r>
+              <a:rPr lang="en-US" sz="2030" dirty="0" err="1"/>
+              <a:t>HindIII</a:t>
+            </a:r>
+            <a:r>
+              <a:rPr lang="en-US" sz="2030" dirty="0"/>
+              <a:t>, 4. ligation, 5. </a:t>
+            </a:r>
+            <a:r>
+              <a:rPr lang="en-US" sz="2030" dirty="0"/>
+              <a:t>reverse cross linking 6. </a:t>
+            </a:r>
+            <a:r>
+              <a:rPr lang="en-US" sz="2030" dirty="0" smtClean="0"/>
+              <a:t>mapping using PCR </a:t>
+            </a:r>
+            <a:endParaRPr lang="en-US" sz="2030" dirty="0"/>
+          </a:p>
+          <a:p>
+            <a:endParaRPr lang="en-US" sz="2030" dirty="0"/>
+          </a:p>
+          <a:p>
+            <a:r>
+              <a:rPr lang="en-US" sz="2030" dirty="0"/>
+              <a:t>Analysis of the </a:t>
+            </a:r>
+            <a:r>
+              <a:rPr lang="en-US" sz="2030" dirty="0" err="1"/>
+              <a:t>HiC</a:t>
+            </a:r>
+            <a:r>
+              <a:rPr lang="en-US" sz="2030" dirty="0"/>
+              <a:t> experiment in mouse embryonic stem cells reveals the presence of stable Topologically Associating Domains (TAD) , in the 4.5Mb region of the  </a:t>
+            </a:r>
+            <a:r>
+              <a:rPr lang="en-US" sz="2030" dirty="0"/>
+              <a:t>X</a:t>
+            </a:r>
+            <a:r>
+              <a:rPr lang="en-US" sz="2030" dirty="0"/>
+              <a:t> inactivation center, however the actual architecture in a specific stage is unknown </a:t>
+            </a:r>
+          </a:p>
+          <a:p>
+            <a:endParaRPr lang="en-US" sz="2030" dirty="0"/>
+          </a:p>
+          <a:p>
+            <a:r>
+              <a:rPr lang="en-US" sz="2030" b="1" dirty="0"/>
+              <a:t>The data</a:t>
+            </a:r>
+            <a:r>
+              <a:rPr lang="en-US" sz="2030" dirty="0"/>
               <a:t>: </a:t>
             </a:r>
-            <a:r>
-              <a:rPr lang="en-US" sz="4000" dirty="0" smtClean="0"/>
-              <a:t>1. Reconstruct </a:t>
-            </a:r>
-            <a:r>
-              <a:rPr lang="en-US" sz="4000" dirty="0" smtClean="0"/>
-              <a:t>the local polymer </a:t>
-            </a:r>
-            <a:r>
-              <a:rPr lang="en-US" sz="4000" dirty="0" smtClean="0"/>
-              <a:t>architecture using </a:t>
-            </a:r>
-            <a:r>
-              <a:rPr lang="en-US" sz="4000" dirty="0" err="1" smtClean="0"/>
-              <a:t>HiC</a:t>
-            </a:r>
-            <a:r>
-              <a:rPr lang="en-US" sz="4000" dirty="0" smtClean="0"/>
-              <a:t> encounter </a:t>
-            </a:r>
-            <a:r>
-              <a:rPr lang="en-US" sz="4000" dirty="0" smtClean="0"/>
-              <a:t>frequency maps; 2. Study the dynamic properties of the resulting structure ,such as the </a:t>
-            </a:r>
-            <a:r>
-              <a:rPr lang="en-US" sz="4000" dirty="0" smtClean="0"/>
-              <a:t>encounter time distribution and Mean First </a:t>
-            </a:r>
-            <a:r>
-              <a:rPr lang="en-US" sz="4000" dirty="0" smtClean="0"/>
-              <a:t>encounter time </a:t>
-            </a:r>
-            <a:r>
-              <a:rPr lang="en-US" sz="4000" dirty="0" smtClean="0"/>
-              <a:t>(</a:t>
-            </a:r>
-            <a:r>
-              <a:rPr lang="en-US" sz="4000" dirty="0" smtClean="0"/>
-              <a:t>MFET</a:t>
-            </a:r>
-            <a:r>
-              <a:rPr lang="en-US" sz="4000" dirty="0" smtClean="0"/>
-              <a:t>) </a:t>
-            </a:r>
-            <a:r>
-              <a:rPr lang="en-US" sz="4000" dirty="0" smtClean="0"/>
-              <a:t>between </a:t>
-            </a:r>
-            <a:r>
-              <a:rPr lang="en-US" sz="4000" dirty="0" smtClean="0"/>
-              <a:t>different </a:t>
-            </a:r>
-            <a:r>
-              <a:rPr lang="en-US" sz="4000" dirty="0" smtClean="0"/>
-              <a:t>parts of a </a:t>
-            </a:r>
-            <a:r>
-              <a:rPr lang="en-US" sz="4000" dirty="0" smtClean="0"/>
-              <a:t>polymer.</a:t>
-            </a:r>
-            <a:endParaRPr lang="en-US" sz="4000" dirty="0" smtClean="0"/>
-          </a:p>
-          <a:p>
-            <a:endParaRPr lang="en-US" sz="4000" dirty="0" smtClean="0"/>
-          </a:p>
-          <a:p>
-            <a:r>
-              <a:rPr lang="en-US" sz="4000" b="1" dirty="0" smtClean="0"/>
-              <a:t>Significance</a:t>
-            </a:r>
-            <a:r>
-              <a:rPr lang="en-US" sz="4000" dirty="0" smtClean="0"/>
-              <a:t>: </a:t>
-            </a:r>
-            <a:r>
-              <a:rPr lang="en-US" sz="4000" dirty="0" smtClean="0"/>
-              <a:t>Providing a tool to transform </a:t>
-            </a:r>
-            <a:r>
-              <a:rPr lang="en-US" sz="4000" dirty="0" smtClean="0"/>
-              <a:t>static encounter map to an average structure, which captures salient features in the chromosome </a:t>
-            </a:r>
-            <a:r>
-              <a:rPr lang="en-US" sz="4000" dirty="0" smtClean="0"/>
-              <a:t>microstructure</a:t>
-            </a:r>
-            <a:endParaRPr lang="en-US" sz="4000" dirty="0" smtClean="0"/>
-          </a:p>
-          <a:p>
-            <a:r>
-              <a:rPr lang="en-US" sz="4000" dirty="0" smtClean="0"/>
-              <a:t>A</a:t>
-            </a:r>
-            <a:r>
-              <a:rPr lang="en-US" sz="4000" dirty="0" smtClean="0"/>
-              <a:t>llows the </a:t>
-            </a:r>
-            <a:r>
-              <a:rPr lang="en-US" sz="4000" dirty="0" smtClean="0"/>
-              <a:t>examination of the polymer behavior in various scenarios. </a:t>
-            </a:r>
-          </a:p>
-          <a:p>
-            <a:endParaRPr lang="en-US" sz="4000" dirty="0" smtClean="0"/>
-          </a:p>
-          <a:p>
-            <a:endParaRPr lang="en-US" sz="4000" dirty="0"/>
-          </a:p>
-          <a:p>
-            <a:r>
-              <a:rPr lang="en-US" sz="4000" b="1" dirty="0" smtClean="0"/>
-              <a:t>Background:</a:t>
-            </a:r>
-          </a:p>
-          <a:p>
-            <a:r>
-              <a:rPr lang="en-US" sz="4000" dirty="0" err="1" smtClean="0"/>
-              <a:t>HiC</a:t>
-            </a:r>
-            <a:r>
-              <a:rPr lang="en-US" sz="4000" dirty="0" smtClean="0"/>
-              <a:t> </a:t>
-            </a:r>
-            <a:r>
-              <a:rPr lang="en-US" sz="4000" dirty="0" smtClean="0"/>
-              <a:t>experiment simultaneously captures millions of looping </a:t>
-            </a:r>
-            <a:r>
-              <a:rPr lang="en-US" sz="4000" dirty="0" smtClean="0"/>
-              <a:t>events of the chromosome. </a:t>
-            </a:r>
-          </a:p>
-          <a:p>
-            <a:endParaRPr lang="en-US" sz="4000" dirty="0"/>
-          </a:p>
-          <a:p>
-            <a:r>
-              <a:rPr lang="en-US" sz="4000" dirty="0" smtClean="0"/>
-              <a:t>Analysis of the </a:t>
-            </a:r>
-            <a:r>
-              <a:rPr lang="en-US" sz="4000" dirty="0" err="1" smtClean="0"/>
-              <a:t>HiC</a:t>
-            </a:r>
-            <a:r>
-              <a:rPr lang="en-US" sz="4000" dirty="0" smtClean="0"/>
-              <a:t> experiment in mouse embryonic stem cells reveals the presence of stable Topologically Associating Domains (TAD) , in the 4.5Mb region of the  </a:t>
-            </a:r>
-            <a:r>
-              <a:rPr lang="en-US" sz="4000" dirty="0"/>
-              <a:t>X</a:t>
-            </a:r>
-            <a:r>
-              <a:rPr lang="en-US" sz="4000" dirty="0" smtClean="0"/>
-              <a:t> inactivation center</a:t>
-            </a:r>
-            <a:r>
-              <a:rPr lang="en-US" sz="4000" dirty="0" smtClean="0"/>
-              <a:t>, however the actual architecture in a specific stage is unknown </a:t>
-            </a:r>
-          </a:p>
-          <a:p>
-            <a:endParaRPr lang="en-US" sz="4000" dirty="0" smtClean="0"/>
-          </a:p>
-          <a:p>
-            <a:r>
-              <a:rPr lang="en-US" sz="4000" dirty="0" err="1" smtClean="0"/>
-              <a:t>Linx</a:t>
-            </a:r>
-            <a:r>
-              <a:rPr lang="en-US" sz="4000" dirty="0" smtClean="0"/>
-              <a:t>, </a:t>
-            </a:r>
-            <a:r>
-              <a:rPr lang="en-US" sz="4000" dirty="0" err="1" smtClean="0"/>
-              <a:t>xIst,Tsix,xite</a:t>
-            </a:r>
-            <a:endParaRPr lang="en-US" sz="4000" dirty="0"/>
-          </a:p>
-          <a:p>
-            <a:endParaRPr lang="en-US" sz="4000" dirty="0" smtClean="0"/>
-          </a:p>
-          <a:p>
-            <a:endParaRPr lang="en-US" sz="4000" dirty="0" smtClean="0"/>
-          </a:p>
-          <a:p>
-            <a:r>
-              <a:rPr lang="en-US" sz="4000" b="1" dirty="0" smtClean="0"/>
-              <a:t>The data</a:t>
-            </a:r>
-            <a:r>
-              <a:rPr lang="en-US" sz="4000" dirty="0" smtClean="0"/>
-              <a:t>: </a:t>
-            </a:r>
-            <a:r>
-              <a:rPr lang="en-US" sz="4000" dirty="0" smtClean="0"/>
-              <a:t>we a subset of  ~1Mb </a:t>
-            </a:r>
-            <a:r>
-              <a:rPr lang="en-US" sz="4000" dirty="0" smtClean="0"/>
-              <a:t>region of the </a:t>
-            </a:r>
-            <a:r>
-              <a:rPr lang="en-US" sz="4000" dirty="0" smtClean="0"/>
-              <a:t>X-chromosome around the X- inactivation </a:t>
-            </a:r>
-            <a:r>
-              <a:rPr lang="en-US" sz="4000" dirty="0" smtClean="0"/>
-              <a:t>center , provided by </a:t>
-            </a:r>
-            <a:r>
-              <a:rPr lang="en-US" sz="4000" dirty="0" err="1" smtClean="0"/>
+            <a:endParaRPr lang="en-US" sz="2030" dirty="0" smtClean="0"/>
+          </a:p>
+          <a:p>
+            <a:r>
+              <a:rPr lang="en-US" sz="2030" dirty="0" smtClean="0"/>
+              <a:t>we use a </a:t>
+            </a:r>
+            <a:r>
+              <a:rPr lang="en-US" sz="2030" dirty="0"/>
+              <a:t>subset of  ~1Mb region of the X-chromosome around the X- inactivation center , provided by </a:t>
+            </a:r>
+            <a:r>
+              <a:rPr lang="en-US" sz="2030" dirty="0" err="1"/>
               <a:t>G.Luca</a:t>
             </a:r>
             <a:r>
-              <a:rPr lang="en-US" sz="4000" dirty="0" smtClean="0"/>
+              <a:rPr lang="en-US" sz="2030" dirty="0"/>
               <a:t> et. Al.</a:t>
             </a:r>
           </a:p>
           <a:p>
-            <a:r>
-              <a:rPr lang="en-US" sz="4000" dirty="0" smtClean="0"/>
-              <a:t>A coarse graining of the polymer into segments of 3kb and mapping the encounters onto it.</a:t>
-            </a:r>
-            <a:endParaRPr lang="en-US" sz="4000" dirty="0" smtClean="0"/>
-          </a:p>
-          <a:p>
-            <a:endParaRPr lang="en-US" dirty="0"/>
-          </a:p>
-          <a:p>
-            <a:endParaRPr lang="en-US" dirty="0" smtClean="0"/>
-          </a:p>
-          <a:p>
-            <a:endParaRPr lang="en-US" dirty="0"/>
-          </a:p>
-          <a:p>
-            <a:endParaRPr lang="en-US" dirty="0"/>
-          </a:p>
-        </p:txBody>
-      </p:sp>
-      <p:sp>
-        <p:nvSpPr>
-          <p:cNvPr id="11" name="TextBox 10"/>
-          <p:cNvSpPr txBox="1"/>
-          <p:nvPr/>
-        </p:nvSpPr>
-        <p:spPr>
-          <a:xfrm>
-            <a:off x="9350478" y="2405146"/>
-            <a:ext cx="10117395" cy="29023330"/>
-          </a:xfrm>
-          <a:prstGeom prst="rect">
-            <a:avLst/>
-          </a:prstGeom>
-          <a:solidFill>
-            <a:schemeClr val="accent1">
-              <a:lumMod val="20000"/>
-              <a:lumOff val="80000"/>
-            </a:schemeClr>
-          </a:solidFill>
-        </p:spPr>
-        <p:txBody>
-          <a:bodyPr wrap="square" rtlCol="0">
-            <a:spAutoFit/>
-          </a:bodyPr>
-          <a:lstStyle/>
-          <a:p>
-            <a:r>
-              <a:rPr lang="en-US" sz="4000" b="1" dirty="0" smtClean="0"/>
-              <a:t>Method:</a:t>
-            </a:r>
-          </a:p>
-          <a:p>
-            <a:r>
-              <a:rPr lang="en-US" sz="4000" b="1" dirty="0" smtClean="0"/>
-              <a:t>General idea:</a:t>
-            </a:r>
-            <a:r>
-              <a:rPr lang="en-US" sz="4000" dirty="0" smtClean="0"/>
-              <a:t> </a:t>
-            </a:r>
-            <a:r>
-              <a:rPr lang="en-US" sz="4000" dirty="0" smtClean="0"/>
-              <a:t>We start by assuming </a:t>
-            </a:r>
-            <a:r>
-              <a:rPr lang="en-US" sz="4000" dirty="0" smtClean="0"/>
-              <a:t>a Rouse </a:t>
-            </a:r>
-            <a:r>
-              <a:rPr lang="en-US" sz="4000" dirty="0" smtClean="0"/>
-              <a:t>model describing the polymer, </a:t>
-            </a:r>
-            <a:r>
-              <a:rPr lang="en-US" sz="4000" dirty="0" smtClean="0"/>
-              <a:t>map encounter signal into part of loops and chains. </a:t>
-            </a:r>
-          </a:p>
-          <a:p>
-            <a:r>
-              <a:rPr lang="en-US" sz="4000" b="1" dirty="0" smtClean="0"/>
-              <a:t>[add image]</a:t>
-            </a:r>
-            <a:endParaRPr lang="en-US" sz="4000" b="1" dirty="0"/>
-          </a:p>
-          <a:p>
-            <a:endParaRPr lang="en-US" sz="4000" b="1" dirty="0" smtClean="0"/>
-          </a:p>
-          <a:p>
-            <a:r>
-              <a:rPr lang="en-US" sz="4000" dirty="0" smtClean="0"/>
-              <a:t>Coarse graining (by Luca): using bead size of 300bp (the mean restriction fragment size of </a:t>
-            </a:r>
-            <a:r>
-              <a:rPr lang="en-US" sz="4000" dirty="0" err="1" smtClean="0"/>
-              <a:t>HindII</a:t>
-            </a:r>
-            <a:r>
-              <a:rPr lang="en-US" sz="4000" dirty="0" smtClean="0"/>
-              <a:t>) encounters were mapped onto beads. Resulting in </a:t>
-            </a:r>
-            <a:r>
-              <a:rPr lang="en-US" sz="4000" dirty="0" smtClean="0"/>
-              <a:t>a polymer of 307 </a:t>
-            </a:r>
-            <a:r>
-              <a:rPr lang="en-US" sz="4000" dirty="0" smtClean="0"/>
-              <a:t>beads. </a:t>
-            </a:r>
-          </a:p>
-          <a:p>
-            <a:endParaRPr lang="en-US" sz="4000" dirty="0" smtClean="0"/>
-          </a:p>
-          <a:p>
-            <a:r>
-              <a:rPr lang="en-US" sz="4000" dirty="0" smtClean="0"/>
-              <a:t>Signals are noisy </a:t>
-            </a:r>
-          </a:p>
-          <a:p>
-            <a:endParaRPr lang="en-US" sz="4000" dirty="0" smtClean="0"/>
-          </a:p>
-          <a:p>
-            <a:r>
-              <a:rPr lang="en-US" sz="4000" dirty="0" smtClean="0"/>
-              <a:t>Interpolate zero values in the signal </a:t>
-            </a:r>
-          </a:p>
-          <a:p>
-            <a:endParaRPr lang="en-US" sz="4000" dirty="0"/>
-          </a:p>
-          <a:p>
-            <a:r>
-              <a:rPr lang="en-US" sz="4000" dirty="0" smtClean="0"/>
-              <a:t>The </a:t>
-            </a:r>
-            <a:r>
-              <a:rPr lang="en-US" sz="4000" dirty="0" smtClean="0"/>
-              <a:t>encounter probability of the Rouse chain behaves like the diffusion (heat) equation, it is therefore natural to smooth the encounter curve using the diffusion equation. To account for the peaks we have to find an </a:t>
-            </a:r>
-            <a:r>
-              <a:rPr lang="en-US" sz="4000" dirty="0" smtClean="0"/>
-              <a:t>unknown, time dependent source function r(t). </a:t>
-            </a:r>
-            <a:r>
-              <a:rPr lang="en-US" sz="4000" dirty="0" smtClean="0"/>
-              <a:t>We arrive at the inverse heat equation. Finding the source then allows us to smooth the curve with analytical formulas.[add image]</a:t>
-            </a:r>
-          </a:p>
-          <a:p>
-            <a:endParaRPr lang="en-US" sz="4000" dirty="0" smtClean="0"/>
-          </a:p>
-          <a:p>
-            <a:r>
-              <a:rPr lang="en-US" sz="4000" dirty="0" smtClean="0"/>
-              <a:t>break the encounter signals into regions of loops and chain [ add image]</a:t>
-            </a:r>
-          </a:p>
-          <a:p>
-            <a:endParaRPr lang="en-US" sz="4000" dirty="0" smtClean="0"/>
-          </a:p>
-          <a:p>
-            <a:r>
-              <a:rPr lang="en-US" sz="4000" dirty="0" smtClean="0"/>
-              <a:t>Resulting structure can now be fitted with encounter probability functions, assuming Rouse model </a:t>
-            </a:r>
-          </a:p>
-          <a:p>
-            <a:endParaRPr lang="en-US" sz="4000" dirty="0" smtClean="0"/>
-          </a:p>
-          <a:p>
-            <a:r>
-              <a:rPr lang="en-US" sz="4000" dirty="0" smtClean="0"/>
-              <a:t>Find an agreement </a:t>
-            </a:r>
-            <a:r>
-              <a:rPr lang="en-US" sz="4000" dirty="0" smtClean="0"/>
-              <a:t>between the loop location in various signals by probabilistic model</a:t>
-            </a:r>
-          </a:p>
-          <a:p>
-            <a:endParaRPr lang="en-US" sz="4000" dirty="0"/>
-          </a:p>
-          <a:p>
-            <a:r>
-              <a:rPr lang="en-US" sz="4000" dirty="0" smtClean="0"/>
-              <a:t>Reconstruction</a:t>
-            </a:r>
-          </a:p>
-          <a:p>
-            <a:endParaRPr lang="en-US" sz="4000" dirty="0" smtClean="0"/>
-          </a:p>
-          <a:p>
-            <a:r>
-              <a:rPr lang="en-US" sz="4000" dirty="0" smtClean="0"/>
-              <a:t>Simulation of the resulted structure</a:t>
-            </a:r>
-          </a:p>
-          <a:p>
-            <a:endParaRPr lang="en-US" sz="4000" dirty="0"/>
-          </a:p>
-          <a:p>
-            <a:r>
-              <a:rPr lang="en-US" sz="4000" dirty="0" smtClean="0"/>
-              <a:t>Validation with the </a:t>
-            </a:r>
-            <a:r>
-              <a:rPr lang="en-US" sz="4000" dirty="0" err="1" smtClean="0"/>
-              <a:t>HiC</a:t>
-            </a:r>
-            <a:r>
-              <a:rPr lang="en-US" sz="4000" dirty="0" smtClean="0"/>
-              <a:t> </a:t>
-            </a:r>
-            <a:r>
-              <a:rPr lang="en-US" sz="4000" dirty="0" smtClean="0"/>
-              <a:t>maps</a:t>
-            </a:r>
-          </a:p>
-          <a:p>
-            <a:endParaRPr lang="en-US" sz="4000" dirty="0"/>
-          </a:p>
-          <a:p>
-            <a:r>
-              <a:rPr lang="en-US" sz="4000" dirty="0"/>
-              <a:t>TODO:</a:t>
-            </a:r>
-          </a:p>
-          <a:p>
-            <a:r>
-              <a:rPr lang="en-US" sz="4000" dirty="0"/>
-              <a:t>Adjusting the spring constant for peaks higher than nearest neighbor </a:t>
-            </a:r>
-          </a:p>
-          <a:p>
-            <a:endParaRPr lang="en-US" sz="4000" dirty="0" smtClean="0"/>
-          </a:p>
-          <a:p>
-            <a:endParaRPr lang="en-US" sz="4000" dirty="0"/>
-          </a:p>
-          <a:p>
-            <a:endParaRPr lang="en-US" sz="4000" dirty="0"/>
-          </a:p>
-        </p:txBody>
-      </p:sp>
+            <a:endParaRPr lang="en-US" sz="2030" dirty="0"/>
+          </a:p>
+          <a:p>
+            <a:endParaRPr lang="en-US" sz="2030" dirty="0"/>
+          </a:p>
+          <a:p>
+            <a:endParaRPr lang="en-US" sz="2030" dirty="0"/>
+          </a:p>
+          <a:p>
+            <a:endParaRPr lang="en-US" sz="2030" dirty="0"/>
+          </a:p>
+        </p:txBody>
+      </p:sp>
+      <mc:AlternateContent xmlns:mc="http://schemas.openxmlformats.org/markup-compatibility/2006">
+        <mc:Choice xmlns:a14="http://schemas.microsoft.com/office/drawing/2010/main" Requires="a14">
+          <p:sp>
+            <p:nvSpPr>
+              <p:cNvPr id="11" name="TextBox 10"/>
+              <p:cNvSpPr txBox="1"/>
+              <p:nvPr/>
+            </p:nvSpPr>
+            <p:spPr>
+              <a:xfrm>
+                <a:off x="7903758" y="1869097"/>
+                <a:ext cx="7336169" cy="29397920"/>
+              </a:xfrm>
+              <a:prstGeom prst="rect">
+                <a:avLst/>
+              </a:prstGeom>
+              <a:solidFill>
+                <a:schemeClr val="accent1">
+                  <a:lumMod val="20000"/>
+                  <a:lumOff val="80000"/>
+                </a:schemeClr>
+              </a:solidFill>
+            </p:spPr>
+            <p:txBody>
+              <a:bodyPr wrap="square" rtlCol="0">
+                <a:spAutoFit/>
+              </a:bodyPr>
+              <a:lstStyle/>
+              <a:p>
+                <a:r>
+                  <a:rPr lang="en-US" sz="4800" b="1" dirty="0" smtClean="0"/>
+                  <a:t>Methods</a:t>
+                </a:r>
+                <a:r>
+                  <a:rPr lang="en-US" sz="2900" b="1" dirty="0" smtClean="0"/>
+                  <a:t/>
+                </a:r>
+                <a:br>
+                  <a:rPr lang="en-US" sz="2900" b="1" dirty="0" smtClean="0"/>
+                </a:br>
+                <a:endParaRPr lang="en-US" sz="2900" b="1" dirty="0" smtClean="0"/>
+              </a:p>
+              <a:p>
+                <a:r>
+                  <a:rPr lang="en-US" sz="2030" b="1" dirty="0" smtClean="0"/>
+                  <a:t>Modeling the polymer </a:t>
+                </a:r>
+              </a:p>
+              <a:p>
+                <a:pPr/>
+                <a:r>
+                  <a:rPr lang="en-US" sz="2030" dirty="0"/>
+                  <a:t>Assuming </a:t>
+                </a:r>
+                <a:r>
+                  <a:rPr lang="en-US" sz="2030" dirty="0"/>
+                  <a:t>a Rouse model </a:t>
+                </a:r>
+                <a:r>
+                  <a:rPr lang="en-US" sz="2030" dirty="0" smtClean="0"/>
+                  <a:t>to describe </a:t>
+                </a:r>
+                <a:r>
+                  <a:rPr lang="en-US" sz="2030" dirty="0"/>
+                  <a:t>the </a:t>
+                </a:r>
+                <a:r>
+                  <a:rPr lang="en-US" sz="2030" dirty="0" smtClean="0"/>
+                  <a:t>dynamics of the polymer . The potential in the Rouse model is given by </a:t>
+                </a:r>
+                <a:br>
+                  <a:rPr lang="en-US" sz="2030" dirty="0" smtClean="0"/>
+                </a:br>
+                <a14:m>
+                  <m:oMathPara xmlns:m="http://schemas.openxmlformats.org/officeDocument/2006/math">
+                    <m:oMathParaPr>
+                      <m:jc m:val="centerGroup"/>
+                    </m:oMathParaPr>
+                    <m:oMath xmlns:m="http://schemas.openxmlformats.org/officeDocument/2006/math">
+                      <m:r>
+                        <m:rPr>
+                          <m:sty m:val="p"/>
+                        </m:rPr>
+                        <a:rPr lang="el-GR" sz="2030" i="1" smtClean="0">
+                          <a:latin typeface="Cambria Math" panose="02040503050406030204" pitchFamily="18" charset="0"/>
+                          <a:ea typeface="Cambria Math" panose="02040503050406030204" pitchFamily="18" charset="0"/>
+                        </a:rPr>
+                        <m:t>Φ</m:t>
+                      </m:r>
+                      <m:d>
+                        <m:dPr>
+                          <m:ctrlPr>
+                            <a:rPr lang="en-US" sz="2030" b="0" i="1" smtClean="0">
+                              <a:latin typeface="Cambria Math" panose="02040503050406030204" pitchFamily="18" charset="0"/>
+                              <a:ea typeface="Cambria Math" panose="02040503050406030204" pitchFamily="18" charset="0"/>
+                            </a:rPr>
+                          </m:ctrlPr>
+                        </m:dPr>
+                        <m:e>
+                          <m:sSub>
+                            <m:sSubPr>
+                              <m:ctrlPr>
+                                <a:rPr lang="en-US" sz="2030" b="0" i="1" smtClean="0">
+                                  <a:latin typeface="Cambria Math" panose="02040503050406030204" pitchFamily="18" charset="0"/>
+                                  <a:ea typeface="Cambria Math" panose="02040503050406030204" pitchFamily="18" charset="0"/>
+                                </a:rPr>
+                              </m:ctrlPr>
+                            </m:sSubPr>
+                            <m:e>
+                              <m:r>
+                                <a:rPr lang="en-US" sz="2030" b="0" i="1" smtClean="0">
+                                  <a:latin typeface="Cambria Math" panose="02040503050406030204" pitchFamily="18" charset="0"/>
+                                  <a:ea typeface="Cambria Math" panose="02040503050406030204" pitchFamily="18" charset="0"/>
+                                </a:rPr>
+                                <m:t>𝑅</m:t>
+                              </m:r>
+                            </m:e>
+                            <m:sub>
+                              <m:r>
+                                <a:rPr lang="en-US" sz="2030" b="0" i="1" smtClean="0">
+                                  <a:latin typeface="Cambria Math" panose="02040503050406030204" pitchFamily="18" charset="0"/>
+                                  <a:ea typeface="Cambria Math" panose="02040503050406030204" pitchFamily="18" charset="0"/>
+                                </a:rPr>
+                                <m:t>1</m:t>
+                              </m:r>
+                            </m:sub>
+                          </m:sSub>
+                          <m:r>
+                            <a:rPr lang="en-US" sz="2030" b="0" i="1" smtClean="0">
+                              <a:latin typeface="Cambria Math" panose="02040503050406030204" pitchFamily="18" charset="0"/>
+                              <a:ea typeface="Cambria Math" panose="02040503050406030204" pitchFamily="18" charset="0"/>
+                            </a:rPr>
+                            <m:t>,</m:t>
+                          </m:r>
+                          <m:sSub>
+                            <m:sSubPr>
+                              <m:ctrlPr>
+                                <a:rPr lang="en-US" sz="2030" b="0" i="1" smtClean="0">
+                                  <a:latin typeface="Cambria Math" panose="02040503050406030204" pitchFamily="18" charset="0"/>
+                                  <a:ea typeface="Cambria Math" panose="02040503050406030204" pitchFamily="18" charset="0"/>
+                                </a:rPr>
+                              </m:ctrlPr>
+                            </m:sSubPr>
+                            <m:e>
+                              <m:r>
+                                <a:rPr lang="en-US" sz="2030" b="0" i="1" smtClean="0">
+                                  <a:latin typeface="Cambria Math" panose="02040503050406030204" pitchFamily="18" charset="0"/>
+                                  <a:ea typeface="Cambria Math" panose="02040503050406030204" pitchFamily="18" charset="0"/>
+                                </a:rPr>
+                                <m:t>𝑅</m:t>
+                              </m:r>
+                            </m:e>
+                            <m:sub>
+                              <m:r>
+                                <a:rPr lang="en-US" sz="2030" b="0" i="1" smtClean="0">
+                                  <a:latin typeface="Cambria Math" panose="02040503050406030204" pitchFamily="18" charset="0"/>
+                                  <a:ea typeface="Cambria Math" panose="02040503050406030204" pitchFamily="18" charset="0"/>
+                                </a:rPr>
+                                <m:t>2</m:t>
+                              </m:r>
+                            </m:sub>
+                          </m:sSub>
+                          <m:r>
+                            <a:rPr lang="en-US" sz="2030" b="0" i="1" smtClean="0">
+                              <a:latin typeface="Cambria Math" panose="02040503050406030204" pitchFamily="18" charset="0"/>
+                              <a:ea typeface="Cambria Math" panose="02040503050406030204" pitchFamily="18" charset="0"/>
+                            </a:rPr>
+                            <m:t>,..,</m:t>
+                          </m:r>
+                          <m:sSub>
+                            <m:sSubPr>
+                              <m:ctrlPr>
+                                <a:rPr lang="en-US" sz="2030" b="0" i="1" smtClean="0">
+                                  <a:latin typeface="Cambria Math" panose="02040503050406030204" pitchFamily="18" charset="0"/>
+                                  <a:ea typeface="Cambria Math" panose="02040503050406030204" pitchFamily="18" charset="0"/>
+                                </a:rPr>
+                              </m:ctrlPr>
+                            </m:sSubPr>
+                            <m:e>
+                              <m:r>
+                                <a:rPr lang="en-US" sz="2030" b="0" i="1" smtClean="0">
+                                  <a:latin typeface="Cambria Math" panose="02040503050406030204" pitchFamily="18" charset="0"/>
+                                  <a:ea typeface="Cambria Math" panose="02040503050406030204" pitchFamily="18" charset="0"/>
+                                </a:rPr>
+                                <m:t>𝑅</m:t>
+                              </m:r>
+                            </m:e>
+                            <m:sub>
+                              <m:r>
+                                <a:rPr lang="en-US" sz="2030" b="0" i="1" smtClean="0">
+                                  <a:latin typeface="Cambria Math" panose="02040503050406030204" pitchFamily="18" charset="0"/>
+                                  <a:ea typeface="Cambria Math" panose="02040503050406030204" pitchFamily="18" charset="0"/>
+                                </a:rPr>
+                                <m:t>𝑁</m:t>
+                              </m:r>
+                            </m:sub>
+                          </m:sSub>
+                        </m:e>
+                      </m:d>
+                      <m:r>
+                        <a:rPr lang="en-US" sz="2030" b="0" i="1" smtClean="0">
+                          <a:latin typeface="Cambria Math" panose="02040503050406030204" pitchFamily="18" charset="0"/>
+                          <a:ea typeface="Cambria Math" panose="02040503050406030204" pitchFamily="18" charset="0"/>
+                        </a:rPr>
+                        <m:t>=</m:t>
+                      </m:r>
+                      <m:f>
+                        <m:fPr>
+                          <m:ctrlPr>
+                            <a:rPr lang="en-US" sz="2030" b="0" i="1" smtClean="0">
+                              <a:latin typeface="Cambria Math" panose="02040503050406030204" pitchFamily="18" charset="0"/>
+                              <a:ea typeface="Cambria Math" panose="02040503050406030204" pitchFamily="18" charset="0"/>
+                            </a:rPr>
+                          </m:ctrlPr>
+                        </m:fPr>
+                        <m:num>
+                          <m:r>
+                            <a:rPr lang="en-US" sz="2030" b="0" i="1" smtClean="0">
+                              <a:latin typeface="Cambria Math" panose="02040503050406030204" pitchFamily="18" charset="0"/>
+                              <a:ea typeface="Cambria Math" panose="02040503050406030204" pitchFamily="18" charset="0"/>
+                            </a:rPr>
+                            <m:t>𝑘</m:t>
+                          </m:r>
+                        </m:num>
+                        <m:den>
+                          <m:r>
+                            <a:rPr lang="en-US" sz="2030" b="0" i="1" smtClean="0">
+                              <a:latin typeface="Cambria Math" panose="02040503050406030204" pitchFamily="18" charset="0"/>
+                              <a:ea typeface="Cambria Math" panose="02040503050406030204" pitchFamily="18" charset="0"/>
+                            </a:rPr>
+                            <m:t>4</m:t>
+                          </m:r>
+                        </m:den>
+                      </m:f>
+                      <m:nary>
+                        <m:naryPr>
+                          <m:chr m:val="∑"/>
+                          <m:ctrlPr>
+                            <a:rPr lang="en-US" sz="2030" b="0" i="1" smtClean="0">
+                              <a:latin typeface="Cambria Math" panose="02040503050406030204" pitchFamily="18" charset="0"/>
+                              <a:ea typeface="Cambria Math" panose="02040503050406030204" pitchFamily="18" charset="0"/>
+                            </a:rPr>
+                          </m:ctrlPr>
+                        </m:naryPr>
+                        <m:sub>
+                          <m:r>
+                            <m:rPr>
+                              <m:brk m:alnAt="23"/>
+                            </m:rPr>
+                            <a:rPr lang="en-US" sz="2030" b="0" i="1" smtClean="0">
+                              <a:latin typeface="Cambria Math" panose="02040503050406030204" pitchFamily="18" charset="0"/>
+                              <a:ea typeface="Cambria Math" panose="02040503050406030204" pitchFamily="18" charset="0"/>
+                            </a:rPr>
+                            <m:t>𝑖</m:t>
+                          </m:r>
+                          <m:r>
+                            <a:rPr lang="en-US" sz="2030" b="0" i="1" smtClean="0">
+                              <a:latin typeface="Cambria Math" panose="02040503050406030204" pitchFamily="18" charset="0"/>
+                              <a:ea typeface="Cambria Math" panose="02040503050406030204" pitchFamily="18" charset="0"/>
+                            </a:rPr>
+                            <m:t>=1</m:t>
+                          </m:r>
+                        </m:sub>
+                        <m:sup>
+                          <m:r>
+                            <a:rPr lang="en-US" sz="2030" b="0" i="1" smtClean="0">
+                              <a:latin typeface="Cambria Math" panose="02040503050406030204" pitchFamily="18" charset="0"/>
+                              <a:ea typeface="Cambria Math" panose="02040503050406030204" pitchFamily="18" charset="0"/>
+                            </a:rPr>
+                            <m:t>𝑁</m:t>
+                          </m:r>
+                        </m:sup>
+                        <m:e>
+                          <m:nary>
+                            <m:naryPr>
+                              <m:chr m:val="∑"/>
+                              <m:ctrlPr>
+                                <a:rPr lang="en-US" sz="2030" i="1">
+                                  <a:latin typeface="Cambria Math" panose="02040503050406030204" pitchFamily="18" charset="0"/>
+                                  <a:ea typeface="Cambria Math" panose="02040503050406030204" pitchFamily="18" charset="0"/>
+                                </a:rPr>
+                              </m:ctrlPr>
+                            </m:naryPr>
+                            <m:sub>
+                              <m:r>
+                                <m:rPr>
+                                  <m:brk m:alnAt="23"/>
+                                </m:rPr>
+                                <a:rPr lang="en-US" sz="2030" b="0" i="1" smtClean="0">
+                                  <a:latin typeface="Cambria Math" panose="02040503050406030204" pitchFamily="18" charset="0"/>
+                                  <a:ea typeface="Cambria Math" panose="02040503050406030204" pitchFamily="18" charset="0"/>
+                                </a:rPr>
+                                <m:t>𝑗</m:t>
+                              </m:r>
+                            </m:sub>
+                            <m:sup>
+                              <m:r>
+                                <a:rPr lang="en-US" sz="2030" b="0" i="1" smtClean="0">
+                                  <a:latin typeface="Cambria Math" panose="02040503050406030204" pitchFamily="18" charset="0"/>
+                                  <a:ea typeface="Cambria Math" panose="02040503050406030204" pitchFamily="18" charset="0"/>
+                                </a:rPr>
+                                <m:t>𝑁</m:t>
+                              </m:r>
+                            </m:sup>
+                            <m:e>
+                              <m:sSup>
+                                <m:sSupPr>
+                                  <m:ctrlPr>
+                                    <a:rPr lang="en-US" sz="2030" i="1">
+                                      <a:latin typeface="Cambria Math" panose="02040503050406030204" pitchFamily="18" charset="0"/>
+                                      <a:ea typeface="Cambria Math" panose="02040503050406030204" pitchFamily="18" charset="0"/>
+                                    </a:rPr>
+                                  </m:ctrlPr>
+                                </m:sSupPr>
+                                <m:e>
+                                  <m:sSub>
+                                    <m:sSubPr>
+                                      <m:ctrlPr>
+                                        <a:rPr lang="en-US" sz="2030" b="0" i="1" smtClean="0">
+                                          <a:latin typeface="Cambria Math" panose="02040503050406030204" pitchFamily="18" charset="0"/>
+                                          <a:ea typeface="Cambria Math" panose="02040503050406030204" pitchFamily="18" charset="0"/>
+                                        </a:rPr>
+                                      </m:ctrlPr>
+                                    </m:sSubPr>
+                                    <m:e>
+                                      <m:r>
+                                        <a:rPr lang="en-US" sz="2030" b="0" i="1" smtClean="0">
+                                          <a:latin typeface="Cambria Math" panose="02040503050406030204" pitchFamily="18" charset="0"/>
+                                          <a:ea typeface="Cambria Math" panose="02040503050406030204" pitchFamily="18" charset="0"/>
+                                        </a:rPr>
+                                        <m:t>𝛿</m:t>
+                                      </m:r>
+                                    </m:e>
+                                    <m:sub>
+                                      <m:r>
+                                        <a:rPr lang="en-US" sz="2030" b="0" i="1" smtClean="0">
+                                          <a:latin typeface="Cambria Math" panose="02040503050406030204" pitchFamily="18" charset="0"/>
+                                          <a:ea typeface="Cambria Math" panose="02040503050406030204" pitchFamily="18" charset="0"/>
+                                        </a:rPr>
+                                        <m:t>𝑖𝑗</m:t>
+                                      </m:r>
+                                    </m:sub>
+                                  </m:sSub>
+                                  <m:d>
+                                    <m:dPr>
+                                      <m:ctrlPr>
+                                        <a:rPr lang="en-US" sz="2030" i="1">
+                                          <a:latin typeface="Cambria Math" panose="02040503050406030204" pitchFamily="18" charset="0"/>
+                                          <a:ea typeface="Cambria Math" panose="02040503050406030204" pitchFamily="18" charset="0"/>
+                                        </a:rPr>
+                                      </m:ctrlPr>
+                                    </m:dPr>
+                                    <m:e>
+                                      <m:sSub>
+                                        <m:sSubPr>
+                                          <m:ctrlPr>
+                                            <a:rPr lang="en-US" sz="2030" i="1">
+                                              <a:latin typeface="Cambria Math" panose="02040503050406030204" pitchFamily="18" charset="0"/>
+                                              <a:ea typeface="Cambria Math" panose="02040503050406030204" pitchFamily="18" charset="0"/>
+                                            </a:rPr>
+                                          </m:ctrlPr>
+                                        </m:sSubPr>
+                                        <m:e>
+                                          <m:r>
+                                            <a:rPr lang="en-US" sz="2030" i="1">
+                                              <a:latin typeface="Cambria Math" panose="02040503050406030204" pitchFamily="18" charset="0"/>
+                                              <a:ea typeface="Cambria Math" panose="02040503050406030204" pitchFamily="18" charset="0"/>
+                                            </a:rPr>
+                                            <m:t>𝑅</m:t>
+                                          </m:r>
+                                        </m:e>
+                                        <m:sub>
+                                          <m:r>
+                                            <a:rPr lang="en-US" sz="2030" i="1">
+                                              <a:latin typeface="Cambria Math" panose="02040503050406030204" pitchFamily="18" charset="0"/>
+                                              <a:ea typeface="Cambria Math" panose="02040503050406030204" pitchFamily="18" charset="0"/>
+                                            </a:rPr>
+                                            <m:t>𝑖</m:t>
+                                          </m:r>
+                                        </m:sub>
+                                      </m:sSub>
+                                      <m:r>
+                                        <a:rPr lang="en-US" sz="2030" i="1">
+                                          <a:latin typeface="Cambria Math" panose="02040503050406030204" pitchFamily="18" charset="0"/>
+                                          <a:ea typeface="Cambria Math" panose="02040503050406030204" pitchFamily="18" charset="0"/>
+                                        </a:rPr>
+                                        <m:t>−</m:t>
+                                      </m:r>
+                                      <m:sSub>
+                                        <m:sSubPr>
+                                          <m:ctrlPr>
+                                            <a:rPr lang="en-US" sz="2030" i="1">
+                                              <a:latin typeface="Cambria Math" panose="02040503050406030204" pitchFamily="18" charset="0"/>
+                                              <a:ea typeface="Cambria Math" panose="02040503050406030204" pitchFamily="18" charset="0"/>
+                                            </a:rPr>
+                                          </m:ctrlPr>
+                                        </m:sSubPr>
+                                        <m:e>
+                                          <m:r>
+                                            <a:rPr lang="en-US" sz="2030" i="1">
+                                              <a:latin typeface="Cambria Math" panose="02040503050406030204" pitchFamily="18" charset="0"/>
+                                              <a:ea typeface="Cambria Math" panose="02040503050406030204" pitchFamily="18" charset="0"/>
+                                            </a:rPr>
+                                            <m:t>𝑅</m:t>
+                                          </m:r>
+                                        </m:e>
+                                        <m:sub>
+                                          <m:r>
+                                            <a:rPr lang="en-US" sz="2030" i="1">
+                                              <a:latin typeface="Cambria Math" panose="02040503050406030204" pitchFamily="18" charset="0"/>
+                                              <a:ea typeface="Cambria Math" panose="02040503050406030204" pitchFamily="18" charset="0"/>
+                                            </a:rPr>
+                                            <m:t>𝑗</m:t>
+                                          </m:r>
+                                        </m:sub>
+                                      </m:sSub>
+                                    </m:e>
+                                  </m:d>
+                                </m:e>
+                                <m:sup>
+                                  <m:r>
+                                    <a:rPr lang="en-US" sz="2030" i="1">
+                                      <a:latin typeface="Cambria Math" panose="02040503050406030204" pitchFamily="18" charset="0"/>
+                                      <a:ea typeface="Cambria Math" panose="02040503050406030204" pitchFamily="18" charset="0"/>
+                                    </a:rPr>
+                                    <m:t>2</m:t>
+                                  </m:r>
+                                </m:sup>
+                              </m:sSup>
+                            </m:e>
+                          </m:nary>
+                        </m:e>
+                      </m:nary>
+                    </m:oMath>
+                  </m:oMathPara>
+                </a14:m>
+                <a:r>
+                  <a:rPr lang="en-US" sz="2030" dirty="0" smtClean="0"/>
+                  <a:t/>
+                </a:r>
+                <a:br>
+                  <a:rPr lang="en-US" sz="2030" dirty="0" smtClean="0"/>
+                </a:br>
+                <a:r>
+                  <a:rPr lang="en-US" sz="2030" dirty="0" smtClean="0"/>
+                  <a:t>with </a:t>
+                </a:r>
+                <a14:m>
+                  <m:oMath xmlns:m="http://schemas.openxmlformats.org/officeDocument/2006/math">
+                    <m:r>
+                      <a:rPr lang="en-US" sz="2030" b="0" i="1" smtClean="0">
+                        <a:latin typeface="Cambria Math" panose="02040503050406030204" pitchFamily="18" charset="0"/>
+                      </a:rPr>
+                      <m:t>𝑘</m:t>
+                    </m:r>
+                  </m:oMath>
+                </a14:m>
+                <a:r>
+                  <a:rPr lang="en-US" sz="2030" dirty="0" smtClean="0"/>
+                  <a:t> the spring constant, </a:t>
+                </a:r>
+                <a14:m>
+                  <m:oMath xmlns:m="http://schemas.openxmlformats.org/officeDocument/2006/math">
+                    <m:sSub>
+                      <m:sSubPr>
+                        <m:ctrlPr>
+                          <a:rPr lang="en-US" sz="2030" b="0" i="1" smtClean="0">
+                            <a:latin typeface="Cambria Math" panose="02040503050406030204" pitchFamily="18" charset="0"/>
+                          </a:rPr>
+                        </m:ctrlPr>
+                      </m:sSubPr>
+                      <m:e>
+                        <m:r>
+                          <a:rPr lang="en-US" sz="2030" b="0" i="1" smtClean="0">
+                            <a:latin typeface="Cambria Math" panose="02040503050406030204" pitchFamily="18" charset="0"/>
+                          </a:rPr>
+                          <m:t>𝛿</m:t>
+                        </m:r>
+                      </m:e>
+                      <m:sub>
+                        <m:r>
+                          <a:rPr lang="en-US" sz="2030" b="0" i="1" smtClean="0">
+                            <a:latin typeface="Cambria Math" panose="02040503050406030204" pitchFamily="18" charset="0"/>
+                          </a:rPr>
+                          <m:t>𝑖𝑗</m:t>
+                        </m:r>
+                      </m:sub>
+                    </m:sSub>
+                    <m:r>
+                      <a:rPr lang="en-US" sz="2030" b="0" i="1" smtClean="0">
+                        <a:latin typeface="Cambria Math" panose="02040503050406030204" pitchFamily="18" charset="0"/>
+                      </a:rPr>
+                      <m:t>=1</m:t>
+                    </m:r>
+                  </m:oMath>
+                </a14:m>
+                <a:r>
+                  <a:rPr lang="en-US" sz="2030" dirty="0" smtClean="0"/>
+                  <a:t> if beads </a:t>
+                </a:r>
+                <a14:m>
+                  <m:oMath xmlns:m="http://schemas.openxmlformats.org/officeDocument/2006/math">
+                    <m:r>
+                      <a:rPr lang="en-US" sz="2030" b="0" i="1" smtClean="0">
+                        <a:latin typeface="Cambria Math" panose="02040503050406030204" pitchFamily="18" charset="0"/>
+                      </a:rPr>
+                      <m:t>𝑖</m:t>
+                    </m:r>
+                  </m:oMath>
+                </a14:m>
+                <a:r>
+                  <a:rPr lang="en-US" sz="2030" dirty="0" smtClean="0"/>
+                  <a:t> and </a:t>
+                </a:r>
+                <a14:m>
+                  <m:oMath xmlns:m="http://schemas.openxmlformats.org/officeDocument/2006/math">
+                    <m:r>
+                      <a:rPr lang="en-US" sz="2030" b="0" i="1" smtClean="0">
+                        <a:latin typeface="Cambria Math" panose="02040503050406030204" pitchFamily="18" charset="0"/>
+                      </a:rPr>
+                      <m:t>𝑗</m:t>
+                    </m:r>
+                  </m:oMath>
+                </a14:m>
+                <a:r>
+                  <a:rPr lang="en-US" sz="2030" dirty="0" smtClean="0"/>
+                  <a:t> are connected, and 0 otherwise. The </a:t>
+                </a:r>
+                <a:r>
+                  <a:rPr lang="en-US" sz="2030" dirty="0"/>
+                  <a:t>stochastic dynamics of bead </a:t>
+                </a:r>
+                <a14:m>
+                  <m:oMath xmlns:m="http://schemas.openxmlformats.org/officeDocument/2006/math">
+                    <m:r>
+                      <a:rPr lang="en-US" sz="2030" b="0" i="1" smtClean="0">
+                        <a:latin typeface="Cambria Math" panose="02040503050406030204" pitchFamily="18" charset="0"/>
+                      </a:rPr>
+                      <m:t>𝑖</m:t>
+                    </m:r>
+                  </m:oMath>
+                </a14:m>
+                <a:r>
+                  <a:rPr lang="en-US" sz="2030" dirty="0" smtClean="0"/>
+                  <a:t>  </a:t>
+                </a:r>
+                <a:r>
+                  <a:rPr lang="en-US" sz="2030" dirty="0"/>
+                  <a:t>in a rouse chain of  N beads is given by</a:t>
+                </a:r>
+                <a:r>
+                  <a:rPr lang="en-US" sz="2030" dirty="0" smtClean="0"/>
+                  <a:t>:</a:t>
+                </a:r>
+              </a:p>
+              <a:p>
+                <a:pPr/>
+                <a:r>
+                  <a:rPr lang="en-US" sz="2030" dirty="0"/>
+                  <a:t/>
+                </a:r>
+                <a:br>
+                  <a:rPr lang="en-US" sz="2030" dirty="0"/>
+                </a:br>
+                <a14:m>
+                  <m:oMathPara xmlns:m="http://schemas.openxmlformats.org/officeDocument/2006/math">
+                    <m:oMathParaPr>
+                      <m:jc m:val="centerGroup"/>
+                    </m:oMathParaPr>
+                    <m:oMath xmlns:m="http://schemas.openxmlformats.org/officeDocument/2006/math">
+                      <m:f>
+                        <m:fPr>
+                          <m:ctrlPr>
+                            <a:rPr lang="en-US" sz="2030" i="1">
+                              <a:latin typeface="Cambria Math" panose="02040503050406030204" pitchFamily="18" charset="0"/>
+                            </a:rPr>
+                          </m:ctrlPr>
+                        </m:fPr>
+                        <m:num>
+                          <m:r>
+                            <a:rPr lang="en-US" sz="2030" i="1">
+                              <a:latin typeface="Cambria Math" panose="02040503050406030204" pitchFamily="18" charset="0"/>
+                            </a:rPr>
+                            <m:t>𝑑</m:t>
+                          </m:r>
+                          <m:sSub>
+                            <m:sSubPr>
+                              <m:ctrlPr>
+                                <a:rPr lang="en-US" sz="2030" i="1">
+                                  <a:latin typeface="Cambria Math" panose="02040503050406030204" pitchFamily="18" charset="0"/>
+                                </a:rPr>
+                              </m:ctrlPr>
+                            </m:sSubPr>
+                            <m:e>
+                              <m:r>
+                                <a:rPr lang="en-US" sz="2030" i="1">
+                                  <a:latin typeface="Cambria Math" panose="02040503050406030204" pitchFamily="18" charset="0"/>
+                                </a:rPr>
+                                <m:t>𝑅</m:t>
+                              </m:r>
+                            </m:e>
+                            <m:sub>
+                              <m:r>
+                                <a:rPr lang="en-US" sz="2030" i="1">
+                                  <a:latin typeface="Cambria Math" panose="02040503050406030204" pitchFamily="18" charset="0"/>
+                                </a:rPr>
+                                <m:t>𝑖</m:t>
+                              </m:r>
+                            </m:sub>
+                          </m:sSub>
+                          <m:r>
+                            <a:rPr lang="en-US" sz="2030" i="1">
+                              <a:latin typeface="Cambria Math" panose="02040503050406030204" pitchFamily="18" charset="0"/>
+                            </a:rPr>
+                            <m:t>(</m:t>
+                          </m:r>
+                          <m:r>
+                            <a:rPr lang="en-US" sz="2030" i="1">
+                              <a:latin typeface="Cambria Math" panose="02040503050406030204" pitchFamily="18" charset="0"/>
+                            </a:rPr>
+                            <m:t>𝑡</m:t>
+                          </m:r>
+                          <m:r>
+                            <a:rPr lang="en-US" sz="2030" i="1">
+                              <a:latin typeface="Cambria Math" panose="02040503050406030204" pitchFamily="18" charset="0"/>
+                            </a:rPr>
+                            <m:t>)</m:t>
+                          </m:r>
+                        </m:num>
+                        <m:den>
+                          <m:r>
+                            <a:rPr lang="en-US" sz="2030" i="1">
+                              <a:latin typeface="Cambria Math" panose="02040503050406030204" pitchFamily="18" charset="0"/>
+                            </a:rPr>
+                            <m:t>𝑑𝑡</m:t>
+                          </m:r>
+                        </m:den>
+                      </m:f>
+                      <m:r>
+                        <a:rPr lang="en-US" sz="2030" i="1">
+                          <a:latin typeface="Cambria Math" panose="02040503050406030204" pitchFamily="18" charset="0"/>
+                        </a:rPr>
+                        <m:t>=−</m:t>
+                      </m:r>
+                      <m:r>
+                        <a:rPr lang="en-US" sz="2030" b="0" i="1" smtClean="0">
+                          <a:latin typeface="Cambria Math" panose="02040503050406030204" pitchFamily="18" charset="0"/>
+                        </a:rPr>
+                        <m:t>𝐷</m:t>
+                      </m:r>
+                      <m:r>
+                        <a:rPr lang="en-US" sz="2030" i="1">
+                          <a:latin typeface="Cambria Math" panose="02040503050406030204" pitchFamily="18" charset="0"/>
+                          <a:ea typeface="Cambria Math" panose="02040503050406030204" pitchFamily="18" charset="0"/>
+                        </a:rPr>
+                        <m:t>∇</m:t>
+                      </m:r>
+                      <m:sSub>
+                        <m:sSubPr>
+                          <m:ctrlPr>
+                            <a:rPr lang="en-US" sz="2030" b="0" i="1" smtClean="0">
+                              <a:latin typeface="Cambria Math" panose="02040503050406030204" pitchFamily="18" charset="0"/>
+                              <a:ea typeface="Cambria Math" panose="02040503050406030204" pitchFamily="18" charset="0"/>
+                            </a:rPr>
+                          </m:ctrlPr>
+                        </m:sSubPr>
+                        <m:e>
+                          <m:r>
+                            <m:rPr>
+                              <m:sty m:val="p"/>
+                            </m:rPr>
+                            <a:rPr lang="el-GR" sz="2030" i="1" smtClean="0">
+                              <a:latin typeface="Cambria Math" panose="02040503050406030204" pitchFamily="18" charset="0"/>
+                              <a:ea typeface="Cambria Math" panose="02040503050406030204" pitchFamily="18" charset="0"/>
+                            </a:rPr>
+                            <m:t>Φ</m:t>
+                          </m:r>
+                        </m:e>
+                        <m:sub>
+                          <m:sSub>
+                            <m:sSubPr>
+                              <m:ctrlPr>
+                                <a:rPr lang="en-US" sz="2030" b="0" i="1" smtClean="0">
+                                  <a:latin typeface="Cambria Math" panose="02040503050406030204" pitchFamily="18" charset="0"/>
+                                  <a:ea typeface="Cambria Math" panose="02040503050406030204" pitchFamily="18" charset="0"/>
+                                </a:rPr>
+                              </m:ctrlPr>
+                            </m:sSubPr>
+                            <m:e>
+                              <m:r>
+                                <a:rPr lang="en-US" sz="2030" b="0" i="1" smtClean="0">
+                                  <a:latin typeface="Cambria Math" panose="02040503050406030204" pitchFamily="18" charset="0"/>
+                                  <a:ea typeface="Cambria Math" panose="02040503050406030204" pitchFamily="18" charset="0"/>
+                                </a:rPr>
+                                <m:t>𝑅</m:t>
+                              </m:r>
+                            </m:e>
+                            <m:sub>
+                              <m:r>
+                                <a:rPr lang="en-US" sz="2030" b="0" i="1" smtClean="0">
+                                  <a:latin typeface="Cambria Math" panose="02040503050406030204" pitchFamily="18" charset="0"/>
+                                  <a:ea typeface="Cambria Math" panose="02040503050406030204" pitchFamily="18" charset="0"/>
+                                </a:rPr>
+                                <m:t>𝑖</m:t>
+                              </m:r>
+                            </m:sub>
+                          </m:sSub>
+                        </m:sub>
+                      </m:sSub>
+                      <m:r>
+                        <a:rPr lang="en-US" sz="2030" i="1">
+                          <a:latin typeface="Cambria Math" panose="02040503050406030204" pitchFamily="18" charset="0"/>
+                        </a:rPr>
+                        <m:t>+</m:t>
+                      </m:r>
+                      <m:rad>
+                        <m:radPr>
+                          <m:degHide m:val="on"/>
+                          <m:ctrlPr>
+                            <a:rPr lang="en-US" sz="2030" i="1">
+                              <a:latin typeface="Cambria Math" panose="02040503050406030204" pitchFamily="18" charset="0"/>
+                            </a:rPr>
+                          </m:ctrlPr>
+                        </m:radPr>
+                        <m:deg/>
+                        <m:e>
+                          <m:r>
+                            <a:rPr lang="en-US" sz="2030" i="1">
+                              <a:latin typeface="Cambria Math" panose="02040503050406030204" pitchFamily="18" charset="0"/>
+                            </a:rPr>
+                            <m:t>2</m:t>
+                          </m:r>
+                          <m:r>
+                            <a:rPr lang="en-US" sz="2030" i="1">
+                              <a:latin typeface="Cambria Math" panose="02040503050406030204" pitchFamily="18" charset="0"/>
+                            </a:rPr>
+                            <m:t>𝐷</m:t>
+                          </m:r>
+                        </m:e>
+                      </m:rad>
+                      <m:f>
+                        <m:fPr>
+                          <m:ctrlPr>
+                            <a:rPr lang="en-US" sz="2030" i="1">
+                              <a:latin typeface="Cambria Math" panose="02040503050406030204" pitchFamily="18" charset="0"/>
+                            </a:rPr>
+                          </m:ctrlPr>
+                        </m:fPr>
+                        <m:num>
+                          <m:r>
+                            <a:rPr lang="en-US" sz="2030" i="1">
+                              <a:latin typeface="Cambria Math" panose="02040503050406030204" pitchFamily="18" charset="0"/>
+                            </a:rPr>
+                            <m:t>𝑑𝑤</m:t>
+                          </m:r>
+                          <m:r>
+                            <a:rPr lang="en-US" sz="2030" i="1">
+                              <a:latin typeface="Cambria Math" panose="02040503050406030204" pitchFamily="18" charset="0"/>
+                            </a:rPr>
+                            <m:t>(</m:t>
+                          </m:r>
+                          <m:r>
+                            <a:rPr lang="en-US" sz="2030" i="1">
+                              <a:latin typeface="Cambria Math" panose="02040503050406030204" pitchFamily="18" charset="0"/>
+                            </a:rPr>
+                            <m:t>𝑡</m:t>
+                          </m:r>
+                          <m:r>
+                            <a:rPr lang="en-US" sz="2030" i="1">
+                              <a:latin typeface="Cambria Math" panose="02040503050406030204" pitchFamily="18" charset="0"/>
+                            </a:rPr>
+                            <m:t>)</m:t>
+                          </m:r>
+                        </m:num>
+                        <m:den>
+                          <m:r>
+                            <a:rPr lang="en-US" sz="2030" i="1">
+                              <a:latin typeface="Cambria Math" panose="02040503050406030204" pitchFamily="18" charset="0"/>
+                            </a:rPr>
+                            <m:t>𝑑𝑡</m:t>
+                          </m:r>
+                        </m:den>
+                      </m:f>
+                    </m:oMath>
+                  </m:oMathPara>
+                </a14:m>
+                <a:endParaRPr lang="en-US" sz="2030" dirty="0"/>
+              </a:p>
+              <a:p>
+                <a:endParaRPr lang="en-US" sz="2030" b="1" dirty="0"/>
+              </a:p>
+              <a:p>
+                <a:r>
+                  <a:rPr lang="en-US" sz="2030" dirty="0"/>
+                  <a:t>With </a:t>
+                </a:r>
+                <a14:m>
+                  <m:oMath xmlns:m="http://schemas.openxmlformats.org/officeDocument/2006/math">
+                    <m:sSub>
+                      <m:sSubPr>
+                        <m:ctrlPr>
+                          <a:rPr lang="en-US" sz="2030" i="1">
+                            <a:latin typeface="Cambria Math" panose="02040503050406030204" pitchFamily="18" charset="0"/>
+                          </a:rPr>
+                        </m:ctrlPr>
+                      </m:sSubPr>
+                      <m:e>
+                        <m:r>
+                          <a:rPr lang="en-US" sz="2030" i="1">
+                            <a:latin typeface="Cambria Math" panose="02040503050406030204" pitchFamily="18" charset="0"/>
+                          </a:rPr>
+                          <m:t>𝑅</m:t>
+                        </m:r>
+                      </m:e>
+                      <m:sub>
+                        <m:r>
+                          <a:rPr lang="en-US" sz="2030" i="1">
+                            <a:latin typeface="Cambria Math" panose="02040503050406030204" pitchFamily="18" charset="0"/>
+                          </a:rPr>
+                          <m:t>𝑖</m:t>
+                        </m:r>
+                      </m:sub>
+                    </m:sSub>
+                    <m:r>
+                      <a:rPr lang="en-US" sz="2030" i="1">
+                        <a:latin typeface="Cambria Math" panose="02040503050406030204" pitchFamily="18" charset="0"/>
+                      </a:rPr>
+                      <m:t>(</m:t>
+                    </m:r>
+                    <m:r>
+                      <a:rPr lang="en-US" sz="2030" i="1">
+                        <a:latin typeface="Cambria Math" panose="02040503050406030204" pitchFamily="18" charset="0"/>
+                      </a:rPr>
+                      <m:t>𝑡</m:t>
+                    </m:r>
+                    <m:r>
+                      <a:rPr lang="en-US" sz="2030" i="1">
+                        <a:latin typeface="Cambria Math" panose="02040503050406030204" pitchFamily="18" charset="0"/>
+                      </a:rPr>
+                      <m:t>)</m:t>
+                    </m:r>
+                  </m:oMath>
+                </a14:m>
+                <a:r>
+                  <a:rPr lang="en-US" sz="2030" dirty="0"/>
+                  <a:t> the position of bead </a:t>
+                </a:r>
+                <a14:m>
+                  <m:oMath xmlns:m="http://schemas.openxmlformats.org/officeDocument/2006/math">
+                    <m:r>
+                      <a:rPr lang="en-US" sz="2030" i="1">
+                        <a:latin typeface="Cambria Math" panose="02040503050406030204" pitchFamily="18" charset="0"/>
+                      </a:rPr>
+                      <m:t>𝑖</m:t>
+                    </m:r>
+                  </m:oMath>
+                </a14:m>
+                <a:r>
+                  <a:rPr lang="en-US" sz="2030" dirty="0"/>
+                  <a:t> at time </a:t>
+                </a:r>
+                <a14:m>
+                  <m:oMath xmlns:m="http://schemas.openxmlformats.org/officeDocument/2006/math">
+                    <m:r>
+                      <a:rPr lang="en-US" sz="2030" i="1">
+                        <a:latin typeface="Cambria Math" panose="02040503050406030204" pitchFamily="18" charset="0"/>
+                      </a:rPr>
+                      <m:t>𝑡</m:t>
+                    </m:r>
+                  </m:oMath>
+                </a14:m>
+                <a:r>
+                  <a:rPr lang="en-US" sz="2030" dirty="0"/>
+                  <a:t> , </a:t>
+                </a:r>
+                <a14:m>
+                  <m:oMath xmlns:m="http://schemas.openxmlformats.org/officeDocument/2006/math">
+                    <m:r>
+                      <a:rPr lang="en-US" sz="2030" i="1">
+                        <a:latin typeface="Cambria Math" panose="02040503050406030204" pitchFamily="18" charset="0"/>
+                      </a:rPr>
+                      <m:t>𝐷</m:t>
+                    </m:r>
+                  </m:oMath>
+                </a14:m>
+                <a:r>
+                  <a:rPr lang="en-US" sz="2030" dirty="0"/>
+                  <a:t> is the diffusion constant, and </a:t>
+                </a:r>
+                <a14:m>
+                  <m:oMath xmlns:m="http://schemas.openxmlformats.org/officeDocument/2006/math">
+                    <m:r>
+                      <a:rPr lang="en-US" sz="2030" i="1">
+                        <a:latin typeface="Cambria Math" panose="02040503050406030204" pitchFamily="18" charset="0"/>
+                      </a:rPr>
+                      <m:t>𝑤</m:t>
+                    </m:r>
+                    <m:r>
+                      <a:rPr lang="en-US" sz="2030" i="1">
+                        <a:latin typeface="Cambria Math" panose="02040503050406030204" pitchFamily="18" charset="0"/>
+                      </a:rPr>
+                      <m:t>(</m:t>
+                    </m:r>
+                    <m:r>
+                      <a:rPr lang="en-US" sz="2030" i="1">
+                        <a:latin typeface="Cambria Math" panose="02040503050406030204" pitchFamily="18" charset="0"/>
+                      </a:rPr>
+                      <m:t>𝑡</m:t>
+                    </m:r>
+                    <m:r>
+                      <a:rPr lang="en-US" sz="2030" i="1">
+                        <a:latin typeface="Cambria Math" panose="02040503050406030204" pitchFamily="18" charset="0"/>
+                      </a:rPr>
+                      <m:t>)</m:t>
+                    </m:r>
+                  </m:oMath>
+                </a14:m>
+                <a:r>
+                  <a:rPr lang="en-US" sz="2030" dirty="0"/>
+                  <a:t> is a white Gaussian noise with </a:t>
+                </a:r>
+                <a:r>
+                  <a:rPr lang="en-US" sz="2030" dirty="0" smtClean="0"/>
+                  <a:t>mean 0 a variance 1.</a:t>
+                </a:r>
+                <a:endParaRPr lang="en-US" sz="2030" dirty="0"/>
+              </a:p>
+              <a:p>
+                <a:r>
+                  <a:rPr lang="en-US" sz="2030" b="1" dirty="0"/>
+                  <a:t/>
+                </a:r>
+                <a:br>
+                  <a:rPr lang="en-US" sz="2030" b="1" dirty="0"/>
+                </a:br>
+                <a:r>
+                  <a:rPr lang="en-US" sz="2030" b="1" dirty="0" smtClean="0"/>
+                  <a:t>Coarse </a:t>
+                </a:r>
+                <a:r>
+                  <a:rPr lang="en-US" sz="2030" b="1" dirty="0"/>
+                  <a:t>graining of the encounter frequency </a:t>
+                </a:r>
+                <a:r>
+                  <a:rPr lang="en-US" sz="2030" dirty="0"/>
+                  <a:t/>
+                </a:r>
+                <a:br>
+                  <a:rPr lang="en-US" sz="2030" dirty="0"/>
+                </a:br>
+                <a:r>
+                  <a:rPr lang="en-US" sz="2030" dirty="0" smtClean="0"/>
+                  <a:t>Segment </a:t>
+                </a:r>
+                <a:r>
+                  <a:rPr lang="en-US" sz="2030" dirty="0"/>
+                  <a:t>size was chosen to be </a:t>
+                </a:r>
+                <a:r>
+                  <a:rPr lang="en-US" sz="2030" dirty="0" smtClean="0"/>
+                  <a:t>3kb, in </a:t>
+                </a:r>
+                <a:r>
+                  <a:rPr lang="en-US" sz="2030" dirty="0"/>
+                  <a:t>agreement with the mean restriction fragment size of </a:t>
+                </a:r>
+                <a:r>
+                  <a:rPr lang="en-US" sz="2030" dirty="0" err="1"/>
+                  <a:t>HindII</a:t>
+                </a:r>
+                <a:r>
+                  <a:rPr lang="en-US" sz="2030" dirty="0"/>
+                  <a:t> enzyme. </a:t>
+                </a:r>
+                <a:r>
+                  <a:rPr lang="en-US" sz="2030" dirty="0"/>
+                  <a:t>Encounters of ~920, </a:t>
+                </a:r>
+                <a:r>
+                  <a:rPr lang="en-US" sz="2030" dirty="0" smtClean="0"/>
+                  <a:t>kb </a:t>
+                </a:r>
+                <a:r>
+                  <a:rPr lang="en-US" sz="2030" dirty="0"/>
+                  <a:t>were mapped onto </a:t>
+                </a:r>
+                <a:r>
+                  <a:rPr lang="en-US" sz="2030" dirty="0" smtClean="0"/>
+                  <a:t>a polymer chain of N=307 beads [performed by Luca et. </a:t>
+                </a:r>
+                <a:r>
+                  <a:rPr lang="en-US" sz="2030" dirty="0"/>
+                  <a:t>a</a:t>
+                </a:r>
+                <a:r>
+                  <a:rPr lang="en-US" sz="2030" dirty="0" smtClean="0"/>
+                  <a:t>l].</a:t>
+                </a:r>
+                <a:endParaRPr lang="en-US" sz="2030" dirty="0"/>
+              </a:p>
+              <a:p>
+                <a:endParaRPr lang="en-US" sz="2030" b="1" dirty="0"/>
+              </a:p>
+              <a:p>
+                <a:r>
+                  <a:rPr lang="en-US" sz="2030" dirty="0"/>
+                  <a:t>1. We wish to partition the encounter signal of each bead into regions of loops and chains [add image]</a:t>
+                </a:r>
+              </a:p>
+              <a:p>
+                <a:endParaRPr lang="en-US" sz="2030" dirty="0"/>
+              </a:p>
+              <a:p>
+                <a:r>
+                  <a:rPr lang="en-US" sz="2030" b="1" dirty="0" smtClean="0"/>
+                  <a:t>Smoothing</a:t>
+                </a:r>
+                <a:br>
+                  <a:rPr lang="en-US" sz="2030" b="1" dirty="0" smtClean="0"/>
+                </a:br>
+                <a:r>
+                  <a:rPr lang="en-US" sz="2030" dirty="0" smtClean="0"/>
+                  <a:t>For </a:t>
+                </a:r>
+                <a:r>
+                  <a:rPr lang="en-US" sz="2030" dirty="0"/>
+                  <a:t>the Rouse polymer, the distribution of the distance between bead m and n is normally distributed with </a:t>
+                </a:r>
+                <a:br>
+                  <a:rPr lang="en-US" sz="2030" dirty="0"/>
+                </a:br>
+                <a:r>
+                  <a:rPr lang="en-US" sz="2030" dirty="0" smtClean="0"/>
+                  <a:t>        </a:t>
+                </a:r>
+                <a14:m>
+                  <m:oMath xmlns:m="http://schemas.openxmlformats.org/officeDocument/2006/math">
+                    <m:r>
+                      <a:rPr lang="en-US" sz="2030" i="1">
+                        <a:latin typeface="Cambria Math" panose="02040503050406030204" pitchFamily="18" charset="0"/>
+                      </a:rPr>
+                      <m:t>𝑃</m:t>
+                    </m:r>
+                    <m:d>
+                      <m:dPr>
+                        <m:ctrlPr>
+                          <a:rPr lang="en-US" sz="2030" i="1">
+                            <a:latin typeface="Cambria Math" panose="02040503050406030204" pitchFamily="18" charset="0"/>
+                          </a:rPr>
+                        </m:ctrlPr>
+                      </m:dPr>
+                      <m:e>
+                        <m:d>
+                          <m:dPr>
+                            <m:begChr m:val="|"/>
+                            <m:endChr m:val="|"/>
+                            <m:ctrlPr>
+                              <a:rPr lang="en-US" sz="2030" i="1">
+                                <a:latin typeface="Cambria Math" panose="02040503050406030204" pitchFamily="18" charset="0"/>
+                              </a:rPr>
+                            </m:ctrlPr>
+                          </m:dPr>
+                          <m:e>
+                            <m:sSub>
+                              <m:sSubPr>
+                                <m:ctrlPr>
+                                  <a:rPr lang="en-US" sz="2030" i="1">
+                                    <a:latin typeface="Cambria Math" panose="02040503050406030204" pitchFamily="18" charset="0"/>
+                                  </a:rPr>
+                                </m:ctrlPr>
+                              </m:sSubPr>
+                              <m:e>
+                                <m:r>
+                                  <a:rPr lang="en-US" sz="2030" i="1">
+                                    <a:latin typeface="Cambria Math" panose="02040503050406030204" pitchFamily="18" charset="0"/>
+                                  </a:rPr>
+                                  <m:t>𝑅</m:t>
+                                </m:r>
+                              </m:e>
+                              <m:sub>
+                                <m:r>
+                                  <a:rPr lang="en-US" sz="2030" i="1">
+                                    <a:latin typeface="Cambria Math" panose="02040503050406030204" pitchFamily="18" charset="0"/>
+                                  </a:rPr>
+                                  <m:t>𝑛</m:t>
+                                </m:r>
+                              </m:sub>
+                            </m:sSub>
+                            <m:r>
+                              <a:rPr lang="en-US" sz="2030" i="1">
+                                <a:latin typeface="Cambria Math" panose="02040503050406030204" pitchFamily="18" charset="0"/>
+                              </a:rPr>
+                              <m:t>−</m:t>
+                            </m:r>
+                            <m:sSub>
+                              <m:sSubPr>
+                                <m:ctrlPr>
+                                  <a:rPr lang="en-US" sz="2030" i="1">
+                                    <a:latin typeface="Cambria Math" panose="02040503050406030204" pitchFamily="18" charset="0"/>
+                                  </a:rPr>
+                                </m:ctrlPr>
+                              </m:sSubPr>
+                              <m:e>
+                                <m:r>
+                                  <a:rPr lang="en-US" sz="2030" i="1">
+                                    <a:latin typeface="Cambria Math" panose="02040503050406030204" pitchFamily="18" charset="0"/>
+                                  </a:rPr>
+                                  <m:t>𝑅</m:t>
+                                </m:r>
+                              </m:e>
+                              <m:sub>
+                                <m:r>
+                                  <a:rPr lang="en-US" sz="2030" i="1">
+                                    <a:latin typeface="Cambria Math" panose="02040503050406030204" pitchFamily="18" charset="0"/>
+                                  </a:rPr>
+                                  <m:t>𝑚</m:t>
+                                </m:r>
+                              </m:sub>
+                            </m:sSub>
+                          </m:e>
+                        </m:d>
+                      </m:e>
+                    </m:d>
+                    <m:r>
+                      <a:rPr lang="en-US" sz="2030" i="1">
+                        <a:latin typeface="Cambria Math" panose="02040503050406030204" pitchFamily="18" charset="0"/>
+                      </a:rPr>
+                      <m:t>=</m:t>
+                    </m:r>
+                    <m:sSup>
+                      <m:sSupPr>
+                        <m:ctrlPr>
+                          <a:rPr lang="en-US" sz="2030" i="1">
+                            <a:latin typeface="Cambria Math" panose="02040503050406030204" pitchFamily="18" charset="0"/>
+                          </a:rPr>
+                        </m:ctrlPr>
+                      </m:sSupPr>
+                      <m:e>
+                        <m:d>
+                          <m:dPr>
+                            <m:ctrlPr>
+                              <a:rPr lang="en-US" sz="2030" i="1">
+                                <a:latin typeface="Cambria Math" panose="02040503050406030204" pitchFamily="18" charset="0"/>
+                              </a:rPr>
+                            </m:ctrlPr>
+                          </m:dPr>
+                          <m:e>
+                            <m:f>
+                              <m:fPr>
+                                <m:ctrlPr>
+                                  <a:rPr lang="en-US" sz="2030" i="1">
+                                    <a:latin typeface="Cambria Math" panose="02040503050406030204" pitchFamily="18" charset="0"/>
+                                  </a:rPr>
+                                </m:ctrlPr>
+                              </m:fPr>
+                              <m:num>
+                                <m:r>
+                                  <a:rPr lang="en-US" sz="2030" i="1">
+                                    <a:latin typeface="Cambria Math" panose="02040503050406030204" pitchFamily="18" charset="0"/>
+                                  </a:rPr>
+                                  <m:t>3</m:t>
+                                </m:r>
+                              </m:num>
+                              <m:den>
+                                <m:r>
+                                  <a:rPr lang="en-US" sz="2030" i="1">
+                                    <a:latin typeface="Cambria Math" panose="02040503050406030204" pitchFamily="18" charset="0"/>
+                                  </a:rPr>
+                                  <m:t>2</m:t>
+                                </m:r>
+                                <m:r>
+                                  <a:rPr lang="en-US" sz="2030" i="1">
+                                    <a:latin typeface="Cambria Math" panose="02040503050406030204" pitchFamily="18" charset="0"/>
+                                    <a:ea typeface="Cambria Math" panose="02040503050406030204" pitchFamily="18" charset="0"/>
+                                  </a:rPr>
+                                  <m:t>𝜋</m:t>
+                                </m:r>
+                                <m:sSup>
+                                  <m:sSupPr>
+                                    <m:ctrlPr>
+                                      <a:rPr lang="en-US" sz="2030" i="1">
+                                        <a:latin typeface="Cambria Math" panose="02040503050406030204" pitchFamily="18" charset="0"/>
+                                        <a:ea typeface="Cambria Math" panose="02040503050406030204" pitchFamily="18" charset="0"/>
+                                      </a:rPr>
+                                    </m:ctrlPr>
+                                  </m:sSupPr>
+                                  <m:e>
+                                    <m:r>
+                                      <a:rPr lang="en-US" sz="2030" i="1">
+                                        <a:latin typeface="Cambria Math" panose="02040503050406030204" pitchFamily="18" charset="0"/>
+                                        <a:ea typeface="Cambria Math" panose="02040503050406030204" pitchFamily="18" charset="0"/>
+                                      </a:rPr>
+                                      <m:t>𝑏</m:t>
+                                    </m:r>
+                                  </m:e>
+                                  <m:sup>
+                                    <m:r>
+                                      <a:rPr lang="en-US" sz="2030" i="1">
+                                        <a:latin typeface="Cambria Math" panose="02040503050406030204" pitchFamily="18" charset="0"/>
+                                        <a:ea typeface="Cambria Math" panose="02040503050406030204" pitchFamily="18" charset="0"/>
+                                      </a:rPr>
+                                      <m:t>2</m:t>
+                                    </m:r>
+                                  </m:sup>
+                                </m:sSup>
+                                <m:r>
+                                  <a:rPr lang="en-US" sz="2030" i="1">
+                                    <a:latin typeface="Cambria Math" panose="02040503050406030204" pitchFamily="18" charset="0"/>
+                                  </a:rPr>
+                                  <m:t>|</m:t>
+                                </m:r>
+                                <m:r>
+                                  <a:rPr lang="en-US" sz="2030" i="1">
+                                    <a:latin typeface="Cambria Math" panose="02040503050406030204" pitchFamily="18" charset="0"/>
+                                  </a:rPr>
+                                  <m:t>𝑚</m:t>
+                                </m:r>
+                                <m:r>
+                                  <a:rPr lang="en-US" sz="2030" i="1">
+                                    <a:latin typeface="Cambria Math" panose="02040503050406030204" pitchFamily="18" charset="0"/>
+                                  </a:rPr>
+                                  <m:t>−</m:t>
+                                </m:r>
+                                <m:r>
+                                  <a:rPr lang="en-US" sz="2030" i="1">
+                                    <a:latin typeface="Cambria Math" panose="02040503050406030204" pitchFamily="18" charset="0"/>
+                                  </a:rPr>
+                                  <m:t>𝑛</m:t>
+                                </m:r>
+                                <m:r>
+                                  <a:rPr lang="en-US" sz="2030" i="1">
+                                    <a:latin typeface="Cambria Math" panose="02040503050406030204" pitchFamily="18" charset="0"/>
+                                  </a:rPr>
+                                  <m:t>|</m:t>
+                                </m:r>
+                              </m:den>
+                            </m:f>
+                          </m:e>
+                        </m:d>
+                      </m:e>
+                      <m:sup>
+                        <m:r>
+                          <a:rPr lang="en-US" sz="2030" i="1">
+                            <a:latin typeface="Cambria Math" panose="02040503050406030204" pitchFamily="18" charset="0"/>
+                          </a:rPr>
+                          <m:t>1.5</m:t>
+                        </m:r>
+                      </m:sup>
+                    </m:sSup>
+                    <m:r>
+                      <m:rPr>
+                        <m:sty m:val="p"/>
+                      </m:rPr>
+                      <a:rPr lang="en-US" sz="2030">
+                        <a:latin typeface="Cambria Math" panose="02040503050406030204" pitchFamily="18" charset="0"/>
+                      </a:rPr>
+                      <m:t>exp</m:t>
+                    </m:r>
+                    <m:r>
+                      <a:rPr lang="en-US" sz="2030" i="1">
+                        <a:latin typeface="Cambria Math" panose="02040503050406030204" pitchFamily="18" charset="0"/>
+                      </a:rPr>
+                      <m:t>⁡</m:t>
+                    </m:r>
+                    <m:d>
+                      <m:dPr>
+                        <m:ctrlPr>
+                          <a:rPr lang="en-US" sz="2030" i="1">
+                            <a:latin typeface="Cambria Math" panose="02040503050406030204" pitchFamily="18" charset="0"/>
+                          </a:rPr>
+                        </m:ctrlPr>
+                      </m:dPr>
+                      <m:e>
+                        <m:r>
+                          <a:rPr lang="en-US" sz="2030" i="1">
+                            <a:latin typeface="Cambria Math" panose="02040503050406030204" pitchFamily="18" charset="0"/>
+                          </a:rPr>
+                          <m:t>−</m:t>
+                        </m:r>
+                        <m:f>
+                          <m:fPr>
+                            <m:ctrlPr>
+                              <a:rPr lang="en-US" sz="2030" i="1">
+                                <a:latin typeface="Cambria Math" panose="02040503050406030204" pitchFamily="18" charset="0"/>
+                              </a:rPr>
+                            </m:ctrlPr>
+                          </m:fPr>
+                          <m:num>
+                            <m:sSup>
+                              <m:sSupPr>
+                                <m:ctrlPr>
+                                  <a:rPr lang="en-US" sz="2030" i="1">
+                                    <a:latin typeface="Cambria Math" panose="02040503050406030204" pitchFamily="18" charset="0"/>
+                                  </a:rPr>
+                                </m:ctrlPr>
+                              </m:sSupPr>
+                              <m:e>
+                                <m:d>
+                                  <m:dPr>
+                                    <m:begChr m:val="|"/>
+                                    <m:endChr m:val="|"/>
+                                    <m:ctrlPr>
+                                      <a:rPr lang="en-US" sz="2030" i="1">
+                                        <a:latin typeface="Cambria Math" panose="02040503050406030204" pitchFamily="18" charset="0"/>
+                                      </a:rPr>
+                                    </m:ctrlPr>
+                                  </m:dPr>
+                                  <m:e>
+                                    <m:sSub>
+                                      <m:sSubPr>
+                                        <m:ctrlPr>
+                                          <a:rPr lang="en-US" sz="2030" i="1">
+                                            <a:latin typeface="Cambria Math" panose="02040503050406030204" pitchFamily="18" charset="0"/>
+                                          </a:rPr>
+                                        </m:ctrlPr>
+                                      </m:sSubPr>
+                                      <m:e>
+                                        <m:r>
+                                          <a:rPr lang="en-US" sz="2030" i="1">
+                                            <a:latin typeface="Cambria Math" panose="02040503050406030204" pitchFamily="18" charset="0"/>
+                                          </a:rPr>
+                                          <m:t>𝑅</m:t>
+                                        </m:r>
+                                      </m:e>
+                                      <m:sub>
+                                        <m:r>
+                                          <a:rPr lang="en-US" sz="2030" i="1">
+                                            <a:latin typeface="Cambria Math" panose="02040503050406030204" pitchFamily="18" charset="0"/>
+                                          </a:rPr>
+                                          <m:t>𝑛</m:t>
+                                        </m:r>
+                                      </m:sub>
+                                    </m:sSub>
+                                    <m:r>
+                                      <a:rPr lang="en-US" sz="2030" i="1">
+                                        <a:latin typeface="Cambria Math" panose="02040503050406030204" pitchFamily="18" charset="0"/>
+                                      </a:rPr>
+                                      <m:t>−</m:t>
+                                    </m:r>
+                                    <m:sSub>
+                                      <m:sSubPr>
+                                        <m:ctrlPr>
+                                          <a:rPr lang="en-US" sz="2030" i="1">
+                                            <a:latin typeface="Cambria Math" panose="02040503050406030204" pitchFamily="18" charset="0"/>
+                                          </a:rPr>
+                                        </m:ctrlPr>
+                                      </m:sSubPr>
+                                      <m:e>
+                                        <m:r>
+                                          <a:rPr lang="en-US" sz="2030" i="1">
+                                            <a:latin typeface="Cambria Math" panose="02040503050406030204" pitchFamily="18" charset="0"/>
+                                          </a:rPr>
+                                          <m:t>𝑅</m:t>
+                                        </m:r>
+                                      </m:e>
+                                      <m:sub>
+                                        <m:r>
+                                          <a:rPr lang="en-US" sz="2030" i="1">
+                                            <a:latin typeface="Cambria Math" panose="02040503050406030204" pitchFamily="18" charset="0"/>
+                                          </a:rPr>
+                                          <m:t>𝑚</m:t>
+                                        </m:r>
+                                      </m:sub>
+                                    </m:sSub>
+                                  </m:e>
+                                </m:d>
+                              </m:e>
+                              <m:sup>
+                                <m:r>
+                                  <a:rPr lang="en-US" sz="2030" i="1">
+                                    <a:latin typeface="Cambria Math" panose="02040503050406030204" pitchFamily="18" charset="0"/>
+                                  </a:rPr>
+                                  <m:t>2</m:t>
+                                </m:r>
+                              </m:sup>
+                            </m:sSup>
+                          </m:num>
+                          <m:den>
+                            <m:r>
+                              <a:rPr lang="en-US" sz="2030" i="1">
+                                <a:latin typeface="Cambria Math" panose="02040503050406030204" pitchFamily="18" charset="0"/>
+                              </a:rPr>
+                              <m:t>2</m:t>
+                            </m:r>
+                            <m:sSup>
+                              <m:sSupPr>
+                                <m:ctrlPr>
+                                  <a:rPr lang="en-US" sz="2030" i="1">
+                                    <a:latin typeface="Cambria Math" panose="02040503050406030204" pitchFamily="18" charset="0"/>
+                                  </a:rPr>
+                                </m:ctrlPr>
+                              </m:sSupPr>
+                              <m:e>
+                                <m:d>
+                                  <m:dPr>
+                                    <m:begChr m:val="|"/>
+                                    <m:endChr m:val="|"/>
+                                    <m:ctrlPr>
+                                      <a:rPr lang="en-US" sz="2030" i="1">
+                                        <a:latin typeface="Cambria Math" panose="02040503050406030204" pitchFamily="18" charset="0"/>
+                                      </a:rPr>
+                                    </m:ctrlPr>
+                                  </m:dPr>
+                                  <m:e>
+                                    <m:r>
+                                      <a:rPr lang="en-US" sz="2030" i="1">
+                                        <a:latin typeface="Cambria Math" panose="02040503050406030204" pitchFamily="18" charset="0"/>
+                                      </a:rPr>
+                                      <m:t>𝑚</m:t>
+                                    </m:r>
+                                    <m:r>
+                                      <a:rPr lang="en-US" sz="2030" i="1">
+                                        <a:latin typeface="Cambria Math" panose="02040503050406030204" pitchFamily="18" charset="0"/>
+                                      </a:rPr>
+                                      <m:t>−</m:t>
+                                    </m:r>
+                                    <m:r>
+                                      <a:rPr lang="en-US" sz="2030" i="1">
+                                        <a:latin typeface="Cambria Math" panose="02040503050406030204" pitchFamily="18" charset="0"/>
+                                      </a:rPr>
+                                      <m:t>𝑛</m:t>
+                                    </m:r>
+                                  </m:e>
+                                </m:d>
+                              </m:e>
+                              <m:sup>
+                                <m:r>
+                                  <a:rPr lang="en-US" sz="2030" i="1">
+                                    <a:latin typeface="Cambria Math" panose="02040503050406030204" pitchFamily="18" charset="0"/>
+                                  </a:rPr>
+                                  <m:t>2</m:t>
+                                </m:r>
+                              </m:sup>
+                            </m:sSup>
+                          </m:den>
+                        </m:f>
+                      </m:e>
+                    </m:d>
+                  </m:oMath>
+                </a14:m>
+                <a:r>
+                  <a:rPr lang="en-US" sz="2030" dirty="0"/>
+                  <a:t> </a:t>
+                </a:r>
+                <a:br>
+                  <a:rPr lang="en-US" sz="2030" dirty="0"/>
+                </a:br>
+                <a:r>
+                  <a:rPr lang="en-US" sz="2030" dirty="0"/>
+                  <a:t/>
+                </a:r>
+                <a:br>
+                  <a:rPr lang="en-US" sz="2030" dirty="0"/>
+                </a:br>
+                <a:r>
+                  <a:rPr lang="en-US" sz="2030" dirty="0"/>
+                  <a:t>with </a:t>
+                </a:r>
+                <a14:m>
+                  <m:oMath xmlns:m="http://schemas.openxmlformats.org/officeDocument/2006/math">
+                    <m:r>
+                      <a:rPr lang="en-US" sz="2030" i="1">
+                        <a:latin typeface="Cambria Math" panose="02040503050406030204" pitchFamily="18" charset="0"/>
+                        <a:ea typeface="Cambria Math" panose="02040503050406030204" pitchFamily="18" charset="0"/>
+                      </a:rPr>
+                      <m:t>𝑏</m:t>
+                    </m:r>
+                    <m:r>
+                      <a:rPr lang="en-US" sz="2030" i="1">
+                        <a:latin typeface="Cambria Math" panose="02040503050406030204" pitchFamily="18" charset="0"/>
+                        <a:ea typeface="Cambria Math" panose="02040503050406030204" pitchFamily="18" charset="0"/>
+                      </a:rPr>
+                      <m:t> </m:t>
+                    </m:r>
+                  </m:oMath>
+                </a14:m>
+                <a:r>
+                  <a:rPr lang="en-US" sz="2030" dirty="0"/>
+                  <a:t>the std. </a:t>
+                </a:r>
+                <a:r>
+                  <a:rPr lang="en-US" sz="2030" dirty="0"/>
+                  <a:t>of the distance between </a:t>
+                </a:r>
+                <a:r>
+                  <a:rPr lang="en-US" sz="2030" dirty="0" smtClean="0"/>
+                  <a:t>beads, whereas for </a:t>
+                </a:r>
+                <a14:m>
+                  <m:oMath xmlns:m="http://schemas.openxmlformats.org/officeDocument/2006/math">
+                    <m:sSub>
+                      <m:sSubPr>
+                        <m:ctrlPr>
+                          <a:rPr lang="en-US" sz="2030" b="0" i="1" smtClean="0">
+                            <a:latin typeface="Cambria Math" panose="02040503050406030204" pitchFamily="18" charset="0"/>
+                          </a:rPr>
+                        </m:ctrlPr>
+                      </m:sSubPr>
+                      <m:e>
+                        <m:r>
+                          <a:rPr lang="en-US" sz="2030" b="0" i="1" smtClean="0">
+                            <a:latin typeface="Cambria Math" panose="02040503050406030204" pitchFamily="18" charset="0"/>
+                          </a:rPr>
+                          <m:t>𝑅</m:t>
+                        </m:r>
+                      </m:e>
+                      <m:sub>
+                        <m:r>
+                          <a:rPr lang="en-US" sz="2030" b="0" i="1" smtClean="0">
+                            <a:latin typeface="Cambria Math" panose="02040503050406030204" pitchFamily="18" charset="0"/>
+                          </a:rPr>
+                          <m:t>𝑚</m:t>
+                        </m:r>
+                      </m:sub>
+                    </m:sSub>
+                    <m:r>
+                      <a:rPr lang="en-US" sz="2030" b="0" i="1" smtClean="0">
+                        <a:latin typeface="Cambria Math" panose="02040503050406030204" pitchFamily="18" charset="0"/>
+                      </a:rPr>
+                      <m:t>=</m:t>
+                    </m:r>
+                    <m:sSub>
+                      <m:sSubPr>
+                        <m:ctrlPr>
+                          <a:rPr lang="en-US" sz="2030" b="0" i="1" smtClean="0">
+                            <a:latin typeface="Cambria Math" panose="02040503050406030204" pitchFamily="18" charset="0"/>
+                          </a:rPr>
+                        </m:ctrlPr>
+                      </m:sSubPr>
+                      <m:e>
+                        <m:r>
+                          <a:rPr lang="en-US" sz="2030" b="0" i="1" smtClean="0">
+                            <a:latin typeface="Cambria Math" panose="02040503050406030204" pitchFamily="18" charset="0"/>
+                          </a:rPr>
+                          <m:t>𝑅</m:t>
+                        </m:r>
+                      </m:e>
+                      <m:sub>
+                        <m:r>
+                          <a:rPr lang="en-US" sz="2030" b="0" i="1" smtClean="0">
+                            <a:latin typeface="Cambria Math" panose="02040503050406030204" pitchFamily="18" charset="0"/>
+                          </a:rPr>
+                          <m:t>𝑛</m:t>
+                        </m:r>
+                      </m:sub>
+                    </m:sSub>
+                  </m:oMath>
+                </a14:m>
+                <a:r>
+                  <a:rPr lang="en-US" sz="2030" dirty="0" smtClean="0"/>
+                  <a:t> we get the encounter probability . This </a:t>
+                </a:r>
+                <a:r>
+                  <a:rPr lang="en-US" sz="2030" dirty="0"/>
+                  <a:t>is also the fundamental solution for the diffusion (heat) equation. It is therefore natural to smooth the encounter curve using the </a:t>
+                </a:r>
+                <a:r>
+                  <a:rPr lang="en-US" sz="2030" dirty="0" smtClean="0"/>
+                  <a:t>diffusion (heat) </a:t>
+                </a:r>
+                <a:r>
+                  <a:rPr lang="en-US" sz="2030" dirty="0"/>
+                  <a:t>equation. To account for the peaks we have to find an unknown, time </a:t>
+                </a:r>
+                <a:r>
+                  <a:rPr lang="en-US" sz="2030" dirty="0" smtClean="0"/>
+                  <a:t>dependent, </a:t>
+                </a:r>
+                <a:r>
+                  <a:rPr lang="en-US" sz="2030" dirty="0"/>
+                  <a:t>heat </a:t>
+                </a:r>
+                <a:r>
+                  <a:rPr lang="en-US" sz="2030" dirty="0" smtClean="0"/>
+                  <a:t>source </a:t>
+                </a:r>
+                <a14:m>
+                  <m:oMath xmlns:m="http://schemas.openxmlformats.org/officeDocument/2006/math">
+                    <m:r>
+                      <a:rPr lang="en-US" sz="2030" b="0" i="1" smtClean="0">
+                        <a:latin typeface="Cambria Math" panose="02040503050406030204" pitchFamily="18" charset="0"/>
+                      </a:rPr>
+                      <m:t>𝑟</m:t>
+                    </m:r>
+                    <m:r>
+                      <a:rPr lang="en-US" sz="2030" b="0" i="1" smtClean="0">
+                        <a:latin typeface="Cambria Math" panose="02040503050406030204" pitchFamily="18" charset="0"/>
+                      </a:rPr>
+                      <m:t>(</m:t>
+                    </m:r>
+                    <m:r>
+                      <a:rPr lang="en-US" sz="2030" b="0" i="1" smtClean="0">
+                        <a:latin typeface="Cambria Math" panose="02040503050406030204" pitchFamily="18" charset="0"/>
+                      </a:rPr>
+                      <m:t>𝑡</m:t>
+                    </m:r>
+                    <m:r>
+                      <a:rPr lang="en-US" sz="2030" b="0" i="1" smtClean="0">
+                        <a:latin typeface="Cambria Math" panose="02040503050406030204" pitchFamily="18" charset="0"/>
+                      </a:rPr>
+                      <m:t>)</m:t>
+                    </m:r>
+                  </m:oMath>
+                </a14:m>
+                <a:r>
+                  <a:rPr lang="en-US" sz="2030" dirty="0" smtClean="0"/>
+                  <a:t>. </a:t>
+                </a:r>
+                <a:r>
+                  <a:rPr lang="en-US" sz="2030" dirty="0"/>
+                  <a:t>We arrive at </a:t>
+                </a:r>
+                <a:r>
+                  <a:rPr lang="en-US" sz="2030" dirty="0" smtClean="0"/>
+                  <a:t>solving the </a:t>
+                </a:r>
+                <a:r>
+                  <a:rPr lang="en-US" sz="2030" dirty="0"/>
+                  <a:t>inverse heat equation. </a:t>
+                </a:r>
+              </a:p>
+              <a:p>
+                <a14:m>
+                  <m:oMathPara xmlns:m="http://schemas.openxmlformats.org/officeDocument/2006/math">
+                    <m:oMathParaPr>
+                      <m:jc m:val="centerGroup"/>
+                    </m:oMathParaPr>
+                    <m:oMath xmlns:m="http://schemas.openxmlformats.org/officeDocument/2006/math">
+                      <m:sSub>
+                        <m:sSubPr>
+                          <m:ctrlPr>
+                            <a:rPr lang="en-US" sz="2030" i="1">
+                              <a:latin typeface="Cambria Math" panose="02040503050406030204" pitchFamily="18" charset="0"/>
+                            </a:rPr>
+                          </m:ctrlPr>
+                        </m:sSubPr>
+                        <m:e>
+                          <m:r>
+                            <a:rPr lang="en-US" sz="2030" i="1">
+                              <a:latin typeface="Cambria Math" panose="02040503050406030204" pitchFamily="18" charset="0"/>
+                            </a:rPr>
+                            <m:t>𝑢</m:t>
+                          </m:r>
+                        </m:e>
+                        <m:sub>
+                          <m:r>
+                            <a:rPr lang="en-US" sz="2030" i="1">
+                              <a:latin typeface="Cambria Math" panose="02040503050406030204" pitchFamily="18" charset="0"/>
+                            </a:rPr>
+                            <m:t>𝑡</m:t>
+                          </m:r>
+                        </m:sub>
+                      </m:sSub>
+                      <m:r>
+                        <a:rPr lang="en-US" sz="2030" i="1">
+                          <a:latin typeface="Cambria Math" panose="02040503050406030204" pitchFamily="18" charset="0"/>
+                        </a:rPr>
+                        <m:t>=</m:t>
+                      </m:r>
+                      <m:sSub>
+                        <m:sSubPr>
+                          <m:ctrlPr>
+                            <a:rPr lang="en-US" sz="2030" i="1">
+                              <a:latin typeface="Cambria Math" panose="02040503050406030204" pitchFamily="18" charset="0"/>
+                            </a:rPr>
+                          </m:ctrlPr>
+                        </m:sSubPr>
+                        <m:e>
+                          <m:r>
+                            <a:rPr lang="en-US" sz="2030" i="1">
+                              <a:latin typeface="Cambria Math" panose="02040503050406030204" pitchFamily="18" charset="0"/>
+                            </a:rPr>
+                            <m:t>𝑢</m:t>
+                          </m:r>
+                        </m:e>
+                        <m:sub>
+                          <m:r>
+                            <a:rPr lang="en-US" sz="2030" i="1">
+                              <a:latin typeface="Cambria Math" panose="02040503050406030204" pitchFamily="18" charset="0"/>
+                            </a:rPr>
+                            <m:t>𝑥𝑥</m:t>
+                          </m:r>
+                        </m:sub>
+                      </m:sSub>
+                      <m:r>
+                        <a:rPr lang="en-US" sz="2030" i="1">
+                          <a:latin typeface="Cambria Math" panose="02040503050406030204" pitchFamily="18" charset="0"/>
+                        </a:rPr>
+                        <m:t>+</m:t>
+                      </m:r>
+                      <m:r>
+                        <a:rPr lang="en-US" sz="2030" i="1">
+                          <a:latin typeface="Cambria Math" panose="02040503050406030204" pitchFamily="18" charset="0"/>
+                        </a:rPr>
+                        <m:t>𝑟</m:t>
+                      </m:r>
+                      <m:d>
+                        <m:dPr>
+                          <m:ctrlPr>
+                            <a:rPr lang="en-US" sz="2030" i="1">
+                              <a:latin typeface="Cambria Math" panose="02040503050406030204" pitchFamily="18" charset="0"/>
+                            </a:rPr>
+                          </m:ctrlPr>
+                        </m:dPr>
+                        <m:e>
+                          <m:r>
+                            <a:rPr lang="en-US" sz="2030" i="1">
+                              <a:latin typeface="Cambria Math" panose="02040503050406030204" pitchFamily="18" charset="0"/>
+                            </a:rPr>
+                            <m:t>𝑡</m:t>
+                          </m:r>
+                        </m:e>
+                      </m:d>
+                      <m:r>
+                        <a:rPr lang="en-US" sz="2030" i="1">
+                          <a:latin typeface="Cambria Math" panose="02040503050406030204" pitchFamily="18" charset="0"/>
+                        </a:rPr>
+                        <m:t>,    0&lt;</m:t>
+                      </m:r>
+                      <m:r>
+                        <a:rPr lang="en-US" sz="2030" i="1">
+                          <a:latin typeface="Cambria Math" panose="02040503050406030204" pitchFamily="18" charset="0"/>
+                        </a:rPr>
+                        <m:t>𝑥</m:t>
+                      </m:r>
+                      <m:r>
+                        <a:rPr lang="en-US" sz="2030" i="1">
+                          <a:latin typeface="Cambria Math" panose="02040503050406030204" pitchFamily="18" charset="0"/>
+                        </a:rPr>
+                        <m:t>&lt;1,  </m:t>
+                      </m:r>
+                      <m:r>
+                        <a:rPr lang="en-US" sz="2030" i="1">
+                          <a:latin typeface="Cambria Math" panose="02040503050406030204" pitchFamily="18" charset="0"/>
+                        </a:rPr>
+                        <m:t>𝑡</m:t>
+                      </m:r>
+                      <m:r>
+                        <a:rPr lang="en-US" sz="2030" i="1">
+                          <a:latin typeface="Cambria Math" panose="02040503050406030204" pitchFamily="18" charset="0"/>
+                          <a:ea typeface="Cambria Math" panose="02040503050406030204" pitchFamily="18" charset="0"/>
+                        </a:rPr>
+                        <m:t>≥0</m:t>
+                      </m:r>
+                    </m:oMath>
+                  </m:oMathPara>
+                </a14:m>
+                <a:endParaRPr lang="en-US" sz="2030" dirty="0"/>
+              </a:p>
+              <a:p>
+                <a:r>
+                  <a:rPr lang="en-US" sz="2030" dirty="0" smtClean="0"/>
+                  <a:t>with </a:t>
+                </a:r>
+                <a:endParaRPr lang="en-US" sz="2030" dirty="0"/>
+              </a:p>
+              <a:p>
+                <a14:m>
+                  <m:oMathPara xmlns:m="http://schemas.openxmlformats.org/officeDocument/2006/math">
+                    <m:oMathParaPr>
+                      <m:jc m:val="centerGroup"/>
+                    </m:oMathParaPr>
+                    <m:oMath xmlns:m="http://schemas.openxmlformats.org/officeDocument/2006/math">
+                      <m:r>
+                        <a:rPr lang="en-US" sz="2030" i="1">
+                          <a:latin typeface="Cambria Math" panose="02040503050406030204" pitchFamily="18" charset="0"/>
+                        </a:rPr>
+                        <m:t>𝑢</m:t>
+                      </m:r>
+                      <m:d>
+                        <m:dPr>
+                          <m:ctrlPr>
+                            <a:rPr lang="en-US" sz="2030" i="1">
+                              <a:latin typeface="Cambria Math" panose="02040503050406030204" pitchFamily="18" charset="0"/>
+                            </a:rPr>
+                          </m:ctrlPr>
+                        </m:dPr>
+                        <m:e>
+                          <m:r>
+                            <a:rPr lang="en-US" sz="2030" i="1">
+                              <a:latin typeface="Cambria Math" panose="02040503050406030204" pitchFamily="18" charset="0"/>
+                            </a:rPr>
+                            <m:t>0,</m:t>
+                          </m:r>
+                          <m:r>
+                            <a:rPr lang="en-US" sz="2030" i="1">
+                              <a:latin typeface="Cambria Math" panose="02040503050406030204" pitchFamily="18" charset="0"/>
+                            </a:rPr>
+                            <m:t>𝑡</m:t>
+                          </m:r>
+                        </m:e>
+                      </m:d>
+                      <m:r>
+                        <a:rPr lang="en-US" sz="2030" i="1">
+                          <a:latin typeface="Cambria Math" panose="02040503050406030204" pitchFamily="18" charset="0"/>
+                        </a:rPr>
+                        <m:t>=</m:t>
+                      </m:r>
+                      <m:r>
+                        <a:rPr lang="en-US" sz="2030" i="1">
+                          <a:latin typeface="Cambria Math" panose="02040503050406030204" pitchFamily="18" charset="0"/>
+                        </a:rPr>
+                        <m:t>𝑢</m:t>
+                      </m:r>
+                      <m:d>
+                        <m:dPr>
+                          <m:ctrlPr>
+                            <a:rPr lang="en-US" sz="2030" i="1">
+                              <a:latin typeface="Cambria Math" panose="02040503050406030204" pitchFamily="18" charset="0"/>
+                            </a:rPr>
+                          </m:ctrlPr>
+                        </m:dPr>
+                        <m:e>
+                          <m:r>
+                            <a:rPr lang="en-US" sz="2030" i="1">
+                              <a:latin typeface="Cambria Math" panose="02040503050406030204" pitchFamily="18" charset="0"/>
+                            </a:rPr>
+                            <m:t>1,</m:t>
+                          </m:r>
+                          <m:r>
+                            <a:rPr lang="en-US" sz="2030" i="1">
+                              <a:latin typeface="Cambria Math" panose="02040503050406030204" pitchFamily="18" charset="0"/>
+                            </a:rPr>
+                            <m:t>𝑡</m:t>
+                          </m:r>
+                        </m:e>
+                      </m:d>
+                      <m:r>
+                        <a:rPr lang="en-US" sz="2030" i="1">
+                          <a:latin typeface="Cambria Math" panose="02040503050406030204" pitchFamily="18" charset="0"/>
+                        </a:rPr>
+                        <m:t>,  </m:t>
+                      </m:r>
+                      <m:sSub>
+                        <m:sSubPr>
+                          <m:ctrlPr>
+                            <a:rPr lang="en-US" sz="2030" i="1">
+                              <a:latin typeface="Cambria Math" panose="02040503050406030204" pitchFamily="18" charset="0"/>
+                            </a:rPr>
+                          </m:ctrlPr>
+                        </m:sSubPr>
+                        <m:e>
+                          <m:r>
+                            <a:rPr lang="en-US" sz="2030" i="1">
+                              <a:latin typeface="Cambria Math" panose="02040503050406030204" pitchFamily="18" charset="0"/>
+                            </a:rPr>
+                            <m:t>𝑢</m:t>
+                          </m:r>
+                        </m:e>
+                        <m:sub>
+                          <m:r>
+                            <a:rPr lang="en-US" sz="2030" i="1">
+                              <a:latin typeface="Cambria Math" panose="02040503050406030204" pitchFamily="18" charset="0"/>
+                            </a:rPr>
+                            <m:t>𝑥</m:t>
+                          </m:r>
+                        </m:sub>
+                      </m:sSub>
+                      <m:d>
+                        <m:dPr>
+                          <m:ctrlPr>
+                            <a:rPr lang="en-US" sz="2030" i="1">
+                              <a:latin typeface="Cambria Math" panose="02040503050406030204" pitchFamily="18" charset="0"/>
+                            </a:rPr>
+                          </m:ctrlPr>
+                        </m:dPr>
+                        <m:e>
+                          <m:r>
+                            <a:rPr lang="en-US" sz="2030" i="1">
+                              <a:latin typeface="Cambria Math" panose="02040503050406030204" pitchFamily="18" charset="0"/>
+                            </a:rPr>
+                            <m:t>0,</m:t>
+                          </m:r>
+                          <m:r>
+                            <a:rPr lang="en-US" sz="2030" i="1">
+                              <a:latin typeface="Cambria Math" panose="02040503050406030204" pitchFamily="18" charset="0"/>
+                            </a:rPr>
+                            <m:t>𝑡</m:t>
+                          </m:r>
+                        </m:e>
+                      </m:d>
+                      <m:r>
+                        <a:rPr lang="en-US" sz="2030" i="1">
+                          <a:latin typeface="Cambria Math" panose="02040503050406030204" pitchFamily="18" charset="0"/>
+                        </a:rPr>
+                        <m:t>+</m:t>
+                      </m:r>
+                      <m:r>
+                        <a:rPr lang="en-US" sz="2030" i="1">
+                          <a:latin typeface="Cambria Math" panose="02040503050406030204" pitchFamily="18" charset="0"/>
+                          <a:ea typeface="Cambria Math" panose="02040503050406030204" pitchFamily="18" charset="0"/>
+                        </a:rPr>
+                        <m:t>𝛼</m:t>
+                      </m:r>
+                      <m:r>
+                        <a:rPr lang="en-US" sz="2030" i="1">
+                          <a:latin typeface="Cambria Math" panose="02040503050406030204" pitchFamily="18" charset="0"/>
+                          <a:ea typeface="Cambria Math" panose="02040503050406030204" pitchFamily="18" charset="0"/>
+                        </a:rPr>
+                        <m:t>𝑢</m:t>
+                      </m:r>
+                      <m:d>
+                        <m:dPr>
+                          <m:ctrlPr>
+                            <a:rPr lang="en-US" sz="2030" i="1">
+                              <a:latin typeface="Cambria Math" panose="02040503050406030204" pitchFamily="18" charset="0"/>
+                              <a:ea typeface="Cambria Math" panose="02040503050406030204" pitchFamily="18" charset="0"/>
+                            </a:rPr>
+                          </m:ctrlPr>
+                        </m:dPr>
+                        <m:e>
+                          <m:r>
+                            <a:rPr lang="en-US" sz="2030" i="1">
+                              <a:latin typeface="Cambria Math" panose="02040503050406030204" pitchFamily="18" charset="0"/>
+                              <a:ea typeface="Cambria Math" panose="02040503050406030204" pitchFamily="18" charset="0"/>
+                            </a:rPr>
+                            <m:t>0,</m:t>
+                          </m:r>
+                          <m:r>
+                            <a:rPr lang="en-US" sz="2030" i="1">
+                              <a:latin typeface="Cambria Math" panose="02040503050406030204" pitchFamily="18" charset="0"/>
+                              <a:ea typeface="Cambria Math" panose="02040503050406030204" pitchFamily="18" charset="0"/>
+                            </a:rPr>
+                            <m:t>𝑡</m:t>
+                          </m:r>
+                        </m:e>
+                      </m:d>
+                      <m:r>
+                        <a:rPr lang="en-US" sz="2030" i="1">
+                          <a:latin typeface="Cambria Math" panose="02040503050406030204" pitchFamily="18" charset="0"/>
+                          <a:ea typeface="Cambria Math" panose="02040503050406030204" pitchFamily="18" charset="0"/>
+                        </a:rPr>
+                        <m:t>=0,  </m:t>
+                      </m:r>
+                      <m:r>
+                        <a:rPr lang="en-US" sz="2030" i="1">
+                          <a:latin typeface="Cambria Math" panose="02040503050406030204" pitchFamily="18" charset="0"/>
+                          <a:ea typeface="Cambria Math" panose="02040503050406030204" pitchFamily="18" charset="0"/>
+                        </a:rPr>
+                        <m:t>𝑢</m:t>
+                      </m:r>
+                      <m:d>
+                        <m:dPr>
+                          <m:ctrlPr>
+                            <a:rPr lang="en-US" sz="2030" i="1">
+                              <a:latin typeface="Cambria Math" panose="02040503050406030204" pitchFamily="18" charset="0"/>
+                              <a:ea typeface="Cambria Math" panose="02040503050406030204" pitchFamily="18" charset="0"/>
+                            </a:rPr>
+                          </m:ctrlPr>
+                        </m:dPr>
+                        <m:e>
+                          <m:r>
+                            <a:rPr lang="en-US" sz="2030" i="1">
+                              <a:latin typeface="Cambria Math" panose="02040503050406030204" pitchFamily="18" charset="0"/>
+                              <a:ea typeface="Cambria Math" panose="02040503050406030204" pitchFamily="18" charset="0"/>
+                            </a:rPr>
+                            <m:t>𝑥</m:t>
+                          </m:r>
+                          <m:r>
+                            <a:rPr lang="en-US" sz="2030" i="1">
+                              <a:latin typeface="Cambria Math" panose="02040503050406030204" pitchFamily="18" charset="0"/>
+                              <a:ea typeface="Cambria Math" panose="02040503050406030204" pitchFamily="18" charset="0"/>
+                            </a:rPr>
+                            <m:t>,0</m:t>
+                          </m:r>
+                        </m:e>
+                      </m:d>
+                      <m:r>
+                        <a:rPr lang="en-US" sz="2030" i="1">
+                          <a:latin typeface="Cambria Math" panose="02040503050406030204" pitchFamily="18" charset="0"/>
+                          <a:ea typeface="Cambria Math" panose="02040503050406030204" pitchFamily="18" charset="0"/>
+                        </a:rPr>
+                        <m:t>=</m:t>
+                      </m:r>
+                      <m:r>
+                        <a:rPr lang="en-US" sz="2030" i="1">
+                          <a:latin typeface="Cambria Math" panose="02040503050406030204" pitchFamily="18" charset="0"/>
+                          <a:ea typeface="Cambria Math" panose="02040503050406030204" pitchFamily="18" charset="0"/>
+                        </a:rPr>
+                        <m:t>𝜑</m:t>
+                      </m:r>
+                      <m:d>
+                        <m:dPr>
+                          <m:ctrlPr>
+                            <a:rPr lang="en-US" sz="2030" i="1">
+                              <a:latin typeface="Cambria Math" panose="02040503050406030204" pitchFamily="18" charset="0"/>
+                              <a:ea typeface="Cambria Math" panose="02040503050406030204" pitchFamily="18" charset="0"/>
+                            </a:rPr>
+                          </m:ctrlPr>
+                        </m:dPr>
+                        <m:e>
+                          <m:r>
+                            <a:rPr lang="en-US" sz="2030" i="1">
+                              <a:latin typeface="Cambria Math" panose="02040503050406030204" pitchFamily="18" charset="0"/>
+                              <a:ea typeface="Cambria Math" panose="02040503050406030204" pitchFamily="18" charset="0"/>
+                            </a:rPr>
+                            <m:t>𝑥</m:t>
+                          </m:r>
+                        </m:e>
+                      </m:d>
+                    </m:oMath>
+                    <m:oMath xmlns:m="http://schemas.openxmlformats.org/officeDocument/2006/math">
+                      <m:nary>
+                        <m:naryPr>
+                          <m:ctrlPr>
+                            <a:rPr lang="en-US" sz="2030" i="1" smtClean="0">
+                              <a:latin typeface="Cambria Math" panose="02040503050406030204" pitchFamily="18" charset="0"/>
+                              <a:ea typeface="Cambria Math" panose="02040503050406030204" pitchFamily="18" charset="0"/>
+                            </a:rPr>
+                          </m:ctrlPr>
+                        </m:naryPr>
+                        <m:sub>
+                          <m:r>
+                            <m:rPr>
+                              <m:brk m:alnAt="23"/>
+                            </m:rPr>
+                            <a:rPr lang="en-US" sz="2030" b="0" i="1" smtClean="0">
+                              <a:latin typeface="Cambria Math" panose="02040503050406030204" pitchFamily="18" charset="0"/>
+                              <a:ea typeface="Cambria Math" panose="02040503050406030204" pitchFamily="18" charset="0"/>
+                            </a:rPr>
+                            <m:t>0</m:t>
+                          </m:r>
+                        </m:sub>
+                        <m:sup>
+                          <m:r>
+                            <a:rPr lang="en-US" sz="2030" b="0" i="1" smtClean="0">
+                              <a:latin typeface="Cambria Math" panose="02040503050406030204" pitchFamily="18" charset="0"/>
+                              <a:ea typeface="Cambria Math" panose="02040503050406030204" pitchFamily="18" charset="0"/>
+                            </a:rPr>
+                            <m:t>1</m:t>
+                          </m:r>
+                        </m:sup>
+                        <m:e>
+                          <m:r>
+                            <a:rPr lang="en-US" sz="2030" b="0" i="1" smtClean="0">
+                              <a:latin typeface="Cambria Math" panose="02040503050406030204" pitchFamily="18" charset="0"/>
+                              <a:ea typeface="Cambria Math" panose="02040503050406030204" pitchFamily="18" charset="0"/>
+                            </a:rPr>
+                            <m:t>𝑢</m:t>
+                          </m:r>
+                          <m:d>
+                            <m:dPr>
+                              <m:ctrlPr>
+                                <a:rPr lang="en-US" sz="2030" b="0" i="1" smtClean="0">
+                                  <a:latin typeface="Cambria Math" panose="02040503050406030204" pitchFamily="18" charset="0"/>
+                                  <a:ea typeface="Cambria Math" panose="02040503050406030204" pitchFamily="18" charset="0"/>
+                                </a:rPr>
+                              </m:ctrlPr>
+                            </m:dPr>
+                            <m:e>
+                              <m:r>
+                                <a:rPr lang="en-US" sz="2030" b="0" i="1" smtClean="0">
+                                  <a:latin typeface="Cambria Math" panose="02040503050406030204" pitchFamily="18" charset="0"/>
+                                  <a:ea typeface="Cambria Math" panose="02040503050406030204" pitchFamily="18" charset="0"/>
+                                </a:rPr>
+                                <m:t>𝑥</m:t>
+                              </m:r>
+                              <m:r>
+                                <a:rPr lang="en-US" sz="2030" b="0" i="1" smtClean="0">
+                                  <a:latin typeface="Cambria Math" panose="02040503050406030204" pitchFamily="18" charset="0"/>
+                                  <a:ea typeface="Cambria Math" panose="02040503050406030204" pitchFamily="18" charset="0"/>
+                                </a:rPr>
+                                <m:t>,</m:t>
+                              </m:r>
+                              <m:r>
+                                <a:rPr lang="en-US" sz="2030" b="0" i="1" smtClean="0">
+                                  <a:latin typeface="Cambria Math" panose="02040503050406030204" pitchFamily="18" charset="0"/>
+                                  <a:ea typeface="Cambria Math" panose="02040503050406030204" pitchFamily="18" charset="0"/>
+                                </a:rPr>
+                                <m:t>𝑡</m:t>
+                              </m:r>
+                            </m:e>
+                          </m:d>
+                          <m:r>
+                            <a:rPr lang="en-US" sz="2030" b="0" i="1" smtClean="0">
+                              <a:latin typeface="Cambria Math" panose="02040503050406030204" pitchFamily="18" charset="0"/>
+                              <a:ea typeface="Cambria Math" panose="02040503050406030204" pitchFamily="18" charset="0"/>
+                            </a:rPr>
+                            <m:t>𝑑𝑥</m:t>
+                          </m:r>
+                          <m:r>
+                            <a:rPr lang="en-US" sz="2030" b="0" i="1" smtClean="0">
+                              <a:latin typeface="Cambria Math" panose="02040503050406030204" pitchFamily="18" charset="0"/>
+                              <a:ea typeface="Cambria Math" panose="02040503050406030204" pitchFamily="18" charset="0"/>
+                            </a:rPr>
+                            <m:t>=</m:t>
+                          </m:r>
+                          <m:r>
+                            <a:rPr lang="en-US" sz="2030" b="0" i="1" smtClean="0">
+                              <a:latin typeface="Cambria Math" panose="02040503050406030204" pitchFamily="18" charset="0"/>
+                              <a:ea typeface="Cambria Math" panose="02040503050406030204" pitchFamily="18" charset="0"/>
+                            </a:rPr>
+                            <m:t>𝐸</m:t>
+                          </m:r>
+                          <m:r>
+                            <a:rPr lang="en-US" sz="2030" b="0" i="1" smtClean="0">
+                              <a:latin typeface="Cambria Math" panose="02040503050406030204" pitchFamily="18" charset="0"/>
+                              <a:ea typeface="Cambria Math" panose="02040503050406030204" pitchFamily="18" charset="0"/>
+                            </a:rPr>
+                            <m:t>(</m:t>
+                          </m:r>
+                          <m:r>
+                            <a:rPr lang="en-US" sz="2030" b="0" i="1" smtClean="0">
+                              <a:latin typeface="Cambria Math" panose="02040503050406030204" pitchFamily="18" charset="0"/>
+                              <a:ea typeface="Cambria Math" panose="02040503050406030204" pitchFamily="18" charset="0"/>
+                            </a:rPr>
+                            <m:t>𝑡</m:t>
+                          </m:r>
+                          <m:r>
+                            <a:rPr lang="en-US" sz="2030" b="0" i="1" smtClean="0">
+                              <a:latin typeface="Cambria Math" panose="02040503050406030204" pitchFamily="18" charset="0"/>
+                              <a:ea typeface="Cambria Math" panose="02040503050406030204" pitchFamily="18" charset="0"/>
+                            </a:rPr>
+                            <m:t>)</m:t>
+                          </m:r>
+                        </m:e>
+                      </m:nary>
+                    </m:oMath>
+                  </m:oMathPara>
+                </a14:m>
+                <a:endParaRPr lang="en-US" sz="2030" dirty="0"/>
+              </a:p>
+              <a:p>
+                <a:endParaRPr lang="en-US" sz="2030" dirty="0" smtClean="0"/>
+              </a:p>
+              <a:p>
+                <a:r>
+                  <a:rPr lang="en-US" sz="2030" dirty="0" smtClean="0"/>
+                  <a:t>Treating t as the distance between beads,  E(t) the encounter signal for bead </a:t>
+                </a:r>
+                <a:r>
+                  <a:rPr lang="en-US" sz="2030" dirty="0" err="1" smtClean="0"/>
+                  <a:t>i</a:t>
+                </a:r>
+                <a:r>
+                  <a:rPr lang="en-US" sz="2030" dirty="0" smtClean="0"/>
+                  <a:t> and using the Boundary Element Method proposed by [</a:t>
+                </a:r>
+                <a:r>
+                  <a:rPr lang="en-US" sz="2030" dirty="0" err="1"/>
+                  <a:t>Farcas</a:t>
+                </a:r>
+                <a:r>
+                  <a:rPr lang="en-US" sz="2030" dirty="0"/>
+                  <a:t> and </a:t>
+                </a:r>
+                <a:r>
+                  <a:rPr lang="en-US" sz="2030" dirty="0" err="1"/>
+                  <a:t>Lesnic</a:t>
+                </a:r>
+                <a:r>
+                  <a:rPr lang="en-US" sz="2030" dirty="0"/>
+                  <a:t> 2006 </a:t>
+                </a:r>
+                <a:r>
+                  <a:rPr lang="en-US" sz="2030" dirty="0" smtClean="0"/>
+                  <a:t>, </a:t>
+                </a:r>
+                <a:r>
+                  <a:rPr lang="en-US" sz="2030" dirty="0" err="1" smtClean="0"/>
+                  <a:t>Hazanee</a:t>
+                </a:r>
+                <a:r>
+                  <a:rPr lang="en-US" sz="2030" dirty="0" smtClean="0"/>
+                  <a:t> et. </a:t>
+                </a:r>
+                <a:r>
+                  <a:rPr lang="en-US" sz="2030" dirty="0"/>
+                  <a:t>a</a:t>
+                </a:r>
+                <a:r>
+                  <a:rPr lang="en-US" sz="2030" dirty="0" smtClean="0"/>
+                  <a:t>l. 2011], we find the unknown source and the smoothed approximation to the encounter signal</a:t>
+                </a:r>
+              </a:p>
+              <a:p>
+                <a:r>
+                  <a:rPr lang="en-US" sz="2030" dirty="0" smtClean="0"/>
+                  <a:t>[Add figure of smoothing]</a:t>
+                </a:r>
+              </a:p>
+              <a:p>
+                <a:endParaRPr lang="en-US" sz="2030" dirty="0" smtClean="0"/>
+              </a:p>
+              <a:p>
+                <a:r>
+                  <a:rPr lang="en-US" sz="2030" dirty="0" smtClean="0"/>
+                  <a:t>3. </a:t>
+                </a:r>
+                <a:r>
+                  <a:rPr lang="en-US" sz="2030" b="1" dirty="0" smtClean="0"/>
+                  <a:t>From encounter signal to loops and chains</a:t>
+                </a:r>
+                <a:endParaRPr lang="en-US" sz="2030" dirty="0"/>
+              </a:p>
+              <a:p>
+                <a:r>
+                  <a:rPr lang="en-US" sz="2030" dirty="0" smtClean="0"/>
+                  <a:t>break </a:t>
+                </a:r>
+                <a:r>
+                  <a:rPr lang="en-US" sz="2030" dirty="0"/>
+                  <a:t>the encounter signals into regions of loops and chain </a:t>
+                </a:r>
+                <a:r>
+                  <a:rPr lang="en-US" sz="2030" dirty="0" smtClean="0"/>
+                  <a:t>[add </a:t>
+                </a:r>
+                <a:r>
+                  <a:rPr lang="en-US" sz="2030" dirty="0"/>
+                  <a:t>image</a:t>
+                </a:r>
+                <a:r>
+                  <a:rPr lang="en-US" sz="2030" dirty="0" smtClean="0"/>
+                  <a:t>]</a:t>
+                </a:r>
+              </a:p>
+              <a:p>
+                <a:endParaRPr lang="en-US" sz="2030" dirty="0"/>
+              </a:p>
+              <a:p>
+                <a:r>
+                  <a:rPr lang="en-US" sz="2030" b="1" dirty="0"/>
+                  <a:t>Assign spring constant </a:t>
+                </a:r>
+              </a:p>
+              <a:p>
+                <a:r>
+                  <a:rPr lang="en-US" sz="2030" dirty="0" smtClean="0"/>
+                  <a:t>For encounter probabilities higher than nearest neighbor probability, we assign a different spring constant between the beads. First we estimate the nearest neighbor interaction using the whole data. Empirically tested we fit a lognormal distribution to the  NN encounter probability and use its expectation in the calculation of the spring constant.  </a:t>
+                </a:r>
+                <a:br>
+                  <a:rPr lang="en-US" sz="2030" dirty="0" smtClean="0"/>
+                </a:br>
+                <a14:m>
+                  <m:oMathPara xmlns:m="http://schemas.openxmlformats.org/officeDocument/2006/math">
+                    <m:oMathParaPr>
+                      <m:jc m:val="centerGroup"/>
+                    </m:oMathParaPr>
+                    <m:oMath xmlns:m="http://schemas.openxmlformats.org/officeDocument/2006/math">
+                      <m:acc>
+                        <m:accPr>
+                          <m:chr m:val="̂"/>
+                          <m:ctrlPr>
+                            <a:rPr lang="en-US" sz="2030" i="1" smtClean="0">
+                              <a:latin typeface="Cambria Math" panose="02040503050406030204" pitchFamily="18" charset="0"/>
+                            </a:rPr>
+                          </m:ctrlPr>
+                        </m:accPr>
+                        <m:e>
+                          <m:r>
+                            <a:rPr lang="en-US" sz="2030" b="0" i="1" smtClean="0">
+                              <a:latin typeface="Cambria Math" panose="02040503050406030204" pitchFamily="18" charset="0"/>
+                            </a:rPr>
+                            <m:t>𝑘</m:t>
+                          </m:r>
+                        </m:e>
+                      </m:acc>
+                      <m:r>
+                        <a:rPr lang="en-US" sz="2030" b="0" i="1" smtClean="0">
+                          <a:latin typeface="Cambria Math" panose="02040503050406030204" pitchFamily="18" charset="0"/>
+                        </a:rPr>
+                        <m:t>=</m:t>
+                      </m:r>
+                    </m:oMath>
+                  </m:oMathPara>
+                </a14:m>
+                <a:r>
+                  <a:rPr lang="en-US" sz="2030" b="1" dirty="0"/>
+                  <a:t/>
+                </a:r>
+                <a:br>
+                  <a:rPr lang="en-US" sz="2030" b="1" dirty="0"/>
+                </a:br>
+                <a:r>
+                  <a:rPr lang="en-US" sz="2030" b="1" dirty="0"/>
+                  <a:t>Simulation</a:t>
+                </a:r>
+              </a:p>
+              <a:p>
+                <a:endParaRPr lang="en-US" sz="2030" dirty="0"/>
+              </a:p>
+              <a:p>
+                <a:endParaRPr lang="en-US" sz="2030" dirty="0"/>
+              </a:p>
+              <a:p>
+                <a:endParaRPr lang="en-US" sz="2030" dirty="0"/>
+              </a:p>
+              <a:p>
+                <a:r>
+                  <a:rPr lang="en-US" sz="2030" dirty="0"/>
+                  <a:t>Resulting structure can now be fitted with encounter probability functions, assuming Rouse model </a:t>
+                </a:r>
+              </a:p>
+              <a:p>
+                <a:endParaRPr lang="en-US" sz="2030" dirty="0"/>
+              </a:p>
+              <a:p>
+                <a:r>
+                  <a:rPr lang="en-US" sz="2030" dirty="0"/>
+                  <a:t>Find an agreement between the loop location in various signals by probabilistic model</a:t>
+                </a:r>
+              </a:p>
+              <a:p>
+                <a:endParaRPr lang="en-US" sz="2030" dirty="0"/>
+              </a:p>
+              <a:p>
+                <a:r>
+                  <a:rPr lang="en-US" sz="2030" dirty="0"/>
+                  <a:t>Reconstruction</a:t>
+                </a:r>
+              </a:p>
+              <a:p>
+                <a:endParaRPr lang="en-US" sz="2030" dirty="0"/>
+              </a:p>
+              <a:p>
+                <a:r>
+                  <a:rPr lang="en-US" sz="2030" dirty="0"/>
+                  <a:t>Simulation of the resulted structure</a:t>
+                </a:r>
+              </a:p>
+              <a:p>
+                <a:endParaRPr lang="en-US" sz="2030" dirty="0"/>
+              </a:p>
+              <a:p>
+                <a:r>
+                  <a:rPr lang="en-US" sz="2030" dirty="0"/>
+                  <a:t>Validation with the </a:t>
+                </a:r>
+                <a:r>
+                  <a:rPr lang="en-US" sz="2030" dirty="0" err="1"/>
+                  <a:t>HiC</a:t>
+                </a:r>
+                <a:r>
+                  <a:rPr lang="en-US" sz="2030" dirty="0"/>
+                  <a:t> maps</a:t>
+                </a:r>
+              </a:p>
+              <a:p>
+                <a:endParaRPr lang="en-US" sz="2030" dirty="0"/>
+              </a:p>
+              <a:p>
+                <a:r>
+                  <a:rPr lang="en-US" sz="2030" dirty="0"/>
+                  <a:t>Adjusting </a:t>
+                </a:r>
+                <a:r>
+                  <a:rPr lang="en-US" sz="2030" dirty="0"/>
+                  <a:t>the spring constant for peaks higher than nearest neighbor </a:t>
+                </a:r>
+                <a:r>
+                  <a:rPr lang="en-US" sz="2030" dirty="0"/>
+                  <a:t>, we estimate the nearest neighbor encounter prob. By calculating the distribution and taking its mean, then for simulation, if we determine k to be our spring constant,  then the new spring constant, for an encounter probability higher then nearest neighbor, for bead m and for distance |m-n| is given by k(P(1)/P(m-n))^1.5 |m-n|</a:t>
+                </a:r>
+                <a:endParaRPr lang="en-US" sz="2030" dirty="0"/>
+              </a:p>
+              <a:p>
+                <a:endParaRPr lang="en-US" sz="2030" dirty="0"/>
+              </a:p>
+              <a:p>
+                <a:endParaRPr lang="en-US" sz="2030" dirty="0"/>
+              </a:p>
+              <a:p>
+                <a:endParaRPr lang="en-US" sz="2030" dirty="0"/>
+              </a:p>
+            </p:txBody>
+          </p:sp>
+        </mc:Choice>
+        <mc:Fallback>
+          <p:sp>
+            <p:nvSpPr>
+              <p:cNvPr id="11" name="TextBox 10"/>
+              <p:cNvSpPr txBox="1">
+                <a:spLocks noRot="1" noChangeAspect="1" noMove="1" noResize="1" noEditPoints="1" noAdjustHandles="1" noChangeArrowheads="1" noChangeShapeType="1" noTextEdit="1"/>
+              </p:cNvSpPr>
+              <p:nvPr/>
+            </p:nvSpPr>
+            <p:spPr>
+              <a:xfrm>
+                <a:off x="7903758" y="1869097"/>
+                <a:ext cx="7336169" cy="29397920"/>
+              </a:xfrm>
+              <a:prstGeom prst="rect">
+                <a:avLst/>
+              </a:prstGeom>
+              <a:blipFill rotWithShape="0">
+                <a:blip r:embed="rId3"/>
+                <a:stretch>
+                  <a:fillRect l="-3824" t="-456" r="-1663"/>
+                </a:stretch>
+              </a:blipFill>
+            </p:spPr>
+            <p:txBody>
+              <a:bodyPr/>
+              <a:lstStyle/>
+              <a:p>
+                <a:r>
+                  <a:rPr lang="en-US">
+                    <a:noFill/>
+                  </a:rPr>
+                  <a:t> </a:t>
+                </a:r>
+              </a:p>
+            </p:txBody>
+          </p:sp>
+        </mc:Fallback>
+      </mc:AlternateContent>
       <p:sp>
         <p:nvSpPr>
           <p:cNvPr id="12" name="TextBox 11"/>
@@ -3645,8 +5801,8 @@
         </p:nvSpPr>
         <p:spPr>
           <a:xfrm>
-            <a:off x="19467873" y="2405146"/>
-            <a:ext cx="9488127" cy="3785652"/>
+            <a:off x="30927840" y="2501539"/>
+            <a:ext cx="6879884" cy="2769989"/>
           </a:xfrm>
           <a:prstGeom prst="rect">
             <a:avLst/>
@@ -3660,36 +5816,339 @@
           <a:lstStyle/>
           <a:p>
             <a:r>
-              <a:rPr lang="en-US" sz="4000" b="1" dirty="0" smtClean="0">
-                <a:solidFill>
-                  <a:schemeClr val="tx1"/>
-                </a:solidFill>
-              </a:rPr>
-              <a:t>Preliminary Results:</a:t>
-            </a:r>
-          </a:p>
-          <a:p>
-            <a:endParaRPr lang="en-US" sz="4000" dirty="0" smtClean="0"/>
-          </a:p>
-          <a:p>
-            <a:r>
-              <a:rPr lang="en-US" sz="4000" dirty="0" smtClean="0">
-                <a:solidFill>
-                  <a:schemeClr val="tx1"/>
-                </a:solidFill>
-              </a:rPr>
+              <a:rPr lang="en-US" sz="2900" b="1" dirty="0" smtClean="0"/>
+              <a:t>Results</a:t>
+            </a:r>
+            <a:r>
+              <a:rPr lang="en-US" sz="2900" b="1" dirty="0"/>
+              <a:t>:</a:t>
+            </a:r>
+          </a:p>
+          <a:p>
+            <a:endParaRPr lang="en-US" sz="2900" dirty="0"/>
+          </a:p>
+          <a:p>
+            <a:r>
+              <a:rPr lang="en-US" sz="2900" dirty="0"/>
               <a:t>In synthetic example, we see accurate reconstruction.</a:t>
             </a:r>
           </a:p>
           <a:p>
-            <a:endParaRPr lang="en-US" sz="4000" dirty="0" smtClean="0">
-              <a:solidFill>
-                <a:schemeClr val="tx1"/>
-              </a:solidFill>
-            </a:endParaRPr>
-          </a:p>
-          <a:p>
-            <a:endParaRPr lang="en-US" sz="4000" dirty="0"/>
+            <a:endParaRPr lang="en-US" sz="2900" dirty="0"/>
+          </a:p>
+          <a:p>
+            <a:endParaRPr lang="en-US" sz="2900" dirty="0"/>
+          </a:p>
+        </p:txBody>
+      </p:sp>
+      <p:grpSp>
+        <p:nvGrpSpPr>
+          <p:cNvPr id="52" name="Group 51"/>
+          <p:cNvGrpSpPr/>
+          <p:nvPr/>
+        </p:nvGrpSpPr>
+        <p:grpSpPr>
+          <a:xfrm>
+            <a:off x="679311" y="15326931"/>
+            <a:ext cx="6500952" cy="3152271"/>
+            <a:chOff x="539750" y="14090700"/>
+            <a:chExt cx="6500952" cy="3152271"/>
+          </a:xfrm>
+        </p:grpSpPr>
+        <p:pic>
+          <p:nvPicPr>
+            <p:cNvPr id="3" name="Picture 2"/>
+            <p:cNvPicPr>
+              <a:picLocks noChangeAspect="1"/>
+            </p:cNvPicPr>
+            <p:nvPr/>
+          </p:nvPicPr>
+          <p:blipFill>
+            <a:blip r:embed="rId4">
+              <a:extLst>
+                <a:ext uri="{28A0092B-C50C-407E-A947-70E740481C1C}">
+                  <a14:useLocalDpi xmlns:a14="http://schemas.microsoft.com/office/drawing/2010/main" val="0"/>
+                </a:ext>
+              </a:extLst>
+            </a:blip>
+            <a:stretch>
+              <a:fillRect/>
+            </a:stretch>
+          </p:blipFill>
+          <p:spPr>
+            <a:xfrm>
+              <a:off x="539750" y="14090700"/>
+              <a:ext cx="3225687" cy="3152271"/>
+            </a:xfrm>
+            <a:prstGeom prst="rect">
+              <a:avLst/>
+            </a:prstGeom>
+          </p:spPr>
+        </p:pic>
+        <p:pic>
+          <p:nvPicPr>
+            <p:cNvPr id="2" name="Picture 1"/>
+            <p:cNvPicPr>
+              <a:picLocks noChangeAspect="1"/>
+            </p:cNvPicPr>
+            <p:nvPr/>
+          </p:nvPicPr>
+          <p:blipFill>
+            <a:blip r:embed="rId5">
+              <a:extLst>
+                <a:ext uri="{28A0092B-C50C-407E-A947-70E740481C1C}">
+                  <a14:useLocalDpi xmlns:a14="http://schemas.microsoft.com/office/drawing/2010/main" val="0"/>
+                </a:ext>
+              </a:extLst>
+            </a:blip>
+            <a:stretch>
+              <a:fillRect/>
+            </a:stretch>
+          </p:blipFill>
+          <p:spPr>
+            <a:xfrm>
+              <a:off x="4628493" y="14090700"/>
+              <a:ext cx="2412209" cy="2598360"/>
+            </a:xfrm>
+            <a:prstGeom prst="rect">
+              <a:avLst/>
+            </a:prstGeom>
+          </p:spPr>
+        </p:pic>
+        <p:cxnSp>
+          <p:nvCxnSpPr>
+            <p:cNvPr id="6" name="Straight Connector 5"/>
+            <p:cNvCxnSpPr/>
+            <p:nvPr/>
+          </p:nvCxnSpPr>
+          <p:spPr>
+            <a:xfrm flipH="1">
+              <a:off x="1509486" y="14427200"/>
+              <a:ext cx="3267654" cy="580570"/>
+            </a:xfrm>
+            <a:prstGeom prst="line">
+              <a:avLst/>
+            </a:prstGeom>
+            <a:ln w="12700"/>
+          </p:spPr>
+          <p:style>
+            <a:lnRef idx="1">
+              <a:schemeClr val="accent1"/>
+            </a:lnRef>
+            <a:fillRef idx="0">
+              <a:schemeClr val="accent1"/>
+            </a:fillRef>
+            <a:effectRef idx="0">
+              <a:schemeClr val="accent1"/>
+            </a:effectRef>
+            <a:fontRef idx="minor">
+              <a:schemeClr val="tx1"/>
+            </a:fontRef>
+          </p:style>
+        </p:cxnSp>
+        <p:cxnSp>
+          <p:nvCxnSpPr>
+            <p:cNvPr id="8" name="Straight Connector 7"/>
+            <p:cNvCxnSpPr/>
+            <p:nvPr/>
+          </p:nvCxnSpPr>
+          <p:spPr>
+            <a:xfrm flipH="1" flipV="1">
+              <a:off x="1509486" y="15718971"/>
+              <a:ext cx="3267654" cy="902155"/>
+            </a:xfrm>
+            <a:prstGeom prst="line">
+              <a:avLst/>
+            </a:prstGeom>
+            <a:ln w="12700"/>
+          </p:spPr>
+          <p:style>
+            <a:lnRef idx="1">
+              <a:schemeClr val="accent1"/>
+            </a:lnRef>
+            <a:fillRef idx="0">
+              <a:schemeClr val="accent1"/>
+            </a:fillRef>
+            <a:effectRef idx="0">
+              <a:schemeClr val="accent1"/>
+            </a:effectRef>
+            <a:fontRef idx="minor">
+              <a:schemeClr val="tx1"/>
+            </a:fontRef>
+          </p:style>
+        </p:cxnSp>
+        <p:sp>
+          <p:nvSpPr>
+            <p:cNvPr id="14" name="Rectangle 13"/>
+            <p:cNvSpPr/>
+            <p:nvPr/>
+          </p:nvSpPr>
+          <p:spPr>
+            <a:xfrm>
+              <a:off x="1509486" y="15007771"/>
+              <a:ext cx="685074" cy="711200"/>
+            </a:xfrm>
+            <a:prstGeom prst="rect">
+              <a:avLst/>
+            </a:prstGeom>
+            <a:noFill/>
+          </p:spPr>
+          <p:style>
+            <a:lnRef idx="2">
+              <a:schemeClr val="accent1">
+                <a:shade val="50000"/>
+              </a:schemeClr>
+            </a:lnRef>
+            <a:fillRef idx="1">
+              <a:schemeClr val="accent1"/>
+            </a:fillRef>
+            <a:effectRef idx="0">
+              <a:schemeClr val="accent1"/>
+            </a:effectRef>
+            <a:fontRef idx="minor">
+              <a:schemeClr val="lt1"/>
+            </a:fontRef>
+          </p:style>
+          <p:txBody>
+            <a:bodyPr rtlCol="0" anchor="ctr"/>
+            <a:lstStyle/>
+            <a:p>
+              <a:pPr algn="ctr"/>
+              <a:endParaRPr lang="en-US"/>
+            </a:p>
+          </p:txBody>
+        </p:sp>
+        <p:cxnSp>
+          <p:nvCxnSpPr>
+            <p:cNvPr id="28" name="Straight Connector 27"/>
+            <p:cNvCxnSpPr/>
+            <p:nvPr/>
+          </p:nvCxnSpPr>
+          <p:spPr>
+            <a:xfrm flipV="1">
+              <a:off x="2194560" y="14693672"/>
+              <a:ext cx="2582580" cy="314100"/>
+            </a:xfrm>
+            <a:prstGeom prst="line">
+              <a:avLst/>
+            </a:prstGeom>
+            <a:ln w="12700"/>
+          </p:spPr>
+          <p:style>
+            <a:lnRef idx="1">
+              <a:schemeClr val="accent1"/>
+            </a:lnRef>
+            <a:fillRef idx="0">
+              <a:schemeClr val="accent1"/>
+            </a:fillRef>
+            <a:effectRef idx="0">
+              <a:schemeClr val="accent1"/>
+            </a:effectRef>
+            <a:fontRef idx="minor">
+              <a:schemeClr val="tx1"/>
+            </a:fontRef>
+          </p:style>
+        </p:cxnSp>
+        <p:cxnSp>
+          <p:nvCxnSpPr>
+            <p:cNvPr id="30" name="Straight Connector 29"/>
+            <p:cNvCxnSpPr/>
+            <p:nvPr/>
+          </p:nvCxnSpPr>
+          <p:spPr>
+            <a:xfrm>
+              <a:off x="2194560" y="15718969"/>
+              <a:ext cx="2582580" cy="489418"/>
+            </a:xfrm>
+            <a:prstGeom prst="line">
+              <a:avLst/>
+            </a:prstGeom>
+            <a:ln w="12700"/>
+          </p:spPr>
+          <p:style>
+            <a:lnRef idx="1">
+              <a:schemeClr val="accent1"/>
+            </a:lnRef>
+            <a:fillRef idx="0">
+              <a:schemeClr val="accent1"/>
+            </a:fillRef>
+            <a:effectRef idx="0">
+              <a:schemeClr val="accent1"/>
+            </a:effectRef>
+            <a:fontRef idx="minor">
+              <a:schemeClr val="tx1"/>
+            </a:fontRef>
+          </p:style>
+        </p:cxnSp>
+      </p:grpSp>
+      <p:sp>
+        <p:nvSpPr>
+          <p:cNvPr id="53" name="Rectangle 52"/>
+          <p:cNvSpPr/>
+          <p:nvPr/>
+        </p:nvSpPr>
+        <p:spPr>
+          <a:xfrm>
+            <a:off x="266700" y="0"/>
+            <a:ext cx="38785800" cy="28194000"/>
+          </a:xfrm>
+          <a:prstGeom prst="rect">
+            <a:avLst/>
+          </a:prstGeom>
+          <a:noFill/>
+        </p:spPr>
+        <p:style>
+          <a:lnRef idx="2">
+            <a:schemeClr val="accent1">
+              <a:shade val="50000"/>
+            </a:schemeClr>
+          </a:lnRef>
+          <a:fillRef idx="1">
+            <a:schemeClr val="accent1"/>
+          </a:fillRef>
+          <a:effectRef idx="0">
+            <a:schemeClr val="accent1"/>
+          </a:effectRef>
+          <a:fontRef idx="minor">
+            <a:schemeClr val="lt1"/>
+          </a:fontRef>
+        </p:style>
+        <p:txBody>
+          <a:bodyPr rtlCol="0" anchor="ctr"/>
+          <a:lstStyle/>
+          <a:p>
+            <a:pPr algn="ctr"/>
+            <a:endParaRPr lang="en-US"/>
+          </a:p>
+        </p:txBody>
+      </p:sp>
+      <p:sp>
+        <p:nvSpPr>
+          <p:cNvPr id="54" name="TextBox 53"/>
+          <p:cNvSpPr txBox="1"/>
+          <p:nvPr/>
+        </p:nvSpPr>
+        <p:spPr>
+          <a:xfrm>
+            <a:off x="952500" y="18479202"/>
+            <a:ext cx="5905500" cy="523220"/>
+          </a:xfrm>
+          <a:prstGeom prst="rect">
+            <a:avLst/>
+          </a:prstGeom>
+          <a:noFill/>
+        </p:spPr>
+        <p:txBody>
+          <a:bodyPr wrap="square" rtlCol="0">
+            <a:spAutoFit/>
+          </a:bodyPr>
+          <a:lstStyle/>
+          <a:p>
+            <a:r>
+              <a:rPr lang="en-US" sz="2800" dirty="0" smtClean="0"/>
+              <a:t>Nora et. Al  2012</a:t>
+            </a:r>
+            <a:endParaRPr lang="en-US" sz="2800" dirty="0"/>
           </a:p>
         </p:txBody>
       </p:sp>

</xml_diff>

<commit_message>
added figures edited poster, there still much to do...
</commit_message>
<xml_diff>
--- a/Documents/epigenetic workshop/Poster.pptx
+++ b/Documents/epigenetic workshop/Poster.pptx
@@ -3138,7 +3138,7 @@
         <p:spPr>
           <a:xfrm>
             <a:off x="539750" y="1902228"/>
-            <a:ext cx="6780074" cy="11026095"/>
+            <a:ext cx="6780074" cy="10401309"/>
           </a:xfrm>
           <a:prstGeom prst="rect">
             <a:avLst/>
@@ -3185,7 +3185,7 @@
             </a:r>
             <a:r>
               <a:rPr lang="en-US" sz="2030" dirty="0" smtClean="0"/>
-              <a:t>maps; Study </a:t>
+              <a:t>maps. Study </a:t>
             </a:r>
             <a:r>
               <a:rPr lang="en-US" sz="2030" dirty="0"/>
@@ -3279,39 +3279,7 @@
             </a:r>
             <a:r>
               <a:rPr lang="en-US" sz="2030" dirty="0" smtClean="0"/>
-              <a:t> steps include 1</a:t>
-            </a:r>
-            <a:r>
-              <a:rPr lang="en-US" sz="2030" dirty="0"/>
-              <a:t>. extraction of </a:t>
-            </a:r>
-            <a:r>
-              <a:rPr lang="en-US" sz="2030" dirty="0" smtClean="0"/>
-              <a:t>loci </a:t>
-            </a:r>
-            <a:r>
-              <a:rPr lang="en-US" sz="2030" dirty="0"/>
-              <a:t>from cells, 2. </a:t>
-            </a:r>
-            <a:r>
-              <a:rPr lang="en-US" sz="2030" dirty="0"/>
-              <a:t>fixation using formaldehyde 3. digestion using restriction enzymes, e.g. </a:t>
-            </a:r>
-            <a:r>
-              <a:rPr lang="en-US" sz="2030" dirty="0" err="1"/>
-              <a:t>HindIII</a:t>
-            </a:r>
-            <a:r>
-              <a:rPr lang="en-US" sz="2030" dirty="0"/>
-              <a:t>, 4. ligation, 5. </a:t>
-            </a:r>
-            <a:r>
-              <a:rPr lang="en-US" sz="2030" dirty="0"/>
-              <a:t>reverse cross linking 6. </a:t>
-            </a:r>
-            <a:r>
-              <a:rPr lang="en-US" sz="2030" dirty="0" smtClean="0"/>
-              <a:t>mapping using PCR </a:t>
+              <a:t> steps are presented in figure 1 A.</a:t>
             </a:r>
             <a:endParaRPr lang="en-US" sz="2030" dirty="0"/>
           </a:p>
@@ -3329,7 +3297,15 @@
             </a:r>
             <a:r>
               <a:rPr lang="en-US" sz="2030" dirty="0"/>
-              <a:t> experiment in mouse embryonic stem cells reveals the presence of stable Topologically Associating Domains (TAD) , in the 4.5Mb region of the  </a:t>
+              <a:t> </a:t>
+            </a:r>
+            <a:r>
+              <a:rPr lang="en-US" sz="2030" dirty="0" smtClean="0"/>
+              <a:t>encounter frequencies in </a:t>
+            </a:r>
+            <a:r>
+              <a:rPr lang="en-US" sz="2030" dirty="0"/>
+              <a:t>mouse embryonic stem cells reveals the presence of stable Topologically Associating Domains (TAD) , in the 4.5Mb region of the  </a:t>
             </a:r>
             <a:r>
               <a:rPr lang="en-US" sz="2030" dirty="0"/>
@@ -3337,7 +3313,15 @@
             </a:r>
             <a:r>
               <a:rPr lang="en-US" sz="2030" dirty="0"/>
-              <a:t> inactivation center, however the actual architecture in a specific stage is unknown </a:t>
+              <a:t> inactivation </a:t>
+            </a:r>
+            <a:r>
+              <a:rPr lang="en-US" sz="2030" dirty="0" smtClean="0"/>
+              <a:t>center figure 1B.  However, </a:t>
+            </a:r>
+            <a:r>
+              <a:rPr lang="en-US" sz="2030" dirty="0"/>
+              <a:t>the actual architecture in a specific stage is unknown </a:t>
             </a:r>
           </a:p>
           <a:p>
@@ -3397,7 +3381,7 @@
             <p:spPr>
               <a:xfrm>
                 <a:off x="7903758" y="1869097"/>
-                <a:ext cx="7336169" cy="29397920"/>
+                <a:ext cx="7336169" cy="28923815"/>
               </a:xfrm>
               <a:prstGeom prst="rect">
                 <a:avLst/>
@@ -3442,7 +3426,15 @@
                 </a:r>
                 <a:r>
                   <a:rPr lang="en-US" sz="2030" dirty="0"/>
-                  <a:t>a Rouse model </a:t>
+                  <a:t>a Rouse </a:t>
+                </a:r>
+                <a:r>
+                  <a:rPr lang="en-US" sz="2030" dirty="0" smtClean="0"/>
+                  <a:t>model </a:t>
+                </a:r>
+                <a:r>
+                  <a:rPr lang="en-US" sz="2030" dirty="0"/>
+                  <a:t>(beads connected by harmonic springs) </a:t>
                 </a:r>
                 <a:r>
                   <a:rPr lang="en-US" sz="2030" dirty="0" smtClean="0"/>
@@ -3934,7 +3926,23 @@
                 </a:r>
                 <a:r>
                   <a:rPr lang="en-US" sz="2030" dirty="0"/>
-                  <a:t>in a rouse chain of  N beads is given by</a:t>
+                  <a:t>in a </a:t>
+                </a:r>
+                <a:r>
+                  <a:rPr lang="en-US" sz="2030" dirty="0" smtClean="0"/>
+                  <a:t>Rouse </a:t>
+                </a:r>
+                <a:r>
+                  <a:rPr lang="en-US" sz="2030" dirty="0"/>
+                  <a:t>chain of </a:t>
+                </a:r>
+                <a:r>
+                  <a:rPr lang="en-US" sz="2030" dirty="0" smtClean="0"/>
+                  <a:t>N </a:t>
+                </a:r>
+                <a:r>
+                  <a:rPr lang="en-US" sz="2030" dirty="0"/>
+                  <a:t>beads is given by</a:t>
                 </a:r>
                 <a:r>
                   <a:rPr lang="en-US" sz="2030" dirty="0" smtClean="0"/>
@@ -4358,7 +4366,11 @@
                 </a:r>
                 <a:r>
                   <a:rPr lang="en-US" sz="2030" dirty="0"/>
-                  <a:t> enzyme. </a:t>
+                  <a:t> </a:t>
+                </a:r>
+                <a:r>
+                  <a:rPr lang="en-US" sz="2030" dirty="0" smtClean="0"/>
+                  <a:t>enzyme (Luca et al.). </a:t>
                 </a:r>
                 <a:r>
                   <a:rPr lang="en-US" sz="2030" dirty="0"/>
@@ -4374,25 +4386,7 @@
                 </a:r>
                 <a:r>
                   <a:rPr lang="en-US" sz="2030" dirty="0" smtClean="0"/>
-                  <a:t>a polymer chain of N=307 beads [performed by Luca et. </a:t>
-                </a:r>
-                <a:r>
-                  <a:rPr lang="en-US" sz="2030" dirty="0"/>
-                  <a:t>a</a:t>
-                </a:r>
-                <a:r>
-                  <a:rPr lang="en-US" sz="2030" dirty="0" smtClean="0"/>
-                  <a:t>l].</a:t>
-                </a:r>
-                <a:endParaRPr lang="en-US" sz="2030" dirty="0"/>
-              </a:p>
-              <a:p>
-                <a:endParaRPr lang="en-US" sz="2030" b="1" dirty="0"/>
-              </a:p>
-              <a:p>
-                <a:r>
-                  <a:rPr lang="en-US" sz="2030" dirty="0"/>
-                  <a:t>1. We wish to partition the encounter signal of each bead into regions of loops and chains [add image]</a:t>
+                  <a:t>a polymer chain of N=307 beads</a:t>
                 </a:r>
               </a:p>
               <a:p>
@@ -4408,11 +4402,11 @@
                 </a:br>
                 <a:r>
                   <a:rPr lang="en-US" sz="2030" dirty="0" smtClean="0"/>
-                  <a:t>For </a:t>
+                  <a:t>For linear </a:t>
                 </a:r>
                 <a:r>
                   <a:rPr lang="en-US" sz="2030" dirty="0"/>
-                  <a:t>the Rouse polymer, the distribution of the distance between bead m and n is normally distributed with </a:t>
+                  <a:t>Rouse polymer, the distribution of the distance between bead m and n is normally distributed with </a:t>
                 </a:r>
                 <a:br>
                   <a:rPr lang="en-US" sz="2030" dirty="0"/>
@@ -5615,7 +5609,72 @@
               <a:p>
                 <a:r>
                   <a:rPr lang="en-US" sz="2030" dirty="0" smtClean="0"/>
-                  <a:t>For encounter probabilities higher than nearest neighbor probability, we assign a different spring constant between the beads. First we estimate the nearest neighbor interaction using the whole data. Empirically tested we fit a lognormal distribution to the  NN encounter probability and use its expectation in the calculation of the spring constant.  </a:t>
+                  <a:t>For encounter probabilities higher than nearest neighbor (NN) probability, we assign a different spring constant between the beads. First, we estimate the NN interaction for all beads </a:t>
+                </a:r>
+                <a14:m>
+                  <m:oMath xmlns:m="http://schemas.openxmlformats.org/officeDocument/2006/math">
+                    <m:acc>
+                      <m:accPr>
+                        <m:chr m:val="̂"/>
+                        <m:ctrlPr>
+                          <a:rPr lang="en-US" sz="2030" i="1" smtClean="0">
+                            <a:latin typeface="Cambria Math" panose="02040503050406030204" pitchFamily="18" charset="0"/>
+                          </a:rPr>
+                        </m:ctrlPr>
+                      </m:accPr>
+                      <m:e>
+                        <m:r>
+                          <a:rPr lang="en-US" sz="2030" b="0" i="1" smtClean="0">
+                            <a:latin typeface="Cambria Math" panose="02040503050406030204" pitchFamily="18" charset="0"/>
+                          </a:rPr>
+                          <m:t>𝑃</m:t>
+                        </m:r>
+                      </m:e>
+                    </m:acc>
+                    <m:r>
+                      <a:rPr lang="en-US" sz="2030" b="0" i="1" smtClean="0">
+                        <a:latin typeface="Cambria Math" panose="02040503050406030204" pitchFamily="18" charset="0"/>
+                      </a:rPr>
+                      <m:t>(1)</m:t>
+                    </m:r>
+                  </m:oMath>
+                </a14:m>
+                <a:r>
+                  <a:rPr lang="en-US" sz="2030" dirty="0" smtClean="0"/>
+                  <a:t>. Empirically tested, we fit a lognormal distribution to the  NN encounter probability and use its expectation in the calculation of the spring constant.  </a:t>
+                </a:r>
+              </a:p>
+              <a:p>
+                <a:endParaRPr lang="en-US" sz="2030" dirty="0"/>
+              </a:p>
+              <a:p>
+                <a:endParaRPr lang="en-US" sz="2030" dirty="0" smtClean="0"/>
+              </a:p>
+              <a:p>
+                <a:endParaRPr lang="en-US" sz="2030" dirty="0"/>
+              </a:p>
+              <a:p>
+                <a:endParaRPr lang="en-US" sz="2030" dirty="0" smtClean="0"/>
+              </a:p>
+              <a:p>
+                <a:endParaRPr lang="en-US" sz="2030" dirty="0"/>
+              </a:p>
+              <a:p>
+                <a:endParaRPr lang="en-US" sz="2030" dirty="0" smtClean="0"/>
+              </a:p>
+              <a:p>
+                <a:endParaRPr lang="en-US" sz="2030" dirty="0"/>
+              </a:p>
+              <a:p>
+                <a:endParaRPr lang="en-US" sz="2030" dirty="0" smtClean="0"/>
+              </a:p>
+              <a:p>
+                <a:endParaRPr lang="en-US" sz="2030" dirty="0"/>
+              </a:p>
+              <a:p>
+                <a:r>
+                  <a:rPr lang="en-US" sz="2030" dirty="0" smtClean="0"/>
+                  <a:t/>
                 </a:r>
                 <a:br>
                   <a:rPr lang="en-US" sz="2030" dirty="0" smtClean="0"/>
@@ -5650,6 +5709,158 @@
                         </a:rPr>
                         <m:t>=</m:t>
                       </m:r>
+                      <m:r>
+                        <a:rPr lang="en-US" sz="2030" b="0" i="1" smtClean="0">
+                          <a:latin typeface="Cambria Math" panose="02040503050406030204" pitchFamily="18" charset="0"/>
+                        </a:rPr>
+                        <m:t>𝑘</m:t>
+                      </m:r>
+                      <m:r>
+                        <a:rPr lang="en-US" sz="2030" b="0" i="1" smtClean="0">
+                          <a:latin typeface="Cambria Math" panose="02040503050406030204" pitchFamily="18" charset="0"/>
+                        </a:rPr>
+                        <m:t>|</m:t>
+                      </m:r>
+                      <m:r>
+                        <a:rPr lang="en-US" sz="2030" b="0" i="1" smtClean="0">
+                          <a:latin typeface="Cambria Math" panose="02040503050406030204" pitchFamily="18" charset="0"/>
+                        </a:rPr>
+                        <m:t>𝑚</m:t>
+                      </m:r>
+                      <m:r>
+                        <a:rPr lang="en-US" sz="2030" b="0" i="1" smtClean="0">
+                          <a:latin typeface="Cambria Math" panose="02040503050406030204" pitchFamily="18" charset="0"/>
+                        </a:rPr>
+                        <m:t>−</m:t>
+                      </m:r>
+                      <m:r>
+                        <a:rPr lang="en-US" sz="2030" b="0" i="1" smtClean="0">
+                          <a:latin typeface="Cambria Math" panose="02040503050406030204" pitchFamily="18" charset="0"/>
+                        </a:rPr>
+                        <m:t>𝑛</m:t>
+                      </m:r>
+                      <m:r>
+                        <a:rPr lang="en-US" sz="2030" b="0" i="1" smtClean="0">
+                          <a:latin typeface="Cambria Math" panose="02040503050406030204" pitchFamily="18" charset="0"/>
+                        </a:rPr>
+                        <m:t>|</m:t>
+                      </m:r>
+                      <m:sSup>
+                        <m:sSupPr>
+                          <m:ctrlPr>
+                            <a:rPr lang="en-US" sz="2030" b="0" i="1" smtClean="0">
+                              <a:latin typeface="Cambria Math" panose="02040503050406030204" pitchFamily="18" charset="0"/>
+                            </a:rPr>
+                          </m:ctrlPr>
+                        </m:sSupPr>
+                        <m:e>
+                          <m:d>
+                            <m:dPr>
+                              <m:ctrlPr>
+                                <a:rPr lang="en-US" sz="2030" b="0" i="1" smtClean="0">
+                                  <a:latin typeface="Cambria Math" panose="02040503050406030204" pitchFamily="18" charset="0"/>
+                                </a:rPr>
+                              </m:ctrlPr>
+                            </m:dPr>
+                            <m:e>
+                              <m:f>
+                                <m:fPr>
+                                  <m:ctrlPr>
+                                    <a:rPr lang="en-US" sz="2030" i="1">
+                                      <a:latin typeface="Cambria Math" panose="02040503050406030204" pitchFamily="18" charset="0"/>
+                                    </a:rPr>
+                                  </m:ctrlPr>
+                                </m:fPr>
+                                <m:num>
+                                  <m:acc>
+                                    <m:accPr>
+                                      <m:chr m:val="̂"/>
+                                      <m:ctrlPr>
+                                        <a:rPr lang="en-US" sz="2030" i="1">
+                                          <a:latin typeface="Cambria Math" panose="02040503050406030204" pitchFamily="18" charset="0"/>
+                                        </a:rPr>
+                                      </m:ctrlPr>
+                                    </m:accPr>
+                                    <m:e>
+                                      <m:r>
+                                        <a:rPr lang="en-US" sz="2030" i="1">
+                                          <a:latin typeface="Cambria Math" panose="02040503050406030204" pitchFamily="18" charset="0"/>
+                                        </a:rPr>
+                                        <m:t>𝑃</m:t>
+                                      </m:r>
+                                    </m:e>
+                                  </m:acc>
+                                  <m:r>
+                                    <a:rPr lang="en-US" sz="2030" i="1">
+                                      <a:latin typeface="Cambria Math" panose="02040503050406030204" pitchFamily="18" charset="0"/>
+                                    </a:rPr>
+                                    <m:t>(1)</m:t>
+                                  </m:r>
+                                </m:num>
+                                <m:den>
+                                  <m:r>
+                                    <a:rPr lang="en-US" sz="2030" i="1">
+                                      <a:latin typeface="Cambria Math" panose="02040503050406030204" pitchFamily="18" charset="0"/>
+                                    </a:rPr>
+                                    <m:t>𝑃</m:t>
+                                  </m:r>
+                                  <m:r>
+                                    <a:rPr lang="en-US" sz="2030" i="1">
+                                      <a:latin typeface="Cambria Math" panose="02040503050406030204" pitchFamily="18" charset="0"/>
+                                    </a:rPr>
+                                    <m:t>(</m:t>
+                                  </m:r>
+                                  <m:d>
+                                    <m:dPr>
+                                      <m:begChr m:val="|"/>
+                                      <m:endChr m:val="|"/>
+                                      <m:ctrlPr>
+                                        <a:rPr lang="en-US" sz="2030" i="1">
+                                          <a:latin typeface="Cambria Math" panose="02040503050406030204" pitchFamily="18" charset="0"/>
+                                        </a:rPr>
+                                      </m:ctrlPr>
+                                    </m:dPr>
+                                    <m:e>
+                                      <m:r>
+                                        <a:rPr lang="en-US" sz="2030" i="1">
+                                          <a:latin typeface="Cambria Math" panose="02040503050406030204" pitchFamily="18" charset="0"/>
+                                        </a:rPr>
+                                        <m:t>𝑚</m:t>
+                                      </m:r>
+                                      <m:r>
+                                        <a:rPr lang="en-US" sz="2030" i="1">
+                                          <a:latin typeface="Cambria Math" panose="02040503050406030204" pitchFamily="18" charset="0"/>
+                                        </a:rPr>
+                                        <m:t>−</m:t>
+                                      </m:r>
+                                      <m:r>
+                                        <a:rPr lang="en-US" sz="2030" i="1">
+                                          <a:latin typeface="Cambria Math" panose="02040503050406030204" pitchFamily="18" charset="0"/>
+                                        </a:rPr>
+                                        <m:t>𝑛</m:t>
+                                      </m:r>
+                                    </m:e>
+                                  </m:d>
+                                  <m:r>
+                                    <a:rPr lang="en-US" sz="2030" i="1">
+                                      <a:latin typeface="Cambria Math" panose="02040503050406030204" pitchFamily="18" charset="0"/>
+                                    </a:rPr>
+                                    <m:t>)</m:t>
+                                  </m:r>
+                                </m:den>
+                              </m:f>
+                            </m:e>
+                          </m:d>
+                        </m:e>
+                        <m:sup>
+                          <m:r>
+                            <a:rPr lang="en-US" sz="2030" b="0" i="1" smtClean="0">
+                              <a:latin typeface="Cambria Math" panose="02040503050406030204" pitchFamily="18" charset="0"/>
+                            </a:rPr>
+                            <m:t>1.5</m:t>
+                          </m:r>
+                        </m:sup>
+                      </m:sSup>
                     </m:oMath>
                   </m:oMathPara>
                 </a14:m>
@@ -5723,30 +5934,6 @@
                   <a:rPr lang="en-US" sz="2030" dirty="0"/>
                   <a:t> maps</a:t>
                 </a:r>
-              </a:p>
-              <a:p>
-                <a:endParaRPr lang="en-US" sz="2030" dirty="0"/>
-              </a:p>
-              <a:p>
-                <a:r>
-                  <a:rPr lang="en-US" sz="2030" dirty="0"/>
-                  <a:t>Adjusting </a:t>
-                </a:r>
-                <a:r>
-                  <a:rPr lang="en-US" sz="2030" dirty="0"/>
-                  <a:t>the spring constant for peaks higher than nearest neighbor </a:t>
-                </a:r>
-                <a:r>
-                  <a:rPr lang="en-US" sz="2030" dirty="0"/>
-                  <a:t>, we estimate the nearest neighbor encounter prob. By calculating the distribution and taking its mean, then for simulation, if we determine k to be our spring constant,  then the new spring constant, for an encounter probability higher then nearest neighbor, for bead m and for distance |m-n| is given by k(P(1)/P(m-n))^1.5 |m-n|</a:t>
-                </a:r>
-                <a:endParaRPr lang="en-US" sz="2030" dirty="0"/>
-              </a:p>
-              <a:p>
-                <a:endParaRPr lang="en-US" sz="2030" dirty="0"/>
-              </a:p>
-              <a:p>
-                <a:endParaRPr lang="en-US" sz="2030" dirty="0"/>
               </a:p>
               <a:p>
                 <a:endParaRPr lang="en-US" sz="2030" dirty="0"/>
@@ -5766,7 +5953,7 @@
             <p:spPr>
               <a:xfrm>
                 <a:off x="7903758" y="1869097"/>
-                <a:ext cx="7336169" cy="29397920"/>
+                <a:ext cx="7336169" cy="28923815"/>
               </a:xfrm>
               <a:prstGeom prst="rect">
                 <a:avLst/>
@@ -5774,7 +5961,7 @@
               <a:blipFill rotWithShape="0">
                 <a:blip r:embed="rId3"/>
                 <a:stretch>
-                  <a:fillRect l="-3824" t="-456" r="-1663"/>
+                  <a:fillRect l="-3824" t="-464" r="-1663"/>
                 </a:stretch>
               </a:blipFill>
             </p:spPr>
@@ -5849,7 +6036,7 @@
         </p:nvGrpSpPr>
         <p:grpSpPr>
           <a:xfrm>
-            <a:off x="679311" y="15326931"/>
+            <a:off x="539750" y="17539568"/>
             <a:ext cx="6500952" cy="3152271"/>
             <a:chOff x="539750" y="14090700"/>
             <a:chExt cx="6500952" cy="3152271"/>
@@ -6130,7 +6317,7 @@
         </p:nvSpPr>
         <p:spPr>
           <a:xfrm>
-            <a:off x="952500" y="18479202"/>
+            <a:off x="539750" y="20821672"/>
             <a:ext cx="5905500" cy="523220"/>
           </a:xfrm>
           <a:prstGeom prst="rect">
@@ -6146,12 +6333,3471 @@
           <a:p>
             <a:r>
               <a:rPr lang="en-US" sz="2800" dirty="0" smtClean="0"/>
-              <a:t>Nora et. Al  2012</a:t>
+              <a:t>Nora et. al  2012</a:t>
             </a:r>
             <a:endParaRPr lang="en-US" sz="2800" dirty="0"/>
           </a:p>
         </p:txBody>
       </p:sp>
+      <p:grpSp>
+        <p:nvGrpSpPr>
+          <p:cNvPr id="115" name="Group 114"/>
+          <p:cNvGrpSpPr/>
+          <p:nvPr/>
+        </p:nvGrpSpPr>
+        <p:grpSpPr>
+          <a:xfrm>
+            <a:off x="870612" y="13104281"/>
+            <a:ext cx="6311241" cy="3774019"/>
+            <a:chOff x="16281615" y="3600181"/>
+            <a:chExt cx="12448242" cy="10757075"/>
+          </a:xfrm>
+        </p:grpSpPr>
+        <p:sp>
+          <p:nvSpPr>
+            <p:cNvPr id="111" name="TextBox 110"/>
+            <p:cNvSpPr txBox="1"/>
+            <p:nvPr/>
+          </p:nvSpPr>
+          <p:spPr>
+            <a:xfrm>
+              <a:off x="23184464" y="3716594"/>
+              <a:ext cx="5545393" cy="658265"/>
+            </a:xfrm>
+            <a:prstGeom prst="rect">
+              <a:avLst/>
+            </a:prstGeom>
+            <a:noFill/>
+          </p:spPr>
+          <p:txBody>
+            <a:bodyPr wrap="square" rtlCol="0">
+              <a:spAutoFit/>
+            </a:bodyPr>
+            <a:lstStyle/>
+            <a:p>
+              <a:r>
+                <a:rPr lang="en-US" sz="2400" b="1" dirty="0" smtClean="0"/>
+                <a:t>2. </a:t>
+              </a:r>
+              <a:r>
+                <a:rPr lang="en-US" sz="2000" dirty="0" err="1" smtClean="0"/>
+                <a:t>HindIII</a:t>
+              </a:r>
+              <a:r>
+                <a:rPr lang="en-US" sz="2000" dirty="0" smtClean="0"/>
+                <a:t> digestion</a:t>
+              </a:r>
+              <a:endParaRPr lang="en-US" sz="2000" dirty="0"/>
+            </a:p>
+          </p:txBody>
+        </p:sp>
+        <p:sp>
+          <p:nvSpPr>
+            <p:cNvPr id="112" name="TextBox 111"/>
+            <p:cNvSpPr txBox="1"/>
+            <p:nvPr/>
+          </p:nvSpPr>
+          <p:spPr>
+            <a:xfrm>
+              <a:off x="23184464" y="8023122"/>
+              <a:ext cx="5545393" cy="658265"/>
+            </a:xfrm>
+            <a:prstGeom prst="rect">
+              <a:avLst/>
+            </a:prstGeom>
+            <a:noFill/>
+          </p:spPr>
+          <p:txBody>
+            <a:bodyPr wrap="square" rtlCol="0">
+              <a:spAutoFit/>
+            </a:bodyPr>
+            <a:lstStyle/>
+            <a:p>
+              <a:r>
+                <a:rPr lang="en-US" sz="2400" b="1" dirty="0" smtClean="0"/>
+                <a:t>3.</a:t>
+              </a:r>
+              <a:r>
+                <a:rPr lang="en-US" sz="2000" b="1" dirty="0" smtClean="0"/>
+                <a:t> </a:t>
+              </a:r>
+              <a:r>
+                <a:rPr lang="en-US" sz="2000" dirty="0" smtClean="0"/>
+                <a:t>Ligation </a:t>
+              </a:r>
+              <a:endParaRPr lang="en-US" sz="2000" dirty="0"/>
+            </a:p>
+          </p:txBody>
+        </p:sp>
+        <p:grpSp>
+          <p:nvGrpSpPr>
+            <p:cNvPr id="114" name="Group 113"/>
+            <p:cNvGrpSpPr/>
+            <p:nvPr/>
+          </p:nvGrpSpPr>
+          <p:grpSpPr>
+            <a:xfrm>
+              <a:off x="16281615" y="3600181"/>
+              <a:ext cx="11756852" cy="10757075"/>
+              <a:chOff x="16291015" y="3240270"/>
+              <a:chExt cx="11051514" cy="11116986"/>
+            </a:xfrm>
+          </p:grpSpPr>
+          <p:grpSp>
+            <p:nvGrpSpPr>
+              <p:cNvPr id="68" name="Group 67"/>
+              <p:cNvGrpSpPr/>
+              <p:nvPr/>
+            </p:nvGrpSpPr>
+            <p:grpSpPr>
+              <a:xfrm>
+                <a:off x="16689689" y="5436327"/>
+                <a:ext cx="4395957" cy="2919880"/>
+                <a:chOff x="18232095" y="8411654"/>
+                <a:chExt cx="2178879" cy="1286381"/>
+              </a:xfrm>
+            </p:grpSpPr>
+            <p:sp>
+              <p:nvSpPr>
+                <p:cNvPr id="57" name="Freeform 56"/>
+                <p:cNvSpPr/>
+                <p:nvPr/>
+              </p:nvSpPr>
+              <p:spPr>
+                <a:xfrm>
+                  <a:off x="18232095" y="8411654"/>
+                  <a:ext cx="2178879" cy="1286381"/>
+                </a:xfrm>
+                <a:custGeom>
+                  <a:avLst/>
+                  <a:gdLst>
+                    <a:gd name="connsiteX0" fmla="*/ 29612 w 2830870"/>
+                    <a:gd name="connsiteY0" fmla="*/ 1277257 h 1828800"/>
+                    <a:gd name="connsiteX1" fmla="*/ 15098 w 2830870"/>
+                    <a:gd name="connsiteY1" fmla="*/ 1175657 h 1828800"/>
+                    <a:gd name="connsiteX2" fmla="*/ 584 w 2830870"/>
+                    <a:gd name="connsiteY2" fmla="*/ 1103086 h 1828800"/>
+                    <a:gd name="connsiteX3" fmla="*/ 145727 w 2830870"/>
+                    <a:gd name="connsiteY3" fmla="*/ 290286 h 1828800"/>
+                    <a:gd name="connsiteX4" fmla="*/ 232812 w 2830870"/>
+                    <a:gd name="connsiteY4" fmla="*/ 203200 h 1828800"/>
+                    <a:gd name="connsiteX5" fmla="*/ 595670 w 2830870"/>
+                    <a:gd name="connsiteY5" fmla="*/ 14514 h 1828800"/>
+                    <a:gd name="connsiteX6" fmla="*/ 871441 w 2830870"/>
+                    <a:gd name="connsiteY6" fmla="*/ 0 h 1828800"/>
+                    <a:gd name="connsiteX7" fmla="*/ 944012 w 2830870"/>
+                    <a:gd name="connsiteY7" fmla="*/ 58057 h 1828800"/>
+                    <a:gd name="connsiteX8" fmla="*/ 1016584 w 2830870"/>
+                    <a:gd name="connsiteY8" fmla="*/ 478971 h 1828800"/>
+                    <a:gd name="connsiteX9" fmla="*/ 1045612 w 2830870"/>
+                    <a:gd name="connsiteY9" fmla="*/ 566057 h 1828800"/>
+                    <a:gd name="connsiteX10" fmla="*/ 1118184 w 2830870"/>
+                    <a:gd name="connsiteY10" fmla="*/ 754743 h 1828800"/>
+                    <a:gd name="connsiteX11" fmla="*/ 1219784 w 2830870"/>
+                    <a:gd name="connsiteY11" fmla="*/ 957943 h 1828800"/>
+                    <a:gd name="connsiteX12" fmla="*/ 1234298 w 2830870"/>
+                    <a:gd name="connsiteY12" fmla="*/ 1001486 h 1828800"/>
+                    <a:gd name="connsiteX13" fmla="*/ 1364927 w 2830870"/>
+                    <a:gd name="connsiteY13" fmla="*/ 1190171 h 1828800"/>
+                    <a:gd name="connsiteX14" fmla="*/ 1626184 w 2830870"/>
+                    <a:gd name="connsiteY14" fmla="*/ 1407886 h 1828800"/>
+                    <a:gd name="connsiteX15" fmla="*/ 1669727 w 2830870"/>
+                    <a:gd name="connsiteY15" fmla="*/ 1436914 h 1828800"/>
+                    <a:gd name="connsiteX16" fmla="*/ 1785841 w 2830870"/>
+                    <a:gd name="connsiteY16" fmla="*/ 1553028 h 1828800"/>
+                    <a:gd name="connsiteX17" fmla="*/ 1843898 w 2830870"/>
+                    <a:gd name="connsiteY17" fmla="*/ 1567543 h 1828800"/>
+                    <a:gd name="connsiteX18" fmla="*/ 1974527 w 2830870"/>
+                    <a:gd name="connsiteY18" fmla="*/ 1625600 h 1828800"/>
+                    <a:gd name="connsiteX19" fmla="*/ 2163212 w 2830870"/>
+                    <a:gd name="connsiteY19" fmla="*/ 1654628 h 1828800"/>
+                    <a:gd name="connsiteX20" fmla="*/ 2221270 w 2830870"/>
+                    <a:gd name="connsiteY20" fmla="*/ 1669143 h 1828800"/>
+                    <a:gd name="connsiteX21" fmla="*/ 2714755 w 2830870"/>
+                    <a:gd name="connsiteY21" fmla="*/ 1524000 h 1828800"/>
+                    <a:gd name="connsiteX22" fmla="*/ 2729270 w 2830870"/>
+                    <a:gd name="connsiteY22" fmla="*/ 1451428 h 1828800"/>
+                    <a:gd name="connsiteX23" fmla="*/ 2700241 w 2830870"/>
+                    <a:gd name="connsiteY23" fmla="*/ 986971 h 1828800"/>
+                    <a:gd name="connsiteX24" fmla="*/ 2714755 w 2830870"/>
+                    <a:gd name="connsiteY24" fmla="*/ 725714 h 1828800"/>
+                    <a:gd name="connsiteX25" fmla="*/ 2743784 w 2830870"/>
+                    <a:gd name="connsiteY25" fmla="*/ 682171 h 1828800"/>
+                    <a:gd name="connsiteX26" fmla="*/ 2830870 w 2830870"/>
+                    <a:gd name="connsiteY26" fmla="*/ 624114 h 1828800"/>
+                    <a:gd name="connsiteX27" fmla="*/ 2816355 w 2830870"/>
+                    <a:gd name="connsiteY27" fmla="*/ 537028 h 1828800"/>
+                    <a:gd name="connsiteX28" fmla="*/ 2772812 w 2830870"/>
+                    <a:gd name="connsiteY28" fmla="*/ 522514 h 1828800"/>
+                    <a:gd name="connsiteX29" fmla="*/ 2540584 w 2830870"/>
+                    <a:gd name="connsiteY29" fmla="*/ 435428 h 1828800"/>
+                    <a:gd name="connsiteX30" fmla="*/ 2497041 w 2830870"/>
+                    <a:gd name="connsiteY30" fmla="*/ 420914 h 1828800"/>
+                    <a:gd name="connsiteX31" fmla="*/ 2380927 w 2830870"/>
+                    <a:gd name="connsiteY31" fmla="*/ 377371 h 1828800"/>
+                    <a:gd name="connsiteX32" fmla="*/ 2206755 w 2830870"/>
+                    <a:gd name="connsiteY32" fmla="*/ 406400 h 1828800"/>
+                    <a:gd name="connsiteX33" fmla="*/ 2192241 w 2830870"/>
+                    <a:gd name="connsiteY33" fmla="*/ 464457 h 1828800"/>
+                    <a:gd name="connsiteX34" fmla="*/ 2177727 w 2830870"/>
+                    <a:gd name="connsiteY34" fmla="*/ 551543 h 1828800"/>
+                    <a:gd name="connsiteX35" fmla="*/ 2148698 w 2830870"/>
+                    <a:gd name="connsiteY35" fmla="*/ 798286 h 1828800"/>
+                    <a:gd name="connsiteX36" fmla="*/ 2134184 w 2830870"/>
+                    <a:gd name="connsiteY36" fmla="*/ 885371 h 1828800"/>
+                    <a:gd name="connsiteX37" fmla="*/ 1800355 w 2830870"/>
+                    <a:gd name="connsiteY37" fmla="*/ 899886 h 1828800"/>
+                    <a:gd name="connsiteX38" fmla="*/ 1539098 w 2830870"/>
+                    <a:gd name="connsiteY38" fmla="*/ 943428 h 1828800"/>
+                    <a:gd name="connsiteX39" fmla="*/ 1408470 w 2830870"/>
+                    <a:gd name="connsiteY39" fmla="*/ 856343 h 1828800"/>
+                    <a:gd name="connsiteX40" fmla="*/ 1350412 w 2830870"/>
+                    <a:gd name="connsiteY40" fmla="*/ 769257 h 1828800"/>
+                    <a:gd name="connsiteX41" fmla="*/ 1364927 w 2830870"/>
+                    <a:gd name="connsiteY41" fmla="*/ 566057 h 1828800"/>
+                    <a:gd name="connsiteX42" fmla="*/ 1393955 w 2830870"/>
+                    <a:gd name="connsiteY42" fmla="*/ 522514 h 1828800"/>
+                    <a:gd name="connsiteX43" fmla="*/ 1408470 w 2830870"/>
+                    <a:gd name="connsiteY43" fmla="*/ 464457 h 1828800"/>
+                    <a:gd name="connsiteX44" fmla="*/ 1393955 w 2830870"/>
+                    <a:gd name="connsiteY44" fmla="*/ 217714 h 1828800"/>
+                    <a:gd name="connsiteX45" fmla="*/ 1263327 w 2830870"/>
+                    <a:gd name="connsiteY45" fmla="*/ 101600 h 1828800"/>
+                    <a:gd name="connsiteX46" fmla="*/ 1219784 w 2830870"/>
+                    <a:gd name="connsiteY46" fmla="*/ 72571 h 1828800"/>
+                    <a:gd name="connsiteX47" fmla="*/ 1161727 w 2830870"/>
+                    <a:gd name="connsiteY47" fmla="*/ 87086 h 1828800"/>
+                    <a:gd name="connsiteX48" fmla="*/ 1132698 w 2830870"/>
+                    <a:gd name="connsiteY48" fmla="*/ 130628 h 1828800"/>
+                    <a:gd name="connsiteX49" fmla="*/ 1118184 w 2830870"/>
+                    <a:gd name="connsiteY49" fmla="*/ 493486 h 1828800"/>
+                    <a:gd name="connsiteX50" fmla="*/ 1074641 w 2830870"/>
+                    <a:gd name="connsiteY50" fmla="*/ 580571 h 1828800"/>
+                    <a:gd name="connsiteX51" fmla="*/ 1060127 w 2830870"/>
+                    <a:gd name="connsiteY51" fmla="*/ 624114 h 1828800"/>
+                    <a:gd name="connsiteX52" fmla="*/ 1002070 w 2830870"/>
+                    <a:gd name="connsiteY52" fmla="*/ 711200 h 1828800"/>
+                    <a:gd name="connsiteX53" fmla="*/ 958527 w 2830870"/>
+                    <a:gd name="connsiteY53" fmla="*/ 798286 h 1828800"/>
+                    <a:gd name="connsiteX54" fmla="*/ 914984 w 2830870"/>
+                    <a:gd name="connsiteY54" fmla="*/ 841828 h 1828800"/>
+                    <a:gd name="connsiteX55" fmla="*/ 842412 w 2830870"/>
+                    <a:gd name="connsiteY55" fmla="*/ 914400 h 1828800"/>
+                    <a:gd name="connsiteX56" fmla="*/ 813384 w 2830870"/>
+                    <a:gd name="connsiteY56" fmla="*/ 957943 h 1828800"/>
+                    <a:gd name="connsiteX57" fmla="*/ 784355 w 2830870"/>
+                    <a:gd name="connsiteY57" fmla="*/ 1117600 h 1828800"/>
+                    <a:gd name="connsiteX58" fmla="*/ 784355 w 2830870"/>
+                    <a:gd name="connsiteY58" fmla="*/ 1567543 h 1828800"/>
+                    <a:gd name="connsiteX59" fmla="*/ 769841 w 2830870"/>
+                    <a:gd name="connsiteY59" fmla="*/ 1611086 h 1828800"/>
+                    <a:gd name="connsiteX60" fmla="*/ 784355 w 2830870"/>
+                    <a:gd name="connsiteY60" fmla="*/ 1698171 h 1828800"/>
+                    <a:gd name="connsiteX61" fmla="*/ 871441 w 2830870"/>
+                    <a:gd name="connsiteY61" fmla="*/ 1756228 h 1828800"/>
+                    <a:gd name="connsiteX62" fmla="*/ 900470 w 2830870"/>
+                    <a:gd name="connsiteY62" fmla="*/ 1799771 h 1828800"/>
+                    <a:gd name="connsiteX63" fmla="*/ 813384 w 2830870"/>
+                    <a:gd name="connsiteY63" fmla="*/ 1828800 h 1828800"/>
+                    <a:gd name="connsiteX64" fmla="*/ 726298 w 2830870"/>
+                    <a:gd name="connsiteY64" fmla="*/ 1799771 h 1828800"/>
+                    <a:gd name="connsiteX65" fmla="*/ 639212 w 2830870"/>
+                    <a:gd name="connsiteY65" fmla="*/ 1741714 h 1828800"/>
+                    <a:gd name="connsiteX66" fmla="*/ 581155 w 2830870"/>
+                    <a:gd name="connsiteY66" fmla="*/ 1654628 h 1828800"/>
+                    <a:gd name="connsiteX67" fmla="*/ 523098 w 2830870"/>
+                    <a:gd name="connsiteY67" fmla="*/ 1509486 h 1828800"/>
+                    <a:gd name="connsiteX68" fmla="*/ 537612 w 2830870"/>
+                    <a:gd name="connsiteY68" fmla="*/ 1335314 h 1828800"/>
+                    <a:gd name="connsiteX69" fmla="*/ 552127 w 2830870"/>
+                    <a:gd name="connsiteY69" fmla="*/ 1291771 h 1828800"/>
+                    <a:gd name="connsiteX70" fmla="*/ 566641 w 2830870"/>
+                    <a:gd name="connsiteY70" fmla="*/ 1233714 h 1828800"/>
+                    <a:gd name="connsiteX71" fmla="*/ 552127 w 2830870"/>
+                    <a:gd name="connsiteY71" fmla="*/ 972457 h 1828800"/>
+                    <a:gd name="connsiteX72" fmla="*/ 537612 w 2830870"/>
+                    <a:gd name="connsiteY72" fmla="*/ 928914 h 1828800"/>
+                    <a:gd name="connsiteX73" fmla="*/ 508584 w 2830870"/>
+                    <a:gd name="connsiteY73" fmla="*/ 798286 h 1828800"/>
+                    <a:gd name="connsiteX74" fmla="*/ 450527 w 2830870"/>
+                    <a:gd name="connsiteY74" fmla="*/ 711200 h 1828800"/>
+                    <a:gd name="connsiteX75" fmla="*/ 421498 w 2830870"/>
+                    <a:gd name="connsiteY75" fmla="*/ 696686 h 1828800"/>
+                  </a:gdLst>
+                  <a:ahLst/>
+                  <a:cxnLst>
+                    <a:cxn ang="0">
+                      <a:pos x="connsiteX0" y="connsiteY0"/>
+                    </a:cxn>
+                    <a:cxn ang="0">
+                      <a:pos x="connsiteX1" y="connsiteY1"/>
+                    </a:cxn>
+                    <a:cxn ang="0">
+                      <a:pos x="connsiteX2" y="connsiteY2"/>
+                    </a:cxn>
+                    <a:cxn ang="0">
+                      <a:pos x="connsiteX3" y="connsiteY3"/>
+                    </a:cxn>
+                    <a:cxn ang="0">
+                      <a:pos x="connsiteX4" y="connsiteY4"/>
+                    </a:cxn>
+                    <a:cxn ang="0">
+                      <a:pos x="connsiteX5" y="connsiteY5"/>
+                    </a:cxn>
+                    <a:cxn ang="0">
+                      <a:pos x="connsiteX6" y="connsiteY6"/>
+                    </a:cxn>
+                    <a:cxn ang="0">
+                      <a:pos x="connsiteX7" y="connsiteY7"/>
+                    </a:cxn>
+                    <a:cxn ang="0">
+                      <a:pos x="connsiteX8" y="connsiteY8"/>
+                    </a:cxn>
+                    <a:cxn ang="0">
+                      <a:pos x="connsiteX9" y="connsiteY9"/>
+                    </a:cxn>
+                    <a:cxn ang="0">
+                      <a:pos x="connsiteX10" y="connsiteY10"/>
+                    </a:cxn>
+                    <a:cxn ang="0">
+                      <a:pos x="connsiteX11" y="connsiteY11"/>
+                    </a:cxn>
+                    <a:cxn ang="0">
+                      <a:pos x="connsiteX12" y="connsiteY12"/>
+                    </a:cxn>
+                    <a:cxn ang="0">
+                      <a:pos x="connsiteX13" y="connsiteY13"/>
+                    </a:cxn>
+                    <a:cxn ang="0">
+                      <a:pos x="connsiteX14" y="connsiteY14"/>
+                    </a:cxn>
+                    <a:cxn ang="0">
+                      <a:pos x="connsiteX15" y="connsiteY15"/>
+                    </a:cxn>
+                    <a:cxn ang="0">
+                      <a:pos x="connsiteX16" y="connsiteY16"/>
+                    </a:cxn>
+                    <a:cxn ang="0">
+                      <a:pos x="connsiteX17" y="connsiteY17"/>
+                    </a:cxn>
+                    <a:cxn ang="0">
+                      <a:pos x="connsiteX18" y="connsiteY18"/>
+                    </a:cxn>
+                    <a:cxn ang="0">
+                      <a:pos x="connsiteX19" y="connsiteY19"/>
+                    </a:cxn>
+                    <a:cxn ang="0">
+                      <a:pos x="connsiteX20" y="connsiteY20"/>
+                    </a:cxn>
+                    <a:cxn ang="0">
+                      <a:pos x="connsiteX21" y="connsiteY21"/>
+                    </a:cxn>
+                    <a:cxn ang="0">
+                      <a:pos x="connsiteX22" y="connsiteY22"/>
+                    </a:cxn>
+                    <a:cxn ang="0">
+                      <a:pos x="connsiteX23" y="connsiteY23"/>
+                    </a:cxn>
+                    <a:cxn ang="0">
+                      <a:pos x="connsiteX24" y="connsiteY24"/>
+                    </a:cxn>
+                    <a:cxn ang="0">
+                      <a:pos x="connsiteX25" y="connsiteY25"/>
+                    </a:cxn>
+                    <a:cxn ang="0">
+                      <a:pos x="connsiteX26" y="connsiteY26"/>
+                    </a:cxn>
+                    <a:cxn ang="0">
+                      <a:pos x="connsiteX27" y="connsiteY27"/>
+                    </a:cxn>
+                    <a:cxn ang="0">
+                      <a:pos x="connsiteX28" y="connsiteY28"/>
+                    </a:cxn>
+                    <a:cxn ang="0">
+                      <a:pos x="connsiteX29" y="connsiteY29"/>
+                    </a:cxn>
+                    <a:cxn ang="0">
+                      <a:pos x="connsiteX30" y="connsiteY30"/>
+                    </a:cxn>
+                    <a:cxn ang="0">
+                      <a:pos x="connsiteX31" y="connsiteY31"/>
+                    </a:cxn>
+                    <a:cxn ang="0">
+                      <a:pos x="connsiteX32" y="connsiteY32"/>
+                    </a:cxn>
+                    <a:cxn ang="0">
+                      <a:pos x="connsiteX33" y="connsiteY33"/>
+                    </a:cxn>
+                    <a:cxn ang="0">
+                      <a:pos x="connsiteX34" y="connsiteY34"/>
+                    </a:cxn>
+                    <a:cxn ang="0">
+                      <a:pos x="connsiteX35" y="connsiteY35"/>
+                    </a:cxn>
+                    <a:cxn ang="0">
+                      <a:pos x="connsiteX36" y="connsiteY36"/>
+                    </a:cxn>
+                    <a:cxn ang="0">
+                      <a:pos x="connsiteX37" y="connsiteY37"/>
+                    </a:cxn>
+                    <a:cxn ang="0">
+                      <a:pos x="connsiteX38" y="connsiteY38"/>
+                    </a:cxn>
+                    <a:cxn ang="0">
+                      <a:pos x="connsiteX39" y="connsiteY39"/>
+                    </a:cxn>
+                    <a:cxn ang="0">
+                      <a:pos x="connsiteX40" y="connsiteY40"/>
+                    </a:cxn>
+                    <a:cxn ang="0">
+                      <a:pos x="connsiteX41" y="connsiteY41"/>
+                    </a:cxn>
+                    <a:cxn ang="0">
+                      <a:pos x="connsiteX42" y="connsiteY42"/>
+                    </a:cxn>
+                    <a:cxn ang="0">
+                      <a:pos x="connsiteX43" y="connsiteY43"/>
+                    </a:cxn>
+                    <a:cxn ang="0">
+                      <a:pos x="connsiteX44" y="connsiteY44"/>
+                    </a:cxn>
+                    <a:cxn ang="0">
+                      <a:pos x="connsiteX45" y="connsiteY45"/>
+                    </a:cxn>
+                    <a:cxn ang="0">
+                      <a:pos x="connsiteX46" y="connsiteY46"/>
+                    </a:cxn>
+                    <a:cxn ang="0">
+                      <a:pos x="connsiteX47" y="connsiteY47"/>
+                    </a:cxn>
+                    <a:cxn ang="0">
+                      <a:pos x="connsiteX48" y="connsiteY48"/>
+                    </a:cxn>
+                    <a:cxn ang="0">
+                      <a:pos x="connsiteX49" y="connsiteY49"/>
+                    </a:cxn>
+                    <a:cxn ang="0">
+                      <a:pos x="connsiteX50" y="connsiteY50"/>
+                    </a:cxn>
+                    <a:cxn ang="0">
+                      <a:pos x="connsiteX51" y="connsiteY51"/>
+                    </a:cxn>
+                    <a:cxn ang="0">
+                      <a:pos x="connsiteX52" y="connsiteY52"/>
+                    </a:cxn>
+                    <a:cxn ang="0">
+                      <a:pos x="connsiteX53" y="connsiteY53"/>
+                    </a:cxn>
+                    <a:cxn ang="0">
+                      <a:pos x="connsiteX54" y="connsiteY54"/>
+                    </a:cxn>
+                    <a:cxn ang="0">
+                      <a:pos x="connsiteX55" y="connsiteY55"/>
+                    </a:cxn>
+                    <a:cxn ang="0">
+                      <a:pos x="connsiteX56" y="connsiteY56"/>
+                    </a:cxn>
+                    <a:cxn ang="0">
+                      <a:pos x="connsiteX57" y="connsiteY57"/>
+                    </a:cxn>
+                    <a:cxn ang="0">
+                      <a:pos x="connsiteX58" y="connsiteY58"/>
+                    </a:cxn>
+                    <a:cxn ang="0">
+                      <a:pos x="connsiteX59" y="connsiteY59"/>
+                    </a:cxn>
+                    <a:cxn ang="0">
+                      <a:pos x="connsiteX60" y="connsiteY60"/>
+                    </a:cxn>
+                    <a:cxn ang="0">
+                      <a:pos x="connsiteX61" y="connsiteY61"/>
+                    </a:cxn>
+                    <a:cxn ang="0">
+                      <a:pos x="connsiteX62" y="connsiteY62"/>
+                    </a:cxn>
+                    <a:cxn ang="0">
+                      <a:pos x="connsiteX63" y="connsiteY63"/>
+                    </a:cxn>
+                    <a:cxn ang="0">
+                      <a:pos x="connsiteX64" y="connsiteY64"/>
+                    </a:cxn>
+                    <a:cxn ang="0">
+                      <a:pos x="connsiteX65" y="connsiteY65"/>
+                    </a:cxn>
+                    <a:cxn ang="0">
+                      <a:pos x="connsiteX66" y="connsiteY66"/>
+                    </a:cxn>
+                    <a:cxn ang="0">
+                      <a:pos x="connsiteX67" y="connsiteY67"/>
+                    </a:cxn>
+                    <a:cxn ang="0">
+                      <a:pos x="connsiteX68" y="connsiteY68"/>
+                    </a:cxn>
+                    <a:cxn ang="0">
+                      <a:pos x="connsiteX69" y="connsiteY69"/>
+                    </a:cxn>
+                    <a:cxn ang="0">
+                      <a:pos x="connsiteX70" y="connsiteY70"/>
+                    </a:cxn>
+                    <a:cxn ang="0">
+                      <a:pos x="connsiteX71" y="connsiteY71"/>
+                    </a:cxn>
+                    <a:cxn ang="0">
+                      <a:pos x="connsiteX72" y="connsiteY72"/>
+                    </a:cxn>
+                    <a:cxn ang="0">
+                      <a:pos x="connsiteX73" y="connsiteY73"/>
+                    </a:cxn>
+                    <a:cxn ang="0">
+                      <a:pos x="connsiteX74" y="connsiteY74"/>
+                    </a:cxn>
+                    <a:cxn ang="0">
+                      <a:pos x="connsiteX75" y="connsiteY75"/>
+                    </a:cxn>
+                  </a:cxnLst>
+                  <a:rect l="l" t="t" r="r" b="b"/>
+                  <a:pathLst>
+                    <a:path w="2830870" h="1828800">
+                      <a:moveTo>
+                        <a:pt x="29612" y="1277257"/>
+                      </a:moveTo>
+                      <a:cubicBezTo>
+                        <a:pt x="24774" y="1243390"/>
+                        <a:pt x="20722" y="1209402"/>
+                        <a:pt x="15098" y="1175657"/>
+                      </a:cubicBezTo>
+                      <a:cubicBezTo>
+                        <a:pt x="11042" y="1151323"/>
+                        <a:pt x="-3017" y="1127491"/>
+                        <a:pt x="584" y="1103086"/>
+                      </a:cubicBezTo>
+                      <a:cubicBezTo>
+                        <a:pt x="40755" y="830814"/>
+                        <a:pt x="76956" y="556775"/>
+                        <a:pt x="145727" y="290286"/>
+                      </a:cubicBezTo>
+                      <a:cubicBezTo>
+                        <a:pt x="155985" y="250536"/>
+                        <a:pt x="199312" y="226929"/>
+                        <a:pt x="232812" y="203200"/>
+                      </a:cubicBezTo>
+                      <a:cubicBezTo>
+                        <a:pt x="310103" y="148452"/>
+                        <a:pt x="469798" y="29038"/>
+                        <a:pt x="595670" y="14514"/>
+                      </a:cubicBezTo>
+                      <a:cubicBezTo>
+                        <a:pt x="687114" y="3963"/>
+                        <a:pt x="779517" y="4838"/>
+                        <a:pt x="871441" y="0"/>
+                      </a:cubicBezTo>
+                      <a:cubicBezTo>
+                        <a:pt x="895631" y="19352"/>
+                        <a:pt x="935028" y="28410"/>
+                        <a:pt x="944012" y="58057"/>
+                      </a:cubicBezTo>
+                      <a:cubicBezTo>
+                        <a:pt x="985302" y="194313"/>
+                        <a:pt x="988662" y="339361"/>
+                        <a:pt x="1016584" y="478971"/>
+                      </a:cubicBezTo>
+                      <a:cubicBezTo>
+                        <a:pt x="1022585" y="508976"/>
+                        <a:pt x="1035034" y="537345"/>
+                        <a:pt x="1045612" y="566057"/>
+                      </a:cubicBezTo>
+                      <a:cubicBezTo>
+                        <a:pt x="1068908" y="629289"/>
+                        <a:pt x="1088048" y="694470"/>
+                        <a:pt x="1118184" y="754743"/>
+                      </a:cubicBezTo>
+                      <a:cubicBezTo>
+                        <a:pt x="1152051" y="822476"/>
+                        <a:pt x="1195837" y="886101"/>
+                        <a:pt x="1219784" y="957943"/>
+                      </a:cubicBezTo>
+                      <a:cubicBezTo>
+                        <a:pt x="1224622" y="972457"/>
+                        <a:pt x="1226189" y="988512"/>
+                        <a:pt x="1234298" y="1001486"/>
+                      </a:cubicBezTo>
+                      <a:cubicBezTo>
+                        <a:pt x="1274841" y="1066355"/>
+                        <a:pt x="1318459" y="1129405"/>
+                        <a:pt x="1364927" y="1190171"/>
+                      </a:cubicBezTo>
+                      <a:cubicBezTo>
+                        <a:pt x="1413717" y="1253973"/>
+                        <a:pt x="1622342" y="1404948"/>
+                        <a:pt x="1626184" y="1407886"/>
+                      </a:cubicBezTo>
+                      <a:cubicBezTo>
+                        <a:pt x="1640041" y="1418482"/>
+                        <a:pt x="1656820" y="1425180"/>
+                        <a:pt x="1669727" y="1436914"/>
+                      </a:cubicBezTo>
+                      <a:cubicBezTo>
+                        <a:pt x="1710229" y="1473734"/>
+                        <a:pt x="1742052" y="1520186"/>
+                        <a:pt x="1785841" y="1553028"/>
+                      </a:cubicBezTo>
+                      <a:cubicBezTo>
+                        <a:pt x="1801799" y="1564997"/>
+                        <a:pt x="1825280" y="1560382"/>
+                        <a:pt x="1843898" y="1567543"/>
+                      </a:cubicBezTo>
+                      <a:cubicBezTo>
+                        <a:pt x="1888372" y="1584648"/>
+                        <a:pt x="1930053" y="1608495"/>
+                        <a:pt x="1974527" y="1625600"/>
+                      </a:cubicBezTo>
+                      <a:cubicBezTo>
+                        <a:pt x="2025592" y="1645240"/>
+                        <a:pt x="2121461" y="1649989"/>
+                        <a:pt x="2163212" y="1654628"/>
+                      </a:cubicBezTo>
+                      <a:cubicBezTo>
+                        <a:pt x="2182565" y="1659466"/>
+                        <a:pt x="2201497" y="1666507"/>
+                        <a:pt x="2221270" y="1669143"/>
+                      </a:cubicBezTo>
+                      <a:cubicBezTo>
+                        <a:pt x="2484171" y="1704197"/>
+                        <a:pt x="2377953" y="1685079"/>
+                        <a:pt x="2714755" y="1524000"/>
+                      </a:cubicBezTo>
+                      <a:cubicBezTo>
+                        <a:pt x="2719593" y="1499809"/>
+                        <a:pt x="2729270" y="1476098"/>
+                        <a:pt x="2729270" y="1451428"/>
+                      </a:cubicBezTo>
+                      <a:cubicBezTo>
+                        <a:pt x="2729270" y="1060352"/>
+                        <a:pt x="2757509" y="1158780"/>
+                        <a:pt x="2700241" y="986971"/>
+                      </a:cubicBezTo>
+                      <a:cubicBezTo>
+                        <a:pt x="2682312" y="861464"/>
+                        <a:pt x="2672912" y="872164"/>
+                        <a:pt x="2714755" y="725714"/>
+                      </a:cubicBezTo>
+                      <a:cubicBezTo>
+                        <a:pt x="2719547" y="708941"/>
+                        <a:pt x="2730656" y="693658"/>
+                        <a:pt x="2743784" y="682171"/>
+                      </a:cubicBezTo>
+                      <a:cubicBezTo>
+                        <a:pt x="2770040" y="659197"/>
+                        <a:pt x="2830870" y="624114"/>
+                        <a:pt x="2830870" y="624114"/>
+                      </a:cubicBezTo>
+                      <a:cubicBezTo>
+                        <a:pt x="2826032" y="595085"/>
+                        <a:pt x="2830956" y="562580"/>
+                        <a:pt x="2816355" y="537028"/>
+                      </a:cubicBezTo>
+                      <a:cubicBezTo>
+                        <a:pt x="2808764" y="523744"/>
+                        <a:pt x="2787168" y="527803"/>
+                        <a:pt x="2772812" y="522514"/>
+                      </a:cubicBezTo>
+                      <a:lnTo>
+                        <a:pt x="2540584" y="435428"/>
+                      </a:lnTo>
+                      <a:cubicBezTo>
+                        <a:pt x="2526228" y="430139"/>
+                        <a:pt x="2511419" y="426142"/>
+                        <a:pt x="2497041" y="420914"/>
+                      </a:cubicBezTo>
+                      <a:cubicBezTo>
+                        <a:pt x="2458193" y="406788"/>
+                        <a:pt x="2419632" y="391885"/>
+                        <a:pt x="2380927" y="377371"/>
+                      </a:cubicBezTo>
+                      <a:cubicBezTo>
+                        <a:pt x="2322870" y="387047"/>
+                        <a:pt x="2260196" y="381735"/>
+                        <a:pt x="2206755" y="406400"/>
+                      </a:cubicBezTo>
+                      <a:cubicBezTo>
+                        <a:pt x="2188643" y="414759"/>
+                        <a:pt x="2196153" y="444896"/>
+                        <a:pt x="2192241" y="464457"/>
+                      </a:cubicBezTo>
+                      <a:cubicBezTo>
+                        <a:pt x="2186470" y="493315"/>
+                        <a:pt x="2180977" y="522294"/>
+                        <a:pt x="2177727" y="551543"/>
+                      </a:cubicBezTo>
+                      <a:cubicBezTo>
+                        <a:pt x="2138216" y="907136"/>
+                        <a:pt x="2184354" y="602174"/>
+                        <a:pt x="2148698" y="798286"/>
+                      </a:cubicBezTo>
+                      <a:cubicBezTo>
+                        <a:pt x="2143434" y="827240"/>
+                        <a:pt x="2162436" y="877131"/>
+                        <a:pt x="2134184" y="885371"/>
+                      </a:cubicBezTo>
+                      <a:cubicBezTo>
+                        <a:pt x="2027258" y="916558"/>
+                        <a:pt x="1911631" y="895048"/>
+                        <a:pt x="1800355" y="899886"/>
+                      </a:cubicBezTo>
+                      <a:cubicBezTo>
+                        <a:pt x="1664796" y="990259"/>
+                        <a:pt x="1748037" y="960840"/>
+                        <a:pt x="1539098" y="943428"/>
+                      </a:cubicBezTo>
+                      <a:cubicBezTo>
+                        <a:pt x="1507707" y="786472"/>
+                        <a:pt x="1563652" y="946866"/>
+                        <a:pt x="1408470" y="856343"/>
+                      </a:cubicBezTo>
+                      <a:cubicBezTo>
+                        <a:pt x="1378334" y="838764"/>
+                        <a:pt x="1350412" y="769257"/>
+                        <a:pt x="1350412" y="769257"/>
+                      </a:cubicBezTo>
+                      <a:cubicBezTo>
+                        <a:pt x="1355250" y="701524"/>
+                        <a:pt x="1353126" y="632930"/>
+                        <a:pt x="1364927" y="566057"/>
+                      </a:cubicBezTo>
+                      <a:cubicBezTo>
+                        <a:pt x="1367959" y="548879"/>
+                        <a:pt x="1387083" y="538547"/>
+                        <a:pt x="1393955" y="522514"/>
+                      </a:cubicBezTo>
+                      <a:cubicBezTo>
+                        <a:pt x="1401813" y="504179"/>
+                        <a:pt x="1403632" y="483809"/>
+                        <a:pt x="1408470" y="464457"/>
+                      </a:cubicBezTo>
+                      <a:cubicBezTo>
+                        <a:pt x="1403632" y="382209"/>
+                        <a:pt x="1409371" y="298649"/>
+                        <a:pt x="1393955" y="217714"/>
+                      </a:cubicBezTo>
+                      <a:cubicBezTo>
+                        <a:pt x="1384577" y="168479"/>
+                        <a:pt x="1291077" y="120100"/>
+                        <a:pt x="1263327" y="101600"/>
+                      </a:cubicBezTo>
+                      <a:lnTo>
+                        <a:pt x="1219784" y="72571"/>
+                      </a:lnTo>
+                      <a:cubicBezTo>
+                        <a:pt x="1200432" y="77409"/>
+                        <a:pt x="1178325" y="76021"/>
+                        <a:pt x="1161727" y="87086"/>
+                      </a:cubicBezTo>
+                      <a:cubicBezTo>
+                        <a:pt x="1147213" y="96762"/>
+                        <a:pt x="1134556" y="113283"/>
+                        <a:pt x="1132698" y="130628"/>
+                      </a:cubicBezTo>
+                      <a:cubicBezTo>
+                        <a:pt x="1119802" y="250989"/>
+                        <a:pt x="1126808" y="372744"/>
+                        <a:pt x="1118184" y="493486"/>
+                      </a:cubicBezTo>
+                      <a:cubicBezTo>
+                        <a:pt x="1115780" y="527137"/>
+                        <a:pt x="1092058" y="554445"/>
+                        <a:pt x="1074641" y="580571"/>
+                      </a:cubicBezTo>
+                      <a:cubicBezTo>
+                        <a:pt x="1069803" y="595085"/>
+                        <a:pt x="1067557" y="610740"/>
+                        <a:pt x="1060127" y="624114"/>
+                      </a:cubicBezTo>
+                      <a:cubicBezTo>
+                        <a:pt x="1043184" y="654612"/>
+                        <a:pt x="1013103" y="678102"/>
+                        <a:pt x="1002070" y="711200"/>
+                      </a:cubicBezTo>
+                      <a:cubicBezTo>
+                        <a:pt x="987523" y="754838"/>
+                        <a:pt x="989788" y="760773"/>
+                        <a:pt x="958527" y="798286"/>
+                      </a:cubicBezTo>
+                      <a:cubicBezTo>
+                        <a:pt x="945386" y="814055"/>
+                        <a:pt x="928125" y="826059"/>
+                        <a:pt x="914984" y="841828"/>
+                      </a:cubicBezTo>
+                      <a:cubicBezTo>
+                        <a:pt x="854506" y="914401"/>
+                        <a:pt x="922242" y="861179"/>
+                        <a:pt x="842412" y="914400"/>
+                      </a:cubicBezTo>
+                      <a:cubicBezTo>
+                        <a:pt x="832736" y="928914"/>
+                        <a:pt x="821185" y="942341"/>
+                        <a:pt x="813384" y="957943"/>
+                      </a:cubicBezTo>
+                      <a:cubicBezTo>
+                        <a:pt x="791011" y="1002691"/>
+                        <a:pt x="789358" y="1077576"/>
+                        <a:pt x="784355" y="1117600"/>
+                      </a:cubicBezTo>
+                      <a:cubicBezTo>
+                        <a:pt x="798372" y="1341864"/>
+                        <a:pt x="808751" y="1347981"/>
+                        <a:pt x="784355" y="1567543"/>
+                      </a:cubicBezTo>
+                      <a:cubicBezTo>
+                        <a:pt x="782665" y="1582749"/>
+                        <a:pt x="774679" y="1596572"/>
+                        <a:pt x="769841" y="1611086"/>
+                      </a:cubicBezTo>
+                      <a:cubicBezTo>
+                        <a:pt x="774679" y="1640114"/>
+                        <a:pt x="767479" y="1674062"/>
+                        <a:pt x="784355" y="1698171"/>
+                      </a:cubicBezTo>
+                      <a:cubicBezTo>
+                        <a:pt x="804362" y="1726752"/>
+                        <a:pt x="871441" y="1756228"/>
+                        <a:pt x="871441" y="1756228"/>
+                      </a:cubicBezTo>
+                      <a:cubicBezTo>
+                        <a:pt x="881117" y="1770742"/>
+                        <a:pt x="911367" y="1786149"/>
+                        <a:pt x="900470" y="1799771"/>
+                      </a:cubicBezTo>
+                      <a:cubicBezTo>
+                        <a:pt x="881355" y="1823665"/>
+                        <a:pt x="813384" y="1828800"/>
+                        <a:pt x="813384" y="1828800"/>
+                      </a:cubicBezTo>
+                      <a:cubicBezTo>
+                        <a:pt x="784355" y="1819124"/>
+                        <a:pt x="751758" y="1816744"/>
+                        <a:pt x="726298" y="1799771"/>
+                      </a:cubicBezTo>
+                      <a:lnTo>
+                        <a:pt x="639212" y="1741714"/>
+                      </a:lnTo>
+                      <a:cubicBezTo>
+                        <a:pt x="619860" y="1712685"/>
+                        <a:pt x="592187" y="1687726"/>
+                        <a:pt x="581155" y="1654628"/>
+                      </a:cubicBezTo>
+                      <a:cubicBezTo>
+                        <a:pt x="545285" y="1547017"/>
+                        <a:pt x="565811" y="1594911"/>
+                        <a:pt x="523098" y="1509486"/>
+                      </a:cubicBezTo>
+                      <a:cubicBezTo>
+                        <a:pt x="527936" y="1451429"/>
+                        <a:pt x="529912" y="1393062"/>
+                        <a:pt x="537612" y="1335314"/>
+                      </a:cubicBezTo>
+                      <a:cubicBezTo>
+                        <a:pt x="539634" y="1320149"/>
+                        <a:pt x="547924" y="1306482"/>
+                        <a:pt x="552127" y="1291771"/>
+                      </a:cubicBezTo>
+                      <a:cubicBezTo>
+                        <a:pt x="557607" y="1272591"/>
+                        <a:pt x="561803" y="1253066"/>
+                        <a:pt x="566641" y="1233714"/>
+                      </a:cubicBezTo>
+                      <a:cubicBezTo>
+                        <a:pt x="561803" y="1146628"/>
+                        <a:pt x="560396" y="1059284"/>
+                        <a:pt x="552127" y="972457"/>
+                      </a:cubicBezTo>
+                      <a:cubicBezTo>
+                        <a:pt x="550676" y="957226"/>
+                        <a:pt x="541323" y="943757"/>
+                        <a:pt x="537612" y="928914"/>
+                      </a:cubicBezTo>
+                      <a:cubicBezTo>
+                        <a:pt x="507674" y="809165"/>
+                        <a:pt x="538390" y="902608"/>
+                        <a:pt x="508584" y="798286"/>
+                      </a:cubicBezTo>
+                      <a:cubicBezTo>
+                        <a:pt x="496053" y="754425"/>
+                        <a:pt x="493520" y="739862"/>
+                        <a:pt x="450527" y="711200"/>
+                      </a:cubicBezTo>
+                      <a:cubicBezTo>
+                        <a:pt x="426461" y="695156"/>
+                        <a:pt x="384074" y="696686"/>
+                        <a:pt x="421498" y="696686"/>
+                      </a:cubicBezTo>
+                    </a:path>
+                  </a:pathLst>
+                </a:custGeom>
+                <a:noFill/>
+                <a:ln w="57150"/>
+              </p:spPr>
+              <p:style>
+                <a:lnRef idx="2">
+                  <a:schemeClr val="accent1">
+                    <a:shade val="50000"/>
+                  </a:schemeClr>
+                </a:lnRef>
+                <a:fillRef idx="1">
+                  <a:schemeClr val="accent1"/>
+                </a:fillRef>
+                <a:effectRef idx="0">
+                  <a:schemeClr val="accent1"/>
+                </a:effectRef>
+                <a:fontRef idx="minor">
+                  <a:schemeClr val="lt1"/>
+                </a:fontRef>
+              </p:style>
+              <p:txBody>
+                <a:bodyPr rtlCol="0" anchor="ctr"/>
+                <a:lstStyle/>
+                <a:p>
+                  <a:pPr algn="ctr"/>
+                  <a:endParaRPr lang="en-US"/>
+                </a:p>
+              </p:txBody>
+            </p:sp>
+            <p:cxnSp>
+              <p:nvCxnSpPr>
+                <p:cNvPr id="59" name="Straight Connector 58"/>
+                <p:cNvCxnSpPr>
+                  <a:stCxn id="57" idx="70"/>
+                  <a:endCxn id="57" idx="57"/>
+                </p:cNvCxnSpPr>
+                <p:nvPr/>
+              </p:nvCxnSpPr>
+              <p:spPr>
+                <a:xfrm flipV="1">
+                  <a:off x="18668231" y="9197775"/>
+                  <a:ext cx="167571" cy="81675"/>
+                </a:xfrm>
+                <a:prstGeom prst="line">
+                  <a:avLst/>
+                </a:prstGeom>
+                <a:ln w="57150">
+                  <a:solidFill>
+                    <a:srgbClr val="C00000"/>
+                  </a:solidFill>
+                </a:ln>
+              </p:spPr>
+              <p:style>
+                <a:lnRef idx="1">
+                  <a:schemeClr val="accent1"/>
+                </a:lnRef>
+                <a:fillRef idx="0">
+                  <a:schemeClr val="accent1"/>
+                </a:fillRef>
+                <a:effectRef idx="0">
+                  <a:schemeClr val="accent1"/>
+                </a:effectRef>
+                <a:fontRef idx="minor">
+                  <a:schemeClr val="tx1"/>
+                </a:fontRef>
+              </p:style>
+            </p:cxnSp>
+            <p:cxnSp>
+              <p:nvCxnSpPr>
+                <p:cNvPr id="61" name="Straight Connector 60"/>
+                <p:cNvCxnSpPr>
+                  <a:stCxn id="57" idx="12"/>
+                  <a:endCxn id="57" idx="39"/>
+                </p:cNvCxnSpPr>
+                <p:nvPr/>
+              </p:nvCxnSpPr>
+              <p:spPr>
+                <a:xfrm flipV="1">
+                  <a:off x="19182116" y="9014007"/>
+                  <a:ext cx="134058" cy="102094"/>
+                </a:xfrm>
+                <a:prstGeom prst="line">
+                  <a:avLst/>
+                </a:prstGeom>
+                <a:ln w="57150">
+                  <a:solidFill>
+                    <a:srgbClr val="C00000"/>
+                  </a:solidFill>
+                </a:ln>
+              </p:spPr>
+              <p:style>
+                <a:lnRef idx="1">
+                  <a:schemeClr val="accent1"/>
+                </a:lnRef>
+                <a:fillRef idx="0">
+                  <a:schemeClr val="accent1"/>
+                </a:fillRef>
+                <a:effectRef idx="0">
+                  <a:schemeClr val="accent1"/>
+                </a:effectRef>
+                <a:fontRef idx="minor">
+                  <a:schemeClr val="tx1"/>
+                </a:fontRef>
+              </p:style>
+            </p:cxnSp>
+            <p:cxnSp>
+              <p:nvCxnSpPr>
+                <p:cNvPr id="63" name="Straight Connector 62"/>
+                <p:cNvCxnSpPr>
+                  <a:stCxn id="57" idx="52"/>
+                </p:cNvCxnSpPr>
+                <p:nvPr/>
+              </p:nvCxnSpPr>
+              <p:spPr>
+                <a:xfrm flipV="1">
+                  <a:off x="19003374" y="8851136"/>
+                  <a:ext cx="91278" cy="60777"/>
+                </a:xfrm>
+                <a:prstGeom prst="line">
+                  <a:avLst/>
+                </a:prstGeom>
+                <a:ln w="57150">
+                  <a:solidFill>
+                    <a:srgbClr val="C00000"/>
+                  </a:solidFill>
+                </a:ln>
+              </p:spPr>
+              <p:style>
+                <a:lnRef idx="1">
+                  <a:schemeClr val="accent1"/>
+                </a:lnRef>
+                <a:fillRef idx="0">
+                  <a:schemeClr val="accent1"/>
+                </a:fillRef>
+                <a:effectRef idx="0">
+                  <a:schemeClr val="accent1"/>
+                </a:effectRef>
+                <a:fontRef idx="minor">
+                  <a:schemeClr val="tx1"/>
+                </a:fontRef>
+              </p:style>
+            </p:cxnSp>
+            <p:cxnSp>
+              <p:nvCxnSpPr>
+                <p:cNvPr id="65" name="Straight Connector 64"/>
+                <p:cNvCxnSpPr/>
+                <p:nvPr/>
+              </p:nvCxnSpPr>
+              <p:spPr>
+                <a:xfrm flipH="1" flipV="1">
+                  <a:off x="19259849" y="8752571"/>
+                  <a:ext cx="101600" cy="14515"/>
+                </a:xfrm>
+                <a:prstGeom prst="line">
+                  <a:avLst/>
+                </a:prstGeom>
+                <a:ln w="57150">
+                  <a:solidFill>
+                    <a:srgbClr val="C00000"/>
+                  </a:solidFill>
+                </a:ln>
+              </p:spPr>
+              <p:style>
+                <a:lnRef idx="1">
+                  <a:schemeClr val="accent1"/>
+                </a:lnRef>
+                <a:fillRef idx="0">
+                  <a:schemeClr val="accent1"/>
+                </a:fillRef>
+                <a:effectRef idx="0">
+                  <a:schemeClr val="accent1"/>
+                </a:effectRef>
+                <a:fontRef idx="minor">
+                  <a:schemeClr val="tx1"/>
+                </a:fontRef>
+              </p:style>
+            </p:cxnSp>
+            <p:cxnSp>
+              <p:nvCxnSpPr>
+                <p:cNvPr id="67" name="Straight Connector 66"/>
+                <p:cNvCxnSpPr>
+                  <a:stCxn id="57" idx="58"/>
+                  <a:endCxn id="57" idx="66"/>
+                </p:cNvCxnSpPr>
+                <p:nvPr/>
+              </p:nvCxnSpPr>
+              <p:spPr>
+                <a:xfrm flipH="1">
+                  <a:off x="18679401" y="9514267"/>
+                  <a:ext cx="156400" cy="61255"/>
+                </a:xfrm>
+                <a:prstGeom prst="line">
+                  <a:avLst/>
+                </a:prstGeom>
+                <a:ln w="57150">
+                  <a:solidFill>
+                    <a:srgbClr val="C00000"/>
+                  </a:solidFill>
+                </a:ln>
+              </p:spPr>
+              <p:style>
+                <a:lnRef idx="1">
+                  <a:schemeClr val="accent1"/>
+                </a:lnRef>
+                <a:fillRef idx="0">
+                  <a:schemeClr val="accent1"/>
+                </a:fillRef>
+                <a:effectRef idx="0">
+                  <a:schemeClr val="accent1"/>
+                </a:effectRef>
+                <a:fontRef idx="minor">
+                  <a:schemeClr val="tx1"/>
+                </a:fontRef>
+              </p:style>
+            </p:cxnSp>
+          </p:grpSp>
+          <p:grpSp>
+            <p:nvGrpSpPr>
+              <p:cNvPr id="78" name="Group 77"/>
+              <p:cNvGrpSpPr/>
+              <p:nvPr/>
+            </p:nvGrpSpPr>
+            <p:grpSpPr>
+              <a:xfrm>
+                <a:off x="16291015" y="8874305"/>
+                <a:ext cx="4853898" cy="1760761"/>
+                <a:chOff x="15461725" y="8862845"/>
+                <a:chExt cx="11133584" cy="1871935"/>
+              </a:xfrm>
+            </p:grpSpPr>
+            <p:sp>
+              <p:nvSpPr>
+                <p:cNvPr id="69" name="Rectangle 68"/>
+                <p:cNvSpPr/>
+                <p:nvPr/>
+              </p:nvSpPr>
+              <p:spPr>
+                <a:xfrm>
+                  <a:off x="15461725" y="8862845"/>
+                  <a:ext cx="11133584" cy="1871935"/>
+                </a:xfrm>
+                <a:prstGeom prst="rect">
+                  <a:avLst/>
+                </a:prstGeom>
+                <a:noFill/>
+              </p:spPr>
+              <p:style>
+                <a:lnRef idx="2">
+                  <a:schemeClr val="accent1">
+                    <a:shade val="50000"/>
+                  </a:schemeClr>
+                </a:lnRef>
+                <a:fillRef idx="1">
+                  <a:schemeClr val="accent1"/>
+                </a:fillRef>
+                <a:effectRef idx="0">
+                  <a:schemeClr val="accent1"/>
+                </a:effectRef>
+                <a:fontRef idx="minor">
+                  <a:schemeClr val="lt1"/>
+                </a:fontRef>
+              </p:style>
+              <p:txBody>
+                <a:bodyPr rtlCol="0" anchor="ctr"/>
+                <a:lstStyle/>
+                <a:p>
+                  <a:pPr algn="ctr"/>
+                  <a:r>
+                    <a:rPr lang="en-US" sz="2400" dirty="0" smtClean="0">
+                      <a:solidFill>
+                        <a:schemeClr val="tx1"/>
+                      </a:solidFill>
+                    </a:rPr>
+                    <a:t>Polymer</a:t>
+                  </a:r>
+                  <a:br>
+                    <a:rPr lang="en-US" sz="2400" dirty="0" smtClean="0">
+                      <a:solidFill>
+                        <a:schemeClr val="tx1"/>
+                      </a:solidFill>
+                    </a:rPr>
+                  </a:br>
+                  <a:r>
+                    <a:rPr lang="en-US" sz="2400" dirty="0" smtClean="0">
+                      <a:solidFill>
+                        <a:schemeClr val="tx1"/>
+                      </a:solidFill>
+                    </a:rPr>
+                    <a:t>   cross-links</a:t>
+                  </a:r>
+                  <a:endParaRPr lang="en-US" sz="2400" dirty="0">
+                    <a:solidFill>
+                      <a:schemeClr val="tx1"/>
+                    </a:solidFill>
+                  </a:endParaRPr>
+                </a:p>
+              </p:txBody>
+            </p:sp>
+            <p:cxnSp>
+              <p:nvCxnSpPr>
+                <p:cNvPr id="71" name="Straight Connector 70"/>
+                <p:cNvCxnSpPr/>
+                <p:nvPr/>
+              </p:nvCxnSpPr>
+              <p:spPr>
+                <a:xfrm>
+                  <a:off x="16589398" y="9286310"/>
+                  <a:ext cx="1660719" cy="0"/>
+                </a:xfrm>
+                <a:prstGeom prst="line">
+                  <a:avLst/>
+                </a:prstGeom>
+                <a:ln w="57150"/>
+              </p:spPr>
+              <p:style>
+                <a:lnRef idx="1">
+                  <a:schemeClr val="accent1"/>
+                </a:lnRef>
+                <a:fillRef idx="0">
+                  <a:schemeClr val="accent1"/>
+                </a:fillRef>
+                <a:effectRef idx="0">
+                  <a:schemeClr val="accent1"/>
+                </a:effectRef>
+                <a:fontRef idx="minor">
+                  <a:schemeClr val="tx1"/>
+                </a:fontRef>
+              </p:style>
+            </p:cxnSp>
+            <p:cxnSp>
+              <p:nvCxnSpPr>
+                <p:cNvPr id="77" name="Straight Connector 76"/>
+                <p:cNvCxnSpPr/>
+                <p:nvPr/>
+              </p:nvCxnSpPr>
+              <p:spPr>
+                <a:xfrm>
+                  <a:off x="16589397" y="10260590"/>
+                  <a:ext cx="1660718" cy="448"/>
+                </a:xfrm>
+                <a:prstGeom prst="line">
+                  <a:avLst/>
+                </a:prstGeom>
+                <a:ln w="57150">
+                  <a:solidFill>
+                    <a:srgbClr val="C00000"/>
+                  </a:solidFill>
+                </a:ln>
+              </p:spPr>
+              <p:style>
+                <a:lnRef idx="1">
+                  <a:schemeClr val="accent1"/>
+                </a:lnRef>
+                <a:fillRef idx="0">
+                  <a:schemeClr val="accent1"/>
+                </a:fillRef>
+                <a:effectRef idx="0">
+                  <a:schemeClr val="accent1"/>
+                </a:effectRef>
+                <a:fontRef idx="minor">
+                  <a:schemeClr val="tx1"/>
+                </a:fontRef>
+              </p:style>
+            </p:cxnSp>
+          </p:grpSp>
+          <p:grpSp>
+            <p:nvGrpSpPr>
+              <p:cNvPr id="105" name="Group 104"/>
+              <p:cNvGrpSpPr/>
+              <p:nvPr/>
+            </p:nvGrpSpPr>
+            <p:grpSpPr>
+              <a:xfrm>
+                <a:off x="23985892" y="5340334"/>
+                <a:ext cx="1799772" cy="2351314"/>
+                <a:chOff x="24296914" y="6052457"/>
+                <a:chExt cx="1799772" cy="2351314"/>
+              </a:xfrm>
+            </p:grpSpPr>
+            <p:sp>
+              <p:nvSpPr>
+                <p:cNvPr id="94" name="Freeform 93"/>
+                <p:cNvSpPr/>
+                <p:nvPr/>
+              </p:nvSpPr>
+              <p:spPr>
+                <a:xfrm>
+                  <a:off x="24296914" y="6429829"/>
+                  <a:ext cx="802521" cy="1973942"/>
+                </a:xfrm>
+                <a:custGeom>
+                  <a:avLst/>
+                  <a:gdLst>
+                    <a:gd name="connsiteX0" fmla="*/ 0 w 802521"/>
+                    <a:gd name="connsiteY0" fmla="*/ 0 h 1973942"/>
+                    <a:gd name="connsiteX1" fmla="*/ 101600 w 802521"/>
+                    <a:gd name="connsiteY1" fmla="*/ 58057 h 1973942"/>
+                    <a:gd name="connsiteX2" fmla="*/ 159657 w 802521"/>
+                    <a:gd name="connsiteY2" fmla="*/ 101600 h 1973942"/>
+                    <a:gd name="connsiteX3" fmla="*/ 232229 w 802521"/>
+                    <a:gd name="connsiteY3" fmla="*/ 145142 h 1973942"/>
+                    <a:gd name="connsiteX4" fmla="*/ 275772 w 802521"/>
+                    <a:gd name="connsiteY4" fmla="*/ 174171 h 1973942"/>
+                    <a:gd name="connsiteX5" fmla="*/ 478972 w 802521"/>
+                    <a:gd name="connsiteY5" fmla="*/ 304800 h 1973942"/>
+                    <a:gd name="connsiteX6" fmla="*/ 653143 w 802521"/>
+                    <a:gd name="connsiteY6" fmla="*/ 464457 h 1973942"/>
+                    <a:gd name="connsiteX7" fmla="*/ 696686 w 802521"/>
+                    <a:gd name="connsiteY7" fmla="*/ 580571 h 1973942"/>
+                    <a:gd name="connsiteX8" fmla="*/ 711200 w 802521"/>
+                    <a:gd name="connsiteY8" fmla="*/ 653142 h 1973942"/>
+                    <a:gd name="connsiteX9" fmla="*/ 725715 w 802521"/>
+                    <a:gd name="connsiteY9" fmla="*/ 711200 h 1973942"/>
+                    <a:gd name="connsiteX10" fmla="*/ 711200 w 802521"/>
+                    <a:gd name="connsiteY10" fmla="*/ 914400 h 1973942"/>
+                    <a:gd name="connsiteX11" fmla="*/ 682172 w 802521"/>
+                    <a:gd name="connsiteY11" fmla="*/ 957942 h 1973942"/>
+                    <a:gd name="connsiteX12" fmla="*/ 667657 w 802521"/>
+                    <a:gd name="connsiteY12" fmla="*/ 1030514 h 1973942"/>
+                    <a:gd name="connsiteX13" fmla="*/ 638629 w 802521"/>
+                    <a:gd name="connsiteY13" fmla="*/ 1117600 h 1973942"/>
+                    <a:gd name="connsiteX14" fmla="*/ 638629 w 802521"/>
+                    <a:gd name="connsiteY14" fmla="*/ 1712685 h 1973942"/>
+                    <a:gd name="connsiteX15" fmla="*/ 667657 w 802521"/>
+                    <a:gd name="connsiteY15" fmla="*/ 1770742 h 1973942"/>
+                    <a:gd name="connsiteX16" fmla="*/ 754743 w 802521"/>
+                    <a:gd name="connsiteY16" fmla="*/ 1872342 h 1973942"/>
+                    <a:gd name="connsiteX17" fmla="*/ 798286 w 802521"/>
+                    <a:gd name="connsiteY17" fmla="*/ 1901371 h 1973942"/>
+                    <a:gd name="connsiteX18" fmla="*/ 798286 w 802521"/>
+                    <a:gd name="connsiteY18" fmla="*/ 1973942 h 1973942"/>
+                  </a:gdLst>
+                  <a:ahLst/>
+                  <a:cxnLst>
+                    <a:cxn ang="0">
+                      <a:pos x="connsiteX0" y="connsiteY0"/>
+                    </a:cxn>
+                    <a:cxn ang="0">
+                      <a:pos x="connsiteX1" y="connsiteY1"/>
+                    </a:cxn>
+                    <a:cxn ang="0">
+                      <a:pos x="connsiteX2" y="connsiteY2"/>
+                    </a:cxn>
+                    <a:cxn ang="0">
+                      <a:pos x="connsiteX3" y="connsiteY3"/>
+                    </a:cxn>
+                    <a:cxn ang="0">
+                      <a:pos x="connsiteX4" y="connsiteY4"/>
+                    </a:cxn>
+                    <a:cxn ang="0">
+                      <a:pos x="connsiteX5" y="connsiteY5"/>
+                    </a:cxn>
+                    <a:cxn ang="0">
+                      <a:pos x="connsiteX6" y="connsiteY6"/>
+                    </a:cxn>
+                    <a:cxn ang="0">
+                      <a:pos x="connsiteX7" y="connsiteY7"/>
+                    </a:cxn>
+                    <a:cxn ang="0">
+                      <a:pos x="connsiteX8" y="connsiteY8"/>
+                    </a:cxn>
+                    <a:cxn ang="0">
+                      <a:pos x="connsiteX9" y="connsiteY9"/>
+                    </a:cxn>
+                    <a:cxn ang="0">
+                      <a:pos x="connsiteX10" y="connsiteY10"/>
+                    </a:cxn>
+                    <a:cxn ang="0">
+                      <a:pos x="connsiteX11" y="connsiteY11"/>
+                    </a:cxn>
+                    <a:cxn ang="0">
+                      <a:pos x="connsiteX12" y="connsiteY12"/>
+                    </a:cxn>
+                    <a:cxn ang="0">
+                      <a:pos x="connsiteX13" y="connsiteY13"/>
+                    </a:cxn>
+                    <a:cxn ang="0">
+                      <a:pos x="connsiteX14" y="connsiteY14"/>
+                    </a:cxn>
+                    <a:cxn ang="0">
+                      <a:pos x="connsiteX15" y="connsiteY15"/>
+                    </a:cxn>
+                    <a:cxn ang="0">
+                      <a:pos x="connsiteX16" y="connsiteY16"/>
+                    </a:cxn>
+                    <a:cxn ang="0">
+                      <a:pos x="connsiteX17" y="connsiteY17"/>
+                    </a:cxn>
+                    <a:cxn ang="0">
+                      <a:pos x="connsiteX18" y="connsiteY18"/>
+                    </a:cxn>
+                  </a:cxnLst>
+                  <a:rect l="l" t="t" r="r" b="b"/>
+                  <a:pathLst>
+                    <a:path w="802521" h="1973942">
+                      <a:moveTo>
+                        <a:pt x="0" y="0"/>
+                      </a:moveTo>
+                      <a:cubicBezTo>
+                        <a:pt x="33867" y="19352"/>
+                        <a:pt x="68692" y="37116"/>
+                        <a:pt x="101600" y="58057"/>
+                      </a:cubicBezTo>
+                      <a:cubicBezTo>
+                        <a:pt x="122009" y="71044"/>
+                        <a:pt x="139529" y="88182"/>
+                        <a:pt x="159657" y="101600"/>
+                      </a:cubicBezTo>
+                      <a:cubicBezTo>
+                        <a:pt x="183130" y="117248"/>
+                        <a:pt x="208306" y="130190"/>
+                        <a:pt x="232229" y="145142"/>
+                      </a:cubicBezTo>
+                      <a:cubicBezTo>
+                        <a:pt x="247022" y="154387"/>
+                        <a:pt x="260916" y="165029"/>
+                        <a:pt x="275772" y="174171"/>
+                      </a:cubicBezTo>
+                      <a:cubicBezTo>
+                        <a:pt x="319977" y="201374"/>
+                        <a:pt x="427948" y="258415"/>
+                        <a:pt x="478972" y="304800"/>
+                      </a:cubicBezTo>
+                      <a:cubicBezTo>
+                        <a:pt x="705397" y="510642"/>
+                        <a:pt x="476603" y="323224"/>
+                        <a:pt x="653143" y="464457"/>
+                      </a:cubicBezTo>
+                      <a:cubicBezTo>
+                        <a:pt x="662025" y="486662"/>
+                        <a:pt x="689101" y="550229"/>
+                        <a:pt x="696686" y="580571"/>
+                      </a:cubicBezTo>
+                      <a:cubicBezTo>
+                        <a:pt x="702669" y="604504"/>
+                        <a:pt x="705848" y="629060"/>
+                        <a:pt x="711200" y="653142"/>
+                      </a:cubicBezTo>
+                      <a:cubicBezTo>
+                        <a:pt x="715527" y="672615"/>
+                        <a:pt x="720877" y="691847"/>
+                        <a:pt x="725715" y="711200"/>
+                      </a:cubicBezTo>
+                      <a:cubicBezTo>
+                        <a:pt x="720877" y="778933"/>
+                        <a:pt x="723001" y="847527"/>
+                        <a:pt x="711200" y="914400"/>
+                      </a:cubicBezTo>
+                      <a:cubicBezTo>
+                        <a:pt x="708169" y="931578"/>
+                        <a:pt x="688297" y="941609"/>
+                        <a:pt x="682172" y="957942"/>
+                      </a:cubicBezTo>
+                      <a:cubicBezTo>
+                        <a:pt x="673510" y="981041"/>
+                        <a:pt x="674148" y="1006713"/>
+                        <a:pt x="667657" y="1030514"/>
+                      </a:cubicBezTo>
+                      <a:cubicBezTo>
+                        <a:pt x="659606" y="1060035"/>
+                        <a:pt x="638629" y="1117600"/>
+                        <a:pt x="638629" y="1117600"/>
+                      </a:cubicBezTo>
+                      <a:cubicBezTo>
+                        <a:pt x="633523" y="1260560"/>
+                        <a:pt x="608293" y="1540777"/>
+                        <a:pt x="638629" y="1712685"/>
+                      </a:cubicBezTo>
+                      <a:cubicBezTo>
+                        <a:pt x="642389" y="1733992"/>
+                        <a:pt x="656922" y="1751956"/>
+                        <a:pt x="667657" y="1770742"/>
+                      </a:cubicBezTo>
+                      <a:cubicBezTo>
+                        <a:pt x="692309" y="1813883"/>
+                        <a:pt x="715037" y="1838308"/>
+                        <a:pt x="754743" y="1872342"/>
+                      </a:cubicBezTo>
+                      <a:cubicBezTo>
+                        <a:pt x="767988" y="1883695"/>
+                        <a:pt x="791414" y="1885337"/>
+                        <a:pt x="798286" y="1901371"/>
+                      </a:cubicBezTo>
+                      <a:cubicBezTo>
+                        <a:pt x="807815" y="1923605"/>
+                        <a:pt x="798286" y="1949752"/>
+                        <a:pt x="798286" y="1973942"/>
+                      </a:cubicBezTo>
+                    </a:path>
+                  </a:pathLst>
+                </a:custGeom>
+                <a:noFill/>
+                <a:ln w="57150"/>
+              </p:spPr>
+              <p:style>
+                <a:lnRef idx="2">
+                  <a:schemeClr val="accent1">
+                    <a:shade val="50000"/>
+                  </a:schemeClr>
+                </a:lnRef>
+                <a:fillRef idx="1">
+                  <a:schemeClr val="accent1"/>
+                </a:fillRef>
+                <a:effectRef idx="0">
+                  <a:schemeClr val="accent1"/>
+                </a:effectRef>
+                <a:fontRef idx="minor">
+                  <a:schemeClr val="lt1"/>
+                </a:fontRef>
+              </p:style>
+              <p:txBody>
+                <a:bodyPr rtlCol="0" anchor="ctr"/>
+                <a:lstStyle/>
+                <a:p>
+                  <a:pPr algn="ctr"/>
+                  <a:endParaRPr lang="en-US"/>
+                </a:p>
+              </p:txBody>
+            </p:sp>
+            <p:sp>
+              <p:nvSpPr>
+                <p:cNvPr id="95" name="Freeform 94"/>
+                <p:cNvSpPr/>
+                <p:nvPr/>
+              </p:nvSpPr>
+              <p:spPr>
+                <a:xfrm>
+                  <a:off x="25138743" y="6052457"/>
+                  <a:ext cx="957943" cy="2119086"/>
+                </a:xfrm>
+                <a:custGeom>
+                  <a:avLst/>
+                  <a:gdLst>
+                    <a:gd name="connsiteX0" fmla="*/ 957943 w 957943"/>
+                    <a:gd name="connsiteY0" fmla="*/ 2119086 h 2119086"/>
+                    <a:gd name="connsiteX1" fmla="*/ 754743 w 957943"/>
+                    <a:gd name="connsiteY1" fmla="*/ 2002972 h 2119086"/>
+                    <a:gd name="connsiteX2" fmla="*/ 696686 w 957943"/>
+                    <a:gd name="connsiteY2" fmla="*/ 1988457 h 2119086"/>
+                    <a:gd name="connsiteX3" fmla="*/ 566057 w 957943"/>
+                    <a:gd name="connsiteY3" fmla="*/ 1930400 h 2119086"/>
+                    <a:gd name="connsiteX4" fmla="*/ 522514 w 957943"/>
+                    <a:gd name="connsiteY4" fmla="*/ 1901372 h 2119086"/>
+                    <a:gd name="connsiteX5" fmla="*/ 493486 w 957943"/>
+                    <a:gd name="connsiteY5" fmla="*/ 1857829 h 2119086"/>
+                    <a:gd name="connsiteX6" fmla="*/ 464457 w 957943"/>
+                    <a:gd name="connsiteY6" fmla="*/ 1727200 h 2119086"/>
+                    <a:gd name="connsiteX7" fmla="*/ 449943 w 957943"/>
+                    <a:gd name="connsiteY7" fmla="*/ 1683657 h 2119086"/>
+                    <a:gd name="connsiteX8" fmla="*/ 435428 w 957943"/>
+                    <a:gd name="connsiteY8" fmla="*/ 1393372 h 2119086"/>
+                    <a:gd name="connsiteX9" fmla="*/ 391886 w 957943"/>
+                    <a:gd name="connsiteY9" fmla="*/ 1306286 h 2119086"/>
+                    <a:gd name="connsiteX10" fmla="*/ 290286 w 957943"/>
+                    <a:gd name="connsiteY10" fmla="*/ 1219200 h 2119086"/>
+                    <a:gd name="connsiteX11" fmla="*/ 246743 w 957943"/>
+                    <a:gd name="connsiteY11" fmla="*/ 1175657 h 2119086"/>
+                    <a:gd name="connsiteX12" fmla="*/ 188686 w 957943"/>
+                    <a:gd name="connsiteY12" fmla="*/ 1132114 h 2119086"/>
+                    <a:gd name="connsiteX13" fmla="*/ 116114 w 957943"/>
+                    <a:gd name="connsiteY13" fmla="*/ 1059543 h 2119086"/>
+                    <a:gd name="connsiteX14" fmla="*/ 101600 w 957943"/>
+                    <a:gd name="connsiteY14" fmla="*/ 1016000 h 2119086"/>
+                    <a:gd name="connsiteX15" fmla="*/ 43543 w 957943"/>
+                    <a:gd name="connsiteY15" fmla="*/ 928914 h 2119086"/>
+                    <a:gd name="connsiteX16" fmla="*/ 0 w 957943"/>
+                    <a:gd name="connsiteY16" fmla="*/ 841829 h 2119086"/>
+                    <a:gd name="connsiteX17" fmla="*/ 29028 w 957943"/>
+                    <a:gd name="connsiteY17" fmla="*/ 537029 h 2119086"/>
+                    <a:gd name="connsiteX18" fmla="*/ 43543 w 957943"/>
+                    <a:gd name="connsiteY18" fmla="*/ 478972 h 2119086"/>
+                    <a:gd name="connsiteX19" fmla="*/ 87086 w 957943"/>
+                    <a:gd name="connsiteY19" fmla="*/ 362857 h 2119086"/>
+                    <a:gd name="connsiteX20" fmla="*/ 116114 w 957943"/>
+                    <a:gd name="connsiteY20" fmla="*/ 304800 h 2119086"/>
+                    <a:gd name="connsiteX21" fmla="*/ 159657 w 957943"/>
+                    <a:gd name="connsiteY21" fmla="*/ 217714 h 2119086"/>
+                    <a:gd name="connsiteX22" fmla="*/ 304800 w 957943"/>
+                    <a:gd name="connsiteY22" fmla="*/ 145143 h 2119086"/>
+                    <a:gd name="connsiteX23" fmla="*/ 377371 w 957943"/>
+                    <a:gd name="connsiteY23" fmla="*/ 101600 h 2119086"/>
+                    <a:gd name="connsiteX24" fmla="*/ 420914 w 957943"/>
+                    <a:gd name="connsiteY24" fmla="*/ 72572 h 2119086"/>
+                    <a:gd name="connsiteX25" fmla="*/ 508000 w 957943"/>
+                    <a:gd name="connsiteY25" fmla="*/ 0 h 2119086"/>
+                  </a:gdLst>
+                  <a:ahLst/>
+                  <a:cxnLst>
+                    <a:cxn ang="0">
+                      <a:pos x="connsiteX0" y="connsiteY0"/>
+                    </a:cxn>
+                    <a:cxn ang="0">
+                      <a:pos x="connsiteX1" y="connsiteY1"/>
+                    </a:cxn>
+                    <a:cxn ang="0">
+                      <a:pos x="connsiteX2" y="connsiteY2"/>
+                    </a:cxn>
+                    <a:cxn ang="0">
+                      <a:pos x="connsiteX3" y="connsiteY3"/>
+                    </a:cxn>
+                    <a:cxn ang="0">
+                      <a:pos x="connsiteX4" y="connsiteY4"/>
+                    </a:cxn>
+                    <a:cxn ang="0">
+                      <a:pos x="connsiteX5" y="connsiteY5"/>
+                    </a:cxn>
+                    <a:cxn ang="0">
+                      <a:pos x="connsiteX6" y="connsiteY6"/>
+                    </a:cxn>
+                    <a:cxn ang="0">
+                      <a:pos x="connsiteX7" y="connsiteY7"/>
+                    </a:cxn>
+                    <a:cxn ang="0">
+                      <a:pos x="connsiteX8" y="connsiteY8"/>
+                    </a:cxn>
+                    <a:cxn ang="0">
+                      <a:pos x="connsiteX9" y="connsiteY9"/>
+                    </a:cxn>
+                    <a:cxn ang="0">
+                      <a:pos x="connsiteX10" y="connsiteY10"/>
+                    </a:cxn>
+                    <a:cxn ang="0">
+                      <a:pos x="connsiteX11" y="connsiteY11"/>
+                    </a:cxn>
+                    <a:cxn ang="0">
+                      <a:pos x="connsiteX12" y="connsiteY12"/>
+                    </a:cxn>
+                    <a:cxn ang="0">
+                      <a:pos x="connsiteX13" y="connsiteY13"/>
+                    </a:cxn>
+                    <a:cxn ang="0">
+                      <a:pos x="connsiteX14" y="connsiteY14"/>
+                    </a:cxn>
+                    <a:cxn ang="0">
+                      <a:pos x="connsiteX15" y="connsiteY15"/>
+                    </a:cxn>
+                    <a:cxn ang="0">
+                      <a:pos x="connsiteX16" y="connsiteY16"/>
+                    </a:cxn>
+                    <a:cxn ang="0">
+                      <a:pos x="connsiteX17" y="connsiteY17"/>
+                    </a:cxn>
+                    <a:cxn ang="0">
+                      <a:pos x="connsiteX18" y="connsiteY18"/>
+                    </a:cxn>
+                    <a:cxn ang="0">
+                      <a:pos x="connsiteX19" y="connsiteY19"/>
+                    </a:cxn>
+                    <a:cxn ang="0">
+                      <a:pos x="connsiteX20" y="connsiteY20"/>
+                    </a:cxn>
+                    <a:cxn ang="0">
+                      <a:pos x="connsiteX21" y="connsiteY21"/>
+                    </a:cxn>
+                    <a:cxn ang="0">
+                      <a:pos x="connsiteX22" y="connsiteY22"/>
+                    </a:cxn>
+                    <a:cxn ang="0">
+                      <a:pos x="connsiteX23" y="connsiteY23"/>
+                    </a:cxn>
+                    <a:cxn ang="0">
+                      <a:pos x="connsiteX24" y="connsiteY24"/>
+                    </a:cxn>
+                    <a:cxn ang="0">
+                      <a:pos x="connsiteX25" y="connsiteY25"/>
+                    </a:cxn>
+                  </a:cxnLst>
+                  <a:rect l="l" t="t" r="r" b="b"/>
+                  <a:pathLst>
+                    <a:path w="957943" h="2119086">
+                      <a:moveTo>
+                        <a:pt x="957943" y="2119086"/>
+                      </a:moveTo>
+                      <a:cubicBezTo>
+                        <a:pt x="890210" y="2080381"/>
+                        <a:pt x="830425" y="2021894"/>
+                        <a:pt x="754743" y="2002972"/>
+                      </a:cubicBezTo>
+                      <a:cubicBezTo>
+                        <a:pt x="735391" y="1998134"/>
+                        <a:pt x="715610" y="1994765"/>
+                        <a:pt x="696686" y="1988457"/>
+                      </a:cubicBezTo>
+                      <a:cubicBezTo>
+                        <a:pt x="659353" y="1976013"/>
+                        <a:pt x="601470" y="1950636"/>
+                        <a:pt x="566057" y="1930400"/>
+                      </a:cubicBezTo>
+                      <a:cubicBezTo>
+                        <a:pt x="550911" y="1921745"/>
+                        <a:pt x="537028" y="1911048"/>
+                        <a:pt x="522514" y="1901372"/>
+                      </a:cubicBezTo>
+                      <a:cubicBezTo>
+                        <a:pt x="512838" y="1886858"/>
+                        <a:pt x="501287" y="1873431"/>
+                        <a:pt x="493486" y="1857829"/>
+                      </a:cubicBezTo>
+                      <a:cubicBezTo>
+                        <a:pt x="473880" y="1818616"/>
+                        <a:pt x="473378" y="1767346"/>
+                        <a:pt x="464457" y="1727200"/>
+                      </a:cubicBezTo>
+                      <a:cubicBezTo>
+                        <a:pt x="461138" y="1712265"/>
+                        <a:pt x="454781" y="1698171"/>
+                        <a:pt x="449943" y="1683657"/>
+                      </a:cubicBezTo>
+                      <a:cubicBezTo>
+                        <a:pt x="445105" y="1586895"/>
+                        <a:pt x="443821" y="1489890"/>
+                        <a:pt x="435428" y="1393372"/>
+                      </a:cubicBezTo>
+                      <a:cubicBezTo>
+                        <a:pt x="432886" y="1364137"/>
+                        <a:pt x="409461" y="1327376"/>
+                        <a:pt x="391886" y="1306286"/>
+                      </a:cubicBezTo>
+                      <a:cubicBezTo>
+                        <a:pt x="346869" y="1252265"/>
+                        <a:pt x="346343" y="1267249"/>
+                        <a:pt x="290286" y="1219200"/>
+                      </a:cubicBezTo>
+                      <a:cubicBezTo>
+                        <a:pt x="274701" y="1205842"/>
+                        <a:pt x="262328" y="1189015"/>
+                        <a:pt x="246743" y="1175657"/>
+                      </a:cubicBezTo>
+                      <a:cubicBezTo>
+                        <a:pt x="228376" y="1159914"/>
+                        <a:pt x="205791" y="1149219"/>
+                        <a:pt x="188686" y="1132114"/>
+                      </a:cubicBezTo>
+                      <a:cubicBezTo>
+                        <a:pt x="91924" y="1035353"/>
+                        <a:pt x="232229" y="1136954"/>
+                        <a:pt x="116114" y="1059543"/>
+                      </a:cubicBezTo>
+                      <a:cubicBezTo>
+                        <a:pt x="111276" y="1045029"/>
+                        <a:pt x="109030" y="1029374"/>
+                        <a:pt x="101600" y="1016000"/>
+                      </a:cubicBezTo>
+                      <a:cubicBezTo>
+                        <a:pt x="84657" y="985502"/>
+                        <a:pt x="54576" y="962011"/>
+                        <a:pt x="43543" y="928914"/>
+                      </a:cubicBezTo>
+                      <a:cubicBezTo>
+                        <a:pt x="23511" y="868823"/>
+                        <a:pt x="37514" y="898102"/>
+                        <a:pt x="0" y="841829"/>
+                      </a:cubicBezTo>
+                      <a:cubicBezTo>
+                        <a:pt x="9676" y="740229"/>
+                        <a:pt x="16868" y="638362"/>
+                        <a:pt x="29028" y="537029"/>
+                      </a:cubicBezTo>
+                      <a:cubicBezTo>
+                        <a:pt x="31405" y="517223"/>
+                        <a:pt x="38063" y="498152"/>
+                        <a:pt x="43543" y="478972"/>
+                      </a:cubicBezTo>
+                      <a:cubicBezTo>
+                        <a:pt x="53120" y="445452"/>
+                        <a:pt x="74813" y="390472"/>
+                        <a:pt x="87086" y="362857"/>
+                      </a:cubicBezTo>
+                      <a:cubicBezTo>
+                        <a:pt x="95873" y="343085"/>
+                        <a:pt x="107591" y="324687"/>
+                        <a:pt x="116114" y="304800"/>
+                      </a:cubicBezTo>
+                      <a:cubicBezTo>
+                        <a:pt x="131200" y="269598"/>
+                        <a:pt x="127778" y="245608"/>
+                        <a:pt x="159657" y="217714"/>
+                      </a:cubicBezTo>
+                      <a:cubicBezTo>
+                        <a:pt x="228780" y="157232"/>
+                        <a:pt x="232658" y="163178"/>
+                        <a:pt x="304800" y="145143"/>
+                      </a:cubicBezTo>
+                      <a:cubicBezTo>
+                        <a:pt x="328990" y="130629"/>
+                        <a:pt x="353448" y="116552"/>
+                        <a:pt x="377371" y="101600"/>
+                      </a:cubicBezTo>
+                      <a:cubicBezTo>
+                        <a:pt x="392163" y="92355"/>
+                        <a:pt x="404974" y="79657"/>
+                        <a:pt x="420914" y="72572"/>
+                      </a:cubicBezTo>
+                      <a:cubicBezTo>
+                        <a:pt x="521769" y="27748"/>
+                        <a:pt x="508000" y="79457"/>
+                        <a:pt x="508000" y="0"/>
+                      </a:cubicBezTo>
+                    </a:path>
+                  </a:pathLst>
+                </a:custGeom>
+                <a:noFill/>
+                <a:ln w="57150"/>
+              </p:spPr>
+              <p:style>
+                <a:lnRef idx="2">
+                  <a:schemeClr val="accent1">
+                    <a:shade val="50000"/>
+                  </a:schemeClr>
+                </a:lnRef>
+                <a:fillRef idx="1">
+                  <a:schemeClr val="accent1"/>
+                </a:fillRef>
+                <a:effectRef idx="0">
+                  <a:schemeClr val="accent1"/>
+                </a:effectRef>
+                <a:fontRef idx="minor">
+                  <a:schemeClr val="lt1"/>
+                </a:fontRef>
+              </p:style>
+              <p:txBody>
+                <a:bodyPr rtlCol="0" anchor="ctr"/>
+                <a:lstStyle/>
+                <a:p>
+                  <a:pPr algn="ctr"/>
+                  <a:endParaRPr lang="en-US"/>
+                </a:p>
+              </p:txBody>
+            </p:sp>
+            <p:cxnSp>
+              <p:nvCxnSpPr>
+                <p:cNvPr id="99" name="Straight Connector 98"/>
+                <p:cNvCxnSpPr>
+                  <a:stCxn id="94" idx="7"/>
+                  <a:endCxn id="95" idx="15"/>
+                </p:cNvCxnSpPr>
+                <p:nvPr/>
+              </p:nvCxnSpPr>
+              <p:spPr>
+                <a:xfrm flipV="1">
+                  <a:off x="24993600" y="6981371"/>
+                  <a:ext cx="188686" cy="29029"/>
+                </a:xfrm>
+                <a:prstGeom prst="line">
+                  <a:avLst/>
+                </a:prstGeom>
+                <a:ln w="57150">
+                  <a:solidFill>
+                    <a:srgbClr val="C00000"/>
+                  </a:solidFill>
+                </a:ln>
+              </p:spPr>
+              <p:style>
+                <a:lnRef idx="1">
+                  <a:schemeClr val="accent1"/>
+                </a:lnRef>
+                <a:fillRef idx="0">
+                  <a:schemeClr val="accent1"/>
+                </a:fillRef>
+                <a:effectRef idx="0">
+                  <a:schemeClr val="accent1"/>
+                </a:effectRef>
+                <a:fontRef idx="minor">
+                  <a:schemeClr val="tx1"/>
+                </a:fontRef>
+              </p:style>
+            </p:cxnSp>
+          </p:grpSp>
+          <p:grpSp>
+            <p:nvGrpSpPr>
+              <p:cNvPr id="106" name="Group 105"/>
+              <p:cNvGrpSpPr/>
+              <p:nvPr/>
+            </p:nvGrpSpPr>
+            <p:grpSpPr>
+              <a:xfrm>
+                <a:off x="24767797" y="9042399"/>
+                <a:ext cx="1880432" cy="2946401"/>
+                <a:chOff x="24767797" y="9042399"/>
+                <a:chExt cx="1880432" cy="2946401"/>
+              </a:xfrm>
+            </p:grpSpPr>
+            <p:sp>
+              <p:nvSpPr>
+                <p:cNvPr id="101" name="Freeform 100"/>
+                <p:cNvSpPr/>
+                <p:nvPr/>
+              </p:nvSpPr>
+              <p:spPr>
+                <a:xfrm>
+                  <a:off x="24767797" y="9114971"/>
+                  <a:ext cx="1880432" cy="2873829"/>
+                </a:xfrm>
+                <a:custGeom>
+                  <a:avLst/>
+                  <a:gdLst>
+                    <a:gd name="connsiteX0" fmla="*/ 399974 w 1880432"/>
+                    <a:gd name="connsiteY0" fmla="*/ 2873829 h 2873829"/>
+                    <a:gd name="connsiteX1" fmla="*/ 472546 w 1880432"/>
+                    <a:gd name="connsiteY1" fmla="*/ 2786743 h 2873829"/>
+                    <a:gd name="connsiteX2" fmla="*/ 516089 w 1880432"/>
+                    <a:gd name="connsiteY2" fmla="*/ 2743200 h 2873829"/>
+                    <a:gd name="connsiteX3" fmla="*/ 530603 w 1880432"/>
+                    <a:gd name="connsiteY3" fmla="*/ 2699658 h 2873829"/>
+                    <a:gd name="connsiteX4" fmla="*/ 559632 w 1880432"/>
+                    <a:gd name="connsiteY4" fmla="*/ 2656115 h 2873829"/>
+                    <a:gd name="connsiteX5" fmla="*/ 559632 w 1880432"/>
+                    <a:gd name="connsiteY5" fmla="*/ 1872343 h 2873829"/>
+                    <a:gd name="connsiteX6" fmla="*/ 530603 w 1880432"/>
+                    <a:gd name="connsiteY6" fmla="*/ 1785258 h 2873829"/>
+                    <a:gd name="connsiteX7" fmla="*/ 516089 w 1880432"/>
+                    <a:gd name="connsiteY7" fmla="*/ 1741715 h 2873829"/>
+                    <a:gd name="connsiteX8" fmla="*/ 443517 w 1880432"/>
+                    <a:gd name="connsiteY8" fmla="*/ 1611086 h 2873829"/>
+                    <a:gd name="connsiteX9" fmla="*/ 429003 w 1880432"/>
+                    <a:gd name="connsiteY9" fmla="*/ 1538515 h 2873829"/>
+                    <a:gd name="connsiteX10" fmla="*/ 385460 w 1880432"/>
+                    <a:gd name="connsiteY10" fmla="*/ 1494972 h 2873829"/>
+                    <a:gd name="connsiteX11" fmla="*/ 341917 w 1880432"/>
+                    <a:gd name="connsiteY11" fmla="*/ 1422400 h 2873829"/>
+                    <a:gd name="connsiteX12" fmla="*/ 298374 w 1880432"/>
+                    <a:gd name="connsiteY12" fmla="*/ 1364343 h 2873829"/>
+                    <a:gd name="connsiteX13" fmla="*/ 283860 w 1880432"/>
+                    <a:gd name="connsiteY13" fmla="*/ 1306286 h 2873829"/>
+                    <a:gd name="connsiteX14" fmla="*/ 211289 w 1880432"/>
+                    <a:gd name="connsiteY14" fmla="*/ 1219200 h 2873829"/>
+                    <a:gd name="connsiteX15" fmla="*/ 153232 w 1880432"/>
+                    <a:gd name="connsiteY15" fmla="*/ 1103086 h 2873829"/>
+                    <a:gd name="connsiteX16" fmla="*/ 109689 w 1880432"/>
+                    <a:gd name="connsiteY16" fmla="*/ 1016000 h 2873829"/>
+                    <a:gd name="connsiteX17" fmla="*/ 66146 w 1880432"/>
+                    <a:gd name="connsiteY17" fmla="*/ 957943 h 2873829"/>
+                    <a:gd name="connsiteX18" fmla="*/ 22603 w 1880432"/>
+                    <a:gd name="connsiteY18" fmla="*/ 812800 h 2873829"/>
+                    <a:gd name="connsiteX19" fmla="*/ 8089 w 1880432"/>
+                    <a:gd name="connsiteY19" fmla="*/ 725715 h 2873829"/>
+                    <a:gd name="connsiteX20" fmla="*/ 95174 w 1880432"/>
+                    <a:gd name="connsiteY20" fmla="*/ 174172 h 2873829"/>
+                    <a:gd name="connsiteX21" fmla="*/ 167746 w 1880432"/>
+                    <a:gd name="connsiteY21" fmla="*/ 116115 h 2873829"/>
+                    <a:gd name="connsiteX22" fmla="*/ 182260 w 1880432"/>
+                    <a:gd name="connsiteY22" fmla="*/ 72572 h 2873829"/>
+                    <a:gd name="connsiteX23" fmla="*/ 254832 w 1880432"/>
+                    <a:gd name="connsiteY23" fmla="*/ 43543 h 2873829"/>
+                    <a:gd name="connsiteX24" fmla="*/ 341917 w 1880432"/>
+                    <a:gd name="connsiteY24" fmla="*/ 0 h 2873829"/>
+                    <a:gd name="connsiteX25" fmla="*/ 1241803 w 1880432"/>
+                    <a:gd name="connsiteY25" fmla="*/ 43543 h 2873829"/>
+                    <a:gd name="connsiteX26" fmla="*/ 1314374 w 1880432"/>
+                    <a:gd name="connsiteY26" fmla="*/ 101600 h 2873829"/>
+                    <a:gd name="connsiteX27" fmla="*/ 1357917 w 1880432"/>
+                    <a:gd name="connsiteY27" fmla="*/ 130629 h 2873829"/>
+                    <a:gd name="connsiteX28" fmla="*/ 1459517 w 1880432"/>
+                    <a:gd name="connsiteY28" fmla="*/ 188686 h 2873829"/>
+                    <a:gd name="connsiteX29" fmla="*/ 1546603 w 1880432"/>
+                    <a:gd name="connsiteY29" fmla="*/ 275772 h 2873829"/>
+                    <a:gd name="connsiteX30" fmla="*/ 1561117 w 1880432"/>
+                    <a:gd name="connsiteY30" fmla="*/ 319315 h 2873829"/>
+                    <a:gd name="connsiteX31" fmla="*/ 1532089 w 1880432"/>
+                    <a:gd name="connsiteY31" fmla="*/ 609600 h 2873829"/>
+                    <a:gd name="connsiteX32" fmla="*/ 1517574 w 1880432"/>
+                    <a:gd name="connsiteY32" fmla="*/ 667658 h 2873829"/>
+                    <a:gd name="connsiteX33" fmla="*/ 1488546 w 1880432"/>
+                    <a:gd name="connsiteY33" fmla="*/ 725715 h 2873829"/>
+                    <a:gd name="connsiteX34" fmla="*/ 1474032 w 1880432"/>
+                    <a:gd name="connsiteY34" fmla="*/ 769258 h 2873829"/>
+                    <a:gd name="connsiteX35" fmla="*/ 1430489 w 1880432"/>
+                    <a:gd name="connsiteY35" fmla="*/ 827315 h 2873829"/>
+                    <a:gd name="connsiteX36" fmla="*/ 1386946 w 1880432"/>
+                    <a:gd name="connsiteY36" fmla="*/ 899886 h 2873829"/>
+                    <a:gd name="connsiteX37" fmla="*/ 1299860 w 1880432"/>
+                    <a:gd name="connsiteY37" fmla="*/ 986972 h 2873829"/>
+                    <a:gd name="connsiteX38" fmla="*/ 1227289 w 1880432"/>
+                    <a:gd name="connsiteY38" fmla="*/ 1132115 h 2873829"/>
+                    <a:gd name="connsiteX39" fmla="*/ 1198260 w 1880432"/>
+                    <a:gd name="connsiteY39" fmla="*/ 1175658 h 2873829"/>
+                    <a:gd name="connsiteX40" fmla="*/ 1154717 w 1880432"/>
+                    <a:gd name="connsiteY40" fmla="*/ 1219200 h 2873829"/>
+                    <a:gd name="connsiteX41" fmla="*/ 1096660 w 1880432"/>
+                    <a:gd name="connsiteY41" fmla="*/ 1306286 h 2873829"/>
+                    <a:gd name="connsiteX42" fmla="*/ 1053117 w 1880432"/>
+                    <a:gd name="connsiteY42" fmla="*/ 1364343 h 2873829"/>
+                    <a:gd name="connsiteX43" fmla="*/ 1024089 w 1880432"/>
+                    <a:gd name="connsiteY43" fmla="*/ 1407886 h 2873829"/>
+                    <a:gd name="connsiteX44" fmla="*/ 995060 w 1880432"/>
+                    <a:gd name="connsiteY44" fmla="*/ 1480458 h 2873829"/>
+                    <a:gd name="connsiteX45" fmla="*/ 907974 w 1880432"/>
+                    <a:gd name="connsiteY45" fmla="*/ 1596572 h 2873829"/>
+                    <a:gd name="connsiteX46" fmla="*/ 849917 w 1880432"/>
+                    <a:gd name="connsiteY46" fmla="*/ 1712686 h 2873829"/>
+                    <a:gd name="connsiteX47" fmla="*/ 849917 w 1880432"/>
+                    <a:gd name="connsiteY47" fmla="*/ 2017486 h 2873829"/>
+                    <a:gd name="connsiteX48" fmla="*/ 864432 w 1880432"/>
+                    <a:gd name="connsiteY48" fmla="*/ 2075543 h 2873829"/>
+                    <a:gd name="connsiteX49" fmla="*/ 951517 w 1880432"/>
+                    <a:gd name="connsiteY49" fmla="*/ 2206172 h 2873829"/>
+                    <a:gd name="connsiteX50" fmla="*/ 1009574 w 1880432"/>
+                    <a:gd name="connsiteY50" fmla="*/ 2278743 h 2873829"/>
+                    <a:gd name="connsiteX51" fmla="*/ 1053117 w 1880432"/>
+                    <a:gd name="connsiteY51" fmla="*/ 2351315 h 2873829"/>
+                    <a:gd name="connsiteX52" fmla="*/ 1096660 w 1880432"/>
+                    <a:gd name="connsiteY52" fmla="*/ 2394858 h 2873829"/>
+                    <a:gd name="connsiteX53" fmla="*/ 1154717 w 1880432"/>
+                    <a:gd name="connsiteY53" fmla="*/ 2481943 h 2873829"/>
+                    <a:gd name="connsiteX54" fmla="*/ 1183746 w 1880432"/>
+                    <a:gd name="connsiteY54" fmla="*/ 2525486 h 2873829"/>
+                    <a:gd name="connsiteX55" fmla="*/ 1227289 w 1880432"/>
+                    <a:gd name="connsiteY55" fmla="*/ 2554515 h 2873829"/>
+                    <a:gd name="connsiteX56" fmla="*/ 1270832 w 1880432"/>
+                    <a:gd name="connsiteY56" fmla="*/ 2598058 h 2873829"/>
+                    <a:gd name="connsiteX57" fmla="*/ 1328889 w 1880432"/>
+                    <a:gd name="connsiteY57" fmla="*/ 2612572 h 2873829"/>
+                    <a:gd name="connsiteX58" fmla="*/ 1372432 w 1880432"/>
+                    <a:gd name="connsiteY58" fmla="*/ 2627086 h 2873829"/>
+                    <a:gd name="connsiteX59" fmla="*/ 1474032 w 1880432"/>
+                    <a:gd name="connsiteY59" fmla="*/ 2670629 h 2873829"/>
+                    <a:gd name="connsiteX60" fmla="*/ 1517574 w 1880432"/>
+                    <a:gd name="connsiteY60" fmla="*/ 2699658 h 2873829"/>
+                    <a:gd name="connsiteX61" fmla="*/ 1561117 w 1880432"/>
+                    <a:gd name="connsiteY61" fmla="*/ 2743200 h 2873829"/>
+                    <a:gd name="connsiteX62" fmla="*/ 1706260 w 1880432"/>
+                    <a:gd name="connsiteY62" fmla="*/ 2786743 h 2873829"/>
+                    <a:gd name="connsiteX63" fmla="*/ 1793346 w 1880432"/>
+                    <a:gd name="connsiteY63" fmla="*/ 2844800 h 2873829"/>
+                    <a:gd name="connsiteX64" fmla="*/ 1880432 w 1880432"/>
+                    <a:gd name="connsiteY64" fmla="*/ 2873829 h 2873829"/>
+                  </a:gdLst>
+                  <a:ahLst/>
+                  <a:cxnLst>
+                    <a:cxn ang="0">
+                      <a:pos x="connsiteX0" y="connsiteY0"/>
+                    </a:cxn>
+                    <a:cxn ang="0">
+                      <a:pos x="connsiteX1" y="connsiteY1"/>
+                    </a:cxn>
+                    <a:cxn ang="0">
+                      <a:pos x="connsiteX2" y="connsiteY2"/>
+                    </a:cxn>
+                    <a:cxn ang="0">
+                      <a:pos x="connsiteX3" y="connsiteY3"/>
+                    </a:cxn>
+                    <a:cxn ang="0">
+                      <a:pos x="connsiteX4" y="connsiteY4"/>
+                    </a:cxn>
+                    <a:cxn ang="0">
+                      <a:pos x="connsiteX5" y="connsiteY5"/>
+                    </a:cxn>
+                    <a:cxn ang="0">
+                      <a:pos x="connsiteX6" y="connsiteY6"/>
+                    </a:cxn>
+                    <a:cxn ang="0">
+                      <a:pos x="connsiteX7" y="connsiteY7"/>
+                    </a:cxn>
+                    <a:cxn ang="0">
+                      <a:pos x="connsiteX8" y="connsiteY8"/>
+                    </a:cxn>
+                    <a:cxn ang="0">
+                      <a:pos x="connsiteX9" y="connsiteY9"/>
+                    </a:cxn>
+                    <a:cxn ang="0">
+                      <a:pos x="connsiteX10" y="connsiteY10"/>
+                    </a:cxn>
+                    <a:cxn ang="0">
+                      <a:pos x="connsiteX11" y="connsiteY11"/>
+                    </a:cxn>
+                    <a:cxn ang="0">
+                      <a:pos x="connsiteX12" y="connsiteY12"/>
+                    </a:cxn>
+                    <a:cxn ang="0">
+                      <a:pos x="connsiteX13" y="connsiteY13"/>
+                    </a:cxn>
+                    <a:cxn ang="0">
+                      <a:pos x="connsiteX14" y="connsiteY14"/>
+                    </a:cxn>
+                    <a:cxn ang="0">
+                      <a:pos x="connsiteX15" y="connsiteY15"/>
+                    </a:cxn>
+                    <a:cxn ang="0">
+                      <a:pos x="connsiteX16" y="connsiteY16"/>
+                    </a:cxn>
+                    <a:cxn ang="0">
+                      <a:pos x="connsiteX17" y="connsiteY17"/>
+                    </a:cxn>
+                    <a:cxn ang="0">
+                      <a:pos x="connsiteX18" y="connsiteY18"/>
+                    </a:cxn>
+                    <a:cxn ang="0">
+                      <a:pos x="connsiteX19" y="connsiteY19"/>
+                    </a:cxn>
+                    <a:cxn ang="0">
+                      <a:pos x="connsiteX20" y="connsiteY20"/>
+                    </a:cxn>
+                    <a:cxn ang="0">
+                      <a:pos x="connsiteX21" y="connsiteY21"/>
+                    </a:cxn>
+                    <a:cxn ang="0">
+                      <a:pos x="connsiteX22" y="connsiteY22"/>
+                    </a:cxn>
+                    <a:cxn ang="0">
+                      <a:pos x="connsiteX23" y="connsiteY23"/>
+                    </a:cxn>
+                    <a:cxn ang="0">
+                      <a:pos x="connsiteX24" y="connsiteY24"/>
+                    </a:cxn>
+                    <a:cxn ang="0">
+                      <a:pos x="connsiteX25" y="connsiteY25"/>
+                    </a:cxn>
+                    <a:cxn ang="0">
+                      <a:pos x="connsiteX26" y="connsiteY26"/>
+                    </a:cxn>
+                    <a:cxn ang="0">
+                      <a:pos x="connsiteX27" y="connsiteY27"/>
+                    </a:cxn>
+                    <a:cxn ang="0">
+                      <a:pos x="connsiteX28" y="connsiteY28"/>
+                    </a:cxn>
+                    <a:cxn ang="0">
+                      <a:pos x="connsiteX29" y="connsiteY29"/>
+                    </a:cxn>
+                    <a:cxn ang="0">
+                      <a:pos x="connsiteX30" y="connsiteY30"/>
+                    </a:cxn>
+                    <a:cxn ang="0">
+                      <a:pos x="connsiteX31" y="connsiteY31"/>
+                    </a:cxn>
+                    <a:cxn ang="0">
+                      <a:pos x="connsiteX32" y="connsiteY32"/>
+                    </a:cxn>
+                    <a:cxn ang="0">
+                      <a:pos x="connsiteX33" y="connsiteY33"/>
+                    </a:cxn>
+                    <a:cxn ang="0">
+                      <a:pos x="connsiteX34" y="connsiteY34"/>
+                    </a:cxn>
+                    <a:cxn ang="0">
+                      <a:pos x="connsiteX35" y="connsiteY35"/>
+                    </a:cxn>
+                    <a:cxn ang="0">
+                      <a:pos x="connsiteX36" y="connsiteY36"/>
+                    </a:cxn>
+                    <a:cxn ang="0">
+                      <a:pos x="connsiteX37" y="connsiteY37"/>
+                    </a:cxn>
+                    <a:cxn ang="0">
+                      <a:pos x="connsiteX38" y="connsiteY38"/>
+                    </a:cxn>
+                    <a:cxn ang="0">
+                      <a:pos x="connsiteX39" y="connsiteY39"/>
+                    </a:cxn>
+                    <a:cxn ang="0">
+                      <a:pos x="connsiteX40" y="connsiteY40"/>
+                    </a:cxn>
+                    <a:cxn ang="0">
+                      <a:pos x="connsiteX41" y="connsiteY41"/>
+                    </a:cxn>
+                    <a:cxn ang="0">
+                      <a:pos x="connsiteX42" y="connsiteY42"/>
+                    </a:cxn>
+                    <a:cxn ang="0">
+                      <a:pos x="connsiteX43" y="connsiteY43"/>
+                    </a:cxn>
+                    <a:cxn ang="0">
+                      <a:pos x="connsiteX44" y="connsiteY44"/>
+                    </a:cxn>
+                    <a:cxn ang="0">
+                      <a:pos x="connsiteX45" y="connsiteY45"/>
+                    </a:cxn>
+                    <a:cxn ang="0">
+                      <a:pos x="connsiteX46" y="connsiteY46"/>
+                    </a:cxn>
+                    <a:cxn ang="0">
+                      <a:pos x="connsiteX47" y="connsiteY47"/>
+                    </a:cxn>
+                    <a:cxn ang="0">
+                      <a:pos x="connsiteX48" y="connsiteY48"/>
+                    </a:cxn>
+                    <a:cxn ang="0">
+                      <a:pos x="connsiteX49" y="connsiteY49"/>
+                    </a:cxn>
+                    <a:cxn ang="0">
+                      <a:pos x="connsiteX50" y="connsiteY50"/>
+                    </a:cxn>
+                    <a:cxn ang="0">
+                      <a:pos x="connsiteX51" y="connsiteY51"/>
+                    </a:cxn>
+                    <a:cxn ang="0">
+                      <a:pos x="connsiteX52" y="connsiteY52"/>
+                    </a:cxn>
+                    <a:cxn ang="0">
+                      <a:pos x="connsiteX53" y="connsiteY53"/>
+                    </a:cxn>
+                    <a:cxn ang="0">
+                      <a:pos x="connsiteX54" y="connsiteY54"/>
+                    </a:cxn>
+                    <a:cxn ang="0">
+                      <a:pos x="connsiteX55" y="connsiteY55"/>
+                    </a:cxn>
+                    <a:cxn ang="0">
+                      <a:pos x="connsiteX56" y="connsiteY56"/>
+                    </a:cxn>
+                    <a:cxn ang="0">
+                      <a:pos x="connsiteX57" y="connsiteY57"/>
+                    </a:cxn>
+                    <a:cxn ang="0">
+                      <a:pos x="connsiteX58" y="connsiteY58"/>
+                    </a:cxn>
+                    <a:cxn ang="0">
+                      <a:pos x="connsiteX59" y="connsiteY59"/>
+                    </a:cxn>
+                    <a:cxn ang="0">
+                      <a:pos x="connsiteX60" y="connsiteY60"/>
+                    </a:cxn>
+                    <a:cxn ang="0">
+                      <a:pos x="connsiteX61" y="connsiteY61"/>
+                    </a:cxn>
+                    <a:cxn ang="0">
+                      <a:pos x="connsiteX62" y="connsiteY62"/>
+                    </a:cxn>
+                    <a:cxn ang="0">
+                      <a:pos x="connsiteX63" y="connsiteY63"/>
+                    </a:cxn>
+                    <a:cxn ang="0">
+                      <a:pos x="connsiteX64" y="connsiteY64"/>
+                    </a:cxn>
+                  </a:cxnLst>
+                  <a:rect l="l" t="t" r="r" b="b"/>
+                  <a:pathLst>
+                    <a:path w="1880432" h="2873829">
+                      <a:moveTo>
+                        <a:pt x="399974" y="2873829"/>
+                      </a:moveTo>
+                      <a:cubicBezTo>
+                        <a:pt x="424165" y="2844800"/>
+                        <a:pt x="447442" y="2814985"/>
+                        <a:pt x="472546" y="2786743"/>
+                      </a:cubicBezTo>
+                      <a:cubicBezTo>
+                        <a:pt x="486183" y="2771401"/>
+                        <a:pt x="504703" y="2760279"/>
+                        <a:pt x="516089" y="2743200"/>
+                      </a:cubicBezTo>
+                      <a:cubicBezTo>
+                        <a:pt x="524575" y="2730470"/>
+                        <a:pt x="523761" y="2713342"/>
+                        <a:pt x="530603" y="2699658"/>
+                      </a:cubicBezTo>
+                      <a:cubicBezTo>
+                        <a:pt x="538404" y="2684056"/>
+                        <a:pt x="549956" y="2670629"/>
+                        <a:pt x="559632" y="2656115"/>
+                      </a:cubicBezTo>
+                      <a:cubicBezTo>
+                        <a:pt x="618594" y="2361299"/>
+                        <a:pt x="594387" y="2509516"/>
+                        <a:pt x="559632" y="1872343"/>
+                      </a:cubicBezTo>
+                      <a:cubicBezTo>
+                        <a:pt x="557965" y="1841790"/>
+                        <a:pt x="540279" y="1814286"/>
+                        <a:pt x="530603" y="1785258"/>
+                      </a:cubicBezTo>
+                      <a:cubicBezTo>
+                        <a:pt x="525765" y="1770744"/>
+                        <a:pt x="522931" y="1755399"/>
+                        <a:pt x="516089" y="1741715"/>
+                      </a:cubicBezTo>
+                      <a:cubicBezTo>
+                        <a:pt x="474444" y="1658426"/>
+                        <a:pt x="498192" y="1702211"/>
+                        <a:pt x="443517" y="1611086"/>
+                      </a:cubicBezTo>
+                      <a:cubicBezTo>
+                        <a:pt x="438679" y="1586896"/>
+                        <a:pt x="440035" y="1560580"/>
+                        <a:pt x="429003" y="1538515"/>
+                      </a:cubicBezTo>
+                      <a:cubicBezTo>
+                        <a:pt x="419823" y="1520156"/>
+                        <a:pt x="397776" y="1511393"/>
+                        <a:pt x="385460" y="1494972"/>
+                      </a:cubicBezTo>
+                      <a:cubicBezTo>
+                        <a:pt x="368533" y="1472403"/>
+                        <a:pt x="357566" y="1445873"/>
+                        <a:pt x="341917" y="1422400"/>
+                      </a:cubicBezTo>
+                      <a:cubicBezTo>
+                        <a:pt x="328499" y="1402272"/>
+                        <a:pt x="312888" y="1383695"/>
+                        <a:pt x="298374" y="1364343"/>
+                      </a:cubicBezTo>
+                      <a:cubicBezTo>
+                        <a:pt x="293536" y="1344991"/>
+                        <a:pt x="291718" y="1324621"/>
+                        <a:pt x="283860" y="1306286"/>
+                      </a:cubicBezTo>
+                      <a:cubicBezTo>
+                        <a:pt x="268704" y="1270922"/>
+                        <a:pt x="237445" y="1245356"/>
+                        <a:pt x="211289" y="1219200"/>
+                      </a:cubicBezTo>
+                      <a:cubicBezTo>
+                        <a:pt x="182277" y="1074146"/>
+                        <a:pt x="222931" y="1207635"/>
+                        <a:pt x="153232" y="1103086"/>
+                      </a:cubicBezTo>
+                      <a:cubicBezTo>
+                        <a:pt x="135229" y="1076082"/>
+                        <a:pt x="126387" y="1043830"/>
+                        <a:pt x="109689" y="1016000"/>
+                      </a:cubicBezTo>
+                      <a:cubicBezTo>
+                        <a:pt x="97243" y="995257"/>
+                        <a:pt x="80660" y="977295"/>
+                        <a:pt x="66146" y="957943"/>
+                      </a:cubicBezTo>
+                      <a:cubicBezTo>
+                        <a:pt x="47630" y="902395"/>
+                        <a:pt x="33572" y="867645"/>
+                        <a:pt x="22603" y="812800"/>
+                      </a:cubicBezTo>
+                      <a:cubicBezTo>
+                        <a:pt x="16832" y="783943"/>
+                        <a:pt x="12927" y="754743"/>
+                        <a:pt x="8089" y="725715"/>
+                      </a:cubicBezTo>
+                      <a:cubicBezTo>
+                        <a:pt x="25835" y="432897"/>
+                        <a:pt x="-60255" y="329600"/>
+                        <a:pt x="95174" y="174172"/>
+                      </a:cubicBezTo>
+                      <a:cubicBezTo>
+                        <a:pt x="117080" y="152267"/>
+                        <a:pt x="143555" y="135467"/>
+                        <a:pt x="167746" y="116115"/>
+                      </a:cubicBezTo>
+                      <a:cubicBezTo>
+                        <a:pt x="172584" y="101601"/>
+                        <a:pt x="170507" y="82366"/>
+                        <a:pt x="182260" y="72572"/>
+                      </a:cubicBezTo>
+                      <a:cubicBezTo>
+                        <a:pt x="202275" y="55892"/>
+                        <a:pt x="231528" y="55195"/>
+                        <a:pt x="254832" y="43543"/>
+                      </a:cubicBezTo>
+                      <a:cubicBezTo>
+                        <a:pt x="367381" y="-12732"/>
+                        <a:pt x="232466" y="36485"/>
+                        <a:pt x="341917" y="0"/>
+                      </a:cubicBezTo>
+                      <a:cubicBezTo>
+                        <a:pt x="641879" y="14514"/>
+                        <a:pt x="943116" y="12337"/>
+                        <a:pt x="1241803" y="43543"/>
+                      </a:cubicBezTo>
+                      <a:cubicBezTo>
+                        <a:pt x="1272614" y="46762"/>
+                        <a:pt x="1289591" y="83013"/>
+                        <a:pt x="1314374" y="101600"/>
+                      </a:cubicBezTo>
+                      <a:cubicBezTo>
+                        <a:pt x="1328329" y="112067"/>
+                        <a:pt x="1342771" y="121974"/>
+                        <a:pt x="1357917" y="130629"/>
+                      </a:cubicBezTo>
+                      <a:cubicBezTo>
+                        <a:pt x="1394708" y="151653"/>
+                        <a:pt x="1427695" y="160400"/>
+                        <a:pt x="1459517" y="188686"/>
+                      </a:cubicBezTo>
+                      <a:cubicBezTo>
+                        <a:pt x="1490200" y="215960"/>
+                        <a:pt x="1546603" y="275772"/>
+                        <a:pt x="1546603" y="275772"/>
+                      </a:cubicBezTo>
+                      <a:cubicBezTo>
+                        <a:pt x="1551441" y="290286"/>
+                        <a:pt x="1561117" y="304016"/>
+                        <a:pt x="1561117" y="319315"/>
+                      </a:cubicBezTo>
+                      <a:cubicBezTo>
+                        <a:pt x="1561117" y="636612"/>
+                        <a:pt x="1569795" y="477631"/>
+                        <a:pt x="1532089" y="609600"/>
+                      </a:cubicBezTo>
+                      <a:cubicBezTo>
+                        <a:pt x="1526609" y="628781"/>
+                        <a:pt x="1524578" y="648980"/>
+                        <a:pt x="1517574" y="667658"/>
+                      </a:cubicBezTo>
+                      <a:cubicBezTo>
+                        <a:pt x="1509977" y="687917"/>
+                        <a:pt x="1497069" y="705828"/>
+                        <a:pt x="1488546" y="725715"/>
+                      </a:cubicBezTo>
+                      <a:cubicBezTo>
+                        <a:pt x="1482519" y="739777"/>
+                        <a:pt x="1481623" y="755974"/>
+                        <a:pt x="1474032" y="769258"/>
+                      </a:cubicBezTo>
+                      <a:cubicBezTo>
+                        <a:pt x="1462030" y="790261"/>
+                        <a:pt x="1443908" y="807187"/>
+                        <a:pt x="1430489" y="827315"/>
+                      </a:cubicBezTo>
+                      <a:cubicBezTo>
+                        <a:pt x="1414840" y="850788"/>
+                        <a:pt x="1404810" y="878052"/>
+                        <a:pt x="1386946" y="899886"/>
+                      </a:cubicBezTo>
+                      <a:cubicBezTo>
+                        <a:pt x="1360950" y="931659"/>
+                        <a:pt x="1299860" y="986972"/>
+                        <a:pt x="1299860" y="986972"/>
+                      </a:cubicBezTo>
+                      <a:cubicBezTo>
+                        <a:pt x="1276885" y="1078875"/>
+                        <a:pt x="1296411" y="1028432"/>
+                        <a:pt x="1227289" y="1132115"/>
+                      </a:cubicBezTo>
+                      <a:cubicBezTo>
+                        <a:pt x="1217613" y="1146629"/>
+                        <a:pt x="1210595" y="1163323"/>
+                        <a:pt x="1198260" y="1175658"/>
+                      </a:cubicBezTo>
+                      <a:cubicBezTo>
+                        <a:pt x="1183746" y="1190172"/>
+                        <a:pt x="1167319" y="1202998"/>
+                        <a:pt x="1154717" y="1219200"/>
+                      </a:cubicBezTo>
+                      <a:cubicBezTo>
+                        <a:pt x="1133298" y="1246739"/>
+                        <a:pt x="1117593" y="1278376"/>
+                        <a:pt x="1096660" y="1306286"/>
+                      </a:cubicBezTo>
+                      <a:cubicBezTo>
+                        <a:pt x="1082146" y="1325638"/>
+                        <a:pt x="1067177" y="1344658"/>
+                        <a:pt x="1053117" y="1364343"/>
+                      </a:cubicBezTo>
+                      <a:cubicBezTo>
+                        <a:pt x="1042978" y="1378538"/>
+                        <a:pt x="1031890" y="1392284"/>
+                        <a:pt x="1024089" y="1407886"/>
+                      </a:cubicBezTo>
+                      <a:cubicBezTo>
+                        <a:pt x="1012437" y="1431190"/>
+                        <a:pt x="1008715" y="1458269"/>
+                        <a:pt x="995060" y="1480458"/>
+                      </a:cubicBezTo>
+                      <a:cubicBezTo>
+                        <a:pt x="969704" y="1521662"/>
+                        <a:pt x="925942" y="1551651"/>
+                        <a:pt x="907974" y="1596572"/>
+                      </a:cubicBezTo>
+                      <a:cubicBezTo>
+                        <a:pt x="872467" y="1685339"/>
+                        <a:pt x="893398" y="1647465"/>
+                        <a:pt x="849917" y="1712686"/>
+                      </a:cubicBezTo>
+                      <a:cubicBezTo>
+                        <a:pt x="809170" y="1834931"/>
+                        <a:pt x="826872" y="1764000"/>
+                        <a:pt x="849917" y="2017486"/>
+                      </a:cubicBezTo>
+                      <a:cubicBezTo>
+                        <a:pt x="851723" y="2037352"/>
+                        <a:pt x="856330" y="2057314"/>
+                        <a:pt x="864432" y="2075543"/>
+                      </a:cubicBezTo>
+                      <a:cubicBezTo>
+                        <a:pt x="884794" y="2121358"/>
+                        <a:pt x="921596" y="2166278"/>
+                        <a:pt x="951517" y="2206172"/>
+                      </a:cubicBezTo>
+                      <a:cubicBezTo>
+                        <a:pt x="985010" y="2306647"/>
+                        <a:pt x="937954" y="2195185"/>
+                        <a:pt x="1009574" y="2278743"/>
+                      </a:cubicBezTo>
+                      <a:cubicBezTo>
+                        <a:pt x="1027933" y="2300162"/>
+                        <a:pt x="1036190" y="2328746"/>
+                        <a:pt x="1053117" y="2351315"/>
+                      </a:cubicBezTo>
+                      <a:cubicBezTo>
+                        <a:pt x="1065433" y="2367736"/>
+                        <a:pt x="1082146" y="2380344"/>
+                        <a:pt x="1096660" y="2394858"/>
+                      </a:cubicBezTo>
+                      <a:cubicBezTo>
+                        <a:pt x="1122167" y="2471378"/>
+                        <a:pt x="1094316" y="2409462"/>
+                        <a:pt x="1154717" y="2481943"/>
+                      </a:cubicBezTo>
+                      <a:cubicBezTo>
+                        <a:pt x="1165884" y="2495344"/>
+                        <a:pt x="1171411" y="2513151"/>
+                        <a:pt x="1183746" y="2525486"/>
+                      </a:cubicBezTo>
+                      <a:cubicBezTo>
+                        <a:pt x="1196081" y="2537821"/>
+                        <a:pt x="1213888" y="2543348"/>
+                        <a:pt x="1227289" y="2554515"/>
+                      </a:cubicBezTo>
+                      <a:cubicBezTo>
+                        <a:pt x="1243058" y="2567656"/>
+                        <a:pt x="1253010" y="2587874"/>
+                        <a:pt x="1270832" y="2598058"/>
+                      </a:cubicBezTo>
+                      <a:cubicBezTo>
+                        <a:pt x="1288152" y="2607955"/>
+                        <a:pt x="1309709" y="2607092"/>
+                        <a:pt x="1328889" y="2612572"/>
+                      </a:cubicBezTo>
+                      <a:cubicBezTo>
+                        <a:pt x="1343600" y="2616775"/>
+                        <a:pt x="1358370" y="2621059"/>
+                        <a:pt x="1372432" y="2627086"/>
+                      </a:cubicBezTo>
+                      <a:cubicBezTo>
+                        <a:pt x="1497979" y="2680892"/>
+                        <a:pt x="1371916" y="2636591"/>
+                        <a:pt x="1474032" y="2670629"/>
+                      </a:cubicBezTo>
+                      <a:cubicBezTo>
+                        <a:pt x="1488546" y="2680305"/>
+                        <a:pt x="1504173" y="2688491"/>
+                        <a:pt x="1517574" y="2699658"/>
+                      </a:cubicBezTo>
+                      <a:cubicBezTo>
+                        <a:pt x="1533343" y="2712799"/>
+                        <a:pt x="1543174" y="2733232"/>
+                        <a:pt x="1561117" y="2743200"/>
+                      </a:cubicBezTo>
+                      <a:cubicBezTo>
+                        <a:pt x="1590032" y="2759264"/>
+                        <a:pt x="1668777" y="2777372"/>
+                        <a:pt x="1706260" y="2786743"/>
+                      </a:cubicBezTo>
+                      <a:cubicBezTo>
+                        <a:pt x="1735289" y="2806095"/>
+                        <a:pt x="1760248" y="2833767"/>
+                        <a:pt x="1793346" y="2844800"/>
+                      </a:cubicBezTo>
+                      <a:lnTo>
+                        <a:pt x="1880432" y="2873829"/>
+                      </a:lnTo>
+                    </a:path>
+                  </a:pathLst>
+                </a:custGeom>
+                <a:noFill/>
+                <a:ln w="57150"/>
+              </p:spPr>
+              <p:style>
+                <a:lnRef idx="2">
+                  <a:schemeClr val="accent1">
+                    <a:shade val="50000"/>
+                  </a:schemeClr>
+                </a:lnRef>
+                <a:fillRef idx="1">
+                  <a:schemeClr val="accent1"/>
+                </a:fillRef>
+                <a:effectRef idx="0">
+                  <a:schemeClr val="accent1"/>
+                </a:effectRef>
+                <a:fontRef idx="minor">
+                  <a:schemeClr val="lt1"/>
+                </a:fontRef>
+              </p:style>
+              <p:txBody>
+                <a:bodyPr rtlCol="0" anchor="ctr"/>
+                <a:lstStyle/>
+                <a:p>
+                  <a:pPr algn="ctr"/>
+                  <a:endParaRPr lang="en-US"/>
+                </a:p>
+              </p:txBody>
+            </p:sp>
+            <p:cxnSp>
+              <p:nvCxnSpPr>
+                <p:cNvPr id="103" name="Straight Connector 102"/>
+                <p:cNvCxnSpPr>
+                  <a:stCxn id="101" idx="5"/>
+                </p:cNvCxnSpPr>
+                <p:nvPr/>
+              </p:nvCxnSpPr>
+              <p:spPr>
+                <a:xfrm>
+                  <a:off x="25327429" y="10987314"/>
+                  <a:ext cx="290285" cy="8075"/>
+                </a:xfrm>
+                <a:prstGeom prst="line">
+                  <a:avLst/>
+                </a:prstGeom>
+                <a:ln w="57150">
+                  <a:solidFill>
+                    <a:srgbClr val="C00000"/>
+                  </a:solidFill>
+                </a:ln>
+              </p:spPr>
+              <p:style>
+                <a:lnRef idx="1">
+                  <a:schemeClr val="accent1"/>
+                </a:lnRef>
+                <a:fillRef idx="0">
+                  <a:schemeClr val="accent1"/>
+                </a:fillRef>
+                <a:effectRef idx="0">
+                  <a:schemeClr val="accent1"/>
+                </a:effectRef>
+                <a:fontRef idx="minor">
+                  <a:schemeClr val="tx1"/>
+                </a:fontRef>
+              </p:style>
+            </p:cxnSp>
+            <p:sp>
+              <p:nvSpPr>
+                <p:cNvPr id="104" name="Oval 103"/>
+                <p:cNvSpPr/>
+                <p:nvPr/>
+              </p:nvSpPr>
+              <p:spPr>
+                <a:xfrm>
+                  <a:off x="25370971" y="9042399"/>
+                  <a:ext cx="337042" cy="230222"/>
+                </a:xfrm>
+                <a:prstGeom prst="ellipse">
+                  <a:avLst/>
+                </a:prstGeom>
+                <a:solidFill>
+                  <a:schemeClr val="accent2"/>
+                </a:solidFill>
+                <a:ln>
+                  <a:solidFill>
+                    <a:schemeClr val="accent2"/>
+                  </a:solidFill>
+                </a:ln>
+              </p:spPr>
+              <p:style>
+                <a:lnRef idx="2">
+                  <a:schemeClr val="accent1">
+                    <a:shade val="50000"/>
+                  </a:schemeClr>
+                </a:lnRef>
+                <a:fillRef idx="1">
+                  <a:schemeClr val="accent1"/>
+                </a:fillRef>
+                <a:effectRef idx="0">
+                  <a:schemeClr val="accent1"/>
+                </a:effectRef>
+                <a:fontRef idx="minor">
+                  <a:schemeClr val="lt1"/>
+                </a:fontRef>
+              </p:style>
+              <p:txBody>
+                <a:bodyPr rtlCol="0" anchor="ctr"/>
+                <a:lstStyle/>
+                <a:p>
+                  <a:pPr algn="ctr"/>
+                  <a:endParaRPr lang="en-US"/>
+                </a:p>
+              </p:txBody>
+            </p:sp>
+          </p:grpSp>
+          <p:grpSp>
+            <p:nvGrpSpPr>
+              <p:cNvPr id="109" name="Group 108"/>
+              <p:cNvGrpSpPr/>
+              <p:nvPr/>
+            </p:nvGrpSpPr>
+            <p:grpSpPr>
+              <a:xfrm>
+                <a:off x="20112013" y="12961882"/>
+                <a:ext cx="4949372" cy="1395374"/>
+                <a:chOff x="20087771" y="11829143"/>
+                <a:chExt cx="4949372" cy="1395374"/>
+              </a:xfrm>
+            </p:grpSpPr>
+            <p:sp>
+              <p:nvSpPr>
+                <p:cNvPr id="107" name="Freeform 106"/>
+                <p:cNvSpPr/>
+                <p:nvPr/>
+              </p:nvSpPr>
+              <p:spPr>
+                <a:xfrm>
+                  <a:off x="20087771" y="11829143"/>
+                  <a:ext cx="4949372" cy="1395374"/>
+                </a:xfrm>
+                <a:custGeom>
+                  <a:avLst/>
+                  <a:gdLst>
+                    <a:gd name="connsiteX0" fmla="*/ 0 w 4949372"/>
+                    <a:gd name="connsiteY0" fmla="*/ 928914 h 1395374"/>
+                    <a:gd name="connsiteX1" fmla="*/ 827315 w 4949372"/>
+                    <a:gd name="connsiteY1" fmla="*/ 928914 h 1395374"/>
+                    <a:gd name="connsiteX2" fmla="*/ 899886 w 4949372"/>
+                    <a:gd name="connsiteY2" fmla="*/ 899886 h 1395374"/>
+                    <a:gd name="connsiteX3" fmla="*/ 972458 w 4949372"/>
+                    <a:gd name="connsiteY3" fmla="*/ 798286 h 1395374"/>
+                    <a:gd name="connsiteX4" fmla="*/ 986972 w 4949372"/>
+                    <a:gd name="connsiteY4" fmla="*/ 754743 h 1395374"/>
+                    <a:gd name="connsiteX5" fmla="*/ 1016000 w 4949372"/>
+                    <a:gd name="connsiteY5" fmla="*/ 696686 h 1395374"/>
+                    <a:gd name="connsiteX6" fmla="*/ 1045029 w 4949372"/>
+                    <a:gd name="connsiteY6" fmla="*/ 609600 h 1395374"/>
+                    <a:gd name="connsiteX7" fmla="*/ 1088572 w 4949372"/>
+                    <a:gd name="connsiteY7" fmla="*/ 551543 h 1395374"/>
+                    <a:gd name="connsiteX8" fmla="*/ 1146629 w 4949372"/>
+                    <a:gd name="connsiteY8" fmla="*/ 464457 h 1395374"/>
+                    <a:gd name="connsiteX9" fmla="*/ 1204686 w 4949372"/>
+                    <a:gd name="connsiteY9" fmla="*/ 362857 h 1395374"/>
+                    <a:gd name="connsiteX10" fmla="*/ 1219200 w 4949372"/>
+                    <a:gd name="connsiteY10" fmla="*/ 319314 h 1395374"/>
+                    <a:gd name="connsiteX11" fmla="*/ 1262743 w 4949372"/>
+                    <a:gd name="connsiteY11" fmla="*/ 246743 h 1395374"/>
+                    <a:gd name="connsiteX12" fmla="*/ 1291772 w 4949372"/>
+                    <a:gd name="connsiteY12" fmla="*/ 188686 h 1395374"/>
+                    <a:gd name="connsiteX13" fmla="*/ 1335315 w 4949372"/>
+                    <a:gd name="connsiteY13" fmla="*/ 145143 h 1395374"/>
+                    <a:gd name="connsiteX14" fmla="*/ 1364343 w 4949372"/>
+                    <a:gd name="connsiteY14" fmla="*/ 101600 h 1395374"/>
+                    <a:gd name="connsiteX15" fmla="*/ 1451429 w 4949372"/>
+                    <a:gd name="connsiteY15" fmla="*/ 58057 h 1395374"/>
+                    <a:gd name="connsiteX16" fmla="*/ 1509486 w 4949372"/>
+                    <a:gd name="connsiteY16" fmla="*/ 29028 h 1395374"/>
+                    <a:gd name="connsiteX17" fmla="*/ 1640115 w 4949372"/>
+                    <a:gd name="connsiteY17" fmla="*/ 0 h 1395374"/>
+                    <a:gd name="connsiteX18" fmla="*/ 1828800 w 4949372"/>
+                    <a:gd name="connsiteY18" fmla="*/ 14514 h 1395374"/>
+                    <a:gd name="connsiteX19" fmla="*/ 1872343 w 4949372"/>
+                    <a:gd name="connsiteY19" fmla="*/ 29028 h 1395374"/>
+                    <a:gd name="connsiteX20" fmla="*/ 1959429 w 4949372"/>
+                    <a:gd name="connsiteY20" fmla="*/ 87086 h 1395374"/>
+                    <a:gd name="connsiteX21" fmla="*/ 2046515 w 4949372"/>
+                    <a:gd name="connsiteY21" fmla="*/ 217714 h 1395374"/>
+                    <a:gd name="connsiteX22" fmla="*/ 2090058 w 4949372"/>
+                    <a:gd name="connsiteY22" fmla="*/ 261257 h 1395374"/>
+                    <a:gd name="connsiteX23" fmla="*/ 2119086 w 4949372"/>
+                    <a:gd name="connsiteY23" fmla="*/ 319314 h 1395374"/>
+                    <a:gd name="connsiteX24" fmla="*/ 2162629 w 4949372"/>
+                    <a:gd name="connsiteY24" fmla="*/ 377371 h 1395374"/>
+                    <a:gd name="connsiteX25" fmla="*/ 2191658 w 4949372"/>
+                    <a:gd name="connsiteY25" fmla="*/ 420914 h 1395374"/>
+                    <a:gd name="connsiteX26" fmla="*/ 2220686 w 4949372"/>
+                    <a:gd name="connsiteY26" fmla="*/ 522514 h 1395374"/>
+                    <a:gd name="connsiteX27" fmla="*/ 2249715 w 4949372"/>
+                    <a:gd name="connsiteY27" fmla="*/ 609600 h 1395374"/>
+                    <a:gd name="connsiteX28" fmla="*/ 2264229 w 4949372"/>
+                    <a:gd name="connsiteY28" fmla="*/ 653143 h 1395374"/>
+                    <a:gd name="connsiteX29" fmla="*/ 2322286 w 4949372"/>
+                    <a:gd name="connsiteY29" fmla="*/ 798286 h 1395374"/>
+                    <a:gd name="connsiteX30" fmla="*/ 2380343 w 4949372"/>
+                    <a:gd name="connsiteY30" fmla="*/ 841828 h 1395374"/>
+                    <a:gd name="connsiteX31" fmla="*/ 2409372 w 4949372"/>
+                    <a:gd name="connsiteY31" fmla="*/ 885371 h 1395374"/>
+                    <a:gd name="connsiteX32" fmla="*/ 2452915 w 4949372"/>
+                    <a:gd name="connsiteY32" fmla="*/ 899886 h 1395374"/>
+                    <a:gd name="connsiteX33" fmla="*/ 2525486 w 4949372"/>
+                    <a:gd name="connsiteY33" fmla="*/ 914400 h 1395374"/>
+                    <a:gd name="connsiteX34" fmla="*/ 2583543 w 4949372"/>
+                    <a:gd name="connsiteY34" fmla="*/ 928914 h 1395374"/>
+                    <a:gd name="connsiteX35" fmla="*/ 3265715 w 4949372"/>
+                    <a:gd name="connsiteY35" fmla="*/ 928914 h 1395374"/>
+                    <a:gd name="connsiteX36" fmla="*/ 3396343 w 4949372"/>
+                    <a:gd name="connsiteY36" fmla="*/ 986971 h 1395374"/>
+                    <a:gd name="connsiteX37" fmla="*/ 3643086 w 4949372"/>
+                    <a:gd name="connsiteY37" fmla="*/ 1030514 h 1395374"/>
+                    <a:gd name="connsiteX38" fmla="*/ 3730172 w 4949372"/>
+                    <a:gd name="connsiteY38" fmla="*/ 1074057 h 1395374"/>
+                    <a:gd name="connsiteX39" fmla="*/ 3773715 w 4949372"/>
+                    <a:gd name="connsiteY39" fmla="*/ 1103086 h 1395374"/>
+                    <a:gd name="connsiteX40" fmla="*/ 3846286 w 4949372"/>
+                    <a:gd name="connsiteY40" fmla="*/ 1204686 h 1395374"/>
+                    <a:gd name="connsiteX41" fmla="*/ 3889829 w 4949372"/>
+                    <a:gd name="connsiteY41" fmla="*/ 1219200 h 1395374"/>
+                    <a:gd name="connsiteX42" fmla="*/ 3947886 w 4949372"/>
+                    <a:gd name="connsiteY42" fmla="*/ 1262743 h 1395374"/>
+                    <a:gd name="connsiteX43" fmla="*/ 4078515 w 4949372"/>
+                    <a:gd name="connsiteY43" fmla="*/ 1277257 h 1395374"/>
+                    <a:gd name="connsiteX44" fmla="*/ 4122058 w 4949372"/>
+                    <a:gd name="connsiteY44" fmla="*/ 1291771 h 1395374"/>
+                    <a:gd name="connsiteX45" fmla="*/ 4194629 w 4949372"/>
+                    <a:gd name="connsiteY45" fmla="*/ 1320800 h 1395374"/>
+                    <a:gd name="connsiteX46" fmla="*/ 4310743 w 4949372"/>
+                    <a:gd name="connsiteY46" fmla="*/ 1378857 h 1395374"/>
+                    <a:gd name="connsiteX47" fmla="*/ 4354286 w 4949372"/>
+                    <a:gd name="connsiteY47" fmla="*/ 1393371 h 1395374"/>
+                    <a:gd name="connsiteX48" fmla="*/ 4949372 w 4949372"/>
+                    <a:gd name="connsiteY48" fmla="*/ 1393371 h 1395374"/>
+                  </a:gdLst>
+                  <a:ahLst/>
+                  <a:cxnLst>
+                    <a:cxn ang="0">
+                      <a:pos x="connsiteX0" y="connsiteY0"/>
+                    </a:cxn>
+                    <a:cxn ang="0">
+                      <a:pos x="connsiteX1" y="connsiteY1"/>
+                    </a:cxn>
+                    <a:cxn ang="0">
+                      <a:pos x="connsiteX2" y="connsiteY2"/>
+                    </a:cxn>
+                    <a:cxn ang="0">
+                      <a:pos x="connsiteX3" y="connsiteY3"/>
+                    </a:cxn>
+                    <a:cxn ang="0">
+                      <a:pos x="connsiteX4" y="connsiteY4"/>
+                    </a:cxn>
+                    <a:cxn ang="0">
+                      <a:pos x="connsiteX5" y="connsiteY5"/>
+                    </a:cxn>
+                    <a:cxn ang="0">
+                      <a:pos x="connsiteX6" y="connsiteY6"/>
+                    </a:cxn>
+                    <a:cxn ang="0">
+                      <a:pos x="connsiteX7" y="connsiteY7"/>
+                    </a:cxn>
+                    <a:cxn ang="0">
+                      <a:pos x="connsiteX8" y="connsiteY8"/>
+                    </a:cxn>
+                    <a:cxn ang="0">
+                      <a:pos x="connsiteX9" y="connsiteY9"/>
+                    </a:cxn>
+                    <a:cxn ang="0">
+                      <a:pos x="connsiteX10" y="connsiteY10"/>
+                    </a:cxn>
+                    <a:cxn ang="0">
+                      <a:pos x="connsiteX11" y="connsiteY11"/>
+                    </a:cxn>
+                    <a:cxn ang="0">
+                      <a:pos x="connsiteX12" y="connsiteY12"/>
+                    </a:cxn>
+                    <a:cxn ang="0">
+                      <a:pos x="connsiteX13" y="connsiteY13"/>
+                    </a:cxn>
+                    <a:cxn ang="0">
+                      <a:pos x="connsiteX14" y="connsiteY14"/>
+                    </a:cxn>
+                    <a:cxn ang="0">
+                      <a:pos x="connsiteX15" y="connsiteY15"/>
+                    </a:cxn>
+                    <a:cxn ang="0">
+                      <a:pos x="connsiteX16" y="connsiteY16"/>
+                    </a:cxn>
+                    <a:cxn ang="0">
+                      <a:pos x="connsiteX17" y="connsiteY17"/>
+                    </a:cxn>
+                    <a:cxn ang="0">
+                      <a:pos x="connsiteX18" y="connsiteY18"/>
+                    </a:cxn>
+                    <a:cxn ang="0">
+                      <a:pos x="connsiteX19" y="connsiteY19"/>
+                    </a:cxn>
+                    <a:cxn ang="0">
+                      <a:pos x="connsiteX20" y="connsiteY20"/>
+                    </a:cxn>
+                    <a:cxn ang="0">
+                      <a:pos x="connsiteX21" y="connsiteY21"/>
+                    </a:cxn>
+                    <a:cxn ang="0">
+                      <a:pos x="connsiteX22" y="connsiteY22"/>
+                    </a:cxn>
+                    <a:cxn ang="0">
+                      <a:pos x="connsiteX23" y="connsiteY23"/>
+                    </a:cxn>
+                    <a:cxn ang="0">
+                      <a:pos x="connsiteX24" y="connsiteY24"/>
+                    </a:cxn>
+                    <a:cxn ang="0">
+                      <a:pos x="connsiteX25" y="connsiteY25"/>
+                    </a:cxn>
+                    <a:cxn ang="0">
+                      <a:pos x="connsiteX26" y="connsiteY26"/>
+                    </a:cxn>
+                    <a:cxn ang="0">
+                      <a:pos x="connsiteX27" y="connsiteY27"/>
+                    </a:cxn>
+                    <a:cxn ang="0">
+                      <a:pos x="connsiteX28" y="connsiteY28"/>
+                    </a:cxn>
+                    <a:cxn ang="0">
+                      <a:pos x="connsiteX29" y="connsiteY29"/>
+                    </a:cxn>
+                    <a:cxn ang="0">
+                      <a:pos x="connsiteX30" y="connsiteY30"/>
+                    </a:cxn>
+                    <a:cxn ang="0">
+                      <a:pos x="connsiteX31" y="connsiteY31"/>
+                    </a:cxn>
+                    <a:cxn ang="0">
+                      <a:pos x="connsiteX32" y="connsiteY32"/>
+                    </a:cxn>
+                    <a:cxn ang="0">
+                      <a:pos x="connsiteX33" y="connsiteY33"/>
+                    </a:cxn>
+                    <a:cxn ang="0">
+                      <a:pos x="connsiteX34" y="connsiteY34"/>
+                    </a:cxn>
+                    <a:cxn ang="0">
+                      <a:pos x="connsiteX35" y="connsiteY35"/>
+                    </a:cxn>
+                    <a:cxn ang="0">
+                      <a:pos x="connsiteX36" y="connsiteY36"/>
+                    </a:cxn>
+                    <a:cxn ang="0">
+                      <a:pos x="connsiteX37" y="connsiteY37"/>
+                    </a:cxn>
+                    <a:cxn ang="0">
+                      <a:pos x="connsiteX38" y="connsiteY38"/>
+                    </a:cxn>
+                    <a:cxn ang="0">
+                      <a:pos x="connsiteX39" y="connsiteY39"/>
+                    </a:cxn>
+                    <a:cxn ang="0">
+                      <a:pos x="connsiteX40" y="connsiteY40"/>
+                    </a:cxn>
+                    <a:cxn ang="0">
+                      <a:pos x="connsiteX41" y="connsiteY41"/>
+                    </a:cxn>
+                    <a:cxn ang="0">
+                      <a:pos x="connsiteX42" y="connsiteY42"/>
+                    </a:cxn>
+                    <a:cxn ang="0">
+                      <a:pos x="connsiteX43" y="connsiteY43"/>
+                    </a:cxn>
+                    <a:cxn ang="0">
+                      <a:pos x="connsiteX44" y="connsiteY44"/>
+                    </a:cxn>
+                    <a:cxn ang="0">
+                      <a:pos x="connsiteX45" y="connsiteY45"/>
+                    </a:cxn>
+                    <a:cxn ang="0">
+                      <a:pos x="connsiteX46" y="connsiteY46"/>
+                    </a:cxn>
+                    <a:cxn ang="0">
+                      <a:pos x="connsiteX47" y="connsiteY47"/>
+                    </a:cxn>
+                    <a:cxn ang="0">
+                      <a:pos x="connsiteX48" y="connsiteY48"/>
+                    </a:cxn>
+                  </a:cxnLst>
+                  <a:rect l="l" t="t" r="r" b="b"/>
+                  <a:pathLst>
+                    <a:path w="4949372" h="1395374">
+                      <a:moveTo>
+                        <a:pt x="0" y="928914"/>
+                      </a:moveTo>
+                      <a:cubicBezTo>
+                        <a:pt x="344596" y="953528"/>
+                        <a:pt x="338085" y="959490"/>
+                        <a:pt x="827315" y="928914"/>
+                      </a:cubicBezTo>
+                      <a:cubicBezTo>
+                        <a:pt x="853318" y="927289"/>
+                        <a:pt x="875696" y="909562"/>
+                        <a:pt x="899886" y="899886"/>
+                      </a:cubicBezTo>
+                      <a:cubicBezTo>
+                        <a:pt x="909741" y="886746"/>
+                        <a:pt x="961850" y="819502"/>
+                        <a:pt x="972458" y="798286"/>
+                      </a:cubicBezTo>
+                      <a:cubicBezTo>
+                        <a:pt x="979300" y="784602"/>
+                        <a:pt x="980945" y="768805"/>
+                        <a:pt x="986972" y="754743"/>
+                      </a:cubicBezTo>
+                      <a:cubicBezTo>
+                        <a:pt x="995495" y="734856"/>
+                        <a:pt x="1007964" y="716775"/>
+                        <a:pt x="1016000" y="696686"/>
+                      </a:cubicBezTo>
+                      <a:cubicBezTo>
+                        <a:pt x="1027364" y="668276"/>
+                        <a:pt x="1026670" y="634079"/>
+                        <a:pt x="1045029" y="609600"/>
+                      </a:cubicBezTo>
+                      <a:cubicBezTo>
+                        <a:pt x="1059543" y="590248"/>
+                        <a:pt x="1074700" y="571361"/>
+                        <a:pt x="1088572" y="551543"/>
+                      </a:cubicBezTo>
+                      <a:cubicBezTo>
+                        <a:pt x="1108579" y="522962"/>
+                        <a:pt x="1146629" y="464457"/>
+                        <a:pt x="1146629" y="464457"/>
+                      </a:cubicBezTo>
+                      <a:cubicBezTo>
+                        <a:pt x="1179907" y="364620"/>
+                        <a:pt x="1134389" y="485876"/>
+                        <a:pt x="1204686" y="362857"/>
+                      </a:cubicBezTo>
+                      <a:cubicBezTo>
+                        <a:pt x="1212277" y="349573"/>
+                        <a:pt x="1212358" y="332998"/>
+                        <a:pt x="1219200" y="319314"/>
+                      </a:cubicBezTo>
+                      <a:cubicBezTo>
+                        <a:pt x="1231816" y="294082"/>
+                        <a:pt x="1249043" y="271403"/>
+                        <a:pt x="1262743" y="246743"/>
+                      </a:cubicBezTo>
+                      <a:cubicBezTo>
+                        <a:pt x="1273251" y="227829"/>
+                        <a:pt x="1279196" y="206292"/>
+                        <a:pt x="1291772" y="188686"/>
+                      </a:cubicBezTo>
+                      <a:cubicBezTo>
+                        <a:pt x="1303703" y="171983"/>
+                        <a:pt x="1322174" y="160912"/>
+                        <a:pt x="1335315" y="145143"/>
+                      </a:cubicBezTo>
+                      <a:cubicBezTo>
+                        <a:pt x="1346482" y="131742"/>
+                        <a:pt x="1352008" y="113935"/>
+                        <a:pt x="1364343" y="101600"/>
+                      </a:cubicBezTo>
+                      <a:cubicBezTo>
+                        <a:pt x="1399210" y="66732"/>
+                        <a:pt x="1410111" y="75765"/>
+                        <a:pt x="1451429" y="58057"/>
+                      </a:cubicBezTo>
+                      <a:cubicBezTo>
+                        <a:pt x="1471316" y="49534"/>
+                        <a:pt x="1489227" y="36625"/>
+                        <a:pt x="1509486" y="29028"/>
+                      </a:cubicBezTo>
+                      <a:cubicBezTo>
+                        <a:pt x="1532911" y="20243"/>
+                        <a:pt x="1620410" y="3941"/>
+                        <a:pt x="1640115" y="0"/>
+                      </a:cubicBezTo>
+                      <a:cubicBezTo>
+                        <a:pt x="1703010" y="4838"/>
+                        <a:pt x="1766206" y="6690"/>
+                        <a:pt x="1828800" y="14514"/>
+                      </a:cubicBezTo>
+                      <a:cubicBezTo>
+                        <a:pt x="1843981" y="16412"/>
+                        <a:pt x="1860396" y="19471"/>
+                        <a:pt x="1872343" y="29028"/>
+                      </a:cubicBezTo>
+                      <a:cubicBezTo>
+                        <a:pt x="1963468" y="101927"/>
+                        <a:pt x="1826094" y="53750"/>
+                        <a:pt x="1959429" y="87086"/>
+                      </a:cubicBezTo>
+                      <a:cubicBezTo>
+                        <a:pt x="1991912" y="141223"/>
+                        <a:pt x="2006202" y="170682"/>
+                        <a:pt x="2046515" y="217714"/>
+                      </a:cubicBezTo>
+                      <a:cubicBezTo>
+                        <a:pt x="2059873" y="233299"/>
+                        <a:pt x="2075544" y="246743"/>
+                        <a:pt x="2090058" y="261257"/>
+                      </a:cubicBezTo>
+                      <a:cubicBezTo>
+                        <a:pt x="2099734" y="280609"/>
+                        <a:pt x="2107619" y="300966"/>
+                        <a:pt x="2119086" y="319314"/>
+                      </a:cubicBezTo>
+                      <a:cubicBezTo>
+                        <a:pt x="2131907" y="339827"/>
+                        <a:pt x="2148569" y="357686"/>
+                        <a:pt x="2162629" y="377371"/>
+                      </a:cubicBezTo>
+                      <a:cubicBezTo>
+                        <a:pt x="2172768" y="391566"/>
+                        <a:pt x="2181982" y="406400"/>
+                        <a:pt x="2191658" y="420914"/>
+                      </a:cubicBezTo>
+                      <a:cubicBezTo>
+                        <a:pt x="2240445" y="567278"/>
+                        <a:pt x="2166000" y="340227"/>
+                        <a:pt x="2220686" y="522514"/>
+                      </a:cubicBezTo>
+                      <a:cubicBezTo>
+                        <a:pt x="2229479" y="551822"/>
+                        <a:pt x="2240039" y="580571"/>
+                        <a:pt x="2249715" y="609600"/>
+                      </a:cubicBezTo>
+                      <a:cubicBezTo>
+                        <a:pt x="2254553" y="624114"/>
+                        <a:pt x="2260518" y="638300"/>
+                        <a:pt x="2264229" y="653143"/>
+                      </a:cubicBezTo>
+                      <a:cubicBezTo>
+                        <a:pt x="2278129" y="708743"/>
+                        <a:pt x="2283628" y="748583"/>
+                        <a:pt x="2322286" y="798286"/>
+                      </a:cubicBezTo>
+                      <a:cubicBezTo>
+                        <a:pt x="2337137" y="817381"/>
+                        <a:pt x="2360991" y="827314"/>
+                        <a:pt x="2380343" y="841828"/>
+                      </a:cubicBezTo>
+                      <a:cubicBezTo>
+                        <a:pt x="2390019" y="856342"/>
+                        <a:pt x="2395750" y="874474"/>
+                        <a:pt x="2409372" y="885371"/>
+                      </a:cubicBezTo>
+                      <a:cubicBezTo>
+                        <a:pt x="2421319" y="894929"/>
+                        <a:pt x="2438072" y="896175"/>
+                        <a:pt x="2452915" y="899886"/>
+                      </a:cubicBezTo>
+                      <a:cubicBezTo>
+                        <a:pt x="2476848" y="905869"/>
+                        <a:pt x="2501404" y="909049"/>
+                        <a:pt x="2525486" y="914400"/>
+                      </a:cubicBezTo>
+                      <a:cubicBezTo>
+                        <a:pt x="2544959" y="918727"/>
+                        <a:pt x="2564191" y="924076"/>
+                        <a:pt x="2583543" y="928914"/>
+                      </a:cubicBezTo>
+                      <a:cubicBezTo>
+                        <a:pt x="2873008" y="908238"/>
+                        <a:pt x="2890721" y="900068"/>
+                        <a:pt x="3265715" y="928914"/>
+                      </a:cubicBezTo>
+                      <a:cubicBezTo>
+                        <a:pt x="3404588" y="939597"/>
+                        <a:pt x="3307251" y="954574"/>
+                        <a:pt x="3396343" y="986971"/>
+                      </a:cubicBezTo>
+                      <a:cubicBezTo>
+                        <a:pt x="3483585" y="1018695"/>
+                        <a:pt x="3551184" y="1020303"/>
+                        <a:pt x="3643086" y="1030514"/>
+                      </a:cubicBezTo>
+                      <a:cubicBezTo>
+                        <a:pt x="3767875" y="1113707"/>
+                        <a:pt x="3609988" y="1013965"/>
+                        <a:pt x="3730172" y="1074057"/>
+                      </a:cubicBezTo>
+                      <a:cubicBezTo>
+                        <a:pt x="3745774" y="1081858"/>
+                        <a:pt x="3759201" y="1093410"/>
+                        <a:pt x="3773715" y="1103086"/>
+                      </a:cubicBezTo>
+                      <a:cubicBezTo>
+                        <a:pt x="3792071" y="1158153"/>
+                        <a:pt x="3786021" y="1161639"/>
+                        <a:pt x="3846286" y="1204686"/>
+                      </a:cubicBezTo>
+                      <a:cubicBezTo>
+                        <a:pt x="3858736" y="1213579"/>
+                        <a:pt x="3875315" y="1214362"/>
+                        <a:pt x="3889829" y="1219200"/>
+                      </a:cubicBezTo>
+                      <a:cubicBezTo>
+                        <a:pt x="3909181" y="1233714"/>
+                        <a:pt x="3924765" y="1255629"/>
+                        <a:pt x="3947886" y="1262743"/>
+                      </a:cubicBezTo>
+                      <a:cubicBezTo>
+                        <a:pt x="3989760" y="1275627"/>
+                        <a:pt x="4035300" y="1270055"/>
+                        <a:pt x="4078515" y="1277257"/>
+                      </a:cubicBezTo>
+                      <a:cubicBezTo>
+                        <a:pt x="4093606" y="1279772"/>
+                        <a:pt x="4107733" y="1286399"/>
+                        <a:pt x="4122058" y="1291771"/>
+                      </a:cubicBezTo>
+                      <a:cubicBezTo>
+                        <a:pt x="4146453" y="1300919"/>
+                        <a:pt x="4170973" y="1309882"/>
+                        <a:pt x="4194629" y="1320800"/>
+                      </a:cubicBezTo>
+                      <a:cubicBezTo>
+                        <a:pt x="4233919" y="1338934"/>
+                        <a:pt x="4269690" y="1365173"/>
+                        <a:pt x="4310743" y="1378857"/>
+                      </a:cubicBezTo>
+                      <a:cubicBezTo>
+                        <a:pt x="4325257" y="1383695"/>
+                        <a:pt x="4338991" y="1393023"/>
+                        <a:pt x="4354286" y="1393371"/>
+                      </a:cubicBezTo>
+                      <a:cubicBezTo>
+                        <a:pt x="4552597" y="1397878"/>
+                        <a:pt x="4751010" y="1393371"/>
+                        <a:pt x="4949372" y="1393371"/>
+                      </a:cubicBezTo>
+                    </a:path>
+                  </a:pathLst>
+                </a:custGeom>
+                <a:noFill/>
+                <a:ln w="57150"/>
+              </p:spPr>
+              <p:style>
+                <a:lnRef idx="2">
+                  <a:schemeClr val="accent1">
+                    <a:shade val="50000"/>
+                  </a:schemeClr>
+                </a:lnRef>
+                <a:fillRef idx="1">
+                  <a:schemeClr val="accent1"/>
+                </a:fillRef>
+                <a:effectRef idx="0">
+                  <a:schemeClr val="accent1"/>
+                </a:effectRef>
+                <a:fontRef idx="minor">
+                  <a:schemeClr val="lt1"/>
+                </a:fontRef>
+              </p:style>
+              <p:txBody>
+                <a:bodyPr rtlCol="0" anchor="ctr"/>
+                <a:lstStyle/>
+                <a:p>
+                  <a:pPr algn="ctr"/>
+                  <a:endParaRPr lang="en-US"/>
+                </a:p>
+              </p:txBody>
+            </p:sp>
+            <p:sp>
+              <p:nvSpPr>
+                <p:cNvPr id="108" name="Oval 107"/>
+                <p:cNvSpPr/>
+                <p:nvPr/>
+              </p:nvSpPr>
+              <p:spPr>
+                <a:xfrm>
+                  <a:off x="22257657" y="12526830"/>
+                  <a:ext cx="337042" cy="230222"/>
+                </a:xfrm>
+                <a:prstGeom prst="ellipse">
+                  <a:avLst/>
+                </a:prstGeom>
+                <a:solidFill>
+                  <a:schemeClr val="accent2"/>
+                </a:solidFill>
+                <a:ln>
+                  <a:solidFill>
+                    <a:schemeClr val="accent2"/>
+                  </a:solidFill>
+                </a:ln>
+              </p:spPr>
+              <p:style>
+                <a:lnRef idx="2">
+                  <a:schemeClr val="accent1">
+                    <a:shade val="50000"/>
+                  </a:schemeClr>
+                </a:lnRef>
+                <a:fillRef idx="1">
+                  <a:schemeClr val="accent1"/>
+                </a:fillRef>
+                <a:effectRef idx="0">
+                  <a:schemeClr val="accent1"/>
+                </a:effectRef>
+                <a:fontRef idx="minor">
+                  <a:schemeClr val="lt1"/>
+                </a:fontRef>
+              </p:style>
+              <p:txBody>
+                <a:bodyPr rtlCol="0" anchor="ctr"/>
+                <a:lstStyle/>
+                <a:p>
+                  <a:pPr algn="ctr"/>
+                  <a:endParaRPr lang="en-US"/>
+                </a:p>
+              </p:txBody>
+            </p:sp>
+          </p:grpSp>
+          <p:sp>
+            <p:nvSpPr>
+              <p:cNvPr id="110" name="TextBox 109"/>
+              <p:cNvSpPr txBox="1"/>
+              <p:nvPr/>
+            </p:nvSpPr>
+            <p:spPr>
+              <a:xfrm>
+                <a:off x="16438289" y="3240270"/>
+                <a:ext cx="5843608" cy="2266513"/>
+              </a:xfrm>
+              <a:prstGeom prst="rect">
+                <a:avLst/>
+              </a:prstGeom>
+              <a:noFill/>
+            </p:spPr>
+            <p:txBody>
+              <a:bodyPr wrap="square" rtlCol="0">
+                <a:spAutoFit/>
+              </a:bodyPr>
+              <a:lstStyle/>
+              <a:p>
+                <a:r>
+                  <a:rPr lang="en-US" sz="2400" b="1" dirty="0" smtClean="0"/>
+                  <a:t>1. </a:t>
+                </a:r>
+                <a:r>
+                  <a:rPr lang="en-US" sz="2000" dirty="0" smtClean="0"/>
+                  <a:t>Cross-linking the polymer</a:t>
+                </a:r>
+                <a:br>
+                  <a:rPr lang="en-US" sz="2000" dirty="0" smtClean="0"/>
+                </a:br>
+                <a:r>
+                  <a:rPr lang="en-US" sz="2000" dirty="0" smtClean="0"/>
+                  <a:t>      using  formaldehyde</a:t>
+                </a:r>
+                <a:endParaRPr lang="en-US" sz="2000" dirty="0"/>
+              </a:p>
+            </p:txBody>
+          </p:sp>
+          <p:sp>
+            <p:nvSpPr>
+              <p:cNvPr id="113" name="TextBox 112"/>
+              <p:cNvSpPr txBox="1"/>
+              <p:nvPr/>
+            </p:nvSpPr>
+            <p:spPr>
+              <a:xfrm>
+                <a:off x="17616725" y="11763491"/>
+                <a:ext cx="9725804" cy="680289"/>
+              </a:xfrm>
+              <a:prstGeom prst="rect">
+                <a:avLst/>
+              </a:prstGeom>
+              <a:noFill/>
+            </p:spPr>
+            <p:txBody>
+              <a:bodyPr wrap="square" rtlCol="0">
+                <a:spAutoFit/>
+              </a:bodyPr>
+              <a:lstStyle/>
+              <a:p>
+                <a:r>
+                  <a:rPr lang="en-US" sz="2400" b="1" dirty="0" smtClean="0"/>
+                  <a:t>4. </a:t>
+                </a:r>
+                <a:r>
+                  <a:rPr lang="en-US" sz="2000" dirty="0" smtClean="0"/>
+                  <a:t>Reverse cross-linking, and PCR</a:t>
+                </a:r>
+                <a:endParaRPr lang="en-US" sz="2000" dirty="0"/>
+              </a:p>
+            </p:txBody>
+          </p:sp>
+        </p:grpSp>
+      </p:grpSp>
+      <p:sp>
+        <p:nvSpPr>
+          <p:cNvPr id="128" name="TextBox 127"/>
+          <p:cNvSpPr txBox="1"/>
+          <p:nvPr/>
+        </p:nvSpPr>
+        <p:spPr>
+          <a:xfrm>
+            <a:off x="539749" y="12433370"/>
+            <a:ext cx="4088743" cy="584775"/>
+          </a:xfrm>
+          <a:prstGeom prst="rect">
+            <a:avLst/>
+          </a:prstGeom>
+          <a:noFill/>
+        </p:spPr>
+        <p:txBody>
+          <a:bodyPr wrap="square" rtlCol="0">
+            <a:spAutoFit/>
+          </a:bodyPr>
+          <a:lstStyle/>
+          <a:p>
+            <a:r>
+              <a:rPr lang="en-US" sz="3200" dirty="0" smtClean="0"/>
+              <a:t>Figure 1</a:t>
+            </a:r>
+            <a:endParaRPr lang="en-US" sz="3200" dirty="0"/>
+          </a:p>
+        </p:txBody>
+      </p:sp>
+      <p:sp>
+        <p:nvSpPr>
+          <p:cNvPr id="129" name="TextBox 128"/>
+          <p:cNvSpPr txBox="1"/>
+          <p:nvPr/>
+        </p:nvSpPr>
+        <p:spPr>
+          <a:xfrm>
+            <a:off x="328411" y="13145123"/>
+            <a:ext cx="235612" cy="927818"/>
+          </a:xfrm>
+          <a:prstGeom prst="rect">
+            <a:avLst/>
+          </a:prstGeom>
+          <a:noFill/>
+        </p:spPr>
+        <p:txBody>
+          <a:bodyPr wrap="square" rtlCol="0">
+            <a:spAutoFit/>
+          </a:bodyPr>
+          <a:lstStyle/>
+          <a:p>
+            <a:r>
+              <a:rPr lang="en-US" dirty="0" smtClean="0"/>
+              <a:t>A</a:t>
+            </a:r>
+            <a:endParaRPr lang="en-US" dirty="0"/>
+          </a:p>
+        </p:txBody>
+      </p:sp>
+      <p:sp>
+        <p:nvSpPr>
+          <p:cNvPr id="130" name="TextBox 129"/>
+          <p:cNvSpPr txBox="1"/>
+          <p:nvPr/>
+        </p:nvSpPr>
+        <p:spPr>
+          <a:xfrm>
+            <a:off x="332420" y="16611750"/>
+            <a:ext cx="538191" cy="927818"/>
+          </a:xfrm>
+          <a:prstGeom prst="rect">
+            <a:avLst/>
+          </a:prstGeom>
+          <a:noFill/>
+        </p:spPr>
+        <p:txBody>
+          <a:bodyPr wrap="square" rtlCol="0">
+            <a:spAutoFit/>
+          </a:bodyPr>
+          <a:lstStyle/>
+          <a:p>
+            <a:r>
+              <a:rPr lang="en-US" dirty="0" smtClean="0"/>
+              <a:t>B</a:t>
+            </a:r>
+            <a:endParaRPr lang="en-US" dirty="0"/>
+          </a:p>
+        </p:txBody>
+      </p:sp>
+      <p:pic>
+        <p:nvPicPr>
+          <p:cNvPr id="131" name="Picture 130"/>
+          <p:cNvPicPr>
+            <a:picLocks noChangeAspect="1"/>
+          </p:cNvPicPr>
+          <p:nvPr/>
+        </p:nvPicPr>
+        <p:blipFill>
+          <a:blip r:embed="rId6" cstate="print">
+            <a:extLst>
+              <a:ext uri="{28A0092B-C50C-407E-A947-70E740481C1C}">
+                <a14:useLocalDpi xmlns:a14="http://schemas.microsoft.com/office/drawing/2010/main" val="0"/>
+              </a:ext>
+            </a:extLst>
+          </a:blip>
+          <a:stretch>
+            <a:fillRect/>
+          </a:stretch>
+        </p:blipFill>
+        <p:spPr>
+          <a:xfrm>
+            <a:off x="15569583" y="16301104"/>
+            <a:ext cx="6376017" cy="3648687"/>
+          </a:xfrm>
+          <a:prstGeom prst="rect">
+            <a:avLst/>
+          </a:prstGeom>
+        </p:spPr>
+      </p:pic>
     </p:spTree>
     <p:extLst>
       <p:ext uri="{BB962C8B-B14F-4D97-AF65-F5344CB8AC3E}">

</xml_diff>

<commit_message>
merge hope it works
</commit_message>
<xml_diff>
--- a/Documents/epigenetic workshop/Poster.pptx
+++ b/Documents/epigenetic workshop/Poster.pptx
@@ -243,7 +243,7 @@
           <a:p>
             <a:fld id="{00271780-4C30-459F-9B60-DDDABA3AB087}" type="datetimeFigureOut">
               <a:rPr lang="en-US" smtClean="0"/>
-              <a:t>3/12/2015</a:t>
+              <a:t>3/13/2015</a:t>
             </a:fld>
             <a:endParaRPr lang="en-US"/>
           </a:p>
@@ -413,7 +413,7 @@
           <a:p>
             <a:fld id="{00271780-4C30-459F-9B60-DDDABA3AB087}" type="datetimeFigureOut">
               <a:rPr lang="en-US" smtClean="0"/>
-              <a:t>3/12/2015</a:t>
+              <a:t>3/13/2015</a:t>
             </a:fld>
             <a:endParaRPr lang="en-US"/>
           </a:p>
@@ -593,7 +593,7 @@
           <a:p>
             <a:fld id="{00271780-4C30-459F-9B60-DDDABA3AB087}" type="datetimeFigureOut">
               <a:rPr lang="en-US" smtClean="0"/>
-              <a:t>3/12/2015</a:t>
+              <a:t>3/13/2015</a:t>
             </a:fld>
             <a:endParaRPr lang="en-US"/>
           </a:p>
@@ -763,7 +763,7 @@
           <a:p>
             <a:fld id="{00271780-4C30-459F-9B60-DDDABA3AB087}" type="datetimeFigureOut">
               <a:rPr lang="en-US" smtClean="0"/>
-              <a:t>3/12/2015</a:t>
+              <a:t>3/13/2015</a:t>
             </a:fld>
             <a:endParaRPr lang="en-US"/>
           </a:p>
@@ -1007,7 +1007,7 @@
           <a:p>
             <a:fld id="{00271780-4C30-459F-9B60-DDDABA3AB087}" type="datetimeFigureOut">
               <a:rPr lang="en-US" smtClean="0"/>
-              <a:t>3/12/2015</a:t>
+              <a:t>3/13/2015</a:t>
             </a:fld>
             <a:endParaRPr lang="en-US"/>
           </a:p>
@@ -1239,7 +1239,7 @@
           <a:p>
             <a:fld id="{00271780-4C30-459F-9B60-DDDABA3AB087}" type="datetimeFigureOut">
               <a:rPr lang="en-US" smtClean="0"/>
-              <a:t>3/12/2015</a:t>
+              <a:t>3/13/2015</a:t>
             </a:fld>
             <a:endParaRPr lang="en-US"/>
           </a:p>
@@ -1606,7 +1606,7 @@
           <a:p>
             <a:fld id="{00271780-4C30-459F-9B60-DDDABA3AB087}" type="datetimeFigureOut">
               <a:rPr lang="en-US" smtClean="0"/>
-              <a:t>3/12/2015</a:t>
+              <a:t>3/13/2015</a:t>
             </a:fld>
             <a:endParaRPr lang="en-US"/>
           </a:p>
@@ -1724,7 +1724,7 @@
           <a:p>
             <a:fld id="{00271780-4C30-459F-9B60-DDDABA3AB087}" type="datetimeFigureOut">
               <a:rPr lang="en-US" smtClean="0"/>
-              <a:t>3/12/2015</a:t>
+              <a:t>3/13/2015</a:t>
             </a:fld>
             <a:endParaRPr lang="en-US"/>
           </a:p>
@@ -1819,7 +1819,7 @@
           <a:p>
             <a:fld id="{00271780-4C30-459F-9B60-DDDABA3AB087}" type="datetimeFigureOut">
               <a:rPr lang="en-US" smtClean="0"/>
-              <a:t>3/12/2015</a:t>
+              <a:t>3/13/2015</a:t>
             </a:fld>
             <a:endParaRPr lang="en-US"/>
           </a:p>
@@ -2096,7 +2096,7 @@
           <a:p>
             <a:fld id="{00271780-4C30-459F-9B60-DDDABA3AB087}" type="datetimeFigureOut">
               <a:rPr lang="en-US" smtClean="0"/>
-              <a:t>3/12/2015</a:t>
+              <a:t>3/13/2015</a:t>
             </a:fld>
             <a:endParaRPr lang="en-US"/>
           </a:p>
@@ -2353,7 +2353,7 @@
           <a:p>
             <a:fld id="{00271780-4C30-459F-9B60-DDDABA3AB087}" type="datetimeFigureOut">
               <a:rPr lang="en-US" smtClean="0"/>
-              <a:t>3/12/2015</a:t>
+              <a:t>3/13/2015</a:t>
             </a:fld>
             <a:endParaRPr lang="en-US"/>
           </a:p>
@@ -2566,7 +2566,7 @@
           <a:p>
             <a:fld id="{00271780-4C30-459F-9B60-DDDABA3AB087}" type="datetimeFigureOut">
               <a:rPr lang="en-US" smtClean="0"/>
-              <a:t>3/12/2015</a:t>
+              <a:t>3/13/2015</a:t>
             </a:fld>
             <a:endParaRPr lang="en-US"/>
           </a:p>
@@ -2980,7 +2980,7 @@
         <p:spPr>
           <a:xfrm>
             <a:off x="23449935" y="2013369"/>
-            <a:ext cx="7503018" cy="13142059"/>
+            <a:ext cx="7503018" cy="11664732"/>
           </a:xfrm>
           <a:prstGeom prst="rect">
             <a:avLst/>
@@ -3111,26 +3111,12 @@
             </a:r>
             <a:r>
               <a:rPr lang="en-US" sz="2400" b="1" dirty="0" smtClean="0"/>
-              <a:t>8A.</a:t>
+              <a:t>8.</a:t>
             </a:r>
             <a:r>
               <a:rPr lang="en-US" sz="2400" dirty="0" smtClean="0"/>
-              <a:t>  A comparison between the simulated and experimental encounter probability and the simulated</a:t>
-            </a:r>
-            <a:endParaRPr lang="en-US" sz="2400" dirty="0" smtClean="0"/>
-          </a:p>
-          <a:p>
-            <a:r>
-              <a:rPr lang="en-US" sz="2400" dirty="0" smtClean="0"/>
-              <a:t>can be appreciated in</a:t>
-            </a:r>
-            <a:r>
-              <a:rPr lang="en-US" sz="2400" b="1" dirty="0" smtClean="0"/>
-              <a:t> Figure 8B</a:t>
-            </a:r>
-            <a:endParaRPr lang="en-US" sz="2400" b="1" dirty="0" smtClean="0"/>
-          </a:p>
-          <a:p>
+              <a:t> </a:t>
+            </a:r>
             <a:endParaRPr lang="en-US" sz="2400" b="1" dirty="0"/>
           </a:p>
         </p:txBody>
@@ -3301,7 +3287,7 @@
         <p:spPr>
           <a:xfrm>
             <a:off x="539750" y="2013369"/>
-            <a:ext cx="6780074" cy="14756347"/>
+            <a:ext cx="6780074" cy="14879458"/>
           </a:xfrm>
           <a:prstGeom prst="rect">
             <a:avLst/>
@@ -3333,6 +3319,13 @@
             <a:br>
               <a:rPr lang="en-US" sz="2400" dirty="0" smtClean="0"/>
             </a:br>
+            <a:endParaRPr lang="en-US" sz="2400" dirty="0" smtClean="0"/>
+          </a:p>
+          <a:p>
+            <a:pPr marL="457200" indent="-457200">
+              <a:buFont typeface="+mj-lt"/>
+              <a:buAutoNum type="arabicPeriod"/>
+            </a:pPr>
             <a:r>
               <a:rPr lang="en-US" sz="2400" dirty="0" smtClean="0"/>
               <a:t>Reconstruct </a:t>
@@ -3351,7 +3344,22 @@
             </a:r>
             <a:r>
               <a:rPr lang="en-US" sz="2400" dirty="0" smtClean="0"/>
-              <a:t>maps. Study the dynamic </a:t>
+              <a:t>maps. </a:t>
+            </a:r>
+            <a:endParaRPr lang="en-US" sz="2400" dirty="0"/>
+          </a:p>
+          <a:p>
+            <a:pPr marL="457200" indent="-457200">
+              <a:buFont typeface="+mj-lt"/>
+              <a:buAutoNum type="arabicPeriod"/>
+            </a:pPr>
+            <a:r>
+              <a:rPr lang="en-US" sz="2400" dirty="0" smtClean="0"/>
+              <a:t>Study </a:t>
+            </a:r>
+            <a:r>
+              <a:rPr lang="en-US" sz="2400" dirty="0" smtClean="0"/>
+              <a:t>the dynamic </a:t>
             </a:r>
             <a:r>
               <a:rPr lang="en-US" sz="2400" dirty="0"/>
@@ -3370,10 +3378,6 @@
             <a:endParaRPr lang="en-US" sz="2400" dirty="0"/>
           </a:p>
           <a:p>
-            <a:r>
-              <a:rPr lang="en-US" sz="4000" b="1" dirty="0" smtClean="0"/>
-              <a:t>Significance</a:t>
-            </a:r>
             <a:r>
               <a:rPr lang="en-US" sz="2400" dirty="0" smtClean="0"/>
               <a:t/>
@@ -3383,7 +3387,7 @@
             </a:br>
             <a:r>
               <a:rPr lang="en-US" sz="2400" dirty="0" smtClean="0"/>
-              <a:t>Providing </a:t>
+              <a:t>By Providing </a:t>
             </a:r>
             <a:r>
               <a:rPr lang="en-US" sz="2400" dirty="0"/>
@@ -3411,7 +3415,19 @@
             </a:r>
             <a:r>
               <a:rPr lang="en-US" sz="2400" dirty="0" smtClean="0"/>
-              <a:t>microstructure of the examined cells, allowing further mathematical analysis and simulation of the dynamics of a cross-linked polymer in various </a:t>
+              <a:t>microstructure of the examined cells, allowing </a:t>
+            </a:r>
+            <a:r>
+              <a:rPr lang="en-US" sz="2400" smtClean="0"/>
+              <a:t>further </a:t>
+            </a:r>
+            <a:r>
+              <a:rPr lang="en-US" sz="2400" smtClean="0"/>
+              <a:t>analysis </a:t>
+            </a:r>
+            <a:r>
+              <a:rPr lang="en-US" sz="2400" dirty="0" smtClean="0"/>
+              <a:t>and simulation of the dynamics of a cross-linked polymer in various </a:t>
             </a:r>
             <a:r>
               <a:rPr lang="en-US" sz="2400" dirty="0"/>
@@ -3496,11 +3512,7 @@
             </a:r>
             <a:r>
               <a:rPr lang="en-US" sz="2400" b="1" dirty="0" smtClean="0"/>
-              <a:t>Figure </a:t>
-            </a:r>
-            <a:r>
-              <a:rPr lang="en-US" sz="2400" b="1" dirty="0" smtClean="0"/>
-              <a:t>1B</a:t>
+              <a:t>Figure 1B</a:t>
             </a:r>
             <a:r>
               <a:rPr lang="en-US" sz="2400" dirty="0" smtClean="0"/>
@@ -3540,11 +3552,7 @@
           <a:p>
             <a:r>
               <a:rPr lang="en-US" sz="2400" dirty="0" smtClean="0"/>
-              <a:t>We </a:t>
-            </a:r>
-            <a:r>
-              <a:rPr lang="en-US" sz="2400" dirty="0" smtClean="0"/>
-              <a:t>use a </a:t>
+              <a:t>We use a </a:t>
             </a:r>
             <a:r>
               <a:rPr lang="en-US" sz="2400" dirty="0"/>
@@ -3577,8 +3585,8 @@
           </a:p>
         </p:txBody>
       </p:sp>
-      <mc:AlternateContent xmlns:mc="http://schemas.openxmlformats.org/markup-compatibility/2006">
-        <mc:Choice xmlns:a14="http://schemas.microsoft.com/office/drawing/2010/main" Requires="a14">
+      <mc:AlternateContent xmlns:mc="http://schemas.openxmlformats.org/markup-compatibility/2006" xmlns:a14="http://schemas.microsoft.com/office/drawing/2010/main">
+        <mc:Choice Requires="a14">
           <p:sp>
             <p:nvSpPr>
               <p:cNvPr id="11" name="TextBox 10"/>
@@ -3889,14 +3897,7 @@
                               <a:latin typeface="Cambria Math" panose="02040503050406030204" pitchFamily="18" charset="0"/>
                               <a:ea typeface="Cambria Math" panose="02040503050406030204" pitchFamily="18" charset="0"/>
                             </a:rPr>
-                            <m:t>=</m:t>
-                          </m:r>
-                          <m:r>
-                            <a:rPr lang="en-US" sz="2400" b="0" i="1" smtClean="0">
-                              <a:latin typeface="Cambria Math" panose="02040503050406030204" pitchFamily="18" charset="0"/>
-                              <a:ea typeface="Cambria Math" panose="02040503050406030204" pitchFamily="18" charset="0"/>
-                            </a:rPr>
-                            <m:t>1</m:t>
+                            <m:t>=1</m:t>
                           </m:r>
                         </m:sub>
                         <m:sup>
@@ -4128,13 +4129,7 @@
                       <a:rPr lang="en-US" sz="2400" b="0" i="1" smtClean="0">
                         <a:latin typeface="Cambria Math" panose="02040503050406030204" pitchFamily="18" charset="0"/>
                       </a:rPr>
-                      <m:t>=</m:t>
-                    </m:r>
-                    <m:r>
-                      <a:rPr lang="en-US" sz="2400" b="0" i="1" smtClean="0">
-                        <a:latin typeface="Cambria Math" panose="02040503050406030204" pitchFamily="18" charset="0"/>
-                      </a:rPr>
-                      <m:t>1</m:t>
+                      <m:t>=1</m:t>
                     </m:r>
                   </m:oMath>
                 </a14:m>
@@ -4847,19 +4842,7 @@
                           <a:rPr lang="en-US" sz="2400" i="1">
                             <a:latin typeface="Cambria Math" panose="02040503050406030204" pitchFamily="18" charset="0"/>
                           </a:rPr>
-                          <m:t>1</m:t>
-                        </m:r>
-                        <m:r>
-                          <a:rPr lang="en-US" sz="2400" i="1">
-                            <a:latin typeface="Cambria Math" panose="02040503050406030204" pitchFamily="18" charset="0"/>
-                          </a:rPr>
-                          <m:t>.</m:t>
-                        </m:r>
-                        <m:r>
-                          <a:rPr lang="en-US" sz="2400" i="1">
-                            <a:latin typeface="Cambria Math" panose="02040503050406030204" pitchFamily="18" charset="0"/>
-                          </a:rPr>
-                          <m:t>5</m:t>
+                          <m:t>1.5</m:t>
                         </m:r>
                       </m:sup>
                     </m:sSup>
@@ -5341,13 +5324,7 @@
                         <a:rPr lang="en-US" sz="2400" b="0" i="1" smtClean="0">
                           <a:latin typeface="Cambria Math" panose="02040503050406030204" pitchFamily="18" charset="0"/>
                         </a:rPr>
-                        <m:t>=</m:t>
-                      </m:r>
-                      <m:r>
-                        <a:rPr lang="en-US" sz="2400" b="0" i="1" smtClean="0">
-                          <a:latin typeface="Cambria Math" panose="02040503050406030204" pitchFamily="18" charset="0"/>
-                        </a:rPr>
-                        <m:t>  </m:t>
+                        <m:t>=  </m:t>
                       </m:r>
                       <m:sSup>
                         <m:sSupPr>
@@ -5496,19 +5473,7 @@
                             <a:rPr lang="en-US" sz="2400" b="0" i="1" smtClean="0">
                               <a:latin typeface="Cambria Math" panose="02040503050406030204" pitchFamily="18" charset="0"/>
                             </a:rPr>
-                            <m:t>1</m:t>
-                          </m:r>
-                          <m:r>
-                            <a:rPr lang="en-US" sz="2400" b="0" i="1" smtClean="0">
-                              <a:latin typeface="Cambria Math" panose="02040503050406030204" pitchFamily="18" charset="0"/>
-                            </a:rPr>
-                            <m:t>.</m:t>
-                          </m:r>
-                          <m:r>
-                            <a:rPr lang="en-US" sz="2400" b="0" i="1" smtClean="0">
-                              <a:latin typeface="Cambria Math" panose="02040503050406030204" pitchFamily="18" charset="0"/>
-                            </a:rPr>
-                            <m:t>5</m:t>
+                            <m:t>1.5</m:t>
                           </m:r>
                         </m:sup>
                       </m:sSup>
@@ -5915,7 +5880,7 @@
             </p:txBody>
           </p:sp>
         </mc:Choice>
-        <mc:Fallback>
+        <mc:Fallback xmlns="">
           <p:sp>
             <p:nvSpPr>
               <p:cNvPr id="11" name="TextBox 10"/>
@@ -9724,8 +9689,8 @@
           </p:txBody>
         </p:sp>
       </p:grpSp>
-      <mc:AlternateContent xmlns:mc="http://schemas.openxmlformats.org/markup-compatibility/2006">
-        <mc:Choice xmlns:a14="http://schemas.microsoft.com/office/drawing/2010/main" Requires="a14">
+      <mc:AlternateContent xmlns:mc="http://schemas.openxmlformats.org/markup-compatibility/2006" xmlns:a14="http://schemas.microsoft.com/office/drawing/2010/main">
+        <mc:Choice Requires="a14">
           <p:sp>
             <p:nvSpPr>
               <p:cNvPr id="16" name="TextBox 15"/>
@@ -9913,19 +9878,7 @@
                         <a:rPr lang="en-US" sz="2400" i="1">
                           <a:latin typeface="Cambria Math" panose="02040503050406030204" pitchFamily="18" charset="0"/>
                         </a:rPr>
-                        <m:t>,    </m:t>
-                      </m:r>
-                      <m:r>
-                        <a:rPr lang="en-US" sz="2400" i="1">
-                          <a:latin typeface="Cambria Math" panose="02040503050406030204" pitchFamily="18" charset="0"/>
-                        </a:rPr>
-                        <m:t>0</m:t>
-                      </m:r>
-                      <m:r>
-                        <a:rPr lang="en-US" sz="2400" i="1">
-                          <a:latin typeface="Cambria Math" panose="02040503050406030204" pitchFamily="18" charset="0"/>
-                        </a:rPr>
-                        <m:t>&lt;</m:t>
+                        <m:t>,    0&lt;</m:t>
                       </m:r>
                       <m:r>
                         <a:rPr lang="en-US" sz="2400" i="1">
@@ -9937,19 +9890,7 @@
                         <a:rPr lang="en-US" sz="2400" i="1">
                           <a:latin typeface="Cambria Math" panose="02040503050406030204" pitchFamily="18" charset="0"/>
                         </a:rPr>
-                        <m:t>&lt;</m:t>
-                      </m:r>
-                      <m:r>
-                        <a:rPr lang="en-US" sz="2400" i="1">
-                          <a:latin typeface="Cambria Math" panose="02040503050406030204" pitchFamily="18" charset="0"/>
-                        </a:rPr>
-                        <m:t>1</m:t>
-                      </m:r>
-                      <m:r>
-                        <a:rPr lang="en-US" sz="2400" i="1">
-                          <a:latin typeface="Cambria Math" panose="02040503050406030204" pitchFamily="18" charset="0"/>
-                        </a:rPr>
-                        <m:t>,  </m:t>
+                        <m:t>&lt;1,  </m:t>
                       </m:r>
                       <m:r>
                         <a:rPr lang="en-US" sz="2400" i="1">
@@ -9962,14 +9903,7 @@
                           <a:latin typeface="Cambria Math" panose="02040503050406030204" pitchFamily="18" charset="0"/>
                           <a:ea typeface="Cambria Math" panose="02040503050406030204" pitchFamily="18" charset="0"/>
                         </a:rPr>
-                        <m:t>≥</m:t>
-                      </m:r>
-                      <m:r>
-                        <a:rPr lang="en-US" sz="2400" i="1">
-                          <a:latin typeface="Cambria Math" panose="02040503050406030204" pitchFamily="18" charset="0"/>
-                          <a:ea typeface="Cambria Math" panose="02040503050406030204" pitchFamily="18" charset="0"/>
-                        </a:rPr>
-                        <m:t>0</m:t>
+                        <m:t>≥0</m:t>
                       </m:r>
                     </m:oMath>
                   </m:oMathPara>
@@ -10010,13 +9944,7 @@
                             <a:rPr lang="en-US" sz="2400" i="1">
                               <a:latin typeface="Cambria Math" panose="02040503050406030204" pitchFamily="18" charset="0"/>
                             </a:rPr>
-                            <m:t>0</m:t>
-                          </m:r>
-                          <m:r>
-                            <a:rPr lang="en-US" sz="2400" i="1">
-                              <a:latin typeface="Cambria Math" panose="02040503050406030204" pitchFamily="18" charset="0"/>
-                            </a:rPr>
-                            <m:t>,</m:t>
+                            <m:t>0,</m:t>
                           </m:r>
                           <m:r>
                             <a:rPr lang="en-US" sz="2400" i="1">
@@ -10051,13 +9979,7 @@
                             <a:rPr lang="en-US" sz="2400" i="1">
                               <a:latin typeface="Cambria Math" panose="02040503050406030204" pitchFamily="18" charset="0"/>
                             </a:rPr>
-                            <m:t>1</m:t>
-                          </m:r>
-                          <m:r>
-                            <a:rPr lang="en-US" sz="2400" i="1">
-                              <a:latin typeface="Cambria Math" panose="02040503050406030204" pitchFamily="18" charset="0"/>
-                            </a:rPr>
-                            <m:t>,</m:t>
+                            <m:t>1,</m:t>
                           </m:r>
                           <m:r>
                             <a:rPr lang="en-US" sz="2400" i="1">
@@ -10111,13 +10033,7 @@
                             <a:rPr lang="en-US" sz="2400" i="1">
                               <a:latin typeface="Cambria Math" panose="02040503050406030204" pitchFamily="18" charset="0"/>
                             </a:rPr>
-                            <m:t>0</m:t>
-                          </m:r>
-                          <m:r>
-                            <a:rPr lang="en-US" sz="2400" i="1">
-                              <a:latin typeface="Cambria Math" panose="02040503050406030204" pitchFamily="18" charset="0"/>
-                            </a:rPr>
-                            <m:t>,</m:t>
+                            <m:t>0,</m:t>
                           </m:r>
                           <m:r>
                             <a:rPr lang="en-US" sz="2400" i="1">
@@ -10162,14 +10078,7 @@
                               <a:latin typeface="Cambria Math" panose="02040503050406030204" pitchFamily="18" charset="0"/>
                               <a:ea typeface="Cambria Math" panose="02040503050406030204" pitchFamily="18" charset="0"/>
                             </a:rPr>
-                            <m:t>0</m:t>
-                          </m:r>
-                          <m:r>
-                            <a:rPr lang="en-US" sz="2400" i="1">
-                              <a:latin typeface="Cambria Math" panose="02040503050406030204" pitchFamily="18" charset="0"/>
-                              <a:ea typeface="Cambria Math" panose="02040503050406030204" pitchFamily="18" charset="0"/>
-                            </a:rPr>
-                            <m:t>,</m:t>
+                            <m:t>0,</m:t>
                           </m:r>
                           <m:r>
                             <a:rPr lang="en-US" sz="2400" i="1">
@@ -10185,14 +10094,7 @@
                           <a:latin typeface="Cambria Math" panose="02040503050406030204" pitchFamily="18" charset="0"/>
                           <a:ea typeface="Cambria Math" panose="02040503050406030204" pitchFamily="18" charset="0"/>
                         </a:rPr>
-                        <m:t>=</m:t>
-                      </m:r>
-                      <m:r>
-                        <a:rPr lang="en-US" sz="2400" i="1">
-                          <a:latin typeface="Cambria Math" panose="02040503050406030204" pitchFamily="18" charset="0"/>
-                          <a:ea typeface="Cambria Math" panose="02040503050406030204" pitchFamily="18" charset="0"/>
-                        </a:rPr>
-                        <m:t>0</m:t>
+                        <m:t>=0</m:t>
                       </m:r>
                       <m:r>
                         <a:rPr lang="en-US" sz="2400" b="0" i="1" smtClean="0">
@@ -10244,14 +10146,7 @@
                               <a:latin typeface="Cambria Math" panose="02040503050406030204" pitchFamily="18" charset="0"/>
                               <a:ea typeface="Cambria Math" panose="02040503050406030204" pitchFamily="18" charset="0"/>
                             </a:rPr>
-                            <m:t>,</m:t>
-                          </m:r>
-                          <m:r>
-                            <a:rPr lang="en-US" sz="2400" i="1">
-                              <a:latin typeface="Cambria Math" panose="02040503050406030204" pitchFamily="18" charset="0"/>
-                              <a:ea typeface="Cambria Math" panose="02040503050406030204" pitchFamily="18" charset="0"/>
-                            </a:rPr>
-                            <m:t>0</m:t>
+                            <m:t>,0</m:t>
                           </m:r>
                         </m:e>
                       </m:d>
@@ -10779,19 +10674,7 @@
                       <a:rPr lang="en-US" sz="2400" i="1">
                         <a:latin typeface="Cambria Math" panose="02040503050406030204" pitchFamily="18" charset="0"/>
                       </a:rPr>
-                      <m:t>(</m:t>
-                    </m:r>
-                    <m:r>
-                      <a:rPr lang="en-US" sz="2400" i="1">
-                        <a:latin typeface="Cambria Math" panose="02040503050406030204" pitchFamily="18" charset="0"/>
-                      </a:rPr>
-                      <m:t>1</m:t>
-                    </m:r>
-                    <m:r>
-                      <a:rPr lang="en-US" sz="2400" i="1">
-                        <a:latin typeface="Cambria Math" panose="02040503050406030204" pitchFamily="18" charset="0"/>
-                      </a:rPr>
-                      <m:t>)</m:t>
+                      <m:t>(1)</m:t>
                     </m:r>
                   </m:oMath>
                 </a14:m>
@@ -10941,19 +10824,7 @@
                                     <a:rPr lang="en-US" sz="2400" i="1">
                                       <a:latin typeface="Cambria Math" panose="02040503050406030204" pitchFamily="18" charset="0"/>
                                     </a:rPr>
-                                    <m:t>(</m:t>
-                                  </m:r>
-                                  <m:r>
-                                    <a:rPr lang="en-US" sz="2400" i="1">
-                                      <a:latin typeface="Cambria Math" panose="02040503050406030204" pitchFamily="18" charset="0"/>
-                                    </a:rPr>
-                                    <m:t>1</m:t>
-                                  </m:r>
-                                  <m:r>
-                                    <a:rPr lang="en-US" sz="2400" i="1">
-                                      <a:latin typeface="Cambria Math" panose="02040503050406030204" pitchFamily="18" charset="0"/>
-                                    </a:rPr>
-                                    <m:t>)</m:t>
+                                    <m:t>(1)</m:t>
                                   </m:r>
                                 </m:num>
                                 <m:den>
@@ -11016,19 +10887,7 @@
                             <a:rPr lang="en-US" sz="2400" i="1">
                               <a:latin typeface="Cambria Math" panose="02040503050406030204" pitchFamily="18" charset="0"/>
                             </a:rPr>
-                            <m:t>1</m:t>
-                          </m:r>
-                          <m:r>
-                            <a:rPr lang="en-US" sz="2400" i="1">
-                              <a:latin typeface="Cambria Math" panose="02040503050406030204" pitchFamily="18" charset="0"/>
-                            </a:rPr>
-                            <m:t>.</m:t>
-                          </m:r>
-                          <m:r>
-                            <a:rPr lang="en-US" sz="2400" i="1">
-                              <a:latin typeface="Cambria Math" panose="02040503050406030204" pitchFamily="18" charset="0"/>
-                            </a:rPr>
-                            <m:t>5</m:t>
+                            <m:t>1.5</m:t>
                           </m:r>
                         </m:sup>
                       </m:sSup>
@@ -11072,7 +10931,7 @@
             </p:txBody>
           </p:sp>
         </mc:Choice>
-        <mc:Fallback>
+        <mc:Fallback xmlns="">
           <p:sp>
             <p:nvSpPr>
               <p:cNvPr id="16" name="TextBox 15"/>
@@ -12481,19 +12340,7 @@
             </a:pPr>
             <a:r>
               <a:rPr lang="en-US" sz="2400" dirty="0" smtClean="0"/>
-              <a:t>We have developed a method to reconstruct the </a:t>
-            </a:r>
-            <a:r>
-              <a:rPr lang="en-US" sz="2400" dirty="0" smtClean="0"/>
-              <a:t>mean architecture </a:t>
-            </a:r>
-            <a:r>
-              <a:rPr lang="en-US" sz="2400" dirty="0" smtClean="0"/>
-              <a:t>of </a:t>
-            </a:r>
-            <a:r>
-              <a:rPr lang="en-US" sz="2400" dirty="0" smtClean="0"/>
-              <a:t>a polymer using </a:t>
+              <a:t>We have developed a method to reconstruct the mean architecture of a polymer using </a:t>
             </a:r>
             <a:r>
               <a:rPr lang="en-US" sz="2400" dirty="0" err="1" smtClean="0"/>
@@ -12510,19 +12357,7 @@
             </a:pPr>
             <a:r>
               <a:rPr lang="en-US" sz="2400" dirty="0" smtClean="0"/>
-              <a:t>Examination </a:t>
-            </a:r>
-            <a:r>
-              <a:rPr lang="en-US" sz="2400" dirty="0" smtClean="0"/>
-              <a:t>of the method </a:t>
-            </a:r>
-            <a:r>
-              <a:rPr lang="en-US" sz="2400" dirty="0" smtClean="0"/>
-              <a:t>shows </a:t>
-            </a:r>
-            <a:r>
-              <a:rPr lang="en-US" sz="2400" dirty="0" smtClean="0"/>
-              <a:t>excellent agreement </a:t>
+              <a:t>Examination of the method shows excellent agreement </a:t>
             </a:r>
             <a:r>
               <a:rPr lang="en-US" sz="2400" dirty="0"/>
@@ -12530,15 +12365,7 @@
             </a:r>
             <a:r>
               <a:rPr lang="en-US" sz="2400" dirty="0" smtClean="0"/>
-              <a:t>data, exemplifies </a:t>
-            </a:r>
-            <a:r>
-              <a:rPr lang="en-US" sz="2400" dirty="0" smtClean="0"/>
-              <a:t>the </a:t>
-            </a:r>
-            <a:r>
-              <a:rPr lang="en-US" sz="2400" dirty="0" smtClean="0"/>
-              <a:t>robustness of our method;</a:t>
+              <a:t>data, exemplifies the robustness of our method;</a:t>
             </a:r>
           </a:p>
           <a:p>
@@ -12555,21 +12382,8 @@
             </a:r>
             <a:r>
               <a:rPr lang="en-US" sz="2400" dirty="0" smtClean="0"/>
-              <a:t> data based on </a:t>
-            </a:r>
-            <a:r>
-              <a:rPr lang="en-US" sz="2400" dirty="0" smtClean="0"/>
-              <a:t>the underlying  </a:t>
-            </a:r>
-            <a:r>
-              <a:rPr lang="en-US" sz="2400" dirty="0" smtClean="0"/>
-              <a:t>assumption </a:t>
-            </a:r>
-            <a:r>
-              <a:rPr lang="en-US" sz="2400" dirty="0" smtClean="0"/>
-              <a:t>of a Rouse polymer.</a:t>
-            </a:r>
-            <a:endParaRPr lang="en-US" sz="2400" dirty="0" smtClean="0"/>
+              <a:t> data based on the underlying  assumption of a Rouse polymer.</a:t>
+            </a:r>
           </a:p>
           <a:p>
             <a:pPr marL="457200" indent="-457200">
@@ -12772,11 +12586,7 @@
             </a:r>
             <a:r>
               <a:rPr lang="en-US" sz="2400"/>
-              <a:t> 157.4 (2014): </a:t>
-            </a:r>
-            <a:r>
-              <a:rPr lang="en-US" sz="2400"/>
-              <a:t>950-963</a:t>
+              <a:t> 157.4 (2014): 950-963</a:t>
             </a:r>
             <a:r>
               <a:rPr lang="en-US" sz="2400" smtClean="0"/>

</xml_diff>